<commit_message>
updations 31 aug 2018
updations 31 aug 2018
</commit_message>
<xml_diff>
--- a/docs/ContributionGraphs.pptx
+++ b/docs/ContributionGraphs.pptx
@@ -14,6 +14,9 @@
     <p:sldId id="262" r:id="rId8"/>
     <p:sldId id="264" r:id="rId9"/>
     <p:sldId id="263" r:id="rId10"/>
+    <p:sldId id="265" r:id="rId11"/>
+    <p:sldId id="266" r:id="rId12"/>
+    <p:sldId id="267" r:id="rId13"/>
   </p:sldIdLst>
   <p:sldSz cx="12192000" cy="6858000"/>
   <p:notesSz cx="6858000" cy="9144000"/>
@@ -3153,12 +3156,12 @@
               </a:defRPr>
             </a:pPr>
             <a:r>
-              <a:rPr lang="en-IN" sz="4800">
+              <a:rPr lang="en-IN" sz="4800" dirty="0">
                 <a:solidFill>
                   <a:schemeClr val="tx1"/>
                 </a:solidFill>
               </a:rPr>
-              <a:t>% of Branch Contributed</a:t>
+              <a:t>% Contributed</a:t>
             </a:r>
           </a:p>
           <a:p>
@@ -3169,7 +3172,7 @@
                 </a:solidFill>
               </a:defRPr>
             </a:pPr>
-            <a:endParaRPr lang="en-IN" sz="4800">
+            <a:endParaRPr lang="en-IN" sz="4800" dirty="0">
               <a:solidFill>
                 <a:schemeClr val="tx1"/>
               </a:solidFill>
@@ -3181,8 +3184,8 @@
         <c:manualLayout>
           <c:xMode val="edge"/>
           <c:yMode val="edge"/>
-          <c:x val="0.16136851582519565"/>
-          <c:y val="0"/>
+          <c:x val="0.30110193485964559"/>
+          <c:y val="9.8966725049241793E-3"/>
         </c:manualLayout>
       </c:layout>
       <c:overlay val="1"/>
@@ -3849,7 +3852,15 @@
                   <a:sysClr val="windowText" lastClr="000000"/>
                 </a:solidFill>
               </a:rPr>
-              <a:t>Departwise Contribution</a:t>
+              <a:t>Departmentwise</a:t>
+            </a:r>
+            <a:r>
+              <a:rPr lang="en-IN" sz="4800" dirty="0">
+                <a:solidFill>
+                  <a:sysClr val="windowText" lastClr="000000"/>
+                </a:solidFill>
+              </a:rPr>
+              <a:t> Contribution</a:t>
             </a:r>
           </a:p>
         </c:rich>
@@ -4013,14 +4024,7 @@
           </c:dLbls>
           <c:cat>
             <c:strRef>
-              <c:extLst>
-                <c:ext xmlns:c15="http://schemas.microsoft.com/office/drawing/2012/chart" uri="{02D57815-91ED-43cb-92C2-25804820EDAC}">
-                  <c15:fullRef>
-                    <c15:sqref>'aug2018'!$C$6:$G$6</c15:sqref>
-                  </c15:fullRef>
-                </c:ext>
-              </c:extLst>
-              <c:f>'aug2018'!$G$6</c:f>
+              <c:f>'aug2018'!$C$6:$G$6</c:f>
               <c:strCache>
                 <c:ptCount val="1"/>
                 <c:pt idx="0">
@@ -4031,18 +4035,11 @@
           </c:cat>
           <c:val>
             <c:numRef>
-              <c:extLst>
-                <c:ext xmlns:c15="http://schemas.microsoft.com/office/drawing/2012/chart" uri="{02D57815-91ED-43cb-92C2-25804820EDAC}">
-                  <c15:fullRef>
-                    <c15:sqref>'aug2018'!$C$7:$G$7</c15:sqref>
-                  </c15:fullRef>
-                </c:ext>
-              </c:extLst>
-              <c:f>'aug2018'!$G$7</c:f>
+              <c:f>'aug2018'!$C$7:$G$7</c:f>
               <c:numCache>
-                <c:formatCode>General</c:formatCode>
+                <c:formatCode>_ "₹"\ * #,##0_ ;_ "₹"\ * \-#,##0_ ;_ "₹"\ * "-"??_ ;_ @_ </c:formatCode>
                 <c:ptCount val="1"/>
-                <c:pt idx="0" formatCode="_ &quot;₹&quot;\ * #,##0_ ;_ &quot;₹&quot;\ * \-#,##0_ ;_ &quot;₹&quot;\ * &quot;-&quot;??_ ;_ @_ ">
+                <c:pt idx="0">
                   <c:v>60000</c:v>
                 </c:pt>
               </c:numCache>
@@ -4167,14 +4164,7 @@
           </c:dLbls>
           <c:cat>
             <c:strRef>
-              <c:extLst>
-                <c:ext xmlns:c15="http://schemas.microsoft.com/office/drawing/2012/chart" uri="{02D57815-91ED-43cb-92C2-25804820EDAC}">
-                  <c15:fullRef>
-                    <c15:sqref>'aug2018'!$C$6:$G$6</c15:sqref>
-                  </c15:fullRef>
-                </c:ext>
-              </c:extLst>
-              <c:f>'aug2018'!$G$6</c:f>
+              <c:f>'aug2018'!$C$6:$G$6</c:f>
               <c:strCache>
                 <c:ptCount val="1"/>
                 <c:pt idx="0">
@@ -4185,18 +4175,11 @@
           </c:cat>
           <c:val>
             <c:numRef>
-              <c:extLst>
-                <c:ext xmlns:c15="http://schemas.microsoft.com/office/drawing/2012/chart" uri="{02D57815-91ED-43cb-92C2-25804820EDAC}">
-                  <c15:fullRef>
-                    <c15:sqref>'aug2018'!$C$12:$G$12</c15:sqref>
-                  </c15:fullRef>
-                </c:ext>
-              </c:extLst>
-              <c:f>'aug2018'!$G$12</c:f>
+              <c:f>'aug2018'!$C$12:$G$12</c:f>
               <c:numCache>
-                <c:formatCode>General</c:formatCode>
+                <c:formatCode>_ "₹"\ * #,##0_ ;_ "₹"\ * \-#,##0_ ;_ "₹"\ * "-"??_ ;_ @_ </c:formatCode>
                 <c:ptCount val="1"/>
-                <c:pt idx="0" formatCode="_ &quot;₹&quot;\ * #,##0_ ;_ &quot;₹&quot;\ * \-#,##0_ ;_ &quot;₹&quot;\ * &quot;-&quot;??_ ;_ @_ ">
+                <c:pt idx="0">
                   <c:v>35000</c:v>
                 </c:pt>
               </c:numCache>
@@ -4324,14 +4307,7 @@
           </c:dLbls>
           <c:cat>
             <c:strRef>
-              <c:extLst>
-                <c:ext xmlns:c15="http://schemas.microsoft.com/office/drawing/2012/chart" uri="{02D57815-91ED-43cb-92C2-25804820EDAC}">
-                  <c15:fullRef>
-                    <c15:sqref>'aug2018'!$C$6:$G$6</c15:sqref>
-                  </c15:fullRef>
-                </c:ext>
-              </c:extLst>
-              <c:f>'aug2018'!$G$6</c:f>
+              <c:f>'aug2018'!$C$6:$G$6</c:f>
               <c:strCache>
                 <c:ptCount val="1"/>
                 <c:pt idx="0">
@@ -4342,18 +4318,11 @@
           </c:cat>
           <c:val>
             <c:numRef>
-              <c:extLst>
-                <c:ext xmlns:c15="http://schemas.microsoft.com/office/drawing/2012/chart" uri="{02D57815-91ED-43cb-92C2-25804820EDAC}">
-                  <c15:fullRef>
-                    <c15:sqref>'aug2018'!$C$13:$G$13</c15:sqref>
-                  </c15:fullRef>
-                </c:ext>
-              </c:extLst>
-              <c:f>'aug2018'!$G$13</c:f>
+              <c:f>'aug2018'!$C$13:$G$13</c:f>
               <c:numCache>
-                <c:formatCode>General</c:formatCode>
+                <c:formatCode>_ "₹"\ * #,##0_ ;_ "₹"\ * \-#,##0_ ;_ "₹"\ * "-"??_ ;_ @_ </c:formatCode>
                 <c:ptCount val="1"/>
-                <c:pt idx="0" formatCode="_ &quot;₹&quot;\ * #,##0_ ;_ &quot;₹&quot;\ * \-#,##0_ ;_ &quot;₹&quot;\ * &quot;-&quot;??_ ;_ @_ ">
+                <c:pt idx="0">
                   <c:v>55000</c:v>
                 </c:pt>
               </c:numCache>
@@ -4481,14 +4450,7 @@
           </c:dLbls>
           <c:cat>
             <c:strRef>
-              <c:extLst>
-                <c:ext xmlns:c15="http://schemas.microsoft.com/office/drawing/2012/chart" uri="{02D57815-91ED-43cb-92C2-25804820EDAC}">
-                  <c15:fullRef>
-                    <c15:sqref>'aug2018'!$C$6:$G$6</c15:sqref>
-                  </c15:fullRef>
-                </c:ext>
-              </c:extLst>
-              <c:f>'aug2018'!$G$6</c:f>
+              <c:f>'aug2018'!$C$6:$G$6</c:f>
               <c:strCache>
                 <c:ptCount val="1"/>
                 <c:pt idx="0">
@@ -4499,18 +4461,11 @@
           </c:cat>
           <c:val>
             <c:numRef>
-              <c:extLst>
-                <c:ext xmlns:c15="http://schemas.microsoft.com/office/drawing/2012/chart" uri="{02D57815-91ED-43cb-92C2-25804820EDAC}">
-                  <c15:fullRef>
-                    <c15:sqref>'aug2018'!$C$14:$G$14</c15:sqref>
-                  </c15:fullRef>
-                </c:ext>
-              </c:extLst>
-              <c:f>'aug2018'!$G$14</c:f>
+              <c:f>'aug2018'!$C$14:$G$14</c:f>
               <c:numCache>
-                <c:formatCode>General</c:formatCode>
+                <c:formatCode>_ "₹"\ * #,##0_ ;_ "₹"\ * \-#,##0_ ;_ "₹"\ * "-"??_ ;_ @_ </c:formatCode>
                 <c:ptCount val="1"/>
-                <c:pt idx="0" formatCode="_ &quot;₹&quot;\ * #,##0_ ;_ &quot;₹&quot;\ * \-#,##0_ ;_ &quot;₹&quot;\ * &quot;-&quot;??_ ;_ @_ ">
+                <c:pt idx="0">
                   <c:v>38307</c:v>
                 </c:pt>
               </c:numCache>
@@ -4638,14 +4593,7 @@
           </c:dLbls>
           <c:cat>
             <c:strRef>
-              <c:extLst>
-                <c:ext xmlns:c15="http://schemas.microsoft.com/office/drawing/2012/chart" uri="{02D57815-91ED-43cb-92C2-25804820EDAC}">
-                  <c15:fullRef>
-                    <c15:sqref>'aug2018'!$C$6:$G$6</c15:sqref>
-                  </c15:fullRef>
-                </c:ext>
-              </c:extLst>
-              <c:f>'aug2018'!$G$6</c:f>
+              <c:f>'aug2018'!$C$6:$G$6</c:f>
               <c:strCache>
                 <c:ptCount val="1"/>
                 <c:pt idx="0">
@@ -4656,18 +4604,11 @@
           </c:cat>
           <c:val>
             <c:numRef>
-              <c:extLst>
-                <c:ext xmlns:c15="http://schemas.microsoft.com/office/drawing/2012/chart" uri="{02D57815-91ED-43cb-92C2-25804820EDAC}">
-                  <c15:fullRef>
-                    <c15:sqref>'aug2018'!$C$15:$G$15</c15:sqref>
-                  </c15:fullRef>
-                </c:ext>
-              </c:extLst>
-              <c:f>'aug2018'!$G$15</c:f>
+              <c:f>'aug2018'!$C$15:$G$15</c:f>
               <c:numCache>
-                <c:formatCode>General</c:formatCode>
+                <c:formatCode>_ "₹"\ * #,##0_ ;_ "₹"\ * \-#,##0_ ;_ "₹"\ * "-"??_ ;_ @_ </c:formatCode>
                 <c:ptCount val="1"/>
-                <c:pt idx="0" formatCode="_ &quot;₹&quot;\ * #,##0_ ;_ &quot;₹&quot;\ * \-#,##0_ ;_ &quot;₹&quot;\ * &quot;-&quot;??_ ;_ @_ ">
+                <c:pt idx="0">
                   <c:v>20000</c:v>
                 </c:pt>
               </c:numCache>
@@ -4792,14 +4733,7 @@
           </c:dLbls>
           <c:cat>
             <c:strRef>
-              <c:extLst>
-                <c:ext xmlns:c15="http://schemas.microsoft.com/office/drawing/2012/chart" uri="{02D57815-91ED-43cb-92C2-25804820EDAC}">
-                  <c15:fullRef>
-                    <c15:sqref>'aug2018'!$C$6:$G$6</c15:sqref>
-                  </c15:fullRef>
-                </c:ext>
-              </c:extLst>
-              <c:f>'aug2018'!$G$6</c:f>
+              <c:f>'aug2018'!$C$6:$G$6</c:f>
               <c:strCache>
                 <c:ptCount val="1"/>
                 <c:pt idx="0">
@@ -4810,18 +4744,11 @@
           </c:cat>
           <c:val>
             <c:numRef>
-              <c:extLst>
-                <c:ext xmlns:c15="http://schemas.microsoft.com/office/drawing/2012/chart" uri="{02D57815-91ED-43cb-92C2-25804820EDAC}">
-                  <c15:fullRef>
-                    <c15:sqref>'aug2018'!$C$8:$G$8</c15:sqref>
-                  </c15:fullRef>
-                </c:ext>
-              </c:extLst>
-              <c:f>'aug2018'!$G$8</c:f>
+              <c:f>'aug2018'!$C$8:$G$8</c:f>
               <c:numCache>
-                <c:formatCode>General</c:formatCode>
+                <c:formatCode>_ "₹"\ * #,##0_ ;_ "₹"\ * \-#,##0_ ;_ "₹"\ * "-"??_ ;_ @_ </c:formatCode>
                 <c:ptCount val="1"/>
-                <c:pt idx="0" formatCode="_ &quot;₹&quot;\ * #,##0_ ;_ &quot;₹&quot;\ * \-#,##0_ ;_ &quot;₹&quot;\ * &quot;-&quot;??_ ;_ @_ ">
+                <c:pt idx="0">
                   <c:v>677000</c:v>
                 </c:pt>
               </c:numCache>
@@ -4946,14 +4873,7 @@
           </c:dLbls>
           <c:cat>
             <c:strRef>
-              <c:extLst>
-                <c:ext xmlns:c15="http://schemas.microsoft.com/office/drawing/2012/chart" uri="{02D57815-91ED-43cb-92C2-25804820EDAC}">
-                  <c15:fullRef>
-                    <c15:sqref>'aug2018'!$C$6:$G$6</c15:sqref>
-                  </c15:fullRef>
-                </c:ext>
-              </c:extLst>
-              <c:f>'aug2018'!$G$6</c:f>
+              <c:f>'aug2018'!$C$6:$G$6</c:f>
               <c:strCache>
                 <c:ptCount val="1"/>
                 <c:pt idx="0">
@@ -4964,18 +4884,11 @@
           </c:cat>
           <c:val>
             <c:numRef>
-              <c:extLst>
-                <c:ext xmlns:c15="http://schemas.microsoft.com/office/drawing/2012/chart" uri="{02D57815-91ED-43cb-92C2-25804820EDAC}">
-                  <c15:fullRef>
-                    <c15:sqref>'aug2018'!$C$9:$G$9</c15:sqref>
-                  </c15:fullRef>
-                </c:ext>
-              </c:extLst>
-              <c:f>'aug2018'!$G$9</c:f>
+              <c:f>'aug2018'!$C$9:$G$9</c:f>
               <c:numCache>
-                <c:formatCode>General</c:formatCode>
+                <c:formatCode>_ "₹"\ * #,##0_ ;_ "₹"\ * \-#,##0_ ;_ "₹"\ * "-"??_ ;_ @_ </c:formatCode>
                 <c:ptCount val="1"/>
-                <c:pt idx="0" formatCode="_ &quot;₹&quot;\ * #,##0_ ;_ &quot;₹&quot;\ * \-#,##0_ ;_ &quot;₹&quot;\ * &quot;-&quot;??_ ;_ @_ ">
+                <c:pt idx="0">
                   <c:v>471001</c:v>
                 </c:pt>
               </c:numCache>
@@ -5100,14 +5013,7 @@
           </c:dLbls>
           <c:cat>
             <c:strRef>
-              <c:extLst>
-                <c:ext xmlns:c15="http://schemas.microsoft.com/office/drawing/2012/chart" uri="{02D57815-91ED-43cb-92C2-25804820EDAC}">
-                  <c15:fullRef>
-                    <c15:sqref>'aug2018'!$C$6:$G$6</c15:sqref>
-                  </c15:fullRef>
-                </c:ext>
-              </c:extLst>
-              <c:f>'aug2018'!$G$6</c:f>
+              <c:f>'aug2018'!$C$6:$G$6</c:f>
               <c:strCache>
                 <c:ptCount val="1"/>
                 <c:pt idx="0">
@@ -5118,18 +5024,11 @@
           </c:cat>
           <c:val>
             <c:numRef>
-              <c:extLst>
-                <c:ext xmlns:c15="http://schemas.microsoft.com/office/drawing/2012/chart" uri="{02D57815-91ED-43cb-92C2-25804820EDAC}">
-                  <c15:fullRef>
-                    <c15:sqref>'aug2018'!$C$10:$G$10</c15:sqref>
-                  </c15:fullRef>
-                </c:ext>
-              </c:extLst>
-              <c:f>'aug2018'!$G$10</c:f>
+              <c:f>'aug2018'!$C$10:$G$10</c:f>
               <c:numCache>
-                <c:formatCode>General</c:formatCode>
+                <c:formatCode>_ "₹"\ * #,##0_ ;_ "₹"\ * \-#,##0_ ;_ "₹"\ * "-"??_ ;_ @_ </c:formatCode>
                 <c:ptCount val="1"/>
-                <c:pt idx="0" formatCode="_ &quot;₹&quot;\ * #,##0_ ;_ &quot;₹&quot;\ * \-#,##0_ ;_ &quot;₹&quot;\ * &quot;-&quot;??_ ;_ @_ ">
+                <c:pt idx="0">
                   <c:v>340000</c:v>
                 </c:pt>
               </c:numCache>
@@ -5254,14 +5153,7 @@
           </c:dLbls>
           <c:cat>
             <c:strRef>
-              <c:extLst>
-                <c:ext xmlns:c15="http://schemas.microsoft.com/office/drawing/2012/chart" uri="{02D57815-91ED-43cb-92C2-25804820EDAC}">
-                  <c15:fullRef>
-                    <c15:sqref>'aug2018'!$C$6:$G$6</c15:sqref>
-                  </c15:fullRef>
-                </c:ext>
-              </c:extLst>
-              <c:f>'aug2018'!$G$6</c:f>
+              <c:f>'aug2018'!$C$6:$G$6</c:f>
               <c:strCache>
                 <c:ptCount val="1"/>
                 <c:pt idx="0">
@@ -5272,18 +5164,11 @@
           </c:cat>
           <c:val>
             <c:numRef>
-              <c:extLst>
-                <c:ext xmlns:c15="http://schemas.microsoft.com/office/drawing/2012/chart" uri="{02D57815-91ED-43cb-92C2-25804820EDAC}">
-                  <c15:fullRef>
-                    <c15:sqref>'aug2018'!$C$11:$G$11</c15:sqref>
-                  </c15:fullRef>
-                </c:ext>
-              </c:extLst>
-              <c:f>'aug2018'!$G$11</c:f>
+              <c:f>'aug2018'!$C$11:$G$11</c:f>
               <c:numCache>
-                <c:formatCode>General</c:formatCode>
+                <c:formatCode>_ "₹"\ * #,##0_ ;_ "₹"\ * \-#,##0_ ;_ "₹"\ * "-"??_ ;_ @_ </c:formatCode>
                 <c:ptCount val="1"/>
-                <c:pt idx="0" formatCode="_ &quot;₹&quot;\ * #,##0_ ;_ &quot;₹&quot;\ * \-#,##0_ ;_ &quot;₹&quot;\ * &quot;-&quot;??_ ;_ @_ ">
+                <c:pt idx="0">
                   <c:v>436003</c:v>
                 </c:pt>
               </c:numCache>
@@ -5348,7 +5233,7 @@
             <a:effectLst/>
           </c:spPr>
         </c:majorGridlines>
-        <c:numFmt formatCode="0%" sourceLinked="1"/>
+        <c:numFmt formatCode="_ &quot;₹&quot;\ * #,##0_ ;_ &quot;₹&quot;\ * \-#,##0_ ;_ &quot;₹&quot;\ * &quot;-&quot;??_ ;_ @_ " sourceLinked="1"/>
         <c:majorTickMark val="none"/>
         <c:minorTickMark val="none"/>
         <c:tickLblPos val="nextTo"/>
@@ -5420,6 +5305,1773 @@
     <a:noFill/>
     <a:ln>
       <a:noFill/>
+    </a:ln>
+    <a:effectLst/>
+  </c:spPr>
+  <c:txPr>
+    <a:bodyPr/>
+    <a:lstStyle/>
+    <a:p>
+      <a:pPr>
+        <a:defRPr/>
+      </a:pPr>
+      <a:endParaRPr lang="en-US"/>
+    </a:p>
+  </c:txPr>
+  <c:externalData r:id="rId3">
+    <c:autoUpdate val="0"/>
+  </c:externalData>
+</c:chartSpace>
+</file>
+
+<file path=ppt/charts/chart7.xml><?xml version="1.0" encoding="utf-8"?>
+<c:chartSpace xmlns:c="http://schemas.openxmlformats.org/drawingml/2006/chart" xmlns:a="http://schemas.openxmlformats.org/drawingml/2006/main" xmlns:r="http://schemas.openxmlformats.org/officeDocument/2006/relationships" xmlns:c16r2="http://schemas.microsoft.com/office/drawing/2015/06/chart">
+  <c:date1904 val="0"/>
+  <c:lang val="en-US"/>
+  <c:roundedCorners val="0"/>
+  <mc:AlternateContent xmlns:mc="http://schemas.openxmlformats.org/markup-compatibility/2006">
+    <mc:Choice xmlns:c14="http://schemas.microsoft.com/office/drawing/2007/8/2/chart" Requires="c14">
+      <c14:style val="102"/>
+    </mc:Choice>
+    <mc:Fallback>
+      <c:style val="2"/>
+    </mc:Fallback>
+  </mc:AlternateContent>
+  <c:chart>
+    <c:title>
+      <c:tx>
+        <c:rich>
+          <a:bodyPr rot="0" spcFirstLastPara="1" vertOverflow="ellipsis" vert="horz" wrap="square" anchor="ctr" anchorCtr="1"/>
+          <a:lstStyle/>
+          <a:p>
+            <a:pPr>
+              <a:defRPr sz="4400" b="0" i="0" u="none" strike="noStrike" kern="1200" spc="-1" baseline="0">
+                <a:solidFill>
+                  <a:srgbClr val="000000"/>
+                </a:solidFill>
+                <a:latin typeface="Arial"/>
+                <a:ea typeface="+mn-ea"/>
+                <a:cs typeface="+mn-cs"/>
+              </a:defRPr>
+            </a:pPr>
+            <a:r>
+              <a:rPr lang="en-IN" sz="4400" b="0" strike="noStrike" spc="-1" dirty="0">
+                <a:solidFill>
+                  <a:srgbClr val="000000"/>
+                </a:solidFill>
+                <a:latin typeface="Arial"/>
+              </a:rPr>
+              <a:t>AY 2018-19 Sponsorship</a:t>
+            </a:r>
+          </a:p>
+        </c:rich>
+      </c:tx>
+      <c:layout>
+        <c:manualLayout>
+          <c:xMode val="edge"/>
+          <c:yMode val="edge"/>
+          <c:x val="0.30129569319017629"/>
+          <c:y val="1.4128352185969164E-2"/>
+        </c:manualLayout>
+      </c:layout>
+      <c:overlay val="0"/>
+      <c:spPr>
+        <a:noFill/>
+        <a:ln>
+          <a:noFill/>
+        </a:ln>
+        <a:effectLst/>
+      </c:spPr>
+      <c:txPr>
+        <a:bodyPr rot="0" spcFirstLastPara="1" vertOverflow="ellipsis" vert="horz" wrap="square" anchor="ctr" anchorCtr="1"/>
+        <a:lstStyle/>
+        <a:p>
+          <a:pPr>
+            <a:defRPr sz="4400" b="0" i="0" u="none" strike="noStrike" kern="1200" spc="-1" baseline="0">
+              <a:solidFill>
+                <a:srgbClr val="000000"/>
+              </a:solidFill>
+              <a:latin typeface="Arial"/>
+              <a:ea typeface="+mn-ea"/>
+              <a:cs typeface="+mn-cs"/>
+            </a:defRPr>
+          </a:pPr>
+          <a:endParaRPr lang="en-US"/>
+        </a:p>
+      </c:txPr>
+    </c:title>
+    <c:autoTitleDeleted val="0"/>
+    <c:view3D>
+      <c:rotX val="30"/>
+      <c:rotY val="0"/>
+      <c:rAngAx val="0"/>
+      <c:perspective val="10"/>
+    </c:view3D>
+    <c:floor>
+      <c:thickness val="0"/>
+      <c:spPr>
+        <a:solidFill>
+          <a:srgbClr val="D9D9D9"/>
+        </a:solidFill>
+        <a:ln w="6350" cap="flat" cmpd="sng" algn="ctr">
+          <a:noFill/>
+          <a:prstDash val="solid"/>
+          <a:round/>
+        </a:ln>
+        <a:effectLst/>
+        <a:sp3d/>
+      </c:spPr>
+    </c:floor>
+    <c:sideWall>
+      <c:thickness val="0"/>
+      <c:spPr>
+        <a:noFill/>
+        <a:ln>
+          <a:noFill/>
+        </a:ln>
+        <a:effectLst/>
+        <a:sp3d/>
+      </c:spPr>
+    </c:sideWall>
+    <c:backWall>
+      <c:thickness val="0"/>
+      <c:spPr>
+        <a:solidFill>
+          <a:srgbClr val="D9D9D9"/>
+        </a:solidFill>
+        <a:ln>
+          <a:noFill/>
+        </a:ln>
+        <a:effectLst/>
+        <a:sp3d/>
+      </c:spPr>
+    </c:backWall>
+    <c:plotArea>
+      <c:layout/>
+      <c:pie3DChart>
+        <c:varyColors val="1"/>
+        <c:ser>
+          <c:idx val="0"/>
+          <c:order val="0"/>
+          <c:tx>
+            <c:strRef>
+              <c:f>label 0</c:f>
+              <c:strCache>
+                <c:ptCount val="1"/>
+                <c:pt idx="0">
+                  <c:v>Column K</c:v>
+                </c:pt>
+              </c:strCache>
+            </c:strRef>
+          </c:tx>
+          <c:dPt>
+            <c:idx val="0"/>
+            <c:bubble3D val="0"/>
+            <c:spPr>
+              <a:solidFill>
+                <a:schemeClr val="accent2"/>
+              </a:solidFill>
+              <a:ln>
+                <a:noFill/>
+              </a:ln>
+              <a:effectLst/>
+              <a:sp3d/>
+            </c:spPr>
+            <c:extLst>
+              <c:ext xmlns:c16="http://schemas.microsoft.com/office/drawing/2014/chart" uri="{C3380CC4-5D6E-409C-BE32-E72D297353CC}">
+                <c16:uniqueId val="{00000001-1001-4C1B-A81F-412E6B99DAB3}"/>
+              </c:ext>
+            </c:extLst>
+          </c:dPt>
+          <c:dPt>
+            <c:idx val="1"/>
+            <c:bubble3D val="0"/>
+            <c:spPr>
+              <a:solidFill>
+                <a:schemeClr val="accent4"/>
+              </a:solidFill>
+              <a:ln>
+                <a:noFill/>
+              </a:ln>
+              <a:effectLst/>
+              <a:sp3d/>
+            </c:spPr>
+            <c:extLst>
+              <c:ext xmlns:c16="http://schemas.microsoft.com/office/drawing/2014/chart" uri="{C3380CC4-5D6E-409C-BE32-E72D297353CC}">
+                <c16:uniqueId val="{00000003-1001-4C1B-A81F-412E6B99DAB3}"/>
+              </c:ext>
+            </c:extLst>
+          </c:dPt>
+          <c:dPt>
+            <c:idx val="2"/>
+            <c:bubble3D val="0"/>
+            <c:spPr>
+              <a:solidFill>
+                <a:schemeClr val="accent6"/>
+              </a:solidFill>
+              <a:ln>
+                <a:noFill/>
+              </a:ln>
+              <a:effectLst/>
+              <a:sp3d/>
+            </c:spPr>
+            <c:extLst>
+              <c:ext xmlns:c16="http://schemas.microsoft.com/office/drawing/2014/chart" uri="{C3380CC4-5D6E-409C-BE32-E72D297353CC}">
+                <c16:uniqueId val="{00000005-1001-4C1B-A81F-412E6B99DAB3}"/>
+              </c:ext>
+            </c:extLst>
+          </c:dPt>
+          <c:dLbls>
+            <c:dLbl>
+              <c:idx val="0"/>
+              <c:layout>
+                <c:manualLayout>
+                  <c:x val="-9.3951480473195917E-3"/>
+                  <c:y val="2.1008176326920854E-3"/>
+                </c:manualLayout>
+              </c:layout>
+              <c:spPr>
+                <a:solidFill>
+                  <a:prstClr val="white"/>
+                </a:solidFill>
+                <a:ln>
+                  <a:solidFill>
+                    <a:prstClr val="black">
+                      <a:lumMod val="65000"/>
+                      <a:lumOff val="35000"/>
+                    </a:prstClr>
+                  </a:solidFill>
+                </a:ln>
+                <a:effectLst/>
+              </c:spPr>
+              <c:txPr>
+                <a:bodyPr rot="0" spcFirstLastPara="1" vertOverflow="ellipsis" vert="horz" wrap="square" lIns="38100" tIns="19050" rIns="38100" bIns="19050" anchor="ctr" anchorCtr="1">
+                  <a:spAutoFit/>
+                </a:bodyPr>
+                <a:lstStyle/>
+                <a:p>
+                  <a:pPr>
+                    <a:defRPr sz="3600" b="1" i="0" u="none" strike="noStrike" kern="1200" baseline="0">
+                      <a:solidFill>
+                        <a:schemeClr val="dk1"/>
+                      </a:solidFill>
+                      <a:latin typeface="+mn-lt"/>
+                      <a:ea typeface="+mn-ea"/>
+                      <a:cs typeface="+mn-cs"/>
+                    </a:defRPr>
+                  </a:pPr>
+                  <a:endParaRPr lang="en-US"/>
+                </a:p>
+              </c:txPr>
+              <c:dLblPos val="bestFit"/>
+              <c:showLegendKey val="0"/>
+              <c:showVal val="0"/>
+              <c:showCatName val="1"/>
+              <c:showSerName val="0"/>
+              <c:showPercent val="1"/>
+              <c:showBubbleSize val="0"/>
+              <c:extLst>
+                <c:ext xmlns:c15="http://schemas.microsoft.com/office/drawing/2012/chart" uri="{CE6537A1-D6FC-4f65-9D91-7224C49458BB}">
+                  <c15:spPr xmlns:c15="http://schemas.microsoft.com/office/drawing/2012/chart">
+                    <a:prstGeom prst="wedgeRectCallout">
+                      <a:avLst/>
+                    </a:prstGeom>
+                    <a:noFill/>
+                    <a:ln>
+                      <a:noFill/>
+                    </a:ln>
+                  </c15:spPr>
+                </c:ext>
+                <c:ext xmlns:c16="http://schemas.microsoft.com/office/drawing/2014/chart" uri="{C3380CC4-5D6E-409C-BE32-E72D297353CC}">
+                  <c16:uniqueId val="{00000001-1001-4C1B-A81F-412E6B99DAB3}"/>
+                </c:ext>
+              </c:extLst>
+            </c:dLbl>
+            <c:dLbl>
+              <c:idx val="1"/>
+              <c:layout>
+                <c:manualLayout>
+                  <c:x val="4.3362355179490231E-8"/>
+                  <c:y val="7.4083739013577204E-2"/>
+                </c:manualLayout>
+              </c:layout>
+              <c:spPr>
+                <a:solidFill>
+                  <a:prstClr val="white"/>
+                </a:solidFill>
+                <a:ln>
+                  <a:solidFill>
+                    <a:prstClr val="black">
+                      <a:lumMod val="65000"/>
+                      <a:lumOff val="35000"/>
+                    </a:prstClr>
+                  </a:solidFill>
+                </a:ln>
+                <a:effectLst/>
+              </c:spPr>
+              <c:txPr>
+                <a:bodyPr rot="0" spcFirstLastPara="1" vertOverflow="ellipsis" vert="horz" wrap="square" lIns="38100" tIns="19050" rIns="38100" bIns="19050" anchor="ctr" anchorCtr="1">
+                  <a:noAutofit/>
+                </a:bodyPr>
+                <a:lstStyle/>
+                <a:p>
+                  <a:pPr>
+                    <a:defRPr sz="3200" b="1" i="0" u="none" strike="noStrike" kern="1200" baseline="0">
+                      <a:solidFill>
+                        <a:schemeClr val="dk1"/>
+                      </a:solidFill>
+                      <a:latin typeface="+mn-lt"/>
+                      <a:ea typeface="+mn-ea"/>
+                      <a:cs typeface="+mn-cs"/>
+                    </a:defRPr>
+                  </a:pPr>
+                  <a:endParaRPr lang="en-US"/>
+                </a:p>
+              </c:txPr>
+              <c:dLblPos val="bestFit"/>
+              <c:showLegendKey val="0"/>
+              <c:showVal val="0"/>
+              <c:showCatName val="1"/>
+              <c:showSerName val="0"/>
+              <c:showPercent val="1"/>
+              <c:showBubbleSize val="1"/>
+              <c:extLst>
+                <c:ext xmlns:c15="http://schemas.microsoft.com/office/drawing/2012/chart" uri="{CE6537A1-D6FC-4f65-9D91-7224C49458BB}">
+                  <c15:spPr xmlns:c15="http://schemas.microsoft.com/office/drawing/2012/chart">
+                    <a:prstGeom prst="wedgeRectCallout">
+                      <a:avLst/>
+                    </a:prstGeom>
+                    <a:noFill/>
+                    <a:ln>
+                      <a:noFill/>
+                    </a:ln>
+                  </c15:spPr>
+                  <c15:layout>
+                    <c:manualLayout>
+                      <c:w val="0.23681032065681129"/>
+                      <c:h val="0.26709880247514745"/>
+                    </c:manualLayout>
+                  </c15:layout>
+                </c:ext>
+                <c:ext xmlns:c16="http://schemas.microsoft.com/office/drawing/2014/chart" uri="{C3380CC4-5D6E-409C-BE32-E72D297353CC}">
+                  <c16:uniqueId val="{00000003-1001-4C1B-A81F-412E6B99DAB3}"/>
+                </c:ext>
+              </c:extLst>
+            </c:dLbl>
+            <c:dLbl>
+              <c:idx val="2"/>
+              <c:layout>
+                <c:manualLayout>
+                  <c:x val="-1.65210139610306E-2"/>
+                  <c:y val="4.6329393710928514E-2"/>
+                </c:manualLayout>
+              </c:layout>
+              <c:tx>
+                <c:rich>
+                  <a:bodyPr rot="0" spcFirstLastPara="1" vertOverflow="ellipsis" vert="horz" wrap="square" lIns="38100" tIns="19050" rIns="38100" bIns="19050" anchor="ctr" anchorCtr="1">
+                    <a:noAutofit/>
+                  </a:bodyPr>
+                  <a:lstStyle/>
+                  <a:p>
+                    <a:pPr>
+                      <a:defRPr sz="2000" b="1" i="0" u="none" strike="noStrike" kern="1200" baseline="0">
+                        <a:solidFill>
+                          <a:schemeClr val="dk1"/>
+                        </a:solidFill>
+                        <a:latin typeface="+mn-lt"/>
+                        <a:ea typeface="+mn-ea"/>
+                        <a:cs typeface="+mn-cs"/>
+                      </a:defRPr>
+                    </a:pPr>
+                    <a:fld id="{4678DEC8-47EF-4AEA-9B6E-1EA88551ADF6}" type="CATEGORYNAME">
+                      <a:rPr lang="en-US" sz="3200" b="1"/>
+                      <a:pPr>
+                        <a:defRPr sz="2000" b="1"/>
+                      </a:pPr>
+                      <a:t>[CATEGORY NAME]</a:t>
+                    </a:fld>
+                    <a:r>
+                      <a:rPr lang="en-US" sz="3200" b="1" baseline="0" dirty="0"/>
+                      <a:t>, </a:t>
+                    </a:r>
+                    <a:fld id="{DB4E9C26-1184-4B80-8B4B-4CFA981264CD}" type="PERCENTAGE">
+                      <a:rPr lang="en-US" sz="3200" b="1" baseline="0"/>
+                      <a:pPr>
+                        <a:defRPr sz="2000" b="1"/>
+                      </a:pPr>
+                      <a:t>[PERCENTAGE]</a:t>
+                    </a:fld>
+                    <a:endParaRPr lang="en-US" sz="3200" b="1" baseline="0" dirty="0"/>
+                  </a:p>
+                </c:rich>
+              </c:tx>
+              <c:spPr>
+                <a:solidFill>
+                  <a:prstClr val="white"/>
+                </a:solidFill>
+                <a:ln>
+                  <a:solidFill>
+                    <a:prstClr val="black">
+                      <a:lumMod val="65000"/>
+                      <a:lumOff val="35000"/>
+                    </a:prstClr>
+                  </a:solidFill>
+                </a:ln>
+                <a:effectLst/>
+              </c:spPr>
+              <c:txPr>
+                <a:bodyPr rot="0" spcFirstLastPara="1" vertOverflow="ellipsis" vert="horz" wrap="square" lIns="38100" tIns="19050" rIns="38100" bIns="19050" anchor="ctr" anchorCtr="1">
+                  <a:noAutofit/>
+                </a:bodyPr>
+                <a:lstStyle/>
+                <a:p>
+                  <a:pPr>
+                    <a:defRPr sz="2000" b="1" i="0" u="none" strike="noStrike" kern="1200" baseline="0">
+                      <a:solidFill>
+                        <a:schemeClr val="dk1"/>
+                      </a:solidFill>
+                      <a:latin typeface="+mn-lt"/>
+                      <a:ea typeface="+mn-ea"/>
+                      <a:cs typeface="+mn-cs"/>
+                    </a:defRPr>
+                  </a:pPr>
+                  <a:endParaRPr lang="en-US"/>
+                </a:p>
+              </c:txPr>
+              <c:dLblPos val="bestFit"/>
+              <c:showLegendKey val="0"/>
+              <c:showVal val="0"/>
+              <c:showCatName val="1"/>
+              <c:showSerName val="0"/>
+              <c:showPercent val="1"/>
+              <c:showBubbleSize val="1"/>
+              <c:extLst>
+                <c:ext xmlns:c15="http://schemas.microsoft.com/office/drawing/2012/chart" uri="{CE6537A1-D6FC-4f65-9D91-7224C49458BB}">
+                  <c15:spPr xmlns:c15="http://schemas.microsoft.com/office/drawing/2012/chart">
+                    <a:prstGeom prst="wedgeRectCallout">
+                      <a:avLst/>
+                    </a:prstGeom>
+                    <a:noFill/>
+                    <a:ln>
+                      <a:noFill/>
+                    </a:ln>
+                  </c15:spPr>
+                  <c15:layout>
+                    <c:manualLayout>
+                      <c:w val="0.25224437046055759"/>
+                      <c:h val="0.24086043412977615"/>
+                    </c:manualLayout>
+                  </c15:layout>
+                  <c15:dlblFieldTable/>
+                  <c15:showDataLabelsRange val="0"/>
+                </c:ext>
+                <c:ext xmlns:c16="http://schemas.microsoft.com/office/drawing/2014/chart" uri="{C3380CC4-5D6E-409C-BE32-E72D297353CC}">
+                  <c16:uniqueId val="{00000005-1001-4C1B-A81F-412E6B99DAB3}"/>
+                </c:ext>
+              </c:extLst>
+            </c:dLbl>
+            <c:spPr>
+              <a:noFill/>
+              <a:ln>
+                <a:noFill/>
+              </a:ln>
+              <a:effectLst/>
+            </c:spPr>
+            <c:txPr>
+              <a:bodyPr rot="0" spcFirstLastPara="1" vertOverflow="ellipsis" vert="horz" wrap="square" lIns="38100" tIns="19050" rIns="38100" bIns="19050" anchor="ctr" anchorCtr="1">
+                <a:spAutoFit/>
+              </a:bodyPr>
+              <a:lstStyle/>
+              <a:p>
+                <a:pPr>
+                  <a:defRPr sz="2000" b="1" i="0" u="none" strike="noStrike" kern="1200" baseline="0">
+                    <a:solidFill>
+                      <a:schemeClr val="tx1"/>
+                    </a:solidFill>
+                    <a:latin typeface="+mn-lt"/>
+                    <a:ea typeface="+mn-ea"/>
+                    <a:cs typeface="+mn-cs"/>
+                  </a:defRPr>
+                </a:pPr>
+                <a:endParaRPr lang="en-US"/>
+              </a:p>
+            </c:txPr>
+            <c:dLblPos val="bestFit"/>
+            <c:showLegendKey val="0"/>
+            <c:showVal val="0"/>
+            <c:showCatName val="0"/>
+            <c:showSerName val="0"/>
+            <c:showPercent val="0"/>
+            <c:showBubbleSize val="1"/>
+            <c:showLeaderLines val="0"/>
+            <c:extLst>
+              <c:ext xmlns:c15="http://schemas.microsoft.com/office/drawing/2012/chart" uri="{CE6537A1-D6FC-4f65-9D91-7224C49458BB}"/>
+            </c:extLst>
+          </c:dLbls>
+          <c:cat>
+            <c:strRef>
+              <c:f>categories</c:f>
+              <c:strCache>
+                <c:ptCount val="3"/>
+                <c:pt idx="0">
+                  <c:v>Trust</c:v>
+                </c:pt>
+                <c:pt idx="1">
+                  <c:v>Individual Direct Sponsors</c:v>
+                </c:pt>
+                <c:pt idx="2">
+                  <c:v>Group of Direct Sponsors</c:v>
+                </c:pt>
+              </c:strCache>
+            </c:strRef>
+          </c:cat>
+          <c:val>
+            <c:numRef>
+              <c:f>0</c:f>
+              <c:numCache>
+                <c:formatCode>General</c:formatCode>
+                <c:ptCount val="3"/>
+                <c:pt idx="0">
+                  <c:v>9</c:v>
+                </c:pt>
+                <c:pt idx="1">
+                  <c:v>2</c:v>
+                </c:pt>
+                <c:pt idx="2">
+                  <c:v>3</c:v>
+                </c:pt>
+              </c:numCache>
+            </c:numRef>
+          </c:val>
+          <c:extLst>
+            <c:ext xmlns:c16="http://schemas.microsoft.com/office/drawing/2014/chart" uri="{C3380CC4-5D6E-409C-BE32-E72D297353CC}">
+              <c16:uniqueId val="{00000006-1001-4C1B-A81F-412E6B99DAB3}"/>
+            </c:ext>
+          </c:extLst>
+        </c:ser>
+        <c:ser>
+          <c:idx val="1"/>
+          <c:order val="1"/>
+          <c:tx>
+            <c:strRef>
+              <c:f>label 1</c:f>
+              <c:strCache>
+                <c:ptCount val="1"/>
+                <c:pt idx="0">
+                  <c:v>Column L</c:v>
+                </c:pt>
+              </c:strCache>
+            </c:strRef>
+          </c:tx>
+          <c:dPt>
+            <c:idx val="0"/>
+            <c:bubble3D val="0"/>
+            <c:spPr>
+              <a:solidFill>
+                <a:schemeClr val="accent2"/>
+              </a:solidFill>
+              <a:ln>
+                <a:noFill/>
+              </a:ln>
+              <a:effectLst/>
+              <a:sp3d/>
+            </c:spPr>
+            <c:extLst>
+              <c:ext xmlns:c16="http://schemas.microsoft.com/office/drawing/2014/chart" uri="{C3380CC4-5D6E-409C-BE32-E72D297353CC}">
+                <c16:uniqueId val="{00000008-1001-4C1B-A81F-412E6B99DAB3}"/>
+              </c:ext>
+            </c:extLst>
+          </c:dPt>
+          <c:dPt>
+            <c:idx val="1"/>
+            <c:bubble3D val="0"/>
+            <c:spPr>
+              <a:solidFill>
+                <a:schemeClr val="accent4"/>
+              </a:solidFill>
+              <a:ln>
+                <a:noFill/>
+              </a:ln>
+              <a:effectLst/>
+              <a:sp3d/>
+            </c:spPr>
+            <c:extLst>
+              <c:ext xmlns:c16="http://schemas.microsoft.com/office/drawing/2014/chart" uri="{C3380CC4-5D6E-409C-BE32-E72D297353CC}">
+                <c16:uniqueId val="{0000000A-1001-4C1B-A81F-412E6B99DAB3}"/>
+              </c:ext>
+            </c:extLst>
+          </c:dPt>
+          <c:dPt>
+            <c:idx val="2"/>
+            <c:bubble3D val="0"/>
+            <c:spPr>
+              <a:solidFill>
+                <a:schemeClr val="accent6"/>
+              </a:solidFill>
+              <a:ln>
+                <a:noFill/>
+              </a:ln>
+              <a:effectLst/>
+              <a:sp3d/>
+            </c:spPr>
+            <c:extLst>
+              <c:ext xmlns:c16="http://schemas.microsoft.com/office/drawing/2014/chart" uri="{C3380CC4-5D6E-409C-BE32-E72D297353CC}">
+                <c16:uniqueId val="{0000000C-1001-4C1B-A81F-412E6B99DAB3}"/>
+              </c:ext>
+            </c:extLst>
+          </c:dPt>
+          <c:dLbls>
+            <c:spPr>
+              <a:noFill/>
+              <a:ln>
+                <a:noFill/>
+              </a:ln>
+              <a:effectLst/>
+            </c:spPr>
+            <c:txPr>
+              <a:bodyPr rot="0" spcFirstLastPara="1" vertOverflow="ellipsis" vert="horz" wrap="square" lIns="38100" tIns="19050" rIns="38100" bIns="19050" anchor="ctr" anchorCtr="1">
+                <a:spAutoFit/>
+              </a:bodyPr>
+              <a:lstStyle/>
+              <a:p>
+                <a:pPr>
+                  <a:defRPr sz="1000" b="0" i="0" u="none" strike="noStrike" kern="1200" baseline="0">
+                    <a:solidFill>
+                      <a:schemeClr val="tx1"/>
+                    </a:solidFill>
+                    <a:latin typeface="+mn-lt"/>
+                    <a:ea typeface="+mn-ea"/>
+                    <a:cs typeface="+mn-cs"/>
+                  </a:defRPr>
+                </a:pPr>
+                <a:endParaRPr lang="en-US"/>
+              </a:p>
+            </c:txPr>
+            <c:dLblPos val="bestFit"/>
+            <c:showLegendKey val="0"/>
+            <c:showVal val="0"/>
+            <c:showCatName val="0"/>
+            <c:showSerName val="0"/>
+            <c:showPercent val="0"/>
+            <c:showBubbleSize val="1"/>
+            <c:showLeaderLines val="0"/>
+            <c:extLst>
+              <c:ext xmlns:c15="http://schemas.microsoft.com/office/drawing/2012/chart" uri="{CE6537A1-D6FC-4f65-9D91-7224C49458BB}"/>
+            </c:extLst>
+          </c:dLbls>
+          <c:cat>
+            <c:strRef>
+              <c:f>categories</c:f>
+              <c:strCache>
+                <c:ptCount val="3"/>
+                <c:pt idx="0">
+                  <c:v>Trust</c:v>
+                </c:pt>
+                <c:pt idx="1">
+                  <c:v>Individual Direct Sponsors</c:v>
+                </c:pt>
+                <c:pt idx="2">
+                  <c:v>Group of Direct Sponsors</c:v>
+                </c:pt>
+              </c:strCache>
+            </c:strRef>
+          </c:cat>
+          <c:val>
+            <c:numRef>
+              <c:f>1</c:f>
+              <c:numCache>
+                <c:formatCode>General</c:formatCode>
+                <c:ptCount val="3"/>
+                <c:pt idx="0">
+                  <c:v>246693</c:v>
+                </c:pt>
+                <c:pt idx="1">
+                  <c:v>134711</c:v>
+                </c:pt>
+                <c:pt idx="2">
+                  <c:v>41709</c:v>
+                </c:pt>
+              </c:numCache>
+            </c:numRef>
+          </c:val>
+          <c:extLst>
+            <c:ext xmlns:c16="http://schemas.microsoft.com/office/drawing/2014/chart" uri="{C3380CC4-5D6E-409C-BE32-E72D297353CC}">
+              <c16:uniqueId val="{0000000D-1001-4C1B-A81F-412E6B99DAB3}"/>
+            </c:ext>
+          </c:extLst>
+        </c:ser>
+        <c:dLbls>
+          <c:dLblPos val="bestFit"/>
+          <c:showLegendKey val="0"/>
+          <c:showVal val="1"/>
+          <c:showCatName val="0"/>
+          <c:showSerName val="0"/>
+          <c:showPercent val="0"/>
+          <c:showBubbleSize val="0"/>
+          <c:showLeaderLines val="0"/>
+        </c:dLbls>
+      </c:pie3DChart>
+      <c:spPr>
+        <a:solidFill>
+          <a:srgbClr val="D9D9D9"/>
+        </a:solidFill>
+        <a:ln>
+          <a:noFill/>
+        </a:ln>
+        <a:effectLst/>
+      </c:spPr>
+    </c:plotArea>
+    <c:plotVisOnly val="1"/>
+    <c:dispBlanksAs val="zero"/>
+    <c:showDLblsOverMax val="1"/>
+  </c:chart>
+  <c:spPr>
+    <a:solidFill>
+      <a:srgbClr val="FFFFFF"/>
+    </a:solidFill>
+    <a:ln w="6350" cap="flat" cmpd="sng" algn="ctr">
+      <a:noFill/>
+      <a:prstDash val="solid"/>
+      <a:miter lim="800000"/>
+    </a:ln>
+    <a:effectLst/>
+  </c:spPr>
+  <c:txPr>
+    <a:bodyPr/>
+    <a:lstStyle/>
+    <a:p>
+      <a:pPr>
+        <a:defRPr/>
+      </a:pPr>
+      <a:endParaRPr lang="en-US"/>
+    </a:p>
+  </c:txPr>
+</c:chartSpace>
+</file>
+
+<file path=ppt/charts/chart8.xml><?xml version="1.0" encoding="utf-8"?>
+<c:chartSpace xmlns:c="http://schemas.openxmlformats.org/drawingml/2006/chart" xmlns:a="http://schemas.openxmlformats.org/drawingml/2006/main" xmlns:r="http://schemas.openxmlformats.org/officeDocument/2006/relationships" xmlns:c16r2="http://schemas.microsoft.com/office/drawing/2015/06/chart">
+  <c:date1904 val="0"/>
+  <c:lang val="en-US"/>
+  <c:roundedCorners val="0"/>
+  <mc:AlternateContent xmlns:mc="http://schemas.openxmlformats.org/markup-compatibility/2006">
+    <mc:Choice xmlns:c14="http://schemas.microsoft.com/office/drawing/2007/8/2/chart" Requires="c14">
+      <c14:style val="102"/>
+    </mc:Choice>
+    <mc:Fallback>
+      <c:style val="2"/>
+    </mc:Fallback>
+  </mc:AlternateContent>
+  <c:chart>
+    <c:title>
+      <c:tx>
+        <c:rich>
+          <a:bodyPr rot="0" spcFirstLastPara="1" vertOverflow="ellipsis" vert="horz" wrap="square" anchor="ctr" anchorCtr="1"/>
+          <a:lstStyle/>
+          <a:p>
+            <a:pPr>
+              <a:defRPr sz="4400" b="0" i="0" u="none" strike="noStrike" kern="1200" spc="-1" baseline="0">
+                <a:solidFill>
+                  <a:srgbClr val="000000"/>
+                </a:solidFill>
+                <a:latin typeface="Arial"/>
+                <a:ea typeface="+mn-ea"/>
+                <a:cs typeface="+mn-cs"/>
+              </a:defRPr>
+            </a:pPr>
+            <a:r>
+              <a:rPr lang="en-IN" sz="4400" b="0" strike="noStrike" spc="-1">
+                <a:solidFill>
+                  <a:srgbClr val="000000"/>
+                </a:solidFill>
+                <a:latin typeface="Arial"/>
+              </a:rPr>
+              <a:t>Student Mix</a:t>
+            </a:r>
+          </a:p>
+        </c:rich>
+      </c:tx>
+      <c:overlay val="0"/>
+      <c:spPr>
+        <a:noFill/>
+        <a:ln>
+          <a:noFill/>
+        </a:ln>
+        <a:effectLst/>
+      </c:spPr>
+      <c:txPr>
+        <a:bodyPr rot="0" spcFirstLastPara="1" vertOverflow="ellipsis" vert="horz" wrap="square" anchor="ctr" anchorCtr="1"/>
+        <a:lstStyle/>
+        <a:p>
+          <a:pPr>
+            <a:defRPr sz="4400" b="0" i="0" u="none" strike="noStrike" kern="1200" spc="-1" baseline="0">
+              <a:solidFill>
+                <a:srgbClr val="000000"/>
+              </a:solidFill>
+              <a:latin typeface="Arial"/>
+              <a:ea typeface="+mn-ea"/>
+              <a:cs typeface="+mn-cs"/>
+            </a:defRPr>
+          </a:pPr>
+          <a:endParaRPr lang="en-US"/>
+        </a:p>
+      </c:txPr>
+    </c:title>
+    <c:autoTitleDeleted val="0"/>
+    <c:plotArea>
+      <c:layout/>
+      <c:barChart>
+        <c:barDir val="col"/>
+        <c:grouping val="clustered"/>
+        <c:varyColors val="0"/>
+        <c:ser>
+          <c:idx val="0"/>
+          <c:order val="0"/>
+          <c:tx>
+            <c:strRef>
+              <c:f>label 0</c:f>
+              <c:strCache>
+                <c:ptCount val="1"/>
+                <c:pt idx="0">
+                  <c:v>Boys</c:v>
+                </c:pt>
+              </c:strCache>
+            </c:strRef>
+          </c:tx>
+          <c:spPr>
+            <a:solidFill>
+              <a:schemeClr val="accent1"/>
+            </a:solidFill>
+            <a:ln>
+              <a:noFill/>
+            </a:ln>
+            <a:effectLst/>
+          </c:spPr>
+          <c:invertIfNegative val="0"/>
+          <c:dLbls>
+            <c:dLbl>
+              <c:idx val="1"/>
+              <c:delete val="1"/>
+              <c:extLst>
+                <c:ext xmlns:c15="http://schemas.microsoft.com/office/drawing/2012/chart" uri="{CE6537A1-D6FC-4f65-9D91-7224C49458BB}"/>
+                <c:ext xmlns:c16="http://schemas.microsoft.com/office/drawing/2014/chart" uri="{C3380CC4-5D6E-409C-BE32-E72D297353CC}">
+                  <c16:uniqueId val="{00000000-BB69-4F99-B831-B7AD88F25E12}"/>
+                </c:ext>
+              </c:extLst>
+            </c:dLbl>
+            <c:spPr>
+              <a:noFill/>
+              <a:ln>
+                <a:noFill/>
+              </a:ln>
+              <a:effectLst/>
+            </c:spPr>
+            <c:txPr>
+              <a:bodyPr rot="0" spcFirstLastPara="1" vertOverflow="ellipsis" vert="horz" wrap="square" lIns="38100" tIns="19050" rIns="38100" bIns="19050" anchor="ctr" anchorCtr="1">
+                <a:spAutoFit/>
+              </a:bodyPr>
+              <a:lstStyle/>
+              <a:p>
+                <a:pPr>
+                  <a:defRPr sz="4000" b="1" i="0" u="none" strike="noStrike" kern="1200" baseline="0">
+                    <a:solidFill>
+                      <a:schemeClr val="tx1"/>
+                    </a:solidFill>
+                    <a:latin typeface="+mn-lt"/>
+                    <a:ea typeface="+mn-ea"/>
+                    <a:cs typeface="+mn-cs"/>
+                  </a:defRPr>
+                </a:pPr>
+                <a:endParaRPr lang="en-US"/>
+              </a:p>
+            </c:txPr>
+            <c:dLblPos val="outEnd"/>
+            <c:showLegendKey val="0"/>
+            <c:showVal val="1"/>
+            <c:showCatName val="0"/>
+            <c:showSerName val="0"/>
+            <c:showPercent val="0"/>
+            <c:showBubbleSize val="0"/>
+            <c:showLeaderLines val="0"/>
+            <c:extLst>
+              <c:ext xmlns:c15="http://schemas.microsoft.com/office/drawing/2012/chart" uri="{CE6537A1-D6FC-4f65-9D91-7224C49458BB}">
+                <c15:showLeaderLines val="1"/>
+                <c15:leaderLines>
+                  <c:spPr>
+                    <a:ln w="6350" cap="flat" cmpd="sng" algn="ctr">
+                      <a:solidFill>
+                        <a:schemeClr val="tx1"/>
+                      </a:solidFill>
+                      <a:prstDash val="solid"/>
+                      <a:round/>
+                    </a:ln>
+                    <a:effectLst/>
+                  </c:spPr>
+                </c15:leaderLines>
+              </c:ext>
+            </c:extLst>
+          </c:dLbls>
+          <c:cat>
+            <c:strRef>
+              <c:f>categories</c:f>
+              <c:strCache>
+                <c:ptCount val="3"/>
+                <c:pt idx="0">
+                  <c:v>II year</c:v>
+                </c:pt>
+                <c:pt idx="1">
+                  <c:v>III year</c:v>
+                </c:pt>
+                <c:pt idx="2">
+                  <c:v>IV year</c:v>
+                </c:pt>
+              </c:strCache>
+            </c:strRef>
+          </c:cat>
+          <c:val>
+            <c:numRef>
+              <c:f>0</c:f>
+              <c:numCache>
+                <c:formatCode>General</c:formatCode>
+                <c:ptCount val="3"/>
+                <c:pt idx="0">
+                  <c:v>1</c:v>
+                </c:pt>
+                <c:pt idx="1">
+                  <c:v>0</c:v>
+                </c:pt>
+                <c:pt idx="2">
+                  <c:v>5</c:v>
+                </c:pt>
+              </c:numCache>
+            </c:numRef>
+          </c:val>
+          <c:extLst>
+            <c:ext xmlns:c16="http://schemas.microsoft.com/office/drawing/2014/chart" uri="{C3380CC4-5D6E-409C-BE32-E72D297353CC}">
+              <c16:uniqueId val="{00000000-0D08-47A8-88ED-2DD54CFA8236}"/>
+            </c:ext>
+          </c:extLst>
+        </c:ser>
+        <c:ser>
+          <c:idx val="1"/>
+          <c:order val="1"/>
+          <c:tx>
+            <c:strRef>
+              <c:f>label 1</c:f>
+              <c:strCache>
+                <c:ptCount val="1"/>
+                <c:pt idx="0">
+                  <c:v>Girls</c:v>
+                </c:pt>
+              </c:strCache>
+            </c:strRef>
+          </c:tx>
+          <c:spPr>
+            <a:solidFill>
+              <a:schemeClr val="accent2"/>
+            </a:solidFill>
+            <a:ln>
+              <a:noFill/>
+            </a:ln>
+            <a:effectLst/>
+          </c:spPr>
+          <c:invertIfNegative val="0"/>
+          <c:dLbls>
+            <c:dLbl>
+              <c:idx val="2"/>
+              <c:delete val="1"/>
+              <c:extLst>
+                <c:ext xmlns:c15="http://schemas.microsoft.com/office/drawing/2012/chart" uri="{CE6537A1-D6FC-4f65-9D91-7224C49458BB}"/>
+                <c:ext xmlns:c16="http://schemas.microsoft.com/office/drawing/2014/chart" uri="{C3380CC4-5D6E-409C-BE32-E72D297353CC}">
+                  <c16:uniqueId val="{00000001-BB69-4F99-B831-B7AD88F25E12}"/>
+                </c:ext>
+              </c:extLst>
+            </c:dLbl>
+            <c:spPr>
+              <a:noFill/>
+              <a:ln>
+                <a:noFill/>
+              </a:ln>
+              <a:effectLst/>
+            </c:spPr>
+            <c:txPr>
+              <a:bodyPr rot="0" spcFirstLastPara="1" vertOverflow="ellipsis" vert="horz" wrap="square" lIns="38100" tIns="19050" rIns="38100" bIns="19050" anchor="ctr" anchorCtr="1">
+                <a:spAutoFit/>
+              </a:bodyPr>
+              <a:lstStyle/>
+              <a:p>
+                <a:pPr>
+                  <a:defRPr sz="4000" b="1" i="0" u="none" strike="noStrike" kern="1200" baseline="0">
+                    <a:solidFill>
+                      <a:schemeClr val="tx1"/>
+                    </a:solidFill>
+                    <a:latin typeface="+mn-lt"/>
+                    <a:ea typeface="+mn-ea"/>
+                    <a:cs typeface="+mn-cs"/>
+                  </a:defRPr>
+                </a:pPr>
+                <a:endParaRPr lang="en-US"/>
+              </a:p>
+            </c:txPr>
+            <c:dLblPos val="outEnd"/>
+            <c:showLegendKey val="0"/>
+            <c:showVal val="1"/>
+            <c:showCatName val="0"/>
+            <c:showSerName val="0"/>
+            <c:showPercent val="0"/>
+            <c:showBubbleSize val="0"/>
+            <c:showLeaderLines val="0"/>
+            <c:extLst>
+              <c:ext xmlns:c15="http://schemas.microsoft.com/office/drawing/2012/chart" uri="{CE6537A1-D6FC-4f65-9D91-7224C49458BB}">
+                <c15:showLeaderLines val="1"/>
+                <c15:leaderLines>
+                  <c:spPr>
+                    <a:ln w="6350" cap="flat" cmpd="sng" algn="ctr">
+                      <a:solidFill>
+                        <a:schemeClr val="tx1"/>
+                      </a:solidFill>
+                      <a:prstDash val="solid"/>
+                      <a:round/>
+                    </a:ln>
+                    <a:effectLst/>
+                  </c:spPr>
+                </c15:leaderLines>
+              </c:ext>
+            </c:extLst>
+          </c:dLbls>
+          <c:cat>
+            <c:strRef>
+              <c:f>categories</c:f>
+              <c:strCache>
+                <c:ptCount val="3"/>
+                <c:pt idx="0">
+                  <c:v>II year</c:v>
+                </c:pt>
+                <c:pt idx="1">
+                  <c:v>III year</c:v>
+                </c:pt>
+                <c:pt idx="2">
+                  <c:v>IV year</c:v>
+                </c:pt>
+              </c:strCache>
+            </c:strRef>
+          </c:cat>
+          <c:val>
+            <c:numRef>
+              <c:f>1</c:f>
+              <c:numCache>
+                <c:formatCode>General</c:formatCode>
+                <c:ptCount val="3"/>
+                <c:pt idx="0">
+                  <c:v>4</c:v>
+                </c:pt>
+                <c:pt idx="1">
+                  <c:v>2</c:v>
+                </c:pt>
+                <c:pt idx="2">
+                  <c:v>0</c:v>
+                </c:pt>
+              </c:numCache>
+            </c:numRef>
+          </c:val>
+          <c:extLst>
+            <c:ext xmlns:c16="http://schemas.microsoft.com/office/drawing/2014/chart" uri="{C3380CC4-5D6E-409C-BE32-E72D297353CC}">
+              <c16:uniqueId val="{00000001-0D08-47A8-88ED-2DD54CFA8236}"/>
+            </c:ext>
+          </c:extLst>
+        </c:ser>
+        <c:dLbls>
+          <c:dLblPos val="outEnd"/>
+          <c:showLegendKey val="0"/>
+          <c:showVal val="1"/>
+          <c:showCatName val="0"/>
+          <c:showSerName val="0"/>
+          <c:showPercent val="0"/>
+          <c:showBubbleSize val="0"/>
+        </c:dLbls>
+        <c:gapWidth val="100"/>
+        <c:axId val="14583877"/>
+        <c:axId val="47542728"/>
+      </c:barChart>
+      <c:catAx>
+        <c:axId val="14583877"/>
+        <c:scaling>
+          <c:orientation val="minMax"/>
+        </c:scaling>
+        <c:delete val="0"/>
+        <c:axPos val="b"/>
+        <c:numFmt formatCode="General" sourceLinked="1"/>
+        <c:majorTickMark val="out"/>
+        <c:minorTickMark val="none"/>
+        <c:tickLblPos val="nextTo"/>
+        <c:spPr>
+          <a:noFill/>
+          <a:ln w="6480" cap="flat" cmpd="sng" algn="ctr">
+            <a:solidFill>
+              <a:srgbClr val="B3B3B3"/>
+            </a:solidFill>
+            <a:prstDash val="solid"/>
+            <a:round/>
+          </a:ln>
+          <a:effectLst/>
+        </c:spPr>
+        <c:txPr>
+          <a:bodyPr rot="-60000000" spcFirstLastPara="1" vertOverflow="ellipsis" vert="horz" wrap="square" anchor="ctr" anchorCtr="1"/>
+          <a:lstStyle/>
+          <a:p>
+            <a:pPr>
+              <a:defRPr sz="4400" b="1" i="0" u="none" strike="noStrike" kern="1200" spc="-1" baseline="0">
+                <a:solidFill>
+                  <a:srgbClr val="000000"/>
+                </a:solidFill>
+                <a:latin typeface="Arial"/>
+                <a:ea typeface="+mn-ea"/>
+                <a:cs typeface="+mn-cs"/>
+              </a:defRPr>
+            </a:pPr>
+            <a:endParaRPr lang="en-US"/>
+          </a:p>
+        </c:txPr>
+        <c:crossAx val="47542728"/>
+        <c:crosses val="autoZero"/>
+        <c:auto val="1"/>
+        <c:lblAlgn val="ctr"/>
+        <c:lblOffset val="100"/>
+        <c:noMultiLvlLbl val="1"/>
+      </c:catAx>
+      <c:valAx>
+        <c:axId val="47542728"/>
+        <c:scaling>
+          <c:orientation val="minMax"/>
+        </c:scaling>
+        <c:delete val="0"/>
+        <c:axPos val="l"/>
+        <c:majorGridlines>
+          <c:spPr>
+            <a:ln w="6480" cap="flat" cmpd="sng" algn="ctr">
+              <a:solidFill>
+                <a:srgbClr val="B3B3B3"/>
+              </a:solidFill>
+              <a:prstDash val="solid"/>
+              <a:round/>
+            </a:ln>
+            <a:effectLst/>
+          </c:spPr>
+        </c:majorGridlines>
+        <c:numFmt formatCode="General" sourceLinked="0"/>
+        <c:majorTickMark val="out"/>
+        <c:minorTickMark val="none"/>
+        <c:tickLblPos val="nextTo"/>
+        <c:spPr>
+          <a:noFill/>
+          <a:ln w="6480" cap="flat" cmpd="sng" algn="ctr">
+            <a:solidFill>
+              <a:srgbClr val="B3B3B3"/>
+            </a:solidFill>
+            <a:prstDash val="solid"/>
+            <a:round/>
+          </a:ln>
+          <a:effectLst/>
+        </c:spPr>
+        <c:txPr>
+          <a:bodyPr rot="-60000000" spcFirstLastPara="1" vertOverflow="ellipsis" vert="horz" wrap="square" anchor="ctr" anchorCtr="1"/>
+          <a:lstStyle/>
+          <a:p>
+            <a:pPr>
+              <a:defRPr sz="1000" b="0" i="0" u="none" strike="noStrike" kern="1200" spc="-1" baseline="0">
+                <a:solidFill>
+                  <a:srgbClr val="000000"/>
+                </a:solidFill>
+                <a:latin typeface="Arial"/>
+                <a:ea typeface="+mn-ea"/>
+                <a:cs typeface="+mn-cs"/>
+              </a:defRPr>
+            </a:pPr>
+            <a:endParaRPr lang="en-US"/>
+          </a:p>
+        </c:txPr>
+        <c:crossAx val="14583877"/>
+        <c:crosses val="autoZero"/>
+        <c:crossBetween val="between"/>
+      </c:valAx>
+      <c:spPr>
+        <a:noFill/>
+        <a:ln>
+          <a:solidFill>
+            <a:srgbClr val="B3B3B3"/>
+          </a:solidFill>
+        </a:ln>
+        <a:effectLst/>
+      </c:spPr>
+    </c:plotArea>
+    <c:legend>
+      <c:legendPos val="r"/>
+      <c:overlay val="0"/>
+      <c:spPr>
+        <a:noFill/>
+        <a:ln>
+          <a:noFill/>
+        </a:ln>
+        <a:effectLst/>
+      </c:spPr>
+      <c:txPr>
+        <a:bodyPr rot="0" spcFirstLastPara="1" vertOverflow="ellipsis" vert="horz" wrap="square" anchor="ctr" anchorCtr="1"/>
+        <a:lstStyle/>
+        <a:p>
+          <a:pPr>
+            <a:defRPr sz="3600" b="0" i="0" u="none" strike="noStrike" kern="1200" baseline="0">
+              <a:solidFill>
+                <a:schemeClr val="tx1"/>
+              </a:solidFill>
+              <a:latin typeface="+mn-lt"/>
+              <a:ea typeface="+mn-ea"/>
+              <a:cs typeface="+mn-cs"/>
+            </a:defRPr>
+          </a:pPr>
+          <a:endParaRPr lang="en-US"/>
+        </a:p>
+      </c:txPr>
+    </c:legend>
+    <c:plotVisOnly val="1"/>
+    <c:dispBlanksAs val="gap"/>
+    <c:showDLblsOverMax val="1"/>
+  </c:chart>
+  <c:spPr>
+    <a:solidFill>
+      <a:srgbClr val="FFFFFF"/>
+    </a:solidFill>
+    <a:ln w="6350" cap="flat" cmpd="sng" algn="ctr">
+      <a:noFill/>
+      <a:prstDash val="solid"/>
+      <a:miter lim="800000"/>
+    </a:ln>
+    <a:effectLst/>
+  </c:spPr>
+  <c:txPr>
+    <a:bodyPr/>
+    <a:lstStyle/>
+    <a:p>
+      <a:pPr>
+        <a:defRPr/>
+      </a:pPr>
+      <a:endParaRPr lang="en-US"/>
+    </a:p>
+  </c:txPr>
+</c:chartSpace>
+</file>
+
+<file path=ppt/charts/chart9.xml><?xml version="1.0" encoding="utf-8"?>
+<c:chartSpace xmlns:c="http://schemas.openxmlformats.org/drawingml/2006/chart" xmlns:a="http://schemas.openxmlformats.org/drawingml/2006/main" xmlns:r="http://schemas.openxmlformats.org/officeDocument/2006/relationships" xmlns:c16r2="http://schemas.microsoft.com/office/drawing/2015/06/chart">
+  <c:date1904 val="0"/>
+  <c:lang val="en-US"/>
+  <c:roundedCorners val="0"/>
+  <mc:AlternateContent xmlns:mc="http://schemas.openxmlformats.org/markup-compatibility/2006">
+    <mc:Choice xmlns:c14="http://schemas.microsoft.com/office/drawing/2007/8/2/chart" Requires="c14">
+      <c14:style val="107"/>
+    </mc:Choice>
+    <mc:Fallback>
+      <c:style val="7"/>
+    </mc:Fallback>
+  </mc:AlternateContent>
+  <c:chart>
+    <c:title>
+      <c:tx>
+        <c:rich>
+          <a:bodyPr rot="0" spcFirstLastPara="1" vertOverflow="ellipsis" vert="horz" wrap="square" anchor="ctr" anchorCtr="1"/>
+          <a:lstStyle/>
+          <a:p>
+            <a:pPr>
+              <a:defRPr sz="4400" b="1" i="0" u="none" strike="noStrike" kern="1200" spc="-1" baseline="0">
+                <a:solidFill>
+                  <a:srgbClr val="000000"/>
+                </a:solidFill>
+                <a:latin typeface="Arial"/>
+                <a:ea typeface="+mn-ea"/>
+                <a:cs typeface="+mn-cs"/>
+              </a:defRPr>
+            </a:pPr>
+            <a:r>
+              <a:rPr lang="en-IN" sz="4400" b="1" strike="noStrike" spc="-1">
+                <a:solidFill>
+                  <a:srgbClr val="000000"/>
+                </a:solidFill>
+                <a:latin typeface="Arial"/>
+              </a:rPr>
+              <a:t>Breakdown of Fees AY2018-19</a:t>
+            </a:r>
+          </a:p>
+        </c:rich>
+      </c:tx>
+      <c:overlay val="0"/>
+      <c:spPr>
+        <a:noFill/>
+        <a:ln>
+          <a:noFill/>
+        </a:ln>
+        <a:effectLst/>
+      </c:spPr>
+      <c:txPr>
+        <a:bodyPr rot="0" spcFirstLastPara="1" vertOverflow="ellipsis" vert="horz" wrap="square" anchor="ctr" anchorCtr="1"/>
+        <a:lstStyle/>
+        <a:p>
+          <a:pPr>
+            <a:defRPr sz="4400" b="1" i="0" u="none" strike="noStrike" kern="1200" spc="-1" baseline="0">
+              <a:solidFill>
+                <a:srgbClr val="000000"/>
+              </a:solidFill>
+              <a:latin typeface="Arial"/>
+              <a:ea typeface="+mn-ea"/>
+              <a:cs typeface="+mn-cs"/>
+            </a:defRPr>
+          </a:pPr>
+          <a:endParaRPr lang="en-US"/>
+        </a:p>
+      </c:txPr>
+    </c:title>
+    <c:autoTitleDeleted val="0"/>
+    <c:plotArea>
+      <c:layout/>
+      <c:barChart>
+        <c:barDir val="col"/>
+        <c:grouping val="clustered"/>
+        <c:varyColors val="0"/>
+        <c:ser>
+          <c:idx val="0"/>
+          <c:order val="0"/>
+          <c:tx>
+            <c:strRef>
+              <c:f>Sheet1!$B$1</c:f>
+              <c:strCache>
+                <c:ptCount val="1"/>
+                <c:pt idx="0">
+                  <c:v>Fees</c:v>
+                </c:pt>
+              </c:strCache>
+            </c:strRef>
+          </c:tx>
+          <c:spPr>
+            <a:solidFill>
+              <a:schemeClr val="accent5"/>
+            </a:solidFill>
+            <a:ln>
+              <a:noFill/>
+            </a:ln>
+            <a:effectLst/>
+          </c:spPr>
+          <c:invertIfNegative val="0"/>
+          <c:dLbls>
+            <c:dLbl>
+              <c:idx val="0"/>
+              <c:tx>
+                <c:rich>
+                  <a:bodyPr rot="0" spcFirstLastPara="1" vertOverflow="ellipsis" vert="horz" wrap="square" lIns="38100" tIns="19050" rIns="38100" bIns="19050" anchor="ctr" anchorCtr="1">
+                    <a:spAutoFit/>
+                  </a:bodyPr>
+                  <a:lstStyle/>
+                  <a:p>
+                    <a:pPr>
+                      <a:defRPr sz="3200" b="1" i="0" u="none" strike="noStrike" kern="1200" baseline="0">
+                        <a:solidFill>
+                          <a:schemeClr val="dk1"/>
+                        </a:solidFill>
+                        <a:latin typeface="+mn-lt"/>
+                        <a:ea typeface="+mn-ea"/>
+                        <a:cs typeface="+mn-cs"/>
+                      </a:defRPr>
+                    </a:pPr>
+                    <a:r>
+                      <a:rPr lang="en-US" sz="3200" b="1" baseline="0" dirty="0"/>
+                      <a:t> </a:t>
+                    </a:r>
+                    <a:fld id="{90161D8A-74FA-4339-AA15-0DAD5F5EE9F6}" type="VALUE">
+                      <a:rPr lang="en-US" sz="3200" b="1" baseline="0" smtClean="0"/>
+                      <a:pPr>
+                        <a:defRPr sz="3200" b="1"/>
+                      </a:pPr>
+                      <a:t>[VALUE]</a:t>
+                    </a:fld>
+                    <a:endParaRPr lang="en-US" sz="3200" b="1" baseline="0" dirty="0"/>
+                  </a:p>
+                </c:rich>
+              </c:tx>
+              <c:spPr>
+                <a:solidFill>
+                  <a:prstClr val="white"/>
+                </a:solidFill>
+                <a:ln>
+                  <a:solidFill>
+                    <a:prstClr val="black">
+                      <a:lumMod val="65000"/>
+                      <a:lumOff val="35000"/>
+                    </a:prstClr>
+                  </a:solidFill>
+                </a:ln>
+                <a:effectLst/>
+              </c:spPr>
+              <c:txPr>
+                <a:bodyPr rot="0" spcFirstLastPara="1" vertOverflow="ellipsis" vert="horz" wrap="square" lIns="38100" tIns="19050" rIns="38100" bIns="19050" anchor="ctr" anchorCtr="1">
+                  <a:spAutoFit/>
+                </a:bodyPr>
+                <a:lstStyle/>
+                <a:p>
+                  <a:pPr>
+                    <a:defRPr sz="3200" b="1" i="0" u="none" strike="noStrike" kern="1200" baseline="0">
+                      <a:solidFill>
+                        <a:schemeClr val="dk1"/>
+                      </a:solidFill>
+                      <a:latin typeface="+mn-lt"/>
+                      <a:ea typeface="+mn-ea"/>
+                      <a:cs typeface="+mn-cs"/>
+                    </a:defRPr>
+                  </a:pPr>
+                  <a:endParaRPr lang="en-US"/>
+                </a:p>
+              </c:txPr>
+              <c:dLblPos val="inEnd"/>
+              <c:showLegendKey val="0"/>
+              <c:showVal val="1"/>
+              <c:showCatName val="1"/>
+              <c:showSerName val="0"/>
+              <c:showPercent val="0"/>
+              <c:showBubbleSize val="1"/>
+              <c:extLst>
+                <c:ext xmlns:c15="http://schemas.microsoft.com/office/drawing/2012/chart" uri="{CE6537A1-D6FC-4f65-9D91-7224C49458BB}">
+                  <c15:spPr xmlns:c15="http://schemas.microsoft.com/office/drawing/2012/chart">
+                    <a:prstGeom prst="wedgeRectCallout">
+                      <a:avLst/>
+                    </a:prstGeom>
+                    <a:noFill/>
+                    <a:ln>
+                      <a:noFill/>
+                    </a:ln>
+                  </c15:spPr>
+                  <c15:dlblFieldTable/>
+                  <c15:showDataLabelsRange val="0"/>
+                </c:ext>
+                <c:ext xmlns:c16="http://schemas.microsoft.com/office/drawing/2014/chart" uri="{C3380CC4-5D6E-409C-BE32-E72D297353CC}">
+                  <c16:uniqueId val="{00000001-EFA9-49F2-9373-6BC795D05D7E}"/>
+                </c:ext>
+              </c:extLst>
+            </c:dLbl>
+            <c:dLbl>
+              <c:idx val="1"/>
+              <c:tx>
+                <c:rich>
+                  <a:bodyPr rot="0" spcFirstLastPara="1" vertOverflow="ellipsis" vert="horz" wrap="square" lIns="38100" tIns="19050" rIns="38100" bIns="19050" anchor="ctr" anchorCtr="1">
+                    <a:spAutoFit/>
+                  </a:bodyPr>
+                  <a:lstStyle/>
+                  <a:p>
+                    <a:pPr>
+                      <a:defRPr sz="3200" b="1" i="0" u="none" strike="noStrike" kern="1200" baseline="0">
+                        <a:solidFill>
+                          <a:schemeClr val="dk1"/>
+                        </a:solidFill>
+                        <a:latin typeface="+mn-lt"/>
+                        <a:ea typeface="+mn-ea"/>
+                        <a:cs typeface="+mn-cs"/>
+                      </a:defRPr>
+                    </a:pPr>
+                    <a:r>
+                      <a:rPr lang="en-US" sz="3200" b="1" baseline="0" dirty="0"/>
+                      <a:t> </a:t>
+                    </a:r>
+                    <a:fld id="{00698048-DDFE-4105-831E-A92691866F7D}" type="VALUE">
+                      <a:rPr lang="en-US" sz="3200" b="1" baseline="0"/>
+                      <a:pPr>
+                        <a:defRPr sz="3200" b="1"/>
+                      </a:pPr>
+                      <a:t>[VALUE]</a:t>
+                    </a:fld>
+                    <a:endParaRPr lang="en-US" sz="3200" b="1" baseline="0" dirty="0"/>
+                  </a:p>
+                </c:rich>
+              </c:tx>
+              <c:spPr>
+                <a:solidFill>
+                  <a:prstClr val="white"/>
+                </a:solidFill>
+                <a:ln>
+                  <a:solidFill>
+                    <a:prstClr val="black">
+                      <a:lumMod val="65000"/>
+                      <a:lumOff val="35000"/>
+                    </a:prstClr>
+                  </a:solidFill>
+                </a:ln>
+                <a:effectLst/>
+              </c:spPr>
+              <c:txPr>
+                <a:bodyPr rot="0" spcFirstLastPara="1" vertOverflow="ellipsis" vert="horz" wrap="square" lIns="38100" tIns="19050" rIns="38100" bIns="19050" anchor="ctr" anchorCtr="1">
+                  <a:spAutoFit/>
+                </a:bodyPr>
+                <a:lstStyle/>
+                <a:p>
+                  <a:pPr>
+                    <a:defRPr sz="3200" b="1" i="0" u="none" strike="noStrike" kern="1200" baseline="0">
+                      <a:solidFill>
+                        <a:schemeClr val="dk1"/>
+                      </a:solidFill>
+                      <a:latin typeface="+mn-lt"/>
+                      <a:ea typeface="+mn-ea"/>
+                      <a:cs typeface="+mn-cs"/>
+                    </a:defRPr>
+                  </a:pPr>
+                  <a:endParaRPr lang="en-US"/>
+                </a:p>
+              </c:txPr>
+              <c:dLblPos val="inEnd"/>
+              <c:showLegendKey val="0"/>
+              <c:showVal val="1"/>
+              <c:showCatName val="1"/>
+              <c:showSerName val="0"/>
+              <c:showPercent val="0"/>
+              <c:showBubbleSize val="1"/>
+              <c:extLst>
+                <c:ext xmlns:c15="http://schemas.microsoft.com/office/drawing/2012/chart" uri="{CE6537A1-D6FC-4f65-9D91-7224C49458BB}">
+                  <c15:spPr xmlns:c15="http://schemas.microsoft.com/office/drawing/2012/chart">
+                    <a:prstGeom prst="wedgeRectCallout">
+                      <a:avLst/>
+                    </a:prstGeom>
+                    <a:noFill/>
+                    <a:ln>
+                      <a:noFill/>
+                    </a:ln>
+                  </c15:spPr>
+                  <c15:dlblFieldTable/>
+                  <c15:showDataLabelsRange val="0"/>
+                </c:ext>
+                <c:ext xmlns:c16="http://schemas.microsoft.com/office/drawing/2014/chart" uri="{C3380CC4-5D6E-409C-BE32-E72D297353CC}">
+                  <c16:uniqueId val="{00000002-EFA9-49F2-9373-6BC795D05D7E}"/>
+                </c:ext>
+              </c:extLst>
+            </c:dLbl>
+            <c:spPr>
+              <a:solidFill>
+                <a:prstClr val="white"/>
+              </a:solidFill>
+              <a:ln>
+                <a:solidFill>
+                  <a:prstClr val="black">
+                    <a:lumMod val="65000"/>
+                    <a:lumOff val="35000"/>
+                  </a:prstClr>
+                </a:solidFill>
+              </a:ln>
+              <a:effectLst/>
+            </c:spPr>
+            <c:txPr>
+              <a:bodyPr rot="0" spcFirstLastPara="1" vertOverflow="ellipsis" vert="horz" wrap="square" lIns="38100" tIns="19050" rIns="38100" bIns="19050" anchor="ctr" anchorCtr="1">
+                <a:spAutoFit/>
+              </a:bodyPr>
+              <a:lstStyle/>
+              <a:p>
+                <a:pPr>
+                  <a:defRPr sz="1000" b="0" i="0" u="none" strike="noStrike" kern="1200" baseline="0">
+                    <a:solidFill>
+                      <a:schemeClr val="dk1"/>
+                    </a:solidFill>
+                    <a:latin typeface="+mn-lt"/>
+                    <a:ea typeface="+mn-ea"/>
+                    <a:cs typeface="+mn-cs"/>
+                  </a:defRPr>
+                </a:pPr>
+                <a:endParaRPr lang="en-US"/>
+              </a:p>
+            </c:txPr>
+            <c:dLblPos val="inEnd"/>
+            <c:showLegendKey val="0"/>
+            <c:showVal val="1"/>
+            <c:showCatName val="1"/>
+            <c:showSerName val="0"/>
+            <c:showPercent val="0"/>
+            <c:showBubbleSize val="1"/>
+            <c:showLeaderLines val="0"/>
+            <c:extLst>
+              <c:ext xmlns:c15="http://schemas.microsoft.com/office/drawing/2012/chart" uri="{CE6537A1-D6FC-4f65-9D91-7224C49458BB}">
+                <c15:spPr xmlns:c15="http://schemas.microsoft.com/office/drawing/2012/chart">
+                  <a:prstGeom prst="wedgeRectCallout">
+                    <a:avLst/>
+                  </a:prstGeom>
+                  <a:noFill/>
+                  <a:ln>
+                    <a:noFill/>
+                  </a:ln>
+                </c15:spPr>
+                <c15:showLeaderLines val="0"/>
+              </c:ext>
+            </c:extLst>
+          </c:dLbls>
+          <c:cat>
+            <c:strRef>
+              <c:f>Sheet1!$A$2:$A$3</c:f>
+              <c:strCache>
+                <c:ptCount val="2"/>
+                <c:pt idx="0">
+                  <c:v>Tuition Fees</c:v>
+                </c:pt>
+                <c:pt idx="1">
+                  <c:v>Hostel Fees</c:v>
+                </c:pt>
+              </c:strCache>
+            </c:strRef>
+          </c:cat>
+          <c:val>
+            <c:numRef>
+              <c:f>Sheet1!$B$2:$B$3</c:f>
+              <c:numCache>
+                <c:formatCode>"₹"\ #,##0</c:formatCode>
+                <c:ptCount val="2"/>
+                <c:pt idx="0">
+                  <c:v>90800</c:v>
+                </c:pt>
+                <c:pt idx="1">
+                  <c:v>332313</c:v>
+                </c:pt>
+              </c:numCache>
+            </c:numRef>
+          </c:val>
+          <c:extLst>
+            <c:ext xmlns:c16="http://schemas.microsoft.com/office/drawing/2014/chart" uri="{C3380CC4-5D6E-409C-BE32-E72D297353CC}">
+              <c16:uniqueId val="{00000000-EFA9-49F2-9373-6BC795D05D7E}"/>
+            </c:ext>
+          </c:extLst>
+        </c:ser>
+        <c:dLbls>
+          <c:showLegendKey val="0"/>
+          <c:showVal val="0"/>
+          <c:showCatName val="0"/>
+          <c:showSerName val="0"/>
+          <c:showPercent val="0"/>
+          <c:showBubbleSize val="0"/>
+        </c:dLbls>
+        <c:gapWidth val="100"/>
+        <c:axId val="30534675"/>
+        <c:axId val="88579600"/>
+      </c:barChart>
+      <c:catAx>
+        <c:axId val="30534675"/>
+        <c:scaling>
+          <c:orientation val="minMax"/>
+        </c:scaling>
+        <c:delete val="0"/>
+        <c:axPos val="b"/>
+        <c:numFmt formatCode="General" sourceLinked="1"/>
+        <c:majorTickMark val="out"/>
+        <c:minorTickMark val="none"/>
+        <c:tickLblPos val="nextTo"/>
+        <c:spPr>
+          <a:noFill/>
+          <a:ln w="6480" cap="flat" cmpd="sng" algn="ctr">
+            <a:solidFill>
+              <a:srgbClr val="B3B3B3"/>
+            </a:solidFill>
+            <a:prstDash val="solid"/>
+            <a:round/>
+          </a:ln>
+          <a:effectLst/>
+        </c:spPr>
+        <c:txPr>
+          <a:bodyPr rot="-60000000" spcFirstLastPara="1" vertOverflow="ellipsis" vert="horz" wrap="square" anchor="ctr" anchorCtr="1"/>
+          <a:lstStyle/>
+          <a:p>
+            <a:pPr>
+              <a:defRPr sz="3600" b="1" i="0" u="none" strike="noStrike" kern="1200" spc="-1" baseline="0">
+                <a:solidFill>
+                  <a:srgbClr val="000000"/>
+                </a:solidFill>
+                <a:latin typeface="Arial"/>
+                <a:ea typeface="+mn-ea"/>
+                <a:cs typeface="+mn-cs"/>
+              </a:defRPr>
+            </a:pPr>
+            <a:endParaRPr lang="en-US"/>
+          </a:p>
+        </c:txPr>
+        <c:crossAx val="88579600"/>
+        <c:crosses val="autoZero"/>
+        <c:auto val="1"/>
+        <c:lblAlgn val="ctr"/>
+        <c:lblOffset val="100"/>
+        <c:noMultiLvlLbl val="1"/>
+      </c:catAx>
+      <c:valAx>
+        <c:axId val="88579600"/>
+        <c:scaling>
+          <c:orientation val="minMax"/>
+        </c:scaling>
+        <c:delete val="0"/>
+        <c:axPos val="l"/>
+        <c:majorGridlines>
+          <c:spPr>
+            <a:ln w="6480" cap="flat" cmpd="sng" algn="ctr">
+              <a:solidFill>
+                <a:srgbClr val="B3B3B3"/>
+              </a:solidFill>
+              <a:prstDash val="solid"/>
+              <a:round/>
+            </a:ln>
+            <a:effectLst/>
+          </c:spPr>
+        </c:majorGridlines>
+        <c:numFmt formatCode="General" sourceLinked="0"/>
+        <c:majorTickMark val="out"/>
+        <c:minorTickMark val="none"/>
+        <c:tickLblPos val="nextTo"/>
+        <c:spPr>
+          <a:noFill/>
+          <a:ln w="6480" cap="flat" cmpd="sng" algn="ctr">
+            <a:solidFill>
+              <a:srgbClr val="B3B3B3"/>
+            </a:solidFill>
+            <a:prstDash val="solid"/>
+            <a:round/>
+          </a:ln>
+          <a:effectLst/>
+        </c:spPr>
+        <c:txPr>
+          <a:bodyPr rot="-60000000" spcFirstLastPara="1" vertOverflow="ellipsis" vert="horz" wrap="square" anchor="ctr" anchorCtr="1"/>
+          <a:lstStyle/>
+          <a:p>
+            <a:pPr>
+              <a:defRPr sz="1000" b="0" i="0" u="none" strike="noStrike" kern="1200" spc="-1" baseline="0">
+                <a:solidFill>
+                  <a:srgbClr val="000000"/>
+                </a:solidFill>
+                <a:latin typeface="Arial"/>
+                <a:ea typeface="+mn-ea"/>
+                <a:cs typeface="+mn-cs"/>
+              </a:defRPr>
+            </a:pPr>
+            <a:endParaRPr lang="en-US"/>
+          </a:p>
+        </c:txPr>
+        <c:crossAx val="30534675"/>
+        <c:crosses val="autoZero"/>
+        <c:crossBetween val="between"/>
+      </c:valAx>
+      <c:spPr>
+        <a:noFill/>
+        <a:ln>
+          <a:solidFill>
+            <a:srgbClr val="B3B3B3"/>
+          </a:solidFill>
+        </a:ln>
+        <a:effectLst/>
+      </c:spPr>
+    </c:plotArea>
+    <c:plotVisOnly val="1"/>
+    <c:dispBlanksAs val="gap"/>
+    <c:showDLblsOverMax val="1"/>
+  </c:chart>
+  <c:spPr>
+    <a:solidFill>
+      <a:srgbClr val="FFFFFF"/>
+    </a:solidFill>
+    <a:ln w="6350" cap="flat" cmpd="sng" algn="ctr">
+      <a:noFill/>
+      <a:prstDash val="solid"/>
+      <a:miter lim="800000"/>
     </a:ln>
     <a:effectLst/>
   </c:spPr>
@@ -5664,6 +7316,89 @@
     <a:lumMod val="50000"/>
     <a:lumOff val="50000"/>
   </cs:variation>
+</cs:colorStyle>
+</file>
+
+<file path=ppt/charts/colors7.xml><?xml version="1.0" encoding="utf-8"?>
+<cs:colorStyle xmlns:cs="http://schemas.microsoft.com/office/drawing/2012/chartStyle" xmlns:a="http://schemas.openxmlformats.org/drawingml/2006/main" meth="cycle" id="12">
+  <a:schemeClr val="accent2"/>
+  <a:schemeClr val="accent4"/>
+  <a:schemeClr val="accent6"/>
+  <cs:variation/>
+  <cs:variation>
+    <a:lumMod val="60000"/>
+  </cs:variation>
+  <cs:variation>
+    <a:lumMod val="80000"/>
+    <a:lumOff val="20000"/>
+  </cs:variation>
+  <cs:variation>
+    <a:lumMod val="80000"/>
+  </cs:variation>
+  <cs:variation>
+    <a:lumMod val="60000"/>
+    <a:lumOff val="40000"/>
+  </cs:variation>
+  <cs:variation>
+    <a:lumMod val="50000"/>
+  </cs:variation>
+  <cs:variation>
+    <a:lumMod val="70000"/>
+    <a:lumOff val="30000"/>
+  </cs:variation>
+  <cs:variation>
+    <a:lumMod val="70000"/>
+  </cs:variation>
+  <cs:variation>
+    <a:lumMod val="50000"/>
+    <a:lumOff val="50000"/>
+  </cs:variation>
+</cs:colorStyle>
+</file>
+
+<file path=ppt/charts/colors8.xml><?xml version="1.0" encoding="utf-8"?>
+<cs:colorStyle xmlns:cs="http://schemas.microsoft.com/office/drawing/2012/chartStyle" xmlns:a="http://schemas.openxmlformats.org/drawingml/2006/main" meth="cycle" id="10">
+  <a:schemeClr val="accent1"/>
+  <a:schemeClr val="accent2"/>
+  <a:schemeClr val="accent3"/>
+  <a:schemeClr val="accent4"/>
+  <a:schemeClr val="accent5"/>
+  <a:schemeClr val="accent6"/>
+  <cs:variation/>
+  <cs:variation>
+    <a:lumMod val="60000"/>
+  </cs:variation>
+  <cs:variation>
+    <a:lumMod val="80000"/>
+    <a:lumOff val="20000"/>
+  </cs:variation>
+  <cs:variation>
+    <a:lumMod val="80000"/>
+  </cs:variation>
+  <cs:variation>
+    <a:lumMod val="60000"/>
+    <a:lumOff val="40000"/>
+  </cs:variation>
+  <cs:variation>
+    <a:lumMod val="50000"/>
+  </cs:variation>
+  <cs:variation>
+    <a:lumMod val="70000"/>
+    <a:lumOff val="30000"/>
+  </cs:variation>
+  <cs:variation>
+    <a:lumMod val="70000"/>
+  </cs:variation>
+  <cs:variation>
+    <a:lumMod val="50000"/>
+    <a:lumOff val="50000"/>
+  </cs:variation>
+</cs:colorStyle>
+</file>
+
+<file path=ppt/charts/colors9.xml><?xml version="1.0" encoding="utf-8"?>
+<cs:colorStyle xmlns:cs="http://schemas.microsoft.com/office/drawing/2012/chartStyle" xmlns:a="http://schemas.openxmlformats.org/drawingml/2006/main" meth="withinLinear" id="18">
+  <a:schemeClr val="accent5"/>
 </cs:colorStyle>
 </file>
 
@@ -8832,6 +10567,1326 @@
     <cs:effectRef idx="0"/>
     <cs:fontRef idx="minor">
       <a:schemeClr val="lt1"/>
+    </cs:fontRef>
+  </cs:wall>
+</cs:chartStyle>
+</file>
+
+<file path=ppt/charts/style7.xml><?xml version="1.0" encoding="utf-8"?>
+<cs:chartStyle xmlns:cs="http://schemas.microsoft.com/office/drawing/2012/chartStyle" xmlns:a="http://schemas.openxmlformats.org/drawingml/2006/main" id="102">
+  <cs:axisTitle>
+    <cs:lnRef idx="0"/>
+    <cs:fillRef idx="0"/>
+    <cs:effectRef idx="0"/>
+    <cs:fontRef idx="minor">
+      <a:schemeClr val="tx1"/>
+    </cs:fontRef>
+    <cs:defRPr sz="1000" b="1" kern="1200"/>
+  </cs:axisTitle>
+  <cs:categoryAxis>
+    <cs:lnRef idx="1">
+      <a:schemeClr val="tx1">
+        <a:tint val="75000"/>
+      </a:schemeClr>
+    </cs:lnRef>
+    <cs:fillRef idx="0"/>
+    <cs:effectRef idx="0"/>
+    <cs:fontRef idx="minor">
+      <a:schemeClr val="tx1"/>
+    </cs:fontRef>
+    <cs:spPr>
+      <a:ln>
+        <a:round/>
+      </a:ln>
+    </cs:spPr>
+    <cs:defRPr sz="1000" kern="1200"/>
+  </cs:categoryAxis>
+  <cs:chartArea mods="allowNoFillOverride allowNoLineOverride">
+    <cs:lnRef idx="1">
+      <a:schemeClr val="tx1">
+        <a:tint val="75000"/>
+      </a:schemeClr>
+    </cs:lnRef>
+    <cs:fillRef idx="1">
+      <a:schemeClr val="bg1"/>
+    </cs:fillRef>
+    <cs:effectRef idx="0"/>
+    <cs:fontRef idx="minor">
+      <a:schemeClr val="tx1"/>
+    </cs:fontRef>
+    <cs:spPr>
+      <a:ln>
+        <a:round/>
+      </a:ln>
+    </cs:spPr>
+    <cs:defRPr sz="1000" kern="1200"/>
+  </cs:chartArea>
+  <cs:dataLabel>
+    <cs:lnRef idx="0"/>
+    <cs:fillRef idx="0"/>
+    <cs:effectRef idx="0"/>
+    <cs:fontRef idx="minor">
+      <a:schemeClr val="tx1"/>
+    </cs:fontRef>
+    <cs:defRPr sz="1000" kern="1200"/>
+  </cs:dataLabel>
+  <cs:dataLabelCallout>
+    <cs:lnRef idx="0"/>
+    <cs:fillRef idx="0"/>
+    <cs:effectRef idx="0"/>
+    <cs:fontRef idx="minor">
+      <a:schemeClr val="dk1"/>
+    </cs:fontRef>
+    <cs:spPr>
+      <a:solidFill>
+        <a:schemeClr val="lt1"/>
+      </a:solidFill>
+      <a:ln>
+        <a:solidFill>
+          <a:schemeClr val="dk1">
+            <a:lumMod val="65000"/>
+            <a:lumOff val="35000"/>
+          </a:schemeClr>
+        </a:solidFill>
+      </a:ln>
+    </cs:spPr>
+    <cs:defRPr sz="1000" kern="1200"/>
+  </cs:dataLabelCallout>
+  <cs:dataPoint>
+    <cs:lnRef idx="0"/>
+    <cs:fillRef idx="1">
+      <cs:styleClr val="auto"/>
+    </cs:fillRef>
+    <cs:effectRef idx="0"/>
+    <cs:fontRef idx="minor">
+      <a:schemeClr val="tx1"/>
+    </cs:fontRef>
+  </cs:dataPoint>
+  <cs:dataPoint3D>
+    <cs:lnRef idx="0"/>
+    <cs:fillRef idx="1">
+      <cs:styleClr val="auto"/>
+    </cs:fillRef>
+    <cs:effectRef idx="0"/>
+    <cs:fontRef idx="minor">
+      <a:schemeClr val="tx1"/>
+    </cs:fontRef>
+  </cs:dataPoint3D>
+  <cs:dataPointLine>
+    <cs:lnRef idx="1">
+      <cs:styleClr val="auto"/>
+    </cs:lnRef>
+    <cs:lineWidthScale>3</cs:lineWidthScale>
+    <cs:fillRef idx="0"/>
+    <cs:effectRef idx="0"/>
+    <cs:fontRef idx="minor">
+      <a:schemeClr val="tx1"/>
+    </cs:fontRef>
+    <cs:spPr>
+      <a:ln cap="rnd">
+        <a:round/>
+      </a:ln>
+    </cs:spPr>
+  </cs:dataPointLine>
+  <cs:dataPointMarker>
+    <cs:lnRef idx="1">
+      <cs:styleClr val="auto"/>
+    </cs:lnRef>
+    <cs:fillRef idx="1">
+      <cs:styleClr val="auto"/>
+    </cs:fillRef>
+    <cs:effectRef idx="0"/>
+    <cs:fontRef idx="minor">
+      <a:schemeClr val="tx1"/>
+    </cs:fontRef>
+    <cs:spPr>
+      <a:ln>
+        <a:round/>
+      </a:ln>
+    </cs:spPr>
+  </cs:dataPointMarker>
+  <cs:dataPointMarkerLayout/>
+  <cs:dataPointWireframe>
+    <cs:lnRef idx="1">
+      <cs:styleClr val="auto"/>
+    </cs:lnRef>
+    <cs:fillRef idx="0"/>
+    <cs:effectRef idx="0"/>
+    <cs:fontRef idx="minor">
+      <a:schemeClr val="tx1"/>
+    </cs:fontRef>
+    <cs:spPr>
+      <a:ln>
+        <a:round/>
+      </a:ln>
+    </cs:spPr>
+  </cs:dataPointWireframe>
+  <cs:dataTable>
+    <cs:lnRef idx="1">
+      <a:schemeClr val="tx1">
+        <a:tint val="75000"/>
+      </a:schemeClr>
+    </cs:lnRef>
+    <cs:fillRef idx="0"/>
+    <cs:effectRef idx="0"/>
+    <cs:fontRef idx="minor">
+      <a:schemeClr val="tx1"/>
+    </cs:fontRef>
+    <cs:spPr>
+      <a:ln>
+        <a:round/>
+      </a:ln>
+    </cs:spPr>
+    <cs:defRPr sz="1000" kern="1200"/>
+  </cs:dataTable>
+  <cs:downBar>
+    <cs:lnRef idx="1">
+      <a:schemeClr val="tx1"/>
+    </cs:lnRef>
+    <cs:fillRef idx="1">
+      <a:schemeClr val="dk1">
+        <a:tint val="95000"/>
+      </a:schemeClr>
+    </cs:fillRef>
+    <cs:effectRef idx="0"/>
+    <cs:fontRef idx="minor">
+      <a:schemeClr val="tx1"/>
+    </cs:fontRef>
+    <cs:spPr>
+      <a:ln>
+        <a:round/>
+      </a:ln>
+    </cs:spPr>
+  </cs:downBar>
+  <cs:dropLine>
+    <cs:lnRef idx="1">
+      <a:schemeClr val="tx1"/>
+    </cs:lnRef>
+    <cs:fillRef idx="0"/>
+    <cs:effectRef idx="0"/>
+    <cs:fontRef idx="minor">
+      <a:schemeClr val="tx1"/>
+    </cs:fontRef>
+    <cs:spPr>
+      <a:ln>
+        <a:round/>
+      </a:ln>
+    </cs:spPr>
+  </cs:dropLine>
+  <cs:errorBar>
+    <cs:lnRef idx="1">
+      <a:schemeClr val="tx1"/>
+    </cs:lnRef>
+    <cs:fillRef idx="1">
+      <a:schemeClr val="tx1"/>
+    </cs:fillRef>
+    <cs:effectRef idx="0"/>
+    <cs:fontRef idx="minor">
+      <a:schemeClr val="tx1"/>
+    </cs:fontRef>
+    <cs:spPr>
+      <a:ln>
+        <a:round/>
+      </a:ln>
+    </cs:spPr>
+  </cs:errorBar>
+  <cs:floor>
+    <cs:lnRef idx="1">
+      <a:schemeClr val="tx1">
+        <a:tint val="75000"/>
+      </a:schemeClr>
+    </cs:lnRef>
+    <cs:fillRef idx="0"/>
+    <cs:effectRef idx="0"/>
+    <cs:fontRef idx="minor">
+      <a:schemeClr val="tx1"/>
+    </cs:fontRef>
+    <cs:spPr>
+      <a:ln>
+        <a:round/>
+      </a:ln>
+    </cs:spPr>
+  </cs:floor>
+  <cs:gridlineMajor>
+    <cs:lnRef idx="1">
+      <a:schemeClr val="tx1">
+        <a:tint val="75000"/>
+      </a:schemeClr>
+    </cs:lnRef>
+    <cs:fillRef idx="0"/>
+    <cs:effectRef idx="0"/>
+    <cs:fontRef idx="minor">
+      <a:schemeClr val="tx1"/>
+    </cs:fontRef>
+    <cs:spPr>
+      <a:ln>
+        <a:round/>
+      </a:ln>
+    </cs:spPr>
+  </cs:gridlineMajor>
+  <cs:gridlineMinor>
+    <cs:lnRef idx="1">
+      <a:schemeClr val="tx1">
+        <a:tint val="50000"/>
+      </a:schemeClr>
+    </cs:lnRef>
+    <cs:fillRef idx="0"/>
+    <cs:effectRef idx="0"/>
+    <cs:fontRef idx="minor">
+      <a:schemeClr val="tx1"/>
+    </cs:fontRef>
+    <cs:spPr>
+      <a:ln>
+        <a:round/>
+      </a:ln>
+    </cs:spPr>
+  </cs:gridlineMinor>
+  <cs:hiLoLine>
+    <cs:lnRef idx="1">
+      <a:schemeClr val="tx1"/>
+    </cs:lnRef>
+    <cs:fillRef idx="0"/>
+    <cs:effectRef idx="0"/>
+    <cs:fontRef idx="minor">
+      <a:schemeClr val="tx1"/>
+    </cs:fontRef>
+    <cs:spPr>
+      <a:ln>
+        <a:round/>
+      </a:ln>
+    </cs:spPr>
+  </cs:hiLoLine>
+  <cs:leaderLine>
+    <cs:lnRef idx="1">
+      <a:schemeClr val="tx1"/>
+    </cs:lnRef>
+    <cs:fillRef idx="0"/>
+    <cs:effectRef idx="0"/>
+    <cs:fontRef idx="minor">
+      <a:schemeClr val="tx1"/>
+    </cs:fontRef>
+    <cs:spPr>
+      <a:ln>
+        <a:round/>
+      </a:ln>
+    </cs:spPr>
+  </cs:leaderLine>
+  <cs:legend>
+    <cs:lnRef idx="0"/>
+    <cs:fillRef idx="0"/>
+    <cs:effectRef idx="0"/>
+    <cs:fontRef idx="minor">
+      <a:schemeClr val="tx1"/>
+    </cs:fontRef>
+    <cs:defRPr sz="1000" kern="1200"/>
+  </cs:legend>
+  <cs:plotArea mods="allowNoFillOverride allowNoLineOverride">
+    <cs:lnRef idx="0"/>
+    <cs:fillRef idx="1">
+      <a:schemeClr val="bg1"/>
+    </cs:fillRef>
+    <cs:effectRef idx="0"/>
+    <cs:fontRef idx="minor">
+      <a:schemeClr val="tx1"/>
+    </cs:fontRef>
+  </cs:plotArea>
+  <cs:plotArea3D>
+    <cs:lnRef idx="0"/>
+    <cs:fillRef idx="0"/>
+    <cs:effectRef idx="0"/>
+    <cs:fontRef idx="minor">
+      <a:schemeClr val="tx1"/>
+    </cs:fontRef>
+  </cs:plotArea3D>
+  <cs:seriesAxis>
+    <cs:lnRef idx="1">
+      <a:schemeClr val="tx1">
+        <a:tint val="75000"/>
+      </a:schemeClr>
+    </cs:lnRef>
+    <cs:fillRef idx="0"/>
+    <cs:effectRef idx="0"/>
+    <cs:fontRef idx="minor">
+      <a:schemeClr val="tx1"/>
+    </cs:fontRef>
+    <cs:spPr>
+      <a:ln>
+        <a:round/>
+      </a:ln>
+    </cs:spPr>
+    <cs:defRPr sz="1000" kern="1200"/>
+  </cs:seriesAxis>
+  <cs:seriesLine>
+    <cs:lnRef idx="1">
+      <a:schemeClr val="tx1"/>
+    </cs:lnRef>
+    <cs:fillRef idx="0"/>
+    <cs:effectRef idx="0"/>
+    <cs:fontRef idx="minor">
+      <a:schemeClr val="tx1"/>
+    </cs:fontRef>
+    <cs:spPr>
+      <a:ln>
+        <a:round/>
+      </a:ln>
+    </cs:spPr>
+  </cs:seriesLine>
+  <cs:title>
+    <cs:lnRef idx="0"/>
+    <cs:fillRef idx="0"/>
+    <cs:effectRef idx="0"/>
+    <cs:fontRef idx="minor">
+      <a:schemeClr val="tx1"/>
+    </cs:fontRef>
+    <cs:defRPr sz="1800" b="1" kern="1200"/>
+  </cs:title>
+  <cs:trendline>
+    <cs:lnRef idx="1">
+      <a:schemeClr val="tx1"/>
+    </cs:lnRef>
+    <cs:fillRef idx="0"/>
+    <cs:effectRef idx="0"/>
+    <cs:fontRef idx="minor">
+      <a:schemeClr val="tx1"/>
+    </cs:fontRef>
+    <cs:spPr>
+      <a:ln cap="rnd">
+        <a:round/>
+      </a:ln>
+    </cs:spPr>
+  </cs:trendline>
+  <cs:trendlineLabel>
+    <cs:lnRef idx="0"/>
+    <cs:fillRef idx="0"/>
+    <cs:effectRef idx="0"/>
+    <cs:fontRef idx="minor">
+      <a:schemeClr val="tx1"/>
+    </cs:fontRef>
+    <cs:defRPr sz="1000" kern="1200"/>
+  </cs:trendlineLabel>
+  <cs:upBar>
+    <cs:lnRef idx="1">
+      <a:schemeClr val="tx1"/>
+    </cs:lnRef>
+    <cs:fillRef idx="1">
+      <a:schemeClr val="dk1">
+        <a:tint val="5000"/>
+      </a:schemeClr>
+    </cs:fillRef>
+    <cs:effectRef idx="0"/>
+    <cs:fontRef idx="minor">
+      <a:schemeClr val="tx1"/>
+    </cs:fontRef>
+    <cs:spPr>
+      <a:ln>
+        <a:round/>
+      </a:ln>
+    </cs:spPr>
+  </cs:upBar>
+  <cs:valueAxis>
+    <cs:lnRef idx="1">
+      <a:schemeClr val="tx1">
+        <a:tint val="75000"/>
+      </a:schemeClr>
+    </cs:lnRef>
+    <cs:fillRef idx="0"/>
+    <cs:effectRef idx="0"/>
+    <cs:fontRef idx="minor">
+      <a:schemeClr val="tx1"/>
+    </cs:fontRef>
+    <cs:spPr>
+      <a:ln>
+        <a:round/>
+      </a:ln>
+    </cs:spPr>
+    <cs:defRPr sz="1000" kern="1200"/>
+  </cs:valueAxis>
+  <cs:wall>
+    <cs:lnRef idx="0"/>
+    <cs:fillRef idx="0"/>
+    <cs:effectRef idx="0"/>
+    <cs:fontRef idx="minor">
+      <a:schemeClr val="tx1"/>
+    </cs:fontRef>
+  </cs:wall>
+</cs:chartStyle>
+</file>
+
+<file path=ppt/charts/style8.xml><?xml version="1.0" encoding="utf-8"?>
+<cs:chartStyle xmlns:cs="http://schemas.microsoft.com/office/drawing/2012/chartStyle" xmlns:a="http://schemas.openxmlformats.org/drawingml/2006/main" id="102">
+  <cs:axisTitle>
+    <cs:lnRef idx="0"/>
+    <cs:fillRef idx="0"/>
+    <cs:effectRef idx="0"/>
+    <cs:fontRef idx="minor">
+      <a:schemeClr val="tx1"/>
+    </cs:fontRef>
+    <cs:defRPr sz="1000" b="1" kern="1200"/>
+  </cs:axisTitle>
+  <cs:categoryAxis>
+    <cs:lnRef idx="1">
+      <a:schemeClr val="tx1">
+        <a:tint val="75000"/>
+      </a:schemeClr>
+    </cs:lnRef>
+    <cs:fillRef idx="0"/>
+    <cs:effectRef idx="0"/>
+    <cs:fontRef idx="minor">
+      <a:schemeClr val="tx1"/>
+    </cs:fontRef>
+    <cs:spPr>
+      <a:ln>
+        <a:round/>
+      </a:ln>
+    </cs:spPr>
+    <cs:defRPr sz="1000" kern="1200"/>
+  </cs:categoryAxis>
+  <cs:chartArea mods="allowNoFillOverride allowNoLineOverride">
+    <cs:lnRef idx="1">
+      <a:schemeClr val="tx1">
+        <a:tint val="75000"/>
+      </a:schemeClr>
+    </cs:lnRef>
+    <cs:fillRef idx="1">
+      <a:schemeClr val="bg1"/>
+    </cs:fillRef>
+    <cs:effectRef idx="0"/>
+    <cs:fontRef idx="minor">
+      <a:schemeClr val="tx1"/>
+    </cs:fontRef>
+    <cs:spPr>
+      <a:ln>
+        <a:round/>
+      </a:ln>
+    </cs:spPr>
+    <cs:defRPr sz="1000" kern="1200"/>
+  </cs:chartArea>
+  <cs:dataLabel>
+    <cs:lnRef idx="0"/>
+    <cs:fillRef idx="0"/>
+    <cs:effectRef idx="0"/>
+    <cs:fontRef idx="minor">
+      <a:schemeClr val="tx1"/>
+    </cs:fontRef>
+    <cs:defRPr sz="1000" kern="1200"/>
+  </cs:dataLabel>
+  <cs:dataLabelCallout>
+    <cs:lnRef idx="0"/>
+    <cs:fillRef idx="0"/>
+    <cs:effectRef idx="0"/>
+    <cs:fontRef idx="minor">
+      <a:schemeClr val="dk1"/>
+    </cs:fontRef>
+    <cs:spPr>
+      <a:solidFill>
+        <a:schemeClr val="lt1"/>
+      </a:solidFill>
+      <a:ln>
+        <a:solidFill>
+          <a:schemeClr val="dk1">
+            <a:lumMod val="65000"/>
+            <a:lumOff val="35000"/>
+          </a:schemeClr>
+        </a:solidFill>
+      </a:ln>
+    </cs:spPr>
+    <cs:defRPr sz="1000" kern="1200"/>
+  </cs:dataLabelCallout>
+  <cs:dataPoint>
+    <cs:lnRef idx="0"/>
+    <cs:fillRef idx="1">
+      <cs:styleClr val="auto"/>
+    </cs:fillRef>
+    <cs:effectRef idx="0"/>
+    <cs:fontRef idx="minor">
+      <a:schemeClr val="tx1"/>
+    </cs:fontRef>
+  </cs:dataPoint>
+  <cs:dataPoint3D>
+    <cs:lnRef idx="0"/>
+    <cs:fillRef idx="1">
+      <cs:styleClr val="auto"/>
+    </cs:fillRef>
+    <cs:effectRef idx="0"/>
+    <cs:fontRef idx="minor">
+      <a:schemeClr val="tx1"/>
+    </cs:fontRef>
+  </cs:dataPoint3D>
+  <cs:dataPointLine>
+    <cs:lnRef idx="1">
+      <cs:styleClr val="auto"/>
+    </cs:lnRef>
+    <cs:lineWidthScale>3</cs:lineWidthScale>
+    <cs:fillRef idx="0"/>
+    <cs:effectRef idx="0"/>
+    <cs:fontRef idx="minor">
+      <a:schemeClr val="tx1"/>
+    </cs:fontRef>
+    <cs:spPr>
+      <a:ln cap="rnd">
+        <a:round/>
+      </a:ln>
+    </cs:spPr>
+  </cs:dataPointLine>
+  <cs:dataPointMarker>
+    <cs:lnRef idx="1">
+      <cs:styleClr val="auto"/>
+    </cs:lnRef>
+    <cs:fillRef idx="1">
+      <cs:styleClr val="auto"/>
+    </cs:fillRef>
+    <cs:effectRef idx="0"/>
+    <cs:fontRef idx="minor">
+      <a:schemeClr val="tx1"/>
+    </cs:fontRef>
+    <cs:spPr>
+      <a:ln>
+        <a:round/>
+      </a:ln>
+    </cs:spPr>
+  </cs:dataPointMarker>
+  <cs:dataPointMarkerLayout/>
+  <cs:dataPointWireframe>
+    <cs:lnRef idx="1">
+      <cs:styleClr val="auto"/>
+    </cs:lnRef>
+    <cs:fillRef idx="0"/>
+    <cs:effectRef idx="0"/>
+    <cs:fontRef idx="minor">
+      <a:schemeClr val="tx1"/>
+    </cs:fontRef>
+    <cs:spPr>
+      <a:ln>
+        <a:round/>
+      </a:ln>
+    </cs:spPr>
+  </cs:dataPointWireframe>
+  <cs:dataTable>
+    <cs:lnRef idx="1">
+      <a:schemeClr val="tx1">
+        <a:tint val="75000"/>
+      </a:schemeClr>
+    </cs:lnRef>
+    <cs:fillRef idx="0"/>
+    <cs:effectRef idx="0"/>
+    <cs:fontRef idx="minor">
+      <a:schemeClr val="tx1"/>
+    </cs:fontRef>
+    <cs:spPr>
+      <a:ln>
+        <a:round/>
+      </a:ln>
+    </cs:spPr>
+    <cs:defRPr sz="1000" kern="1200"/>
+  </cs:dataTable>
+  <cs:downBar>
+    <cs:lnRef idx="1">
+      <a:schemeClr val="tx1"/>
+    </cs:lnRef>
+    <cs:fillRef idx="1">
+      <a:schemeClr val="dk1">
+        <a:tint val="95000"/>
+      </a:schemeClr>
+    </cs:fillRef>
+    <cs:effectRef idx="0"/>
+    <cs:fontRef idx="minor">
+      <a:schemeClr val="tx1"/>
+    </cs:fontRef>
+    <cs:spPr>
+      <a:ln>
+        <a:round/>
+      </a:ln>
+    </cs:spPr>
+  </cs:downBar>
+  <cs:dropLine>
+    <cs:lnRef idx="1">
+      <a:schemeClr val="tx1"/>
+    </cs:lnRef>
+    <cs:fillRef idx="0"/>
+    <cs:effectRef idx="0"/>
+    <cs:fontRef idx="minor">
+      <a:schemeClr val="tx1"/>
+    </cs:fontRef>
+    <cs:spPr>
+      <a:ln>
+        <a:round/>
+      </a:ln>
+    </cs:spPr>
+  </cs:dropLine>
+  <cs:errorBar>
+    <cs:lnRef idx="1">
+      <a:schemeClr val="tx1"/>
+    </cs:lnRef>
+    <cs:fillRef idx="1">
+      <a:schemeClr val="tx1"/>
+    </cs:fillRef>
+    <cs:effectRef idx="0"/>
+    <cs:fontRef idx="minor">
+      <a:schemeClr val="tx1"/>
+    </cs:fontRef>
+    <cs:spPr>
+      <a:ln>
+        <a:round/>
+      </a:ln>
+    </cs:spPr>
+  </cs:errorBar>
+  <cs:floor>
+    <cs:lnRef idx="1">
+      <a:schemeClr val="tx1">
+        <a:tint val="75000"/>
+      </a:schemeClr>
+    </cs:lnRef>
+    <cs:fillRef idx="0"/>
+    <cs:effectRef idx="0"/>
+    <cs:fontRef idx="minor">
+      <a:schemeClr val="tx1"/>
+    </cs:fontRef>
+    <cs:spPr>
+      <a:ln>
+        <a:round/>
+      </a:ln>
+    </cs:spPr>
+  </cs:floor>
+  <cs:gridlineMajor>
+    <cs:lnRef idx="1">
+      <a:schemeClr val="tx1">
+        <a:tint val="75000"/>
+      </a:schemeClr>
+    </cs:lnRef>
+    <cs:fillRef idx="0"/>
+    <cs:effectRef idx="0"/>
+    <cs:fontRef idx="minor">
+      <a:schemeClr val="tx1"/>
+    </cs:fontRef>
+    <cs:spPr>
+      <a:ln>
+        <a:round/>
+      </a:ln>
+    </cs:spPr>
+  </cs:gridlineMajor>
+  <cs:gridlineMinor>
+    <cs:lnRef idx="1">
+      <a:schemeClr val="tx1">
+        <a:tint val="50000"/>
+      </a:schemeClr>
+    </cs:lnRef>
+    <cs:fillRef idx="0"/>
+    <cs:effectRef idx="0"/>
+    <cs:fontRef idx="minor">
+      <a:schemeClr val="tx1"/>
+    </cs:fontRef>
+    <cs:spPr>
+      <a:ln>
+        <a:round/>
+      </a:ln>
+    </cs:spPr>
+  </cs:gridlineMinor>
+  <cs:hiLoLine>
+    <cs:lnRef idx="1">
+      <a:schemeClr val="tx1"/>
+    </cs:lnRef>
+    <cs:fillRef idx="0"/>
+    <cs:effectRef idx="0"/>
+    <cs:fontRef idx="minor">
+      <a:schemeClr val="tx1"/>
+    </cs:fontRef>
+    <cs:spPr>
+      <a:ln>
+        <a:round/>
+      </a:ln>
+    </cs:spPr>
+  </cs:hiLoLine>
+  <cs:leaderLine>
+    <cs:lnRef idx="1">
+      <a:schemeClr val="tx1"/>
+    </cs:lnRef>
+    <cs:fillRef idx="0"/>
+    <cs:effectRef idx="0"/>
+    <cs:fontRef idx="minor">
+      <a:schemeClr val="tx1"/>
+    </cs:fontRef>
+    <cs:spPr>
+      <a:ln>
+        <a:round/>
+      </a:ln>
+    </cs:spPr>
+  </cs:leaderLine>
+  <cs:legend>
+    <cs:lnRef idx="0"/>
+    <cs:fillRef idx="0"/>
+    <cs:effectRef idx="0"/>
+    <cs:fontRef idx="minor">
+      <a:schemeClr val="tx1"/>
+    </cs:fontRef>
+    <cs:defRPr sz="1000" kern="1200"/>
+  </cs:legend>
+  <cs:plotArea mods="allowNoFillOverride allowNoLineOverride">
+    <cs:lnRef idx="0"/>
+    <cs:fillRef idx="1">
+      <a:schemeClr val="bg1"/>
+    </cs:fillRef>
+    <cs:effectRef idx="0"/>
+    <cs:fontRef idx="minor">
+      <a:schemeClr val="tx1"/>
+    </cs:fontRef>
+  </cs:plotArea>
+  <cs:plotArea3D>
+    <cs:lnRef idx="0"/>
+    <cs:fillRef idx="0"/>
+    <cs:effectRef idx="0"/>
+    <cs:fontRef idx="minor">
+      <a:schemeClr val="tx1"/>
+    </cs:fontRef>
+  </cs:plotArea3D>
+  <cs:seriesAxis>
+    <cs:lnRef idx="1">
+      <a:schemeClr val="tx1">
+        <a:tint val="75000"/>
+      </a:schemeClr>
+    </cs:lnRef>
+    <cs:fillRef idx="0"/>
+    <cs:effectRef idx="0"/>
+    <cs:fontRef idx="minor">
+      <a:schemeClr val="tx1"/>
+    </cs:fontRef>
+    <cs:spPr>
+      <a:ln>
+        <a:round/>
+      </a:ln>
+    </cs:spPr>
+    <cs:defRPr sz="1000" kern="1200"/>
+  </cs:seriesAxis>
+  <cs:seriesLine>
+    <cs:lnRef idx="1">
+      <a:schemeClr val="tx1"/>
+    </cs:lnRef>
+    <cs:fillRef idx="0"/>
+    <cs:effectRef idx="0"/>
+    <cs:fontRef idx="minor">
+      <a:schemeClr val="tx1"/>
+    </cs:fontRef>
+    <cs:spPr>
+      <a:ln>
+        <a:round/>
+      </a:ln>
+    </cs:spPr>
+  </cs:seriesLine>
+  <cs:title>
+    <cs:lnRef idx="0"/>
+    <cs:fillRef idx="0"/>
+    <cs:effectRef idx="0"/>
+    <cs:fontRef idx="minor">
+      <a:schemeClr val="tx1"/>
+    </cs:fontRef>
+    <cs:defRPr sz="1800" b="1" kern="1200"/>
+  </cs:title>
+  <cs:trendline>
+    <cs:lnRef idx="1">
+      <a:schemeClr val="tx1"/>
+    </cs:lnRef>
+    <cs:fillRef idx="0"/>
+    <cs:effectRef idx="0"/>
+    <cs:fontRef idx="minor">
+      <a:schemeClr val="tx1"/>
+    </cs:fontRef>
+    <cs:spPr>
+      <a:ln cap="rnd">
+        <a:round/>
+      </a:ln>
+    </cs:spPr>
+  </cs:trendline>
+  <cs:trendlineLabel>
+    <cs:lnRef idx="0"/>
+    <cs:fillRef idx="0"/>
+    <cs:effectRef idx="0"/>
+    <cs:fontRef idx="minor">
+      <a:schemeClr val="tx1"/>
+    </cs:fontRef>
+    <cs:defRPr sz="1000" kern="1200"/>
+  </cs:trendlineLabel>
+  <cs:upBar>
+    <cs:lnRef idx="1">
+      <a:schemeClr val="tx1"/>
+    </cs:lnRef>
+    <cs:fillRef idx="1">
+      <a:schemeClr val="dk1">
+        <a:tint val="5000"/>
+      </a:schemeClr>
+    </cs:fillRef>
+    <cs:effectRef idx="0"/>
+    <cs:fontRef idx="minor">
+      <a:schemeClr val="tx1"/>
+    </cs:fontRef>
+    <cs:spPr>
+      <a:ln>
+        <a:round/>
+      </a:ln>
+    </cs:spPr>
+  </cs:upBar>
+  <cs:valueAxis>
+    <cs:lnRef idx="1">
+      <a:schemeClr val="tx1">
+        <a:tint val="75000"/>
+      </a:schemeClr>
+    </cs:lnRef>
+    <cs:fillRef idx="0"/>
+    <cs:effectRef idx="0"/>
+    <cs:fontRef idx="minor">
+      <a:schemeClr val="tx1"/>
+    </cs:fontRef>
+    <cs:spPr>
+      <a:ln>
+        <a:round/>
+      </a:ln>
+    </cs:spPr>
+    <cs:defRPr sz="1000" kern="1200"/>
+  </cs:valueAxis>
+  <cs:wall>
+    <cs:lnRef idx="0"/>
+    <cs:fillRef idx="0"/>
+    <cs:effectRef idx="0"/>
+    <cs:fontRef idx="minor">
+      <a:schemeClr val="tx1"/>
+    </cs:fontRef>
+  </cs:wall>
+</cs:chartStyle>
+</file>
+
+<file path=ppt/charts/style9.xml><?xml version="1.0" encoding="utf-8"?>
+<cs:chartStyle xmlns:cs="http://schemas.microsoft.com/office/drawing/2012/chartStyle" xmlns:a="http://schemas.openxmlformats.org/drawingml/2006/main" id="102">
+  <cs:axisTitle>
+    <cs:lnRef idx="0"/>
+    <cs:fillRef idx="0"/>
+    <cs:effectRef idx="0"/>
+    <cs:fontRef idx="minor">
+      <a:schemeClr val="tx1"/>
+    </cs:fontRef>
+    <cs:defRPr sz="1000" b="1" kern="1200"/>
+  </cs:axisTitle>
+  <cs:categoryAxis>
+    <cs:lnRef idx="1">
+      <a:schemeClr val="tx1">
+        <a:tint val="75000"/>
+      </a:schemeClr>
+    </cs:lnRef>
+    <cs:fillRef idx="0"/>
+    <cs:effectRef idx="0"/>
+    <cs:fontRef idx="minor">
+      <a:schemeClr val="tx1"/>
+    </cs:fontRef>
+    <cs:spPr>
+      <a:ln>
+        <a:round/>
+      </a:ln>
+    </cs:spPr>
+    <cs:defRPr sz="1000" kern="1200"/>
+  </cs:categoryAxis>
+  <cs:chartArea mods="allowNoFillOverride allowNoLineOverride">
+    <cs:lnRef idx="1">
+      <a:schemeClr val="tx1">
+        <a:tint val="75000"/>
+      </a:schemeClr>
+    </cs:lnRef>
+    <cs:fillRef idx="1">
+      <a:schemeClr val="bg1"/>
+    </cs:fillRef>
+    <cs:effectRef idx="0"/>
+    <cs:fontRef idx="minor">
+      <a:schemeClr val="tx1"/>
+    </cs:fontRef>
+    <cs:spPr>
+      <a:ln>
+        <a:round/>
+      </a:ln>
+    </cs:spPr>
+    <cs:defRPr sz="1000" kern="1200"/>
+  </cs:chartArea>
+  <cs:dataLabel>
+    <cs:lnRef idx="0"/>
+    <cs:fillRef idx="0"/>
+    <cs:effectRef idx="0"/>
+    <cs:fontRef idx="minor">
+      <a:schemeClr val="tx1"/>
+    </cs:fontRef>
+    <cs:defRPr sz="1000" kern="1200"/>
+  </cs:dataLabel>
+  <cs:dataLabelCallout>
+    <cs:lnRef idx="0"/>
+    <cs:fillRef idx="0"/>
+    <cs:effectRef idx="0"/>
+    <cs:fontRef idx="minor">
+      <a:schemeClr val="dk1"/>
+    </cs:fontRef>
+    <cs:spPr>
+      <a:solidFill>
+        <a:schemeClr val="lt1"/>
+      </a:solidFill>
+      <a:ln>
+        <a:solidFill>
+          <a:schemeClr val="dk1">
+            <a:lumMod val="65000"/>
+            <a:lumOff val="35000"/>
+          </a:schemeClr>
+        </a:solidFill>
+      </a:ln>
+    </cs:spPr>
+    <cs:defRPr sz="1000" kern="1200"/>
+  </cs:dataLabelCallout>
+  <cs:dataPoint>
+    <cs:lnRef idx="0"/>
+    <cs:fillRef idx="1">
+      <cs:styleClr val="auto"/>
+    </cs:fillRef>
+    <cs:effectRef idx="0"/>
+    <cs:fontRef idx="minor">
+      <a:schemeClr val="tx1"/>
+    </cs:fontRef>
+  </cs:dataPoint>
+  <cs:dataPoint3D>
+    <cs:lnRef idx="0"/>
+    <cs:fillRef idx="1">
+      <cs:styleClr val="auto"/>
+    </cs:fillRef>
+    <cs:effectRef idx="0"/>
+    <cs:fontRef idx="minor">
+      <a:schemeClr val="tx1"/>
+    </cs:fontRef>
+  </cs:dataPoint3D>
+  <cs:dataPointLine>
+    <cs:lnRef idx="1">
+      <cs:styleClr val="auto"/>
+    </cs:lnRef>
+    <cs:lineWidthScale>3</cs:lineWidthScale>
+    <cs:fillRef idx="0"/>
+    <cs:effectRef idx="0"/>
+    <cs:fontRef idx="minor">
+      <a:schemeClr val="tx1"/>
+    </cs:fontRef>
+    <cs:spPr>
+      <a:ln cap="rnd">
+        <a:round/>
+      </a:ln>
+    </cs:spPr>
+  </cs:dataPointLine>
+  <cs:dataPointMarker>
+    <cs:lnRef idx="1">
+      <cs:styleClr val="auto"/>
+    </cs:lnRef>
+    <cs:fillRef idx="1">
+      <cs:styleClr val="auto"/>
+    </cs:fillRef>
+    <cs:effectRef idx="0"/>
+    <cs:fontRef idx="minor">
+      <a:schemeClr val="tx1"/>
+    </cs:fontRef>
+    <cs:spPr>
+      <a:ln>
+        <a:round/>
+      </a:ln>
+    </cs:spPr>
+  </cs:dataPointMarker>
+  <cs:dataPointMarkerLayout/>
+  <cs:dataPointWireframe>
+    <cs:lnRef idx="1">
+      <cs:styleClr val="auto"/>
+    </cs:lnRef>
+    <cs:fillRef idx="0"/>
+    <cs:effectRef idx="0"/>
+    <cs:fontRef idx="minor">
+      <a:schemeClr val="tx1"/>
+    </cs:fontRef>
+    <cs:spPr>
+      <a:ln>
+        <a:round/>
+      </a:ln>
+    </cs:spPr>
+  </cs:dataPointWireframe>
+  <cs:dataTable>
+    <cs:lnRef idx="1">
+      <a:schemeClr val="tx1">
+        <a:tint val="75000"/>
+      </a:schemeClr>
+    </cs:lnRef>
+    <cs:fillRef idx="0"/>
+    <cs:effectRef idx="0"/>
+    <cs:fontRef idx="minor">
+      <a:schemeClr val="tx1"/>
+    </cs:fontRef>
+    <cs:spPr>
+      <a:ln>
+        <a:round/>
+      </a:ln>
+    </cs:spPr>
+    <cs:defRPr sz="1000" kern="1200"/>
+  </cs:dataTable>
+  <cs:downBar>
+    <cs:lnRef idx="1">
+      <a:schemeClr val="tx1"/>
+    </cs:lnRef>
+    <cs:fillRef idx="1">
+      <a:schemeClr val="dk1">
+        <a:tint val="95000"/>
+      </a:schemeClr>
+    </cs:fillRef>
+    <cs:effectRef idx="0"/>
+    <cs:fontRef idx="minor">
+      <a:schemeClr val="tx1"/>
+    </cs:fontRef>
+    <cs:spPr>
+      <a:ln>
+        <a:round/>
+      </a:ln>
+    </cs:spPr>
+  </cs:downBar>
+  <cs:dropLine>
+    <cs:lnRef idx="1">
+      <a:schemeClr val="tx1"/>
+    </cs:lnRef>
+    <cs:fillRef idx="0"/>
+    <cs:effectRef idx="0"/>
+    <cs:fontRef idx="minor">
+      <a:schemeClr val="tx1"/>
+    </cs:fontRef>
+    <cs:spPr>
+      <a:ln>
+        <a:round/>
+      </a:ln>
+    </cs:spPr>
+  </cs:dropLine>
+  <cs:errorBar>
+    <cs:lnRef idx="1">
+      <a:schemeClr val="tx1"/>
+    </cs:lnRef>
+    <cs:fillRef idx="1">
+      <a:schemeClr val="tx1"/>
+    </cs:fillRef>
+    <cs:effectRef idx="0"/>
+    <cs:fontRef idx="minor">
+      <a:schemeClr val="tx1"/>
+    </cs:fontRef>
+    <cs:spPr>
+      <a:ln>
+        <a:round/>
+      </a:ln>
+    </cs:spPr>
+  </cs:errorBar>
+  <cs:floor>
+    <cs:lnRef idx="1">
+      <a:schemeClr val="tx1">
+        <a:tint val="75000"/>
+      </a:schemeClr>
+    </cs:lnRef>
+    <cs:fillRef idx="0"/>
+    <cs:effectRef idx="0"/>
+    <cs:fontRef idx="minor">
+      <a:schemeClr val="tx1"/>
+    </cs:fontRef>
+    <cs:spPr>
+      <a:ln>
+        <a:round/>
+      </a:ln>
+    </cs:spPr>
+  </cs:floor>
+  <cs:gridlineMajor>
+    <cs:lnRef idx="1">
+      <a:schemeClr val="tx1">
+        <a:tint val="75000"/>
+      </a:schemeClr>
+    </cs:lnRef>
+    <cs:fillRef idx="0"/>
+    <cs:effectRef idx="0"/>
+    <cs:fontRef idx="minor">
+      <a:schemeClr val="tx1"/>
+    </cs:fontRef>
+    <cs:spPr>
+      <a:ln>
+        <a:round/>
+      </a:ln>
+    </cs:spPr>
+  </cs:gridlineMajor>
+  <cs:gridlineMinor>
+    <cs:lnRef idx="1">
+      <a:schemeClr val="tx1">
+        <a:tint val="50000"/>
+      </a:schemeClr>
+    </cs:lnRef>
+    <cs:fillRef idx="0"/>
+    <cs:effectRef idx="0"/>
+    <cs:fontRef idx="minor">
+      <a:schemeClr val="tx1"/>
+    </cs:fontRef>
+    <cs:spPr>
+      <a:ln>
+        <a:round/>
+      </a:ln>
+    </cs:spPr>
+  </cs:gridlineMinor>
+  <cs:hiLoLine>
+    <cs:lnRef idx="1">
+      <a:schemeClr val="tx1"/>
+    </cs:lnRef>
+    <cs:fillRef idx="0"/>
+    <cs:effectRef idx="0"/>
+    <cs:fontRef idx="minor">
+      <a:schemeClr val="tx1"/>
+    </cs:fontRef>
+    <cs:spPr>
+      <a:ln>
+        <a:round/>
+      </a:ln>
+    </cs:spPr>
+  </cs:hiLoLine>
+  <cs:leaderLine>
+    <cs:lnRef idx="1">
+      <a:schemeClr val="tx1"/>
+    </cs:lnRef>
+    <cs:fillRef idx="0"/>
+    <cs:effectRef idx="0"/>
+    <cs:fontRef idx="minor">
+      <a:schemeClr val="tx1"/>
+    </cs:fontRef>
+    <cs:spPr>
+      <a:ln>
+        <a:round/>
+      </a:ln>
+    </cs:spPr>
+  </cs:leaderLine>
+  <cs:legend>
+    <cs:lnRef idx="0"/>
+    <cs:fillRef idx="0"/>
+    <cs:effectRef idx="0"/>
+    <cs:fontRef idx="minor">
+      <a:schemeClr val="tx1"/>
+    </cs:fontRef>
+    <cs:defRPr sz="1000" kern="1200"/>
+  </cs:legend>
+  <cs:plotArea mods="allowNoFillOverride allowNoLineOverride">
+    <cs:lnRef idx="0"/>
+    <cs:fillRef idx="1">
+      <a:schemeClr val="bg1"/>
+    </cs:fillRef>
+    <cs:effectRef idx="0"/>
+    <cs:fontRef idx="minor">
+      <a:schemeClr val="tx1"/>
+    </cs:fontRef>
+  </cs:plotArea>
+  <cs:plotArea3D>
+    <cs:lnRef idx="0"/>
+    <cs:fillRef idx="0"/>
+    <cs:effectRef idx="0"/>
+    <cs:fontRef idx="minor">
+      <a:schemeClr val="tx1"/>
+    </cs:fontRef>
+  </cs:plotArea3D>
+  <cs:seriesAxis>
+    <cs:lnRef idx="1">
+      <a:schemeClr val="tx1">
+        <a:tint val="75000"/>
+      </a:schemeClr>
+    </cs:lnRef>
+    <cs:fillRef idx="0"/>
+    <cs:effectRef idx="0"/>
+    <cs:fontRef idx="minor">
+      <a:schemeClr val="tx1"/>
+    </cs:fontRef>
+    <cs:spPr>
+      <a:ln>
+        <a:round/>
+      </a:ln>
+    </cs:spPr>
+    <cs:defRPr sz="1000" kern="1200"/>
+  </cs:seriesAxis>
+  <cs:seriesLine>
+    <cs:lnRef idx="1">
+      <a:schemeClr val="tx1"/>
+    </cs:lnRef>
+    <cs:fillRef idx="0"/>
+    <cs:effectRef idx="0"/>
+    <cs:fontRef idx="minor">
+      <a:schemeClr val="tx1"/>
+    </cs:fontRef>
+    <cs:spPr>
+      <a:ln>
+        <a:round/>
+      </a:ln>
+    </cs:spPr>
+  </cs:seriesLine>
+  <cs:title>
+    <cs:lnRef idx="0"/>
+    <cs:fillRef idx="0"/>
+    <cs:effectRef idx="0"/>
+    <cs:fontRef idx="minor">
+      <a:schemeClr val="tx1"/>
+    </cs:fontRef>
+    <cs:defRPr sz="1800" b="1" kern="1200"/>
+  </cs:title>
+  <cs:trendline>
+    <cs:lnRef idx="1">
+      <a:schemeClr val="tx1"/>
+    </cs:lnRef>
+    <cs:fillRef idx="0"/>
+    <cs:effectRef idx="0"/>
+    <cs:fontRef idx="minor">
+      <a:schemeClr val="tx1"/>
+    </cs:fontRef>
+    <cs:spPr>
+      <a:ln cap="rnd">
+        <a:round/>
+      </a:ln>
+    </cs:spPr>
+  </cs:trendline>
+  <cs:trendlineLabel>
+    <cs:lnRef idx="0"/>
+    <cs:fillRef idx="0"/>
+    <cs:effectRef idx="0"/>
+    <cs:fontRef idx="minor">
+      <a:schemeClr val="tx1"/>
+    </cs:fontRef>
+    <cs:defRPr sz="1000" kern="1200"/>
+  </cs:trendlineLabel>
+  <cs:upBar>
+    <cs:lnRef idx="1">
+      <a:schemeClr val="tx1"/>
+    </cs:lnRef>
+    <cs:fillRef idx="1">
+      <a:schemeClr val="dk1">
+        <a:tint val="5000"/>
+      </a:schemeClr>
+    </cs:fillRef>
+    <cs:effectRef idx="0"/>
+    <cs:fontRef idx="minor">
+      <a:schemeClr val="tx1"/>
+    </cs:fontRef>
+    <cs:spPr>
+      <a:ln>
+        <a:round/>
+      </a:ln>
+    </cs:spPr>
+  </cs:upBar>
+  <cs:valueAxis>
+    <cs:lnRef idx="1">
+      <a:schemeClr val="tx1">
+        <a:tint val="75000"/>
+      </a:schemeClr>
+    </cs:lnRef>
+    <cs:fillRef idx="0"/>
+    <cs:effectRef idx="0"/>
+    <cs:fontRef idx="minor">
+      <a:schemeClr val="tx1"/>
+    </cs:fontRef>
+    <cs:spPr>
+      <a:ln>
+        <a:round/>
+      </a:ln>
+    </cs:spPr>
+    <cs:defRPr sz="1000" kern="1200"/>
+  </cs:valueAxis>
+  <cs:wall>
+    <cs:lnRef idx="0"/>
+    <cs:fillRef idx="0"/>
+    <cs:effectRef idx="0"/>
+    <cs:fontRef idx="minor">
+      <a:schemeClr val="tx1"/>
     </cs:fontRef>
   </cs:wall>
 </cs:chartStyle>
@@ -16466,7 +19521,7 @@
           <a:p>
             <a:fld id="{A88ED8C5-EA9B-4755-BFCA-84BA78378920}" type="datetimeFigureOut">
               <a:rPr lang="en-IN" smtClean="0"/>
-              <a:t>19-08-2018</a:t>
+              <a:t>31-08-2018</a:t>
             </a:fld>
             <a:endParaRPr lang="en-IN"/>
           </a:p>
@@ -16666,7 +19721,7 @@
           <a:p>
             <a:fld id="{A88ED8C5-EA9B-4755-BFCA-84BA78378920}" type="datetimeFigureOut">
               <a:rPr lang="en-IN" smtClean="0"/>
-              <a:t>19-08-2018</a:t>
+              <a:t>31-08-2018</a:t>
             </a:fld>
             <a:endParaRPr lang="en-IN"/>
           </a:p>
@@ -16876,7 +19931,7 @@
           <a:p>
             <a:fld id="{A88ED8C5-EA9B-4755-BFCA-84BA78378920}" type="datetimeFigureOut">
               <a:rPr lang="en-IN" smtClean="0"/>
-              <a:t>19-08-2018</a:t>
+              <a:t>31-08-2018</a:t>
             </a:fld>
             <a:endParaRPr lang="en-IN"/>
           </a:p>
@@ -17076,7 +20131,7 @@
           <a:p>
             <a:fld id="{A88ED8C5-EA9B-4755-BFCA-84BA78378920}" type="datetimeFigureOut">
               <a:rPr lang="en-IN" smtClean="0"/>
-              <a:t>19-08-2018</a:t>
+              <a:t>31-08-2018</a:t>
             </a:fld>
             <a:endParaRPr lang="en-IN"/>
           </a:p>
@@ -17352,7 +20407,7 @@
           <a:p>
             <a:fld id="{A88ED8C5-EA9B-4755-BFCA-84BA78378920}" type="datetimeFigureOut">
               <a:rPr lang="en-IN" smtClean="0"/>
-              <a:t>19-08-2018</a:t>
+              <a:t>31-08-2018</a:t>
             </a:fld>
             <a:endParaRPr lang="en-IN"/>
           </a:p>
@@ -17620,7 +20675,7 @@
           <a:p>
             <a:fld id="{A88ED8C5-EA9B-4755-BFCA-84BA78378920}" type="datetimeFigureOut">
               <a:rPr lang="en-IN" smtClean="0"/>
-              <a:t>19-08-2018</a:t>
+              <a:t>31-08-2018</a:t>
             </a:fld>
             <a:endParaRPr lang="en-IN"/>
           </a:p>
@@ -18035,7 +21090,7 @@
           <a:p>
             <a:fld id="{A88ED8C5-EA9B-4755-BFCA-84BA78378920}" type="datetimeFigureOut">
               <a:rPr lang="en-IN" smtClean="0"/>
-              <a:t>19-08-2018</a:t>
+              <a:t>31-08-2018</a:t>
             </a:fld>
             <a:endParaRPr lang="en-IN"/>
           </a:p>
@@ -18177,7 +21232,7 @@
           <a:p>
             <a:fld id="{A88ED8C5-EA9B-4755-BFCA-84BA78378920}" type="datetimeFigureOut">
               <a:rPr lang="en-IN" smtClean="0"/>
-              <a:t>19-08-2018</a:t>
+              <a:t>31-08-2018</a:t>
             </a:fld>
             <a:endParaRPr lang="en-IN"/>
           </a:p>
@@ -18290,7 +21345,7 @@
           <a:p>
             <a:fld id="{A88ED8C5-EA9B-4755-BFCA-84BA78378920}" type="datetimeFigureOut">
               <a:rPr lang="en-IN" smtClean="0"/>
-              <a:t>19-08-2018</a:t>
+              <a:t>31-08-2018</a:t>
             </a:fld>
             <a:endParaRPr lang="en-IN"/>
           </a:p>
@@ -18603,7 +21658,7 @@
           <a:p>
             <a:fld id="{A88ED8C5-EA9B-4755-BFCA-84BA78378920}" type="datetimeFigureOut">
               <a:rPr lang="en-IN" smtClean="0"/>
-              <a:t>19-08-2018</a:t>
+              <a:t>31-08-2018</a:t>
             </a:fld>
             <a:endParaRPr lang="en-IN"/>
           </a:p>
@@ -18892,7 +21947,7 @@
           <a:p>
             <a:fld id="{A88ED8C5-EA9B-4755-BFCA-84BA78378920}" type="datetimeFigureOut">
               <a:rPr lang="en-IN" smtClean="0"/>
-              <a:t>19-08-2018</a:t>
+              <a:t>31-08-2018</a:t>
             </a:fld>
             <a:endParaRPr lang="en-IN"/>
           </a:p>
@@ -19135,7 +22190,7 @@
           <a:p>
             <a:fld id="{A88ED8C5-EA9B-4755-BFCA-84BA78378920}" type="datetimeFigureOut">
               <a:rPr lang="en-IN" smtClean="0"/>
-              <a:t>19-08-2018</a:t>
+              <a:t>31-08-2018</a:t>
             </a:fld>
             <a:endParaRPr lang="en-IN"/>
           </a:p>
@@ -19595,6 +22650,180 @@
 </p:sld>
 </file>
 
+<file path=ppt/slides/slide10.xml><?xml version="1.0" encoding="utf-8"?>
+<p:sld xmlns:a="http://schemas.openxmlformats.org/drawingml/2006/main" xmlns:r="http://schemas.openxmlformats.org/officeDocument/2006/relationships" xmlns:p="http://schemas.openxmlformats.org/presentationml/2006/main">
+  <p:cSld>
+    <p:spTree>
+      <p:nvGrpSpPr>
+        <p:cNvPr id="1" name=""/>
+        <p:cNvGrpSpPr/>
+        <p:nvPr/>
+      </p:nvGrpSpPr>
+      <p:grpSpPr>
+        <a:xfrm>
+          <a:off x="0" y="0"/>
+          <a:ext cx="0" cy="0"/>
+          <a:chOff x="0" y="0"/>
+          <a:chExt cx="0" cy="0"/>
+        </a:xfrm>
+      </p:grpSpPr>
+      <p:graphicFrame>
+        <p:nvGraphicFramePr>
+          <p:cNvPr id="4" name="Chart 3">
+            <a:extLst>
+              <a:ext uri="{FF2B5EF4-FFF2-40B4-BE49-F238E27FC236}">
+                <a16:creationId xmlns:a16="http://schemas.microsoft.com/office/drawing/2014/main" id="{9DBF9349-6896-46B1-A116-825F9CB91148}"/>
+              </a:ext>
+            </a:extLst>
+          </p:cNvPr>
+          <p:cNvGraphicFramePr/>
+          <p:nvPr>
+            <p:extLst>
+              <p:ext uri="{D42A27DB-BD31-4B8C-83A1-F6EECF244321}">
+                <p14:modId xmlns:p14="http://schemas.microsoft.com/office/powerpoint/2010/main" val="86451360"/>
+              </p:ext>
+            </p:extLst>
+          </p:nvPr>
+        </p:nvGraphicFramePr>
+        <p:xfrm>
+          <a:off x="325464" y="294468"/>
+          <a:ext cx="11530739" cy="6292312"/>
+        </p:xfrm>
+        <a:graphic>
+          <a:graphicData uri="http://schemas.openxmlformats.org/drawingml/2006/chart">
+            <c:chart xmlns:c="http://schemas.openxmlformats.org/drawingml/2006/chart" xmlns:r="http://schemas.openxmlformats.org/officeDocument/2006/relationships" r:id="rId2"/>
+          </a:graphicData>
+        </a:graphic>
+      </p:graphicFrame>
+    </p:spTree>
+    <p:extLst>
+      <p:ext uri="{BB962C8B-B14F-4D97-AF65-F5344CB8AC3E}">
+        <p14:creationId xmlns:p14="http://schemas.microsoft.com/office/powerpoint/2010/main" val="316023439"/>
+      </p:ext>
+    </p:extLst>
+  </p:cSld>
+  <p:clrMapOvr>
+    <a:masterClrMapping/>
+  </p:clrMapOvr>
+</p:sld>
+</file>
+
+<file path=ppt/slides/slide11.xml><?xml version="1.0" encoding="utf-8"?>
+<p:sld xmlns:a="http://schemas.openxmlformats.org/drawingml/2006/main" xmlns:r="http://schemas.openxmlformats.org/officeDocument/2006/relationships" xmlns:p="http://schemas.openxmlformats.org/presentationml/2006/main">
+  <p:cSld>
+    <p:spTree>
+      <p:nvGrpSpPr>
+        <p:cNvPr id="1" name=""/>
+        <p:cNvGrpSpPr/>
+        <p:nvPr/>
+      </p:nvGrpSpPr>
+      <p:grpSpPr>
+        <a:xfrm>
+          <a:off x="0" y="0"/>
+          <a:ext cx="0" cy="0"/>
+          <a:chOff x="0" y="0"/>
+          <a:chExt cx="0" cy="0"/>
+        </a:xfrm>
+      </p:grpSpPr>
+      <p:graphicFrame>
+        <p:nvGraphicFramePr>
+          <p:cNvPr id="4" name="Chart 3">
+            <a:extLst>
+              <a:ext uri="{FF2B5EF4-FFF2-40B4-BE49-F238E27FC236}">
+                <a16:creationId xmlns:a16="http://schemas.microsoft.com/office/drawing/2014/main" id="{70E4F1BC-C5BD-4442-89EE-A4FE93514FBE}"/>
+              </a:ext>
+            </a:extLst>
+          </p:cNvPr>
+          <p:cNvGraphicFramePr/>
+          <p:nvPr>
+            <p:extLst>
+              <p:ext uri="{D42A27DB-BD31-4B8C-83A1-F6EECF244321}">
+                <p14:modId xmlns:p14="http://schemas.microsoft.com/office/powerpoint/2010/main" val="3799874008"/>
+              </p:ext>
+            </p:extLst>
+          </p:nvPr>
+        </p:nvGraphicFramePr>
+        <p:xfrm>
+          <a:off x="586154" y="226646"/>
+          <a:ext cx="10996246" cy="6299200"/>
+        </p:xfrm>
+        <a:graphic>
+          <a:graphicData uri="http://schemas.openxmlformats.org/drawingml/2006/chart">
+            <c:chart xmlns:c="http://schemas.openxmlformats.org/drawingml/2006/chart" xmlns:r="http://schemas.openxmlformats.org/officeDocument/2006/relationships" r:id="rId2"/>
+          </a:graphicData>
+        </a:graphic>
+      </p:graphicFrame>
+    </p:spTree>
+    <p:extLst>
+      <p:ext uri="{BB962C8B-B14F-4D97-AF65-F5344CB8AC3E}">
+        <p14:creationId xmlns:p14="http://schemas.microsoft.com/office/powerpoint/2010/main" val="3767170770"/>
+      </p:ext>
+    </p:extLst>
+  </p:cSld>
+  <p:clrMapOvr>
+    <a:masterClrMapping/>
+  </p:clrMapOvr>
+</p:sld>
+</file>
+
+<file path=ppt/slides/slide12.xml><?xml version="1.0" encoding="utf-8"?>
+<p:sld xmlns:a="http://schemas.openxmlformats.org/drawingml/2006/main" xmlns:r="http://schemas.openxmlformats.org/officeDocument/2006/relationships" xmlns:p="http://schemas.openxmlformats.org/presentationml/2006/main">
+  <p:cSld>
+    <p:spTree>
+      <p:nvGrpSpPr>
+        <p:cNvPr id="1" name=""/>
+        <p:cNvGrpSpPr/>
+        <p:nvPr/>
+      </p:nvGrpSpPr>
+      <p:grpSpPr>
+        <a:xfrm>
+          <a:off x="0" y="0"/>
+          <a:ext cx="0" cy="0"/>
+          <a:chOff x="0" y="0"/>
+          <a:chExt cx="0" cy="0"/>
+        </a:xfrm>
+      </p:grpSpPr>
+      <p:graphicFrame>
+        <p:nvGraphicFramePr>
+          <p:cNvPr id="4" name="Chart 3">
+            <a:extLst>
+              <a:ext uri="{FF2B5EF4-FFF2-40B4-BE49-F238E27FC236}">
+                <a16:creationId xmlns:a16="http://schemas.microsoft.com/office/drawing/2014/main" id="{C8343C6A-61AE-4DAC-A37A-E3F275D6AA73}"/>
+              </a:ext>
+            </a:extLst>
+          </p:cNvPr>
+          <p:cNvGraphicFramePr/>
+          <p:nvPr>
+            <p:extLst>
+              <p:ext uri="{D42A27DB-BD31-4B8C-83A1-F6EECF244321}">
+                <p14:modId xmlns:p14="http://schemas.microsoft.com/office/powerpoint/2010/main" val="2794121738"/>
+              </p:ext>
+            </p:extLst>
+          </p:nvPr>
+        </p:nvGraphicFramePr>
+        <p:xfrm>
+          <a:off x="550191" y="371959"/>
+          <a:ext cx="11166528" cy="6300061"/>
+        </p:xfrm>
+        <a:graphic>
+          <a:graphicData uri="http://schemas.openxmlformats.org/drawingml/2006/chart">
+            <c:chart xmlns:c="http://schemas.openxmlformats.org/drawingml/2006/chart" xmlns:r="http://schemas.openxmlformats.org/officeDocument/2006/relationships" r:id="rId2"/>
+          </a:graphicData>
+        </a:graphic>
+      </p:graphicFrame>
+    </p:spTree>
+    <p:extLst>
+      <p:ext uri="{BB962C8B-B14F-4D97-AF65-F5344CB8AC3E}">
+        <p14:creationId xmlns:p14="http://schemas.microsoft.com/office/powerpoint/2010/main" val="2837850230"/>
+      </p:ext>
+    </p:extLst>
+  </p:cSld>
+  <p:clrMapOvr>
+    <a:masterClrMapping/>
+  </p:clrMapOvr>
+</p:sld>
+</file>
+
 <file path=ppt/slides/slide2.xml><?xml version="1.0" encoding="utf-8"?>
 <p:sld xmlns:a="http://schemas.openxmlformats.org/drawingml/2006/main" xmlns:r="http://schemas.openxmlformats.org/officeDocument/2006/relationships" xmlns:p="http://schemas.openxmlformats.org/presentationml/2006/main">
   <p:cSld>
@@ -24307,7 +27536,7 @@
           <p:nvPr>
             <p:extLst>
               <p:ext uri="{D42A27DB-BD31-4B8C-83A1-F6EECF244321}">
-                <p14:modId xmlns:p14="http://schemas.microsoft.com/office/powerpoint/2010/main" val="1117944189"/>
+                <p14:modId xmlns:p14="http://schemas.microsoft.com/office/powerpoint/2010/main" val="2150968043"/>
               </p:ext>
             </p:extLst>
           </p:nvPr>
@@ -24367,7 +27596,7 @@
           <p:nvPr>
             <p:extLst>
               <p:ext uri="{D42A27DB-BD31-4B8C-83A1-F6EECF244321}">
-                <p14:modId xmlns:p14="http://schemas.microsoft.com/office/powerpoint/2010/main" val="3180360486"/>
+                <p14:modId xmlns:p14="http://schemas.microsoft.com/office/powerpoint/2010/main" val="1181729501"/>
               </p:ext>
             </p:extLst>
           </p:nvPr>

</xml_diff>

<commit_message>
changes for dec 2018-2019 v1.0
</commit_message>
<xml_diff>
--- a/docs/ContributionGraphs.pptx
+++ b/docs/ContributionGraphs.pptx
@@ -17,6 +17,9 @@
     <p:sldId id="265" r:id="rId11"/>
     <p:sldId id="266" r:id="rId12"/>
     <p:sldId id="267" r:id="rId13"/>
+    <p:sldId id="268" r:id="rId14"/>
+    <p:sldId id="269" r:id="rId15"/>
+    <p:sldId id="270" r:id="rId16"/>
   </p:sldIdLst>
   <p:sldSz cx="12192000" cy="6858000"/>
   <p:notesSz cx="6858000" cy="9144000"/>
@@ -772,6 +775,933 @@
     </c:legend>
     <c:plotVisOnly val="1"/>
     <c:dispBlanksAs val="gap"/>
+    <c:showDLblsOverMax val="0"/>
+  </c:chart>
+  <c:spPr>
+    <a:noFill/>
+    <a:ln>
+      <a:noFill/>
+    </a:ln>
+    <a:effectLst/>
+  </c:spPr>
+  <c:txPr>
+    <a:bodyPr/>
+    <a:lstStyle/>
+    <a:p>
+      <a:pPr>
+        <a:defRPr/>
+      </a:pPr>
+      <a:endParaRPr lang="en-US"/>
+    </a:p>
+  </c:txPr>
+  <c:externalData r:id="rId3">
+    <c:autoUpdate val="0"/>
+  </c:externalData>
+</c:chartSpace>
+</file>
+
+<file path=ppt/charts/chart10.xml><?xml version="1.0" encoding="utf-8"?>
+<c:chartSpace xmlns:c="http://schemas.openxmlformats.org/drawingml/2006/chart" xmlns:a="http://schemas.openxmlformats.org/drawingml/2006/main" xmlns:r="http://schemas.openxmlformats.org/officeDocument/2006/relationships" xmlns:c16r2="http://schemas.microsoft.com/office/drawing/2015/06/chart">
+  <c:date1904 val="0"/>
+  <c:lang val="en-US"/>
+  <c:roundedCorners val="0"/>
+  <mc:AlternateContent xmlns:mc="http://schemas.openxmlformats.org/markup-compatibility/2006">
+    <mc:Choice xmlns:c14="http://schemas.microsoft.com/office/drawing/2007/8/2/chart" Requires="c14">
+      <c14:style val="104"/>
+    </mc:Choice>
+    <mc:Fallback>
+      <c:style val="4"/>
+    </mc:Fallback>
+  </mc:AlternateContent>
+  <c:chart>
+    <c:autoTitleDeleted val="1"/>
+    <c:plotArea>
+      <c:layout>
+        <c:manualLayout>
+          <c:layoutTarget val="inner"/>
+          <c:xMode val="edge"/>
+          <c:yMode val="edge"/>
+          <c:x val="0.31940921637744007"/>
+          <c:y val="2.0337519552843602E-3"/>
+          <c:w val="0.61253832491379645"/>
+          <c:h val="0.89651003308301058"/>
+        </c:manualLayout>
+      </c:layout>
+      <c:barChart>
+        <c:barDir val="bar"/>
+        <c:grouping val="clustered"/>
+        <c:varyColors val="0"/>
+        <c:ser>
+          <c:idx val="0"/>
+          <c:order val="0"/>
+          <c:spPr>
+            <a:pattFill prst="narVert">
+              <a:fgClr>
+                <a:schemeClr val="accent2"/>
+              </a:fgClr>
+              <a:bgClr>
+                <a:schemeClr val="accent2">
+                  <a:lumMod val="20000"/>
+                  <a:lumOff val="80000"/>
+                </a:schemeClr>
+              </a:bgClr>
+            </a:pattFill>
+            <a:ln>
+              <a:noFill/>
+            </a:ln>
+            <a:effectLst>
+              <a:innerShdw blurRad="114300">
+                <a:schemeClr val="accent2"/>
+              </a:innerShdw>
+            </a:effectLst>
+          </c:spPr>
+          <c:invertIfNegative val="0"/>
+          <c:dLbls>
+            <c:spPr>
+              <a:noFill/>
+              <a:ln>
+                <a:noFill/>
+              </a:ln>
+              <a:effectLst/>
+            </c:spPr>
+            <c:txPr>
+              <a:bodyPr rot="0" spcFirstLastPara="1" vertOverflow="ellipsis" vert="horz" wrap="square" lIns="38100" tIns="19050" rIns="38100" bIns="19050" anchor="ctr" anchorCtr="1">
+                <a:spAutoFit/>
+              </a:bodyPr>
+              <a:lstStyle/>
+              <a:p>
+                <a:pPr>
+                  <a:defRPr sz="2000" b="1" i="0" u="none" strike="noStrike" kern="1200" baseline="0">
+                    <a:solidFill>
+                      <a:schemeClr val="tx1">
+                        <a:lumMod val="75000"/>
+                        <a:lumOff val="25000"/>
+                      </a:schemeClr>
+                    </a:solidFill>
+                    <a:latin typeface="+mn-lt"/>
+                    <a:ea typeface="+mn-ea"/>
+                    <a:cs typeface="+mn-cs"/>
+                  </a:defRPr>
+                </a:pPr>
+                <a:endParaRPr lang="en-US"/>
+              </a:p>
+            </c:txPr>
+            <c:dLblPos val="outEnd"/>
+            <c:showLegendKey val="0"/>
+            <c:showVal val="1"/>
+            <c:showCatName val="0"/>
+            <c:showSerName val="0"/>
+            <c:showPercent val="0"/>
+            <c:showBubbleSize val="0"/>
+            <c:showLeaderLines val="0"/>
+            <c:extLst>
+              <c:ext xmlns:c15="http://schemas.microsoft.com/office/drawing/2012/chart" uri="{CE6537A1-D6FC-4f65-9D91-7224C49458BB}">
+                <c15:showLeaderLines val="1"/>
+                <c15:leaderLines>
+                  <c:spPr>
+                    <a:ln w="9525">
+                      <a:solidFill>
+                        <a:schemeClr val="tx1">
+                          <a:lumMod val="35000"/>
+                          <a:lumOff val="65000"/>
+                        </a:schemeClr>
+                      </a:solidFill>
+                    </a:ln>
+                    <a:effectLst/>
+                  </c:spPr>
+                </c15:leaderLines>
+              </c:ext>
+            </c:extLst>
+          </c:dLbls>
+          <c:cat>
+            <c:strRef>
+              <c:f>'For Portal'!$K$14:$K$26</c:f>
+              <c:strCache>
+                <c:ptCount val="12"/>
+                <c:pt idx="0">
+                  <c:v>Agri Engg</c:v>
+                </c:pt>
+                <c:pt idx="1">
+                  <c:v>Civil Tamil</c:v>
+                </c:pt>
+                <c:pt idx="2">
+                  <c:v>Civil</c:v>
+                </c:pt>
+                <c:pt idx="3">
+                  <c:v>CSE</c:v>
+                </c:pt>
+                <c:pt idx="4">
+                  <c:v>ECE</c:v>
+                </c:pt>
+                <c:pt idx="5">
+                  <c:v>EEE</c:v>
+                </c:pt>
+                <c:pt idx="6">
+                  <c:v>GeoInformatics</c:v>
+                </c:pt>
+                <c:pt idx="7">
+                  <c:v>IT</c:v>
+                </c:pt>
+                <c:pt idx="8">
+                  <c:v>Manufacturing</c:v>
+                </c:pt>
+                <c:pt idx="9">
+                  <c:v>Material Science</c:v>
+                </c:pt>
+                <c:pt idx="10">
+                  <c:v>Mech</c:v>
+                </c:pt>
+                <c:pt idx="11">
+                  <c:v>Mining</c:v>
+                </c:pt>
+              </c:strCache>
+            </c:strRef>
+          </c:cat>
+          <c:val>
+            <c:numRef>
+              <c:f>'For Portal'!$L$14:$L$26</c:f>
+              <c:numCache>
+                <c:formatCode>General</c:formatCode>
+                <c:ptCount val="13"/>
+                <c:pt idx="0">
+                  <c:v>2</c:v>
+                </c:pt>
+                <c:pt idx="1">
+                  <c:v>1</c:v>
+                </c:pt>
+                <c:pt idx="2">
+                  <c:v>1</c:v>
+                </c:pt>
+                <c:pt idx="3">
+                  <c:v>2</c:v>
+                </c:pt>
+                <c:pt idx="4">
+                  <c:v>3</c:v>
+                </c:pt>
+                <c:pt idx="5">
+                  <c:v>1</c:v>
+                </c:pt>
+                <c:pt idx="6">
+                  <c:v>1</c:v>
+                </c:pt>
+                <c:pt idx="7">
+                  <c:v>2</c:v>
+                </c:pt>
+                <c:pt idx="8">
+                  <c:v>3</c:v>
+                </c:pt>
+                <c:pt idx="9">
+                  <c:v>2</c:v>
+                </c:pt>
+                <c:pt idx="10">
+                  <c:v>3</c:v>
+                </c:pt>
+                <c:pt idx="11">
+                  <c:v>1</c:v>
+                </c:pt>
+              </c:numCache>
+            </c:numRef>
+          </c:val>
+          <c:extLst>
+            <c:ext xmlns:c16="http://schemas.microsoft.com/office/drawing/2014/chart" uri="{C3380CC4-5D6E-409C-BE32-E72D297353CC}">
+              <c16:uniqueId val="{00000000-FC67-48E5-862D-1558B917AB63}"/>
+            </c:ext>
+          </c:extLst>
+        </c:ser>
+        <c:dLbls>
+          <c:dLblPos val="outEnd"/>
+          <c:showLegendKey val="0"/>
+          <c:showVal val="1"/>
+          <c:showCatName val="0"/>
+          <c:showSerName val="0"/>
+          <c:showPercent val="0"/>
+          <c:showBubbleSize val="0"/>
+        </c:dLbls>
+        <c:gapWidth val="227"/>
+        <c:overlap val="-48"/>
+        <c:axId val="1463427647"/>
+        <c:axId val="1263355839"/>
+      </c:barChart>
+      <c:catAx>
+        <c:axId val="1463427647"/>
+        <c:scaling>
+          <c:orientation val="minMax"/>
+        </c:scaling>
+        <c:delete val="0"/>
+        <c:axPos val="l"/>
+        <c:numFmt formatCode="General" sourceLinked="1"/>
+        <c:majorTickMark val="none"/>
+        <c:minorTickMark val="none"/>
+        <c:tickLblPos val="nextTo"/>
+        <c:spPr>
+          <a:noFill/>
+          <a:ln w="19050" cap="flat" cmpd="sng" algn="ctr">
+            <a:solidFill>
+              <a:schemeClr val="tx1">
+                <a:lumMod val="25000"/>
+                <a:lumOff val="75000"/>
+              </a:schemeClr>
+            </a:solidFill>
+            <a:round/>
+          </a:ln>
+          <a:effectLst/>
+        </c:spPr>
+        <c:txPr>
+          <a:bodyPr rot="-60000000" spcFirstLastPara="1" vertOverflow="ellipsis" vert="horz" wrap="square" anchor="ctr" anchorCtr="1"/>
+          <a:lstStyle/>
+          <a:p>
+            <a:pPr>
+              <a:defRPr sz="2400" b="1" i="0" u="none" strike="noStrike" kern="1200" baseline="0">
+                <a:solidFill>
+                  <a:schemeClr val="tx1">
+                    <a:lumMod val="65000"/>
+                    <a:lumOff val="35000"/>
+                  </a:schemeClr>
+                </a:solidFill>
+                <a:latin typeface="+mn-lt"/>
+                <a:ea typeface="+mn-ea"/>
+                <a:cs typeface="+mn-cs"/>
+              </a:defRPr>
+            </a:pPr>
+            <a:endParaRPr lang="en-US"/>
+          </a:p>
+        </c:txPr>
+        <c:crossAx val="1263355839"/>
+        <c:crosses val="autoZero"/>
+        <c:auto val="1"/>
+        <c:lblAlgn val="ctr"/>
+        <c:lblOffset val="100"/>
+        <c:noMultiLvlLbl val="0"/>
+      </c:catAx>
+      <c:valAx>
+        <c:axId val="1263355839"/>
+        <c:scaling>
+          <c:orientation val="minMax"/>
+        </c:scaling>
+        <c:delete val="1"/>
+        <c:axPos val="b"/>
+        <c:numFmt formatCode="General" sourceLinked="1"/>
+        <c:majorTickMark val="none"/>
+        <c:minorTickMark val="none"/>
+        <c:tickLblPos val="nextTo"/>
+        <c:crossAx val="1463427647"/>
+        <c:crosses val="autoZero"/>
+        <c:crossBetween val="between"/>
+      </c:valAx>
+      <c:spPr>
+        <a:noFill/>
+        <a:ln>
+          <a:noFill/>
+        </a:ln>
+        <a:effectLst/>
+      </c:spPr>
+    </c:plotArea>
+    <c:plotVisOnly val="1"/>
+    <c:dispBlanksAs val="gap"/>
+    <c:showDLblsOverMax val="0"/>
+  </c:chart>
+  <c:spPr>
+    <a:noFill/>
+    <a:ln>
+      <a:noFill/>
+    </a:ln>
+    <a:effectLst/>
+  </c:spPr>
+  <c:txPr>
+    <a:bodyPr/>
+    <a:lstStyle/>
+    <a:p>
+      <a:pPr>
+        <a:defRPr/>
+      </a:pPr>
+      <a:endParaRPr lang="en-US"/>
+    </a:p>
+  </c:txPr>
+  <c:externalData r:id="rId3">
+    <c:autoUpdate val="0"/>
+  </c:externalData>
+  <c:userShapes r:id="rId4"/>
+</c:chartSpace>
+</file>
+
+<file path=ppt/charts/chart11.xml><?xml version="1.0" encoding="utf-8"?>
+<c:chartSpace xmlns:c="http://schemas.openxmlformats.org/drawingml/2006/chart" xmlns:a="http://schemas.openxmlformats.org/drawingml/2006/main" xmlns:r="http://schemas.openxmlformats.org/officeDocument/2006/relationships" xmlns:c16r2="http://schemas.microsoft.com/office/drawing/2015/06/chart">
+  <c:date1904 val="0"/>
+  <c:lang val="en-US"/>
+  <c:roundedCorners val="0"/>
+  <mc:AlternateContent xmlns:mc="http://schemas.openxmlformats.org/markup-compatibility/2006">
+    <mc:Choice xmlns:c14="http://schemas.microsoft.com/office/drawing/2007/8/2/chart" Requires="c14">
+      <c14:style val="102"/>
+    </mc:Choice>
+    <mc:Fallback>
+      <c:style val="2"/>
+    </mc:Fallback>
+  </mc:AlternateContent>
+  <c:chart>
+    <c:title>
+      <c:tx>
+        <c:rich>
+          <a:bodyPr rot="0" spcFirstLastPara="1" vertOverflow="ellipsis" vert="horz" wrap="square" anchor="ctr" anchorCtr="1"/>
+          <a:lstStyle/>
+          <a:p>
+            <a:pPr>
+              <a:defRPr sz="3600" b="1" i="0" u="none" strike="noStrike" kern="1200" spc="0" baseline="0">
+                <a:solidFill>
+                  <a:schemeClr val="tx1">
+                    <a:lumMod val="65000"/>
+                    <a:lumOff val="35000"/>
+                  </a:schemeClr>
+                </a:solidFill>
+                <a:latin typeface="+mn-lt"/>
+                <a:ea typeface="+mn-ea"/>
+                <a:cs typeface="+mn-cs"/>
+              </a:defRPr>
+            </a:pPr>
+            <a:r>
+              <a:rPr lang="en-IN" sz="3600" b="1" dirty="0"/>
+              <a:t>Sponsorship split </a:t>
+            </a:r>
+          </a:p>
+        </c:rich>
+      </c:tx>
+      <c:overlay val="0"/>
+      <c:spPr>
+        <a:noFill/>
+        <a:ln>
+          <a:noFill/>
+        </a:ln>
+        <a:effectLst/>
+      </c:spPr>
+      <c:txPr>
+        <a:bodyPr rot="0" spcFirstLastPara="1" vertOverflow="ellipsis" vert="horz" wrap="square" anchor="ctr" anchorCtr="1"/>
+        <a:lstStyle/>
+        <a:p>
+          <a:pPr>
+            <a:defRPr sz="3600" b="1" i="0" u="none" strike="noStrike" kern="1200" spc="0" baseline="0">
+              <a:solidFill>
+                <a:schemeClr val="tx1">
+                  <a:lumMod val="65000"/>
+                  <a:lumOff val="35000"/>
+                </a:schemeClr>
+              </a:solidFill>
+              <a:latin typeface="+mn-lt"/>
+              <a:ea typeface="+mn-ea"/>
+              <a:cs typeface="+mn-cs"/>
+            </a:defRPr>
+          </a:pPr>
+          <a:endParaRPr lang="en-US"/>
+        </a:p>
+      </c:txPr>
+    </c:title>
+    <c:autoTitleDeleted val="0"/>
+    <c:plotArea>
+      <c:layout/>
+      <c:doughnutChart>
+        <c:varyColors val="1"/>
+        <c:ser>
+          <c:idx val="0"/>
+          <c:order val="0"/>
+          <c:dPt>
+            <c:idx val="0"/>
+            <c:bubble3D val="0"/>
+            <c:spPr>
+              <a:solidFill>
+                <a:schemeClr val="accent6"/>
+              </a:solidFill>
+              <a:ln w="19050">
+                <a:solidFill>
+                  <a:schemeClr val="lt1"/>
+                </a:solidFill>
+              </a:ln>
+              <a:effectLst/>
+            </c:spPr>
+            <c:extLst>
+              <c:ext xmlns:c16="http://schemas.microsoft.com/office/drawing/2014/chart" uri="{C3380CC4-5D6E-409C-BE32-E72D297353CC}">
+                <c16:uniqueId val="{00000001-3962-44CA-BD86-EB63939BD29B}"/>
+              </c:ext>
+            </c:extLst>
+          </c:dPt>
+          <c:dPt>
+            <c:idx val="1"/>
+            <c:bubble3D val="0"/>
+            <c:spPr>
+              <a:solidFill>
+                <a:schemeClr val="accent5"/>
+              </a:solidFill>
+              <a:ln w="19050">
+                <a:solidFill>
+                  <a:schemeClr val="lt1"/>
+                </a:solidFill>
+              </a:ln>
+              <a:effectLst/>
+            </c:spPr>
+            <c:extLst>
+              <c:ext xmlns:c16="http://schemas.microsoft.com/office/drawing/2014/chart" uri="{C3380CC4-5D6E-409C-BE32-E72D297353CC}">
+                <c16:uniqueId val="{00000003-3962-44CA-BD86-EB63939BD29B}"/>
+              </c:ext>
+            </c:extLst>
+          </c:dPt>
+          <c:dPt>
+            <c:idx val="2"/>
+            <c:bubble3D val="0"/>
+            <c:spPr>
+              <a:solidFill>
+                <a:schemeClr val="accent4"/>
+              </a:solidFill>
+              <a:ln w="19050">
+                <a:solidFill>
+                  <a:schemeClr val="lt1"/>
+                </a:solidFill>
+              </a:ln>
+              <a:effectLst/>
+            </c:spPr>
+            <c:extLst>
+              <c:ext xmlns:c16="http://schemas.microsoft.com/office/drawing/2014/chart" uri="{C3380CC4-5D6E-409C-BE32-E72D297353CC}">
+                <c16:uniqueId val="{00000005-3962-44CA-BD86-EB63939BD29B}"/>
+              </c:ext>
+            </c:extLst>
+          </c:dPt>
+          <c:dLbls>
+            <c:dLbl>
+              <c:idx val="0"/>
+              <c:layout>
+                <c:manualLayout>
+                  <c:x val="-3.1968179869232061E-2"/>
+                  <c:y val="-2.4635151013642925E-2"/>
+                </c:manualLayout>
+              </c:layout>
+              <c:showLegendKey val="0"/>
+              <c:showVal val="1"/>
+              <c:showCatName val="0"/>
+              <c:showSerName val="0"/>
+              <c:showPercent val="0"/>
+              <c:showBubbleSize val="0"/>
+              <c:extLst>
+                <c:ext xmlns:c15="http://schemas.microsoft.com/office/drawing/2012/chart" uri="{CE6537A1-D6FC-4f65-9D91-7224C49458BB}"/>
+                <c:ext xmlns:c16="http://schemas.microsoft.com/office/drawing/2014/chart" uri="{C3380CC4-5D6E-409C-BE32-E72D297353CC}">
+                  <c16:uniqueId val="{00000001-3962-44CA-BD86-EB63939BD29B}"/>
+                </c:ext>
+              </c:extLst>
+            </c:dLbl>
+            <c:dLbl>
+              <c:idx val="1"/>
+              <c:layout>
+                <c:manualLayout>
+                  <c:x val="3.0178992579733867E-2"/>
+                  <c:y val="1.3854296290362967E-2"/>
+                </c:manualLayout>
+              </c:layout>
+              <c:showLegendKey val="0"/>
+              <c:showVal val="1"/>
+              <c:showCatName val="0"/>
+              <c:showSerName val="0"/>
+              <c:showPercent val="0"/>
+              <c:showBubbleSize val="0"/>
+              <c:extLst>
+                <c:ext xmlns:c15="http://schemas.microsoft.com/office/drawing/2012/chart" uri="{CE6537A1-D6FC-4f65-9D91-7224C49458BB}"/>
+                <c:ext xmlns:c16="http://schemas.microsoft.com/office/drawing/2014/chart" uri="{C3380CC4-5D6E-409C-BE32-E72D297353CC}">
+                  <c16:uniqueId val="{00000003-3962-44CA-BD86-EB63939BD29B}"/>
+                </c:ext>
+              </c:extLst>
+            </c:dLbl>
+            <c:dLbl>
+              <c:idx val="2"/>
+              <c:layout>
+                <c:manualLayout>
+                  <c:x val="-3.399625586117535E-3"/>
+                  <c:y val="5.8187850978884542E-2"/>
+                </c:manualLayout>
+              </c:layout>
+              <c:showLegendKey val="0"/>
+              <c:showVal val="1"/>
+              <c:showCatName val="0"/>
+              <c:showSerName val="0"/>
+              <c:showPercent val="0"/>
+              <c:showBubbleSize val="0"/>
+              <c:extLst>
+                <c:ext xmlns:c15="http://schemas.microsoft.com/office/drawing/2012/chart" uri="{CE6537A1-D6FC-4f65-9D91-7224C49458BB}"/>
+                <c:ext xmlns:c16="http://schemas.microsoft.com/office/drawing/2014/chart" uri="{C3380CC4-5D6E-409C-BE32-E72D297353CC}">
+                  <c16:uniqueId val="{00000005-3962-44CA-BD86-EB63939BD29B}"/>
+                </c:ext>
+              </c:extLst>
+            </c:dLbl>
+            <c:spPr>
+              <a:noFill/>
+              <a:ln>
+                <a:noFill/>
+              </a:ln>
+              <a:effectLst/>
+            </c:spPr>
+            <c:txPr>
+              <a:bodyPr rot="0" spcFirstLastPara="1" vertOverflow="ellipsis" vert="horz" wrap="square" lIns="38100" tIns="19050" rIns="38100" bIns="19050" anchor="ctr" anchorCtr="1">
+                <a:spAutoFit/>
+              </a:bodyPr>
+              <a:lstStyle/>
+              <a:p>
+                <a:pPr>
+                  <a:defRPr sz="2400" b="1" i="0" u="none" strike="noStrike" kern="1200" baseline="0">
+                    <a:solidFill>
+                      <a:schemeClr val="tx1">
+                        <a:lumMod val="75000"/>
+                        <a:lumOff val="25000"/>
+                      </a:schemeClr>
+                    </a:solidFill>
+                    <a:latin typeface="+mn-lt"/>
+                    <a:ea typeface="+mn-ea"/>
+                    <a:cs typeface="+mn-cs"/>
+                  </a:defRPr>
+                </a:pPr>
+                <a:endParaRPr lang="en-US"/>
+              </a:p>
+            </c:txPr>
+            <c:showLegendKey val="0"/>
+            <c:showVal val="1"/>
+            <c:showCatName val="0"/>
+            <c:showSerName val="0"/>
+            <c:showPercent val="0"/>
+            <c:showBubbleSize val="0"/>
+            <c:showLeaderLines val="1"/>
+            <c:leaderLines>
+              <c:spPr>
+                <a:ln w="9525" cap="flat" cmpd="sng" algn="ctr">
+                  <a:solidFill>
+                    <a:schemeClr val="tx1">
+                      <a:lumMod val="35000"/>
+                      <a:lumOff val="65000"/>
+                    </a:schemeClr>
+                  </a:solidFill>
+                  <a:round/>
+                </a:ln>
+                <a:effectLst/>
+              </c:spPr>
+            </c:leaderLines>
+            <c:extLst>
+              <c:ext xmlns:c15="http://schemas.microsoft.com/office/drawing/2012/chart" uri="{CE6537A1-D6FC-4f65-9D91-7224C49458BB}"/>
+            </c:extLst>
+          </c:dLbls>
+          <c:cat>
+            <c:strRef>
+              <c:f>'For Portal'!$B$37:$B$39</c:f>
+              <c:strCache>
+                <c:ptCount val="3"/>
+                <c:pt idx="0">
+                  <c:v>Trust</c:v>
+                </c:pt>
+                <c:pt idx="1">
+                  <c:v>Direct Sponsors</c:v>
+                </c:pt>
+                <c:pt idx="2">
+                  <c:v>Group Direct Sponsors</c:v>
+                </c:pt>
+              </c:strCache>
+            </c:strRef>
+          </c:cat>
+          <c:val>
+            <c:numRef>
+              <c:f>'For Portal'!$C$37:$C$39</c:f>
+              <c:numCache>
+                <c:formatCode>General</c:formatCode>
+                <c:ptCount val="3"/>
+                <c:pt idx="0">
+                  <c:v>11</c:v>
+                </c:pt>
+                <c:pt idx="1">
+                  <c:v>8</c:v>
+                </c:pt>
+                <c:pt idx="2">
+                  <c:v>3</c:v>
+                </c:pt>
+              </c:numCache>
+            </c:numRef>
+          </c:val>
+          <c:extLst>
+            <c:ext xmlns:c16="http://schemas.microsoft.com/office/drawing/2014/chart" uri="{C3380CC4-5D6E-409C-BE32-E72D297353CC}">
+              <c16:uniqueId val="{00000006-3962-44CA-BD86-EB63939BD29B}"/>
+            </c:ext>
+          </c:extLst>
+        </c:ser>
+        <c:ser>
+          <c:idx val="1"/>
+          <c:order val="1"/>
+          <c:dPt>
+            <c:idx val="0"/>
+            <c:bubble3D val="0"/>
+            <c:spPr>
+              <a:solidFill>
+                <a:schemeClr val="accent6"/>
+              </a:solidFill>
+              <a:ln w="19050">
+                <a:solidFill>
+                  <a:schemeClr val="lt1"/>
+                </a:solidFill>
+              </a:ln>
+              <a:effectLst/>
+            </c:spPr>
+            <c:extLst>
+              <c:ext xmlns:c16="http://schemas.microsoft.com/office/drawing/2014/chart" uri="{C3380CC4-5D6E-409C-BE32-E72D297353CC}">
+                <c16:uniqueId val="{00000008-3962-44CA-BD86-EB63939BD29B}"/>
+              </c:ext>
+            </c:extLst>
+          </c:dPt>
+          <c:dPt>
+            <c:idx val="1"/>
+            <c:bubble3D val="0"/>
+            <c:spPr>
+              <a:solidFill>
+                <a:schemeClr val="accent5"/>
+              </a:solidFill>
+              <a:ln w="19050">
+                <a:solidFill>
+                  <a:schemeClr val="lt1"/>
+                </a:solidFill>
+              </a:ln>
+              <a:effectLst/>
+            </c:spPr>
+            <c:extLst>
+              <c:ext xmlns:c16="http://schemas.microsoft.com/office/drawing/2014/chart" uri="{C3380CC4-5D6E-409C-BE32-E72D297353CC}">
+                <c16:uniqueId val="{0000000A-3962-44CA-BD86-EB63939BD29B}"/>
+              </c:ext>
+            </c:extLst>
+          </c:dPt>
+          <c:dPt>
+            <c:idx val="2"/>
+            <c:bubble3D val="0"/>
+            <c:spPr>
+              <a:solidFill>
+                <a:schemeClr val="accent4"/>
+              </a:solidFill>
+              <a:ln w="19050">
+                <a:solidFill>
+                  <a:schemeClr val="lt1"/>
+                </a:solidFill>
+              </a:ln>
+              <a:effectLst/>
+            </c:spPr>
+            <c:extLst>
+              <c:ext xmlns:c16="http://schemas.microsoft.com/office/drawing/2014/chart" uri="{C3380CC4-5D6E-409C-BE32-E72D297353CC}">
+                <c16:uniqueId val="{0000000C-3962-44CA-BD86-EB63939BD29B}"/>
+              </c:ext>
+            </c:extLst>
+          </c:dPt>
+          <c:dLbls>
+            <c:dLbl>
+              <c:idx val="0"/>
+              <c:layout>
+                <c:manualLayout>
+                  <c:x val="8.3720330738062607E-2"/>
+                  <c:y val="4.7877888856622912E-2"/>
+                </c:manualLayout>
+              </c:layout>
+              <c:showLegendKey val="0"/>
+              <c:showVal val="1"/>
+              <c:showCatName val="0"/>
+              <c:showSerName val="0"/>
+              <c:showPercent val="0"/>
+              <c:showBubbleSize val="0"/>
+              <c:extLst>
+                <c:ext xmlns:c15="http://schemas.microsoft.com/office/drawing/2012/chart" uri="{CE6537A1-D6FC-4f65-9D91-7224C49458BB}"/>
+                <c:ext xmlns:c16="http://schemas.microsoft.com/office/drawing/2014/chart" uri="{C3380CC4-5D6E-409C-BE32-E72D297353CC}">
+                  <c16:uniqueId val="{00000008-3962-44CA-BD86-EB63939BD29B}"/>
+                </c:ext>
+              </c:extLst>
+            </c:dLbl>
+            <c:dLbl>
+              <c:idx val="1"/>
+              <c:layout>
+                <c:manualLayout>
+                  <c:x val="-0.11013903531742532"/>
+                  <c:y val="-6.2817570505588505E-2"/>
+                </c:manualLayout>
+              </c:layout>
+              <c:showLegendKey val="0"/>
+              <c:showVal val="1"/>
+              <c:showCatName val="0"/>
+              <c:showSerName val="0"/>
+              <c:showPercent val="0"/>
+              <c:showBubbleSize val="0"/>
+              <c:extLst>
+                <c:ext xmlns:c15="http://schemas.microsoft.com/office/drawing/2012/chart" uri="{CE6537A1-D6FC-4f65-9D91-7224C49458BB}"/>
+                <c:ext xmlns:c16="http://schemas.microsoft.com/office/drawing/2014/chart" uri="{C3380CC4-5D6E-409C-BE32-E72D297353CC}">
+                  <c16:uniqueId val="{0000000A-3962-44CA-BD86-EB63939BD29B}"/>
+                </c:ext>
+              </c:extLst>
+            </c:dLbl>
+            <c:dLbl>
+              <c:idx val="2"/>
+              <c:layout>
+                <c:manualLayout>
+                  <c:x val="-6.0558173014441316E-2"/>
+                  <c:y val="-2.412952218545452E-2"/>
+                </c:manualLayout>
+              </c:layout>
+              <c:showLegendKey val="0"/>
+              <c:showVal val="1"/>
+              <c:showCatName val="0"/>
+              <c:showSerName val="0"/>
+              <c:showPercent val="0"/>
+              <c:showBubbleSize val="0"/>
+              <c:extLst>
+                <c:ext xmlns:c15="http://schemas.microsoft.com/office/drawing/2012/chart" uri="{CE6537A1-D6FC-4f65-9D91-7224C49458BB}"/>
+                <c:ext xmlns:c16="http://schemas.microsoft.com/office/drawing/2014/chart" uri="{C3380CC4-5D6E-409C-BE32-E72D297353CC}">
+                  <c16:uniqueId val="{0000000C-3962-44CA-BD86-EB63939BD29B}"/>
+                </c:ext>
+              </c:extLst>
+            </c:dLbl>
+            <c:spPr>
+              <a:noFill/>
+              <a:ln>
+                <a:noFill/>
+              </a:ln>
+              <a:effectLst/>
+            </c:spPr>
+            <c:txPr>
+              <a:bodyPr rot="0" spcFirstLastPara="1" vertOverflow="ellipsis" vert="horz" wrap="square" lIns="38100" tIns="19050" rIns="38100" bIns="19050" anchor="ctr" anchorCtr="1">
+                <a:spAutoFit/>
+              </a:bodyPr>
+              <a:lstStyle/>
+              <a:p>
+                <a:pPr>
+                  <a:defRPr sz="2000" b="1" i="0" u="none" strike="noStrike" kern="1200" baseline="0">
+                    <a:solidFill>
+                      <a:schemeClr val="tx1">
+                        <a:lumMod val="75000"/>
+                        <a:lumOff val="25000"/>
+                      </a:schemeClr>
+                    </a:solidFill>
+                    <a:latin typeface="+mn-lt"/>
+                    <a:ea typeface="+mn-ea"/>
+                    <a:cs typeface="+mn-cs"/>
+                  </a:defRPr>
+                </a:pPr>
+                <a:endParaRPr lang="en-US"/>
+              </a:p>
+            </c:txPr>
+            <c:showLegendKey val="0"/>
+            <c:showVal val="1"/>
+            <c:showCatName val="0"/>
+            <c:showSerName val="0"/>
+            <c:showPercent val="0"/>
+            <c:showBubbleSize val="0"/>
+            <c:showLeaderLines val="1"/>
+            <c:leaderLines>
+              <c:spPr>
+                <a:ln w="9525" cap="flat" cmpd="sng" algn="ctr">
+                  <a:solidFill>
+                    <a:schemeClr val="tx1">
+                      <a:lumMod val="35000"/>
+                      <a:lumOff val="65000"/>
+                    </a:schemeClr>
+                  </a:solidFill>
+                  <a:round/>
+                </a:ln>
+                <a:effectLst/>
+              </c:spPr>
+            </c:leaderLines>
+            <c:extLst>
+              <c:ext xmlns:c15="http://schemas.microsoft.com/office/drawing/2012/chart" uri="{CE6537A1-D6FC-4f65-9D91-7224C49458BB}"/>
+            </c:extLst>
+          </c:dLbls>
+          <c:cat>
+            <c:strRef>
+              <c:f>'For Portal'!$B$37:$B$39</c:f>
+              <c:strCache>
+                <c:ptCount val="3"/>
+                <c:pt idx="0">
+                  <c:v>Trust</c:v>
+                </c:pt>
+                <c:pt idx="1">
+                  <c:v>Direct Sponsors</c:v>
+                </c:pt>
+                <c:pt idx="2">
+                  <c:v>Group Direct Sponsors</c:v>
+                </c:pt>
+              </c:strCache>
+            </c:strRef>
+          </c:cat>
+          <c:val>
+            <c:numRef>
+              <c:f>'For Portal'!$D$37:$D$39</c:f>
+              <c:numCache>
+                <c:formatCode>[$₹-4009]#,##0;\-[$₹-4009]#,##0</c:formatCode>
+                <c:ptCount val="3"/>
+                <c:pt idx="0">
+                  <c:v>315524</c:v>
+                </c:pt>
+                <c:pt idx="1">
+                  <c:v>323275</c:v>
+                </c:pt>
+                <c:pt idx="2">
+                  <c:v>92938</c:v>
+                </c:pt>
+              </c:numCache>
+            </c:numRef>
+          </c:val>
+          <c:extLst>
+            <c:ext xmlns:c16="http://schemas.microsoft.com/office/drawing/2014/chart" uri="{C3380CC4-5D6E-409C-BE32-E72D297353CC}">
+              <c16:uniqueId val="{0000000D-3962-44CA-BD86-EB63939BD29B}"/>
+            </c:ext>
+          </c:extLst>
+        </c:ser>
+        <c:dLbls>
+          <c:showLegendKey val="0"/>
+          <c:showVal val="0"/>
+          <c:showCatName val="0"/>
+          <c:showSerName val="0"/>
+          <c:showPercent val="0"/>
+          <c:showBubbleSize val="0"/>
+          <c:showLeaderLines val="1"/>
+        </c:dLbls>
+        <c:firstSliceAng val="0"/>
+        <c:holeSize val="75"/>
+      </c:doughnutChart>
+      <c:spPr>
+        <a:noFill/>
+        <a:ln>
+          <a:noFill/>
+        </a:ln>
+        <a:effectLst/>
+      </c:spPr>
+    </c:plotArea>
+    <c:legend>
+      <c:legendPos val="b"/>
+      <c:overlay val="0"/>
+      <c:spPr>
+        <a:noFill/>
+        <a:ln>
+          <a:noFill/>
+        </a:ln>
+        <a:effectLst/>
+      </c:spPr>
+      <c:txPr>
+        <a:bodyPr rot="0" spcFirstLastPara="1" vertOverflow="ellipsis" vert="horz" wrap="square" anchor="ctr" anchorCtr="1"/>
+        <a:lstStyle/>
+        <a:p>
+          <a:pPr>
+            <a:defRPr sz="2800" b="1" i="0" u="none" strike="noStrike" kern="1200" baseline="0">
+              <a:solidFill>
+                <a:schemeClr val="tx1">
+                  <a:lumMod val="65000"/>
+                  <a:lumOff val="35000"/>
+                </a:schemeClr>
+              </a:solidFill>
+              <a:latin typeface="+mn-lt"/>
+              <a:ea typeface="+mn-ea"/>
+              <a:cs typeface="+mn-cs"/>
+            </a:defRPr>
+          </a:pPr>
+          <a:endParaRPr lang="en-US"/>
+        </a:p>
+      </c:txPr>
+    </c:legend>
+    <c:plotVisOnly val="1"/>
+    <c:dispBlanksAs val="gap"/>
+    <c:extLst>
+      <c:ext xmlns:c16r3="http://schemas.microsoft.com/office/drawing/2017/03/chart" uri="{56B9EC1D-385E-4148-901F-78D8002777C0}">
+        <c16r3:dataDisplayOptions16>
+          <c16r3:dispNaAsBlank val="1"/>
+        </c16r3:dataDisplayOptions16>
+      </c:ext>
+    </c:extLst>
     <c:showDLblsOverMax val="0"/>
   </c:chart>
   <c:spPr>
@@ -7128,6 +8058,49 @@
 </cs:colorStyle>
 </file>
 
+<file path=ppt/charts/colors10.xml><?xml version="1.0" encoding="utf-8"?>
+<cs:colorStyle xmlns:cs="http://schemas.microsoft.com/office/drawing/2012/chartStyle" xmlns:a="http://schemas.openxmlformats.org/drawingml/2006/main" meth="withinLinear" id="15">
+  <a:schemeClr val="accent2"/>
+</cs:colorStyle>
+</file>
+
+<file path=ppt/charts/colors11.xml><?xml version="1.0" encoding="utf-8"?>
+<cs:colorStyle xmlns:cs="http://schemas.microsoft.com/office/drawing/2012/chartStyle" xmlns:a="http://schemas.openxmlformats.org/drawingml/2006/main" meth="cycle" id="13">
+  <a:schemeClr val="accent6"/>
+  <a:schemeClr val="accent5"/>
+  <a:schemeClr val="accent4"/>
+  <cs:variation/>
+  <cs:variation>
+    <a:lumMod val="60000"/>
+  </cs:variation>
+  <cs:variation>
+    <a:lumMod val="80000"/>
+    <a:lumOff val="20000"/>
+  </cs:variation>
+  <cs:variation>
+    <a:lumMod val="80000"/>
+  </cs:variation>
+  <cs:variation>
+    <a:lumMod val="60000"/>
+    <a:lumOff val="40000"/>
+  </cs:variation>
+  <cs:variation>
+    <a:lumMod val="50000"/>
+  </cs:variation>
+  <cs:variation>
+    <a:lumMod val="70000"/>
+    <a:lumOff val="30000"/>
+  </cs:variation>
+  <cs:variation>
+    <a:lumMod val="70000"/>
+  </cs:variation>
+  <cs:variation>
+    <a:lumMod val="50000"/>
+    <a:lumOff val="50000"/>
+  </cs:variation>
+</cs:colorStyle>
+</file>
+
 <file path=ppt/charts/colors2.xml><?xml version="1.0" encoding="utf-8"?>
 <cs:colorStyle xmlns:cs="http://schemas.microsoft.com/office/drawing/2012/chartStyle" xmlns:a="http://schemas.openxmlformats.org/drawingml/2006/main" meth="cycle" id="10">
   <a:schemeClr val="accent1"/>
@@ -7915,6 +8888,1044 @@
     <cs:fontRef idx="minor">
       <a:schemeClr val="dk1"/>
     </cs:fontRef>
+  </cs:wall>
+</cs:chartStyle>
+</file>
+
+<file path=ppt/charts/style10.xml><?xml version="1.0" encoding="utf-8"?>
+<cs:chartStyle xmlns:cs="http://schemas.microsoft.com/office/drawing/2012/chartStyle" xmlns:a="http://schemas.openxmlformats.org/drawingml/2006/main" id="217">
+  <cs:axisTitle>
+    <cs:lnRef idx="0"/>
+    <cs:fillRef idx="0"/>
+    <cs:effectRef idx="0"/>
+    <cs:fontRef idx="minor">
+      <a:schemeClr val="tx1">
+        <a:lumMod val="65000"/>
+        <a:lumOff val="35000"/>
+      </a:schemeClr>
+    </cs:fontRef>
+    <cs:defRPr sz="1197" b="1" kern="1200"/>
+  </cs:axisTitle>
+  <cs:categoryAxis>
+    <cs:lnRef idx="0"/>
+    <cs:fillRef idx="0"/>
+    <cs:effectRef idx="0"/>
+    <cs:fontRef idx="minor">
+      <a:schemeClr val="tx1">
+        <a:lumMod val="65000"/>
+        <a:lumOff val="35000"/>
+      </a:schemeClr>
+    </cs:fontRef>
+    <cs:spPr>
+      <a:ln w="19050" cap="flat" cmpd="sng" algn="ctr">
+        <a:solidFill>
+          <a:schemeClr val="tx1">
+            <a:lumMod val="25000"/>
+            <a:lumOff val="75000"/>
+          </a:schemeClr>
+        </a:solidFill>
+        <a:round/>
+      </a:ln>
+    </cs:spPr>
+    <cs:defRPr sz="1197" kern="1200"/>
+  </cs:categoryAxis>
+  <cs:chartArea mods="allowNoFillOverride allowNoLineOverride">
+    <cs:lnRef idx="0"/>
+    <cs:fillRef idx="0"/>
+    <cs:effectRef idx="0"/>
+    <cs:fontRef idx="minor">
+      <a:schemeClr val="dk1"/>
+    </cs:fontRef>
+    <cs:spPr>
+      <a:solidFill>
+        <a:schemeClr val="bg1"/>
+      </a:solidFill>
+      <a:ln w="9525" cap="flat" cmpd="sng" algn="ctr">
+        <a:solidFill>
+          <a:schemeClr val="tx1">
+            <a:lumMod val="15000"/>
+            <a:lumOff val="85000"/>
+          </a:schemeClr>
+        </a:solidFill>
+        <a:round/>
+      </a:ln>
+    </cs:spPr>
+    <cs:defRPr sz="1197" kern="1200"/>
+  </cs:chartArea>
+  <cs:dataLabel>
+    <cs:lnRef idx="0"/>
+    <cs:fillRef idx="0"/>
+    <cs:effectRef idx="0"/>
+    <cs:fontRef idx="minor">
+      <a:schemeClr val="tx1">
+        <a:lumMod val="75000"/>
+        <a:lumOff val="25000"/>
+      </a:schemeClr>
+    </cs:fontRef>
+    <cs:defRPr sz="1197" kern="1200"/>
+  </cs:dataLabel>
+  <cs:dataLabelCallout>
+    <cs:lnRef idx="0"/>
+    <cs:fillRef idx="0"/>
+    <cs:effectRef idx="0"/>
+    <cs:fontRef idx="minor">
+      <a:schemeClr val="dk1">
+        <a:lumMod val="65000"/>
+        <a:lumOff val="35000"/>
+      </a:schemeClr>
+    </cs:fontRef>
+    <cs:spPr>
+      <a:solidFill>
+        <a:schemeClr val="lt1"/>
+      </a:solidFill>
+      <a:ln>
+        <a:solidFill>
+          <a:schemeClr val="dk1">
+            <a:lumMod val="25000"/>
+            <a:lumOff val="75000"/>
+          </a:schemeClr>
+        </a:solidFill>
+      </a:ln>
+    </cs:spPr>
+    <cs:defRPr sz="1197" kern="1200"/>
+    <cs:bodyPr rot="0" spcFirstLastPara="1" vertOverflow="clip" horzOverflow="clip" vert="horz" wrap="square" lIns="36576" tIns="18288" rIns="36576" bIns="18288" anchor="ctr" anchorCtr="1">
+      <a:spAutoFit/>
+    </cs:bodyPr>
+  </cs:dataLabelCallout>
+  <cs:dataPoint>
+    <cs:lnRef idx="0"/>
+    <cs:fillRef idx="0">
+      <cs:styleClr val="auto"/>
+    </cs:fillRef>
+    <cs:effectRef idx="0">
+      <cs:styleClr val="auto"/>
+    </cs:effectRef>
+    <cs:fontRef idx="minor">
+      <a:schemeClr val="dk1"/>
+    </cs:fontRef>
+    <cs:spPr>
+      <a:pattFill prst="narVert">
+        <a:fgClr>
+          <a:schemeClr val="phClr"/>
+        </a:fgClr>
+        <a:bgClr>
+          <a:schemeClr val="phClr">
+            <a:lumMod val="20000"/>
+            <a:lumOff val="80000"/>
+          </a:schemeClr>
+        </a:bgClr>
+      </a:pattFill>
+      <a:effectLst>
+        <a:innerShdw blurRad="114300">
+          <a:schemeClr val="phClr"/>
+        </a:innerShdw>
+      </a:effectLst>
+    </cs:spPr>
+  </cs:dataPoint>
+  <cs:dataPoint3D>
+    <cs:lnRef idx="0"/>
+    <cs:fillRef idx="0">
+      <cs:styleClr val="auto"/>
+    </cs:fillRef>
+    <cs:effectRef idx="0"/>
+    <cs:fontRef idx="minor">
+      <a:schemeClr val="dk1"/>
+    </cs:fontRef>
+    <cs:spPr>
+      <a:pattFill prst="narVert">
+        <a:fgClr>
+          <a:schemeClr val="phClr"/>
+        </a:fgClr>
+        <a:bgClr>
+          <a:schemeClr val="phClr">
+            <a:lumMod val="20000"/>
+            <a:lumOff val="80000"/>
+          </a:schemeClr>
+        </a:bgClr>
+      </a:pattFill>
+      <a:effectLst>
+        <a:innerShdw blurRad="114300">
+          <a:schemeClr val="phClr"/>
+        </a:innerShdw>
+      </a:effectLst>
+    </cs:spPr>
+  </cs:dataPoint3D>
+  <cs:dataPointLine>
+    <cs:lnRef idx="0">
+      <cs:styleClr val="auto"/>
+    </cs:lnRef>
+    <cs:fillRef idx="0"/>
+    <cs:effectRef idx="0"/>
+    <cs:fontRef idx="minor">
+      <a:schemeClr val="dk1"/>
+    </cs:fontRef>
+    <cs:spPr>
+      <a:ln w="28575" cap="rnd">
+        <a:solidFill>
+          <a:schemeClr val="phClr"/>
+        </a:solidFill>
+        <a:round/>
+      </a:ln>
+    </cs:spPr>
+  </cs:dataPointLine>
+  <cs:dataPointMarker>
+    <cs:lnRef idx="0"/>
+    <cs:fillRef idx="0">
+      <cs:styleClr val="auto"/>
+    </cs:fillRef>
+    <cs:effectRef idx="0"/>
+    <cs:fontRef idx="minor">
+      <a:schemeClr val="dk1"/>
+    </cs:fontRef>
+    <cs:spPr>
+      <a:solidFill>
+        <a:schemeClr val="phClr"/>
+      </a:solidFill>
+    </cs:spPr>
+  </cs:dataPointMarker>
+  <cs:dataPointMarkerLayout symbol="circle" size="6"/>
+  <cs:dataPointWireframe>
+    <cs:lnRef idx="0">
+      <cs:styleClr val="auto"/>
+    </cs:lnRef>
+    <cs:fillRef idx="0"/>
+    <cs:effectRef idx="0"/>
+    <cs:fontRef idx="minor">
+      <a:schemeClr val="dk1"/>
+    </cs:fontRef>
+    <cs:spPr>
+      <a:ln w="9525" cap="rnd">
+        <a:solidFill>
+          <a:schemeClr val="phClr"/>
+        </a:solidFill>
+        <a:round/>
+      </a:ln>
+    </cs:spPr>
+  </cs:dataPointWireframe>
+  <cs:dataTable>
+    <cs:lnRef idx="0"/>
+    <cs:fillRef idx="0"/>
+    <cs:effectRef idx="0"/>
+    <cs:fontRef idx="minor">
+      <a:schemeClr val="tx1">
+        <a:lumMod val="65000"/>
+        <a:lumOff val="35000"/>
+      </a:schemeClr>
+    </cs:fontRef>
+    <cs:spPr>
+      <a:ln w="9525">
+        <a:solidFill>
+          <a:schemeClr val="tx1">
+            <a:lumMod val="15000"/>
+            <a:lumOff val="85000"/>
+          </a:schemeClr>
+        </a:solidFill>
+      </a:ln>
+    </cs:spPr>
+    <cs:defRPr sz="1197" kern="1200"/>
+  </cs:dataTable>
+  <cs:downBar>
+    <cs:lnRef idx="0"/>
+    <cs:fillRef idx="0"/>
+    <cs:effectRef idx="0"/>
+    <cs:fontRef idx="minor">
+      <a:schemeClr val="dk1"/>
+    </cs:fontRef>
+    <cs:spPr>
+      <a:solidFill>
+        <a:schemeClr val="dk1">
+          <a:lumMod val="75000"/>
+          <a:lumOff val="25000"/>
+        </a:schemeClr>
+      </a:solidFill>
+      <a:ln w="9525">
+        <a:solidFill>
+          <a:schemeClr val="tx1">
+            <a:lumMod val="50000"/>
+            <a:lumOff val="50000"/>
+          </a:schemeClr>
+        </a:solidFill>
+      </a:ln>
+    </cs:spPr>
+  </cs:downBar>
+  <cs:dropLine>
+    <cs:lnRef idx="0"/>
+    <cs:fillRef idx="0"/>
+    <cs:effectRef idx="0"/>
+    <cs:fontRef idx="minor">
+      <a:schemeClr val="dk1"/>
+    </cs:fontRef>
+    <cs:spPr>
+      <a:ln w="9525">
+        <a:solidFill>
+          <a:schemeClr val="tx1">
+            <a:lumMod val="35000"/>
+            <a:lumOff val="65000"/>
+          </a:schemeClr>
+        </a:solidFill>
+        <a:round/>
+      </a:ln>
+    </cs:spPr>
+  </cs:dropLine>
+  <cs:errorBar>
+    <cs:lnRef idx="0"/>
+    <cs:fillRef idx="0"/>
+    <cs:effectRef idx="0"/>
+    <cs:fontRef idx="minor">
+      <a:schemeClr val="dk1"/>
+    </cs:fontRef>
+    <cs:spPr>
+      <a:ln w="9525">
+        <a:solidFill>
+          <a:schemeClr val="tx1">
+            <a:lumMod val="50000"/>
+            <a:lumOff val="50000"/>
+          </a:schemeClr>
+        </a:solidFill>
+        <a:round/>
+      </a:ln>
+    </cs:spPr>
+  </cs:errorBar>
+  <cs:floor>
+    <cs:lnRef idx="0"/>
+    <cs:fillRef idx="0"/>
+    <cs:effectRef idx="0"/>
+    <cs:fontRef idx="minor">
+      <a:schemeClr val="dk1"/>
+    </cs:fontRef>
+  </cs:floor>
+  <cs:gridlineMajor>
+    <cs:lnRef idx="0"/>
+    <cs:fillRef idx="0"/>
+    <cs:effectRef idx="0"/>
+    <cs:fontRef idx="minor">
+      <a:schemeClr val="dk1"/>
+    </cs:fontRef>
+    <cs:spPr>
+      <a:ln>
+        <a:solidFill>
+          <a:schemeClr val="tx1">
+            <a:lumMod val="15000"/>
+            <a:lumOff val="85000"/>
+          </a:schemeClr>
+        </a:solidFill>
+      </a:ln>
+    </cs:spPr>
+  </cs:gridlineMajor>
+  <cs:gridlineMinor>
+    <cs:lnRef idx="0"/>
+    <cs:fillRef idx="0"/>
+    <cs:effectRef idx="0"/>
+    <cs:fontRef idx="minor">
+      <a:schemeClr val="dk1"/>
+    </cs:fontRef>
+    <cs:spPr>
+      <a:ln>
+        <a:solidFill>
+          <a:schemeClr val="tx1">
+            <a:lumMod val="5000"/>
+            <a:lumOff val="95000"/>
+          </a:schemeClr>
+        </a:solidFill>
+      </a:ln>
+    </cs:spPr>
+  </cs:gridlineMinor>
+  <cs:hiLoLine>
+    <cs:lnRef idx="0"/>
+    <cs:fillRef idx="0"/>
+    <cs:effectRef idx="0"/>
+    <cs:fontRef idx="minor">
+      <a:schemeClr val="dk1"/>
+    </cs:fontRef>
+    <cs:spPr>
+      <a:ln w="9525">
+        <a:solidFill>
+          <a:schemeClr val="tx1">
+            <a:lumMod val="35000"/>
+            <a:lumOff val="65000"/>
+          </a:schemeClr>
+        </a:solidFill>
+        <a:round/>
+      </a:ln>
+    </cs:spPr>
+  </cs:hiLoLine>
+  <cs:leaderLine>
+    <cs:lnRef idx="0"/>
+    <cs:fillRef idx="0"/>
+    <cs:effectRef idx="0"/>
+    <cs:fontRef idx="minor">
+      <a:schemeClr val="dk1"/>
+    </cs:fontRef>
+    <cs:spPr>
+      <a:ln w="9525">
+        <a:solidFill>
+          <a:schemeClr val="tx1">
+            <a:lumMod val="35000"/>
+            <a:lumOff val="65000"/>
+          </a:schemeClr>
+        </a:solidFill>
+      </a:ln>
+    </cs:spPr>
+  </cs:leaderLine>
+  <cs:legend>
+    <cs:lnRef idx="0"/>
+    <cs:fillRef idx="0"/>
+    <cs:effectRef idx="0"/>
+    <cs:fontRef idx="minor">
+      <a:schemeClr val="tx1">
+        <a:lumMod val="65000"/>
+        <a:lumOff val="35000"/>
+      </a:schemeClr>
+    </cs:fontRef>
+    <cs:defRPr sz="1197" kern="1200"/>
+  </cs:legend>
+  <cs:plotArea mods="allowNoFillOverride allowNoLineOverride">
+    <cs:lnRef idx="0"/>
+    <cs:fillRef idx="0"/>
+    <cs:effectRef idx="0"/>
+    <cs:fontRef idx="minor">
+      <a:schemeClr val="dk1"/>
+    </cs:fontRef>
+  </cs:plotArea>
+  <cs:plotArea3D mods="allowNoFillOverride allowNoLineOverride">
+    <cs:lnRef idx="0"/>
+    <cs:fillRef idx="0"/>
+    <cs:effectRef idx="0"/>
+    <cs:fontRef idx="minor">
+      <a:schemeClr val="dk1"/>
+    </cs:fontRef>
+  </cs:plotArea3D>
+  <cs:seriesAxis>
+    <cs:lnRef idx="0"/>
+    <cs:fillRef idx="0"/>
+    <cs:effectRef idx="0"/>
+    <cs:fontRef idx="minor">
+      <a:schemeClr val="tx1">
+        <a:lumMod val="65000"/>
+        <a:lumOff val="35000"/>
+      </a:schemeClr>
+    </cs:fontRef>
+    <cs:defRPr sz="1197" kern="1200"/>
+  </cs:seriesAxis>
+  <cs:seriesLine>
+    <cs:lnRef idx="0"/>
+    <cs:fillRef idx="0"/>
+    <cs:effectRef idx="0"/>
+    <cs:fontRef idx="minor">
+      <a:schemeClr val="dk1"/>
+    </cs:fontRef>
+    <cs:spPr>
+      <a:ln w="9525">
+        <a:solidFill>
+          <a:schemeClr val="tx1">
+            <a:lumMod val="35000"/>
+            <a:lumOff val="65000"/>
+          </a:schemeClr>
+        </a:solidFill>
+        <a:round/>
+      </a:ln>
+    </cs:spPr>
+  </cs:seriesLine>
+  <cs:title>
+    <cs:lnRef idx="0"/>
+    <cs:fillRef idx="0"/>
+    <cs:effectRef idx="0"/>
+    <cs:fontRef idx="minor">
+      <a:schemeClr val="tx1">
+        <a:lumMod val="50000"/>
+        <a:lumOff val="50000"/>
+      </a:schemeClr>
+    </cs:fontRef>
+    <cs:defRPr sz="2200" b="1" kern="1200" cap="all" spc="150" baseline="0"/>
+  </cs:title>
+  <cs:trendline>
+    <cs:lnRef idx="0">
+      <cs:styleClr val="auto"/>
+    </cs:lnRef>
+    <cs:fillRef idx="0"/>
+    <cs:effectRef idx="0"/>
+    <cs:fontRef idx="minor">
+      <a:schemeClr val="dk1"/>
+    </cs:fontRef>
+    <cs:spPr>
+      <a:ln w="19050" cap="rnd">
+        <a:solidFill>
+          <a:schemeClr val="phClr"/>
+        </a:solidFill>
+      </a:ln>
+    </cs:spPr>
+  </cs:trendline>
+  <cs:trendlineLabel>
+    <cs:lnRef idx="0"/>
+    <cs:fillRef idx="0"/>
+    <cs:effectRef idx="0"/>
+    <cs:fontRef idx="minor">
+      <a:schemeClr val="tx1">
+        <a:lumMod val="65000"/>
+        <a:lumOff val="35000"/>
+      </a:schemeClr>
+    </cs:fontRef>
+    <cs:defRPr sz="1197" kern="1200"/>
+  </cs:trendlineLabel>
+  <cs:upBar>
+    <cs:lnRef idx="0"/>
+    <cs:fillRef idx="0"/>
+    <cs:effectRef idx="0"/>
+    <cs:fontRef idx="minor">
+      <a:schemeClr val="dk1"/>
+    </cs:fontRef>
+    <cs:spPr>
+      <a:solidFill>
+        <a:schemeClr val="lt1"/>
+      </a:solidFill>
+      <a:ln w="9525">
+        <a:solidFill>
+          <a:schemeClr val="tx1">
+            <a:lumMod val="50000"/>
+            <a:lumOff val="50000"/>
+          </a:schemeClr>
+        </a:solidFill>
+      </a:ln>
+    </cs:spPr>
+  </cs:upBar>
+  <cs:valueAxis>
+    <cs:lnRef idx="0"/>
+    <cs:fillRef idx="0"/>
+    <cs:effectRef idx="0"/>
+    <cs:fontRef idx="minor">
+      <a:schemeClr val="tx1">
+        <a:lumMod val="65000"/>
+        <a:lumOff val="35000"/>
+      </a:schemeClr>
+    </cs:fontRef>
+    <cs:defRPr sz="1197" kern="1200"/>
+  </cs:valueAxis>
+  <cs:wall>
+    <cs:lnRef idx="0"/>
+    <cs:fillRef idx="0"/>
+    <cs:effectRef idx="0"/>
+    <cs:fontRef idx="minor">
+      <a:schemeClr val="dk1"/>
+    </cs:fontRef>
+  </cs:wall>
+</cs:chartStyle>
+</file>
+
+<file path=ppt/charts/style11.xml><?xml version="1.0" encoding="utf-8"?>
+<cs:chartStyle xmlns:cs="http://schemas.microsoft.com/office/drawing/2012/chartStyle" xmlns:a="http://schemas.openxmlformats.org/drawingml/2006/main" id="251">
+  <cs:axisTitle>
+    <cs:lnRef idx="0"/>
+    <cs:fillRef idx="0"/>
+    <cs:effectRef idx="0"/>
+    <cs:fontRef idx="minor">
+      <a:schemeClr val="tx1">
+        <a:lumMod val="65000"/>
+        <a:lumOff val="35000"/>
+      </a:schemeClr>
+    </cs:fontRef>
+    <cs:defRPr sz="1000" kern="1200"/>
+  </cs:axisTitle>
+  <cs:categoryAxis>
+    <cs:lnRef idx="0"/>
+    <cs:fillRef idx="0"/>
+    <cs:effectRef idx="0"/>
+    <cs:fontRef idx="minor">
+      <a:schemeClr val="tx1">
+        <a:lumMod val="65000"/>
+        <a:lumOff val="35000"/>
+      </a:schemeClr>
+    </cs:fontRef>
+    <cs:spPr>
+      <a:ln w="9525" cap="flat" cmpd="sng" algn="ctr">
+        <a:solidFill>
+          <a:schemeClr val="tx1">
+            <a:lumMod val="15000"/>
+            <a:lumOff val="85000"/>
+          </a:schemeClr>
+        </a:solidFill>
+        <a:round/>
+      </a:ln>
+    </cs:spPr>
+    <cs:defRPr sz="900" kern="1200"/>
+  </cs:categoryAxis>
+  <cs:chartArea mods="allowNoFillOverride allowNoLineOverride">
+    <cs:lnRef idx="0"/>
+    <cs:fillRef idx="0"/>
+    <cs:effectRef idx="0"/>
+    <cs:fontRef idx="minor">
+      <a:schemeClr val="tx1"/>
+    </cs:fontRef>
+    <cs:spPr>
+      <a:solidFill>
+        <a:schemeClr val="bg1"/>
+      </a:solidFill>
+      <a:ln w="9525" cap="flat" cmpd="sng" algn="ctr">
+        <a:solidFill>
+          <a:schemeClr val="tx1">
+            <a:lumMod val="15000"/>
+            <a:lumOff val="85000"/>
+          </a:schemeClr>
+        </a:solidFill>
+        <a:round/>
+      </a:ln>
+    </cs:spPr>
+    <cs:defRPr sz="900" kern="1200"/>
+  </cs:chartArea>
+  <cs:dataLabel>
+    <cs:lnRef idx="0"/>
+    <cs:fillRef idx="0"/>
+    <cs:effectRef idx="0"/>
+    <cs:fontRef idx="minor">
+      <a:schemeClr val="tx1">
+        <a:lumMod val="75000"/>
+        <a:lumOff val="25000"/>
+      </a:schemeClr>
+    </cs:fontRef>
+    <cs:defRPr sz="900" kern="1200"/>
+  </cs:dataLabel>
+  <cs:dataLabelCallout>
+    <cs:lnRef idx="0"/>
+    <cs:fillRef idx="0"/>
+    <cs:effectRef idx="0"/>
+    <cs:fontRef idx="minor">
+      <a:schemeClr val="dk1">
+        <a:lumMod val="65000"/>
+        <a:lumOff val="35000"/>
+      </a:schemeClr>
+    </cs:fontRef>
+    <cs:spPr>
+      <a:solidFill>
+        <a:schemeClr val="lt1"/>
+      </a:solidFill>
+      <a:ln>
+        <a:solidFill>
+          <a:schemeClr val="dk1">
+            <a:lumMod val="25000"/>
+            <a:lumOff val="75000"/>
+          </a:schemeClr>
+        </a:solidFill>
+      </a:ln>
+    </cs:spPr>
+    <cs:defRPr sz="900" kern="1200"/>
+    <cs:bodyPr rot="0" spcFirstLastPara="1" vertOverflow="clip" horzOverflow="clip" vert="horz" wrap="square" lIns="36576" tIns="18288" rIns="36576" bIns="18288" anchor="ctr" anchorCtr="1">
+      <a:spAutoFit/>
+    </cs:bodyPr>
+  </cs:dataLabelCallout>
+  <cs:dataPoint>
+    <cs:lnRef idx="0"/>
+    <cs:fillRef idx="1">
+      <cs:styleClr val="auto"/>
+    </cs:fillRef>
+    <cs:effectRef idx="0"/>
+    <cs:fontRef idx="minor">
+      <a:schemeClr val="tx1"/>
+    </cs:fontRef>
+    <cs:spPr>
+      <a:ln w="19050">
+        <a:solidFill>
+          <a:schemeClr val="lt1"/>
+        </a:solidFill>
+      </a:ln>
+    </cs:spPr>
+  </cs:dataPoint>
+  <cs:dataPoint3D>
+    <cs:lnRef idx="0"/>
+    <cs:fillRef idx="1">
+      <cs:styleClr val="auto"/>
+    </cs:fillRef>
+    <cs:effectRef idx="0"/>
+    <cs:fontRef idx="minor">
+      <a:schemeClr val="tx1"/>
+    </cs:fontRef>
+    <cs:spPr>
+      <a:ln w="25400">
+        <a:solidFill>
+          <a:schemeClr val="lt1"/>
+        </a:solidFill>
+      </a:ln>
+    </cs:spPr>
+  </cs:dataPoint3D>
+  <cs:dataPointLine>
+    <cs:lnRef idx="0">
+      <cs:styleClr val="auto"/>
+    </cs:lnRef>
+    <cs:fillRef idx="0"/>
+    <cs:effectRef idx="0"/>
+    <cs:fontRef idx="minor">
+      <a:schemeClr val="tx1"/>
+    </cs:fontRef>
+    <cs:spPr>
+      <a:ln w="28575" cap="rnd">
+        <a:solidFill>
+          <a:schemeClr val="phClr"/>
+        </a:solidFill>
+        <a:round/>
+      </a:ln>
+    </cs:spPr>
+  </cs:dataPointLine>
+  <cs:dataPointMarker>
+    <cs:lnRef idx="0">
+      <cs:styleClr val="auto"/>
+    </cs:lnRef>
+    <cs:fillRef idx="1">
+      <cs:styleClr val="auto"/>
+    </cs:fillRef>
+    <cs:effectRef idx="0"/>
+    <cs:fontRef idx="minor">
+      <a:schemeClr val="tx1"/>
+    </cs:fontRef>
+    <cs:spPr>
+      <a:ln w="9525">
+        <a:solidFill>
+          <a:schemeClr val="phClr"/>
+        </a:solidFill>
+      </a:ln>
+    </cs:spPr>
+  </cs:dataPointMarker>
+  <cs:dataPointMarkerLayout symbol="circle" size="5"/>
+  <cs:dataPointWireframe>
+    <cs:lnRef idx="0">
+      <cs:styleClr val="auto"/>
+    </cs:lnRef>
+    <cs:fillRef idx="0"/>
+    <cs:effectRef idx="0"/>
+    <cs:fontRef idx="minor">
+      <a:schemeClr val="tx1"/>
+    </cs:fontRef>
+    <cs:spPr>
+      <a:ln w="9525" cap="rnd">
+        <a:solidFill>
+          <a:schemeClr val="phClr"/>
+        </a:solidFill>
+        <a:round/>
+      </a:ln>
+    </cs:spPr>
+  </cs:dataPointWireframe>
+  <cs:dataTable>
+    <cs:lnRef idx="0"/>
+    <cs:fillRef idx="0"/>
+    <cs:effectRef idx="0"/>
+    <cs:fontRef idx="minor">
+      <a:schemeClr val="tx1">
+        <a:lumMod val="65000"/>
+        <a:lumOff val="35000"/>
+      </a:schemeClr>
+    </cs:fontRef>
+    <cs:spPr>
+      <a:noFill/>
+      <a:ln w="9525" cap="flat" cmpd="sng" algn="ctr">
+        <a:solidFill>
+          <a:schemeClr val="tx1">
+            <a:lumMod val="15000"/>
+            <a:lumOff val="85000"/>
+          </a:schemeClr>
+        </a:solidFill>
+        <a:round/>
+      </a:ln>
+    </cs:spPr>
+    <cs:defRPr sz="900" kern="1200"/>
+  </cs:dataTable>
+  <cs:downBar>
+    <cs:lnRef idx="0"/>
+    <cs:fillRef idx="0"/>
+    <cs:effectRef idx="0"/>
+    <cs:fontRef idx="minor">
+      <a:schemeClr val="tx1"/>
+    </cs:fontRef>
+    <cs:spPr>
+      <a:solidFill>
+        <a:schemeClr val="dk1">
+          <a:lumMod val="75000"/>
+          <a:lumOff val="25000"/>
+        </a:schemeClr>
+      </a:solidFill>
+      <a:ln w="9525" cap="flat" cmpd="sng" algn="ctr">
+        <a:solidFill>
+          <a:schemeClr val="tx1">
+            <a:lumMod val="65000"/>
+            <a:lumOff val="35000"/>
+          </a:schemeClr>
+        </a:solidFill>
+        <a:round/>
+      </a:ln>
+    </cs:spPr>
+  </cs:downBar>
+  <cs:dropLine>
+    <cs:lnRef idx="0"/>
+    <cs:fillRef idx="0"/>
+    <cs:effectRef idx="0"/>
+    <cs:fontRef idx="minor">
+      <a:schemeClr val="tx1"/>
+    </cs:fontRef>
+    <cs:spPr>
+      <a:ln w="9525" cap="flat" cmpd="sng" algn="ctr">
+        <a:solidFill>
+          <a:schemeClr val="tx1">
+            <a:lumMod val="35000"/>
+            <a:lumOff val="65000"/>
+          </a:schemeClr>
+        </a:solidFill>
+        <a:round/>
+      </a:ln>
+    </cs:spPr>
+  </cs:dropLine>
+  <cs:errorBar>
+    <cs:lnRef idx="0"/>
+    <cs:fillRef idx="0"/>
+    <cs:effectRef idx="0"/>
+    <cs:fontRef idx="minor">
+      <a:schemeClr val="tx1"/>
+    </cs:fontRef>
+    <cs:spPr>
+      <a:ln w="9525" cap="flat" cmpd="sng" algn="ctr">
+        <a:solidFill>
+          <a:schemeClr val="tx1">
+            <a:lumMod val="65000"/>
+            <a:lumOff val="35000"/>
+          </a:schemeClr>
+        </a:solidFill>
+        <a:round/>
+      </a:ln>
+    </cs:spPr>
+  </cs:errorBar>
+  <cs:floor>
+    <cs:lnRef idx="0"/>
+    <cs:fillRef idx="0"/>
+    <cs:effectRef idx="0"/>
+    <cs:fontRef idx="minor">
+      <a:schemeClr val="tx1"/>
+    </cs:fontRef>
+    <cs:spPr>
+      <a:noFill/>
+      <a:ln>
+        <a:noFill/>
+      </a:ln>
+    </cs:spPr>
+  </cs:floor>
+  <cs:gridlineMajor>
+    <cs:lnRef idx="0"/>
+    <cs:fillRef idx="0"/>
+    <cs:effectRef idx="0"/>
+    <cs:fontRef idx="minor">
+      <a:schemeClr val="tx1"/>
+    </cs:fontRef>
+    <cs:spPr>
+      <a:ln w="9525" cap="flat" cmpd="sng" algn="ctr">
+        <a:solidFill>
+          <a:schemeClr val="tx1">
+            <a:lumMod val="15000"/>
+            <a:lumOff val="85000"/>
+          </a:schemeClr>
+        </a:solidFill>
+        <a:round/>
+      </a:ln>
+    </cs:spPr>
+  </cs:gridlineMajor>
+  <cs:gridlineMinor>
+    <cs:lnRef idx="0"/>
+    <cs:fillRef idx="0"/>
+    <cs:effectRef idx="0"/>
+    <cs:fontRef idx="minor">
+      <a:schemeClr val="tx1"/>
+    </cs:fontRef>
+    <cs:spPr>
+      <a:ln w="9525" cap="flat" cmpd="sng" algn="ctr">
+        <a:solidFill>
+          <a:schemeClr val="tx1">
+            <a:lumMod val="5000"/>
+            <a:lumOff val="95000"/>
+          </a:schemeClr>
+        </a:solidFill>
+        <a:round/>
+      </a:ln>
+    </cs:spPr>
+  </cs:gridlineMinor>
+  <cs:hiLoLine>
+    <cs:lnRef idx="0"/>
+    <cs:fillRef idx="0"/>
+    <cs:effectRef idx="0"/>
+    <cs:fontRef idx="minor">
+      <a:schemeClr val="tx1"/>
+    </cs:fontRef>
+    <cs:spPr>
+      <a:ln w="9525" cap="flat" cmpd="sng" algn="ctr">
+        <a:solidFill>
+          <a:schemeClr val="tx1">
+            <a:lumMod val="50000"/>
+            <a:lumOff val="50000"/>
+          </a:schemeClr>
+        </a:solidFill>
+        <a:round/>
+      </a:ln>
+    </cs:spPr>
+  </cs:hiLoLine>
+  <cs:leaderLine>
+    <cs:lnRef idx="0"/>
+    <cs:fillRef idx="0"/>
+    <cs:effectRef idx="0"/>
+    <cs:fontRef idx="minor">
+      <a:schemeClr val="tx1"/>
+    </cs:fontRef>
+    <cs:spPr>
+      <a:ln w="9525" cap="flat" cmpd="sng" algn="ctr">
+        <a:solidFill>
+          <a:schemeClr val="tx1">
+            <a:lumMod val="35000"/>
+            <a:lumOff val="65000"/>
+          </a:schemeClr>
+        </a:solidFill>
+        <a:round/>
+      </a:ln>
+    </cs:spPr>
+  </cs:leaderLine>
+  <cs:legend>
+    <cs:lnRef idx="0"/>
+    <cs:fillRef idx="0"/>
+    <cs:effectRef idx="0"/>
+    <cs:fontRef idx="minor">
+      <a:schemeClr val="tx1">
+        <a:lumMod val="65000"/>
+        <a:lumOff val="35000"/>
+      </a:schemeClr>
+    </cs:fontRef>
+    <cs:defRPr sz="900" kern="1200"/>
+  </cs:legend>
+  <cs:plotArea mods="allowNoFillOverride allowNoLineOverride">
+    <cs:lnRef idx="0"/>
+    <cs:fillRef idx="0"/>
+    <cs:effectRef idx="0"/>
+    <cs:fontRef idx="minor">
+      <a:schemeClr val="tx1"/>
+    </cs:fontRef>
+  </cs:plotArea>
+  <cs:plotArea3D mods="allowNoFillOverride allowNoLineOverride">
+    <cs:lnRef idx="0"/>
+    <cs:fillRef idx="0"/>
+    <cs:effectRef idx="0"/>
+    <cs:fontRef idx="minor">
+      <a:schemeClr val="tx1"/>
+    </cs:fontRef>
+  </cs:plotArea3D>
+  <cs:seriesAxis>
+    <cs:lnRef idx="0"/>
+    <cs:fillRef idx="0"/>
+    <cs:effectRef idx="0"/>
+    <cs:fontRef idx="minor">
+      <a:schemeClr val="tx1">
+        <a:lumMod val="65000"/>
+        <a:lumOff val="35000"/>
+      </a:schemeClr>
+    </cs:fontRef>
+    <cs:defRPr sz="900" kern="1200"/>
+  </cs:seriesAxis>
+  <cs:seriesLine>
+    <cs:lnRef idx="0"/>
+    <cs:fillRef idx="0"/>
+    <cs:effectRef idx="0"/>
+    <cs:fontRef idx="minor">
+      <a:schemeClr val="tx1"/>
+    </cs:fontRef>
+    <cs:spPr>
+      <a:ln w="9525" cap="flat" cmpd="sng" algn="ctr">
+        <a:solidFill>
+          <a:schemeClr val="tx1">
+            <a:lumMod val="35000"/>
+            <a:lumOff val="65000"/>
+          </a:schemeClr>
+        </a:solidFill>
+        <a:round/>
+      </a:ln>
+    </cs:spPr>
+  </cs:seriesLine>
+  <cs:title>
+    <cs:lnRef idx="0"/>
+    <cs:fillRef idx="0"/>
+    <cs:effectRef idx="0"/>
+    <cs:fontRef idx="minor">
+      <a:schemeClr val="tx1">
+        <a:lumMod val="65000"/>
+        <a:lumOff val="35000"/>
+      </a:schemeClr>
+    </cs:fontRef>
+    <cs:defRPr sz="1400" b="0" kern="1200" spc="0" baseline="0"/>
+  </cs:title>
+  <cs:trendline>
+    <cs:lnRef idx="0">
+      <cs:styleClr val="auto"/>
+    </cs:lnRef>
+    <cs:fillRef idx="0"/>
+    <cs:effectRef idx="0"/>
+    <cs:fontRef idx="minor">
+      <a:schemeClr val="tx1"/>
+    </cs:fontRef>
+    <cs:spPr>
+      <a:ln w="19050" cap="rnd">
+        <a:solidFill>
+          <a:schemeClr val="phClr"/>
+        </a:solidFill>
+        <a:prstDash val="sysDot"/>
+      </a:ln>
+    </cs:spPr>
+  </cs:trendline>
+  <cs:trendlineLabel>
+    <cs:lnRef idx="0"/>
+    <cs:fillRef idx="0"/>
+    <cs:effectRef idx="0"/>
+    <cs:fontRef idx="minor">
+      <a:schemeClr val="tx1">
+        <a:lumMod val="65000"/>
+        <a:lumOff val="35000"/>
+      </a:schemeClr>
+    </cs:fontRef>
+    <cs:defRPr sz="900" kern="1200"/>
+  </cs:trendlineLabel>
+  <cs:upBar>
+    <cs:lnRef idx="0"/>
+    <cs:fillRef idx="0"/>
+    <cs:effectRef idx="0"/>
+    <cs:fontRef idx="minor">
+      <a:schemeClr val="tx1"/>
+    </cs:fontRef>
+    <cs:spPr>
+      <a:solidFill>
+        <a:schemeClr val="lt1"/>
+      </a:solidFill>
+      <a:ln w="9525" cap="flat" cmpd="sng" algn="ctr">
+        <a:solidFill>
+          <a:schemeClr val="tx1">
+            <a:lumMod val="65000"/>
+            <a:lumOff val="35000"/>
+          </a:schemeClr>
+        </a:solidFill>
+        <a:round/>
+      </a:ln>
+    </cs:spPr>
+  </cs:upBar>
+  <cs:valueAxis>
+    <cs:lnRef idx="0"/>
+    <cs:fillRef idx="0"/>
+    <cs:effectRef idx="0"/>
+    <cs:fontRef idx="minor">
+      <a:schemeClr val="tx1">
+        <a:lumMod val="65000"/>
+        <a:lumOff val="35000"/>
+      </a:schemeClr>
+    </cs:fontRef>
+    <cs:defRPr sz="900" kern="1200"/>
+  </cs:valueAxis>
+  <cs:wall>
+    <cs:lnRef idx="0"/>
+    <cs:fillRef idx="0"/>
+    <cs:effectRef idx="0"/>
+    <cs:fontRef idx="minor">
+      <a:schemeClr val="tx1"/>
+    </cs:fontRef>
+    <cs:spPr>
+      <a:noFill/>
+      <a:ln>
+        <a:noFill/>
+      </a:ln>
+    </cs:spPr>
   </cs:wall>
 </cs:chartStyle>
 </file>
@@ -19372,6 +21383,56 @@
 </c:userShapes>
 </file>
 
+<file path=ppt/drawings/drawing2.xml><?xml version="1.0" encoding="utf-8"?>
+<c:userShapes xmlns:c="http://schemas.openxmlformats.org/drawingml/2006/chart">
+  <cdr:relSizeAnchor xmlns:cdr="http://schemas.openxmlformats.org/drawingml/2006/chartDrawing">
+    <cdr:from>
+      <cdr:x>0.6393</cdr:x>
+      <cdr:y>0</cdr:y>
+    </cdr:from>
+    <cdr:to>
+      <cdr:x>0.96472</cdr:x>
+      <cdr:y>0.12815</cdr:y>
+    </cdr:to>
+    <cdr:sp macro="" textlink="">
+      <cdr:nvSpPr>
+        <cdr:cNvPr id="2" name="TextBox 1">
+          <a:extLst xmlns:a="http://schemas.openxmlformats.org/drawingml/2006/main">
+            <a:ext uri="{FF2B5EF4-FFF2-40B4-BE49-F238E27FC236}">
+              <a16:creationId xmlns:a16="http://schemas.microsoft.com/office/drawing/2014/main" id="{25ABDB2A-E5AD-4525-93A5-00D8F9108960}"/>
+            </a:ext>
+          </a:extLst>
+        </cdr:cNvPr>
+        <cdr:cNvSpPr txBox="1"/>
+      </cdr:nvSpPr>
+      <cdr:spPr>
+        <a:xfrm xmlns:a="http://schemas.openxmlformats.org/drawingml/2006/main">
+          <a:off x="4107866" y="0"/>
+          <a:ext cx="2091004" cy="474346"/>
+        </a:xfrm>
+        <a:prstGeom xmlns:a="http://schemas.openxmlformats.org/drawingml/2006/main" prst="rect">
+          <a:avLst/>
+        </a:prstGeom>
+      </cdr:spPr>
+      <cdr:txBody>
+        <a:bodyPr xmlns:a="http://schemas.openxmlformats.org/drawingml/2006/main" vertOverflow="clip" wrap="square" rtlCol="0"/>
+        <a:lstStyle xmlns:a="http://schemas.openxmlformats.org/drawingml/2006/main"/>
+        <a:p xmlns:a="http://schemas.openxmlformats.org/drawingml/2006/main">
+          <a:r>
+            <a:rPr lang="en-IN" sz="3600" dirty="0"/>
+            <a:t>Total: 22 Students</a:t>
+          </a:r>
+          <a:endParaRPr lang="en-IN" sz="2000" dirty="0"/>
+        </a:p>
+        <a:p xmlns:a="http://schemas.openxmlformats.org/drawingml/2006/main">
+          <a:endParaRPr lang="en-IN" sz="2000" dirty="0"/>
+        </a:p>
+      </cdr:txBody>
+    </cdr:sp>
+  </cdr:relSizeAnchor>
+</c:userShapes>
+</file>
+
 <file path=ppt/slideLayouts/slideLayout1.xml><?xml version="1.0" encoding="utf-8"?>
 <p:sldLayout xmlns:a="http://schemas.openxmlformats.org/drawingml/2006/main" xmlns:r="http://schemas.openxmlformats.org/officeDocument/2006/relationships" xmlns:p="http://schemas.openxmlformats.org/presentationml/2006/main" type="title" preserve="1">
   <p:cSld name="Title Slide">
@@ -19521,7 +21582,7 @@
           <a:p>
             <a:fld id="{A88ED8C5-EA9B-4755-BFCA-84BA78378920}" type="datetimeFigureOut">
               <a:rPr lang="en-IN" smtClean="0"/>
-              <a:t>31-08-2018</a:t>
+              <a:t>04-01-2019</a:t>
             </a:fld>
             <a:endParaRPr lang="en-IN"/>
           </a:p>
@@ -19721,7 +21782,7 @@
           <a:p>
             <a:fld id="{A88ED8C5-EA9B-4755-BFCA-84BA78378920}" type="datetimeFigureOut">
               <a:rPr lang="en-IN" smtClean="0"/>
-              <a:t>31-08-2018</a:t>
+              <a:t>04-01-2019</a:t>
             </a:fld>
             <a:endParaRPr lang="en-IN"/>
           </a:p>
@@ -19931,7 +21992,7 @@
           <a:p>
             <a:fld id="{A88ED8C5-EA9B-4755-BFCA-84BA78378920}" type="datetimeFigureOut">
               <a:rPr lang="en-IN" smtClean="0"/>
-              <a:t>31-08-2018</a:t>
+              <a:t>04-01-2019</a:t>
             </a:fld>
             <a:endParaRPr lang="en-IN"/>
           </a:p>
@@ -20131,7 +22192,7 @@
           <a:p>
             <a:fld id="{A88ED8C5-EA9B-4755-BFCA-84BA78378920}" type="datetimeFigureOut">
               <a:rPr lang="en-IN" smtClean="0"/>
-              <a:t>31-08-2018</a:t>
+              <a:t>04-01-2019</a:t>
             </a:fld>
             <a:endParaRPr lang="en-IN"/>
           </a:p>
@@ -20407,7 +22468,7 @@
           <a:p>
             <a:fld id="{A88ED8C5-EA9B-4755-BFCA-84BA78378920}" type="datetimeFigureOut">
               <a:rPr lang="en-IN" smtClean="0"/>
-              <a:t>31-08-2018</a:t>
+              <a:t>04-01-2019</a:t>
             </a:fld>
             <a:endParaRPr lang="en-IN"/>
           </a:p>
@@ -20675,7 +22736,7 @@
           <a:p>
             <a:fld id="{A88ED8C5-EA9B-4755-BFCA-84BA78378920}" type="datetimeFigureOut">
               <a:rPr lang="en-IN" smtClean="0"/>
-              <a:t>31-08-2018</a:t>
+              <a:t>04-01-2019</a:t>
             </a:fld>
             <a:endParaRPr lang="en-IN"/>
           </a:p>
@@ -21090,7 +23151,7 @@
           <a:p>
             <a:fld id="{A88ED8C5-EA9B-4755-BFCA-84BA78378920}" type="datetimeFigureOut">
               <a:rPr lang="en-IN" smtClean="0"/>
-              <a:t>31-08-2018</a:t>
+              <a:t>04-01-2019</a:t>
             </a:fld>
             <a:endParaRPr lang="en-IN"/>
           </a:p>
@@ -21232,7 +23293,7 @@
           <a:p>
             <a:fld id="{A88ED8C5-EA9B-4755-BFCA-84BA78378920}" type="datetimeFigureOut">
               <a:rPr lang="en-IN" smtClean="0"/>
-              <a:t>31-08-2018</a:t>
+              <a:t>04-01-2019</a:t>
             </a:fld>
             <a:endParaRPr lang="en-IN"/>
           </a:p>
@@ -21345,7 +23406,7 @@
           <a:p>
             <a:fld id="{A88ED8C5-EA9B-4755-BFCA-84BA78378920}" type="datetimeFigureOut">
               <a:rPr lang="en-IN" smtClean="0"/>
-              <a:t>31-08-2018</a:t>
+              <a:t>04-01-2019</a:t>
             </a:fld>
             <a:endParaRPr lang="en-IN"/>
           </a:p>
@@ -21658,7 +23719,7 @@
           <a:p>
             <a:fld id="{A88ED8C5-EA9B-4755-BFCA-84BA78378920}" type="datetimeFigureOut">
               <a:rPr lang="en-IN" smtClean="0"/>
-              <a:t>31-08-2018</a:t>
+              <a:t>04-01-2019</a:t>
             </a:fld>
             <a:endParaRPr lang="en-IN"/>
           </a:p>
@@ -21947,7 +24008,7 @@
           <a:p>
             <a:fld id="{A88ED8C5-EA9B-4755-BFCA-84BA78378920}" type="datetimeFigureOut">
               <a:rPr lang="en-IN" smtClean="0"/>
-              <a:t>31-08-2018</a:t>
+              <a:t>04-01-2019</a:t>
             </a:fld>
             <a:endParaRPr lang="en-IN"/>
           </a:p>
@@ -22190,7 +24251,7 @@
           <a:p>
             <a:fld id="{A88ED8C5-EA9B-4755-BFCA-84BA78378920}" type="datetimeFigureOut">
               <a:rPr lang="en-IN" smtClean="0"/>
-              <a:t>31-08-2018</a:t>
+              <a:t>04-01-2019</a:t>
             </a:fld>
             <a:endParaRPr lang="en-IN"/>
           </a:p>
@@ -22815,6 +24876,1467 @@
     <p:extLst>
       <p:ext uri="{BB962C8B-B14F-4D97-AF65-F5344CB8AC3E}">
         <p14:creationId xmlns:p14="http://schemas.microsoft.com/office/powerpoint/2010/main" val="2837850230"/>
+      </p:ext>
+    </p:extLst>
+  </p:cSld>
+  <p:clrMapOvr>
+    <a:masterClrMapping/>
+  </p:clrMapOvr>
+</p:sld>
+</file>
+
+<file path=ppt/slides/slide13.xml><?xml version="1.0" encoding="utf-8"?>
+<p:sld xmlns:a="http://schemas.openxmlformats.org/drawingml/2006/main" xmlns:r="http://schemas.openxmlformats.org/officeDocument/2006/relationships" xmlns:p="http://schemas.openxmlformats.org/presentationml/2006/main">
+  <p:cSld>
+    <p:spTree>
+      <p:nvGrpSpPr>
+        <p:cNvPr id="1" name=""/>
+        <p:cNvGrpSpPr/>
+        <p:nvPr/>
+      </p:nvGrpSpPr>
+      <p:grpSpPr>
+        <a:xfrm>
+          <a:off x="0" y="0"/>
+          <a:ext cx="0" cy="0"/>
+          <a:chOff x="0" y="0"/>
+          <a:chExt cx="0" cy="0"/>
+        </a:xfrm>
+      </p:grpSpPr>
+      <p:graphicFrame>
+        <p:nvGraphicFramePr>
+          <p:cNvPr id="4" name="Table 3">
+            <a:extLst>
+              <a:ext uri="{FF2B5EF4-FFF2-40B4-BE49-F238E27FC236}">
+                <a16:creationId xmlns:a16="http://schemas.microsoft.com/office/drawing/2014/main" id="{8BA27396-326B-47ED-A9C5-2542F4EA5617}"/>
+              </a:ext>
+            </a:extLst>
+          </p:cNvPr>
+          <p:cNvGraphicFramePr>
+            <a:graphicFrameLocks noGrp="1"/>
+          </p:cNvGraphicFramePr>
+          <p:nvPr>
+            <p:extLst>
+              <p:ext uri="{D42A27DB-BD31-4B8C-83A1-F6EECF244321}">
+                <p14:modId xmlns:p14="http://schemas.microsoft.com/office/powerpoint/2010/main" val="4257741755"/>
+              </p:ext>
+            </p:extLst>
+          </p:nvPr>
+        </p:nvGraphicFramePr>
+        <p:xfrm>
+          <a:off x="402672" y="780176"/>
+          <a:ext cx="11501308" cy="5041784"/>
+        </p:xfrm>
+        <a:graphic>
+          <a:graphicData uri="http://schemas.openxmlformats.org/drawingml/2006/table">
+            <a:tbl>
+              <a:tblPr>
+                <a:effectLst>
+                  <a:outerShdw blurRad="50800" dist="38100" dir="5400000" algn="t" rotWithShape="0">
+                    <a:prstClr val="black">
+                      <a:alpha val="40000"/>
+                    </a:prstClr>
+                  </a:outerShdw>
+                </a:effectLst>
+                <a:tableStyleId>{F5AB1C69-6EDB-4FF4-983F-18BD219EF322}</a:tableStyleId>
+              </a:tblPr>
+              <a:tblGrid>
+                <a:gridCol w="908918">
+                  <a:extLst>
+                    <a:ext uri="{9D8B030D-6E8A-4147-A177-3AD203B41FA5}">
+                      <a16:colId xmlns:a16="http://schemas.microsoft.com/office/drawing/2014/main" val="3470720179"/>
+                    </a:ext>
+                  </a:extLst>
+                </a:gridCol>
+                <a:gridCol w="2219856">
+                  <a:extLst>
+                    <a:ext uri="{9D8B030D-6E8A-4147-A177-3AD203B41FA5}">
+                      <a16:colId xmlns:a16="http://schemas.microsoft.com/office/drawing/2014/main" val="394327988"/>
+                    </a:ext>
+                  </a:extLst>
+                </a:gridCol>
+                <a:gridCol w="2202379">
+                  <a:extLst>
+                    <a:ext uri="{9D8B030D-6E8A-4147-A177-3AD203B41FA5}">
+                      <a16:colId xmlns:a16="http://schemas.microsoft.com/office/drawing/2014/main" val="757948988"/>
+                    </a:ext>
+                  </a:extLst>
+                </a:gridCol>
+                <a:gridCol w="2219856">
+                  <a:extLst>
+                    <a:ext uri="{9D8B030D-6E8A-4147-A177-3AD203B41FA5}">
+                      <a16:colId xmlns:a16="http://schemas.microsoft.com/office/drawing/2014/main" val="2317696018"/>
+                    </a:ext>
+                  </a:extLst>
+                </a:gridCol>
+                <a:gridCol w="2202379">
+                  <a:extLst>
+                    <a:ext uri="{9D8B030D-6E8A-4147-A177-3AD203B41FA5}">
+                      <a16:colId xmlns:a16="http://schemas.microsoft.com/office/drawing/2014/main" val="903491076"/>
+                    </a:ext>
+                  </a:extLst>
+                </a:gridCol>
+                <a:gridCol w="1747920">
+                  <a:extLst>
+                    <a:ext uri="{9D8B030D-6E8A-4147-A177-3AD203B41FA5}">
+                      <a16:colId xmlns:a16="http://schemas.microsoft.com/office/drawing/2014/main" val="1418716750"/>
+                    </a:ext>
+                  </a:extLst>
+                </a:gridCol>
+              </a:tblGrid>
+              <a:tr h="703504">
+                <a:tc>
+                  <a:txBody>
+                    <a:bodyPr/>
+                    <a:lstStyle/>
+                    <a:p>
+                      <a:pPr algn="l" fontAlgn="b"/>
+                      <a:endParaRPr lang="en-IN" sz="2000" b="1" i="0" u="none" strike="noStrike" dirty="0">
+                        <a:effectLst/>
+                        <a:latin typeface="Arial" panose="020B0604020202020204" pitchFamily="34" charset="0"/>
+                      </a:endParaRPr>
+                    </a:p>
+                  </a:txBody>
+                  <a:tcPr marL="7620" marR="7620" marT="7620" marB="0" anchor="b">
+                    <a:solidFill>
+                      <a:schemeClr val="bg2"/>
+                    </a:solidFill>
+                  </a:tcPr>
+                </a:tc>
+                <a:tc gridSpan="2">
+                  <a:txBody>
+                    <a:bodyPr/>
+                    <a:lstStyle/>
+                    <a:p>
+                      <a:pPr algn="ctr" fontAlgn="b"/>
+                      <a:r>
+                        <a:rPr lang="en-IN" sz="2000" u="none" strike="noStrike" dirty="0">
+                          <a:effectLst/>
+                        </a:rPr>
+                        <a:t>Jul-18</a:t>
+                      </a:r>
+                      <a:endParaRPr lang="en-IN" sz="2000" b="1" i="0" u="none" strike="noStrike" dirty="0">
+                        <a:effectLst/>
+                        <a:latin typeface="Arial" panose="020B0604020202020204" pitchFamily="34" charset="0"/>
+                      </a:endParaRPr>
+                    </a:p>
+                  </a:txBody>
+                  <a:tcPr marL="7620" marR="7620" marT="7620" marB="0" anchor="b">
+                    <a:solidFill>
+                      <a:schemeClr val="bg2"/>
+                    </a:solidFill>
+                  </a:tcPr>
+                </a:tc>
+                <a:tc hMerge="1">
+                  <a:txBody>
+                    <a:bodyPr/>
+                    <a:lstStyle/>
+                    <a:p>
+                      <a:endParaRPr lang="en-IN"/>
+                    </a:p>
+                  </a:txBody>
+                  <a:tcPr/>
+                </a:tc>
+                <a:tc gridSpan="2">
+                  <a:txBody>
+                    <a:bodyPr/>
+                    <a:lstStyle/>
+                    <a:p>
+                      <a:pPr algn="ctr" fontAlgn="b"/>
+                      <a:r>
+                        <a:rPr lang="en-IN" sz="2000" u="none" strike="noStrike" dirty="0">
+                          <a:effectLst/>
+                        </a:rPr>
+                        <a:t>Dec-18</a:t>
+                      </a:r>
+                      <a:endParaRPr lang="en-IN" sz="2000" b="1" i="0" u="none" strike="noStrike" dirty="0">
+                        <a:effectLst/>
+                        <a:latin typeface="Arial" panose="020B0604020202020204" pitchFamily="34" charset="0"/>
+                      </a:endParaRPr>
+                    </a:p>
+                  </a:txBody>
+                  <a:tcPr marL="7620" marR="7620" marT="7620" marB="0" anchor="b">
+                    <a:solidFill>
+                      <a:schemeClr val="bg2"/>
+                    </a:solidFill>
+                  </a:tcPr>
+                </a:tc>
+                <a:tc hMerge="1">
+                  <a:txBody>
+                    <a:bodyPr/>
+                    <a:lstStyle/>
+                    <a:p>
+                      <a:endParaRPr lang="en-IN"/>
+                    </a:p>
+                  </a:txBody>
+                  <a:tcPr/>
+                </a:tc>
+                <a:tc>
+                  <a:txBody>
+                    <a:bodyPr/>
+                    <a:lstStyle/>
+                    <a:p>
+                      <a:pPr algn="l" fontAlgn="b"/>
+                      <a:endParaRPr lang="en-IN" sz="2000" b="0" i="0" u="none" strike="noStrike" dirty="0">
+                        <a:effectLst/>
+                        <a:latin typeface="Arial" panose="020B0604020202020204" pitchFamily="34" charset="0"/>
+                      </a:endParaRPr>
+                    </a:p>
+                  </a:txBody>
+                  <a:tcPr marL="7620" marR="7620" marT="7620" marB="0" anchor="b">
+                    <a:solidFill>
+                      <a:schemeClr val="bg2"/>
+                    </a:solidFill>
+                  </a:tcPr>
+                </a:tc>
+                <a:extLst>
+                  <a:ext uri="{0D108BD9-81ED-4DB2-BD59-A6C34878D82A}">
+                    <a16:rowId xmlns:a16="http://schemas.microsoft.com/office/drawing/2014/main" val="244004340"/>
+                  </a:ext>
+                </a:extLst>
+              </a:tr>
+              <a:tr h="703504">
+                <a:tc>
+                  <a:txBody>
+                    <a:bodyPr/>
+                    <a:lstStyle/>
+                    <a:p>
+                      <a:pPr algn="ctr" fontAlgn="b"/>
+                      <a:r>
+                        <a:rPr lang="en-IN" sz="2000" u="none" strike="noStrike" dirty="0">
+                          <a:effectLst/>
+                        </a:rPr>
+                        <a:t>Year</a:t>
+                      </a:r>
+                      <a:endParaRPr lang="en-IN" sz="2000" b="1" i="0" u="none" strike="noStrike" dirty="0">
+                        <a:effectLst/>
+                        <a:latin typeface="Arial" panose="020B0604020202020204" pitchFamily="34" charset="0"/>
+                      </a:endParaRPr>
+                    </a:p>
+                  </a:txBody>
+                  <a:tcPr marL="7620" marR="7620" marT="7620" marB="0" anchor="b">
+                    <a:solidFill>
+                      <a:schemeClr val="bg2"/>
+                    </a:solidFill>
+                  </a:tcPr>
+                </a:tc>
+                <a:tc>
+                  <a:txBody>
+                    <a:bodyPr/>
+                    <a:lstStyle/>
+                    <a:p>
+                      <a:pPr algn="r" fontAlgn="b"/>
+                      <a:r>
+                        <a:rPr lang="en-IN" sz="2000" u="none" strike="noStrike" dirty="0">
+                          <a:effectLst/>
+                        </a:rPr>
+                        <a:t>Tuition Fees</a:t>
+                      </a:r>
+                      <a:endParaRPr lang="en-IN" sz="2000" b="1" i="0" u="none" strike="noStrike" dirty="0">
+                        <a:effectLst/>
+                        <a:latin typeface="Arial" panose="020B0604020202020204" pitchFamily="34" charset="0"/>
+                      </a:endParaRPr>
+                    </a:p>
+                  </a:txBody>
+                  <a:tcPr marL="7620" marR="7620" marT="7620" marB="0" anchor="b">
+                    <a:solidFill>
+                      <a:schemeClr val="bg2"/>
+                    </a:solidFill>
+                  </a:tcPr>
+                </a:tc>
+                <a:tc>
+                  <a:txBody>
+                    <a:bodyPr/>
+                    <a:lstStyle/>
+                    <a:p>
+                      <a:pPr algn="r" fontAlgn="b"/>
+                      <a:r>
+                        <a:rPr lang="en-IN" sz="2000" u="none" strike="noStrike" dirty="0">
+                          <a:effectLst/>
+                        </a:rPr>
+                        <a:t>Hostel Fees</a:t>
+                      </a:r>
+                      <a:endParaRPr lang="en-IN" sz="2000" b="1" i="0" u="none" strike="noStrike" dirty="0">
+                        <a:effectLst/>
+                        <a:latin typeface="Arial" panose="020B0604020202020204" pitchFamily="34" charset="0"/>
+                      </a:endParaRPr>
+                    </a:p>
+                  </a:txBody>
+                  <a:tcPr marL="7620" marR="7620" marT="7620" marB="0" anchor="b">
+                    <a:solidFill>
+                      <a:schemeClr val="bg2"/>
+                    </a:solidFill>
+                  </a:tcPr>
+                </a:tc>
+                <a:tc>
+                  <a:txBody>
+                    <a:bodyPr/>
+                    <a:lstStyle/>
+                    <a:p>
+                      <a:pPr algn="r" fontAlgn="b"/>
+                      <a:r>
+                        <a:rPr lang="en-IN" sz="2000" u="none" strike="noStrike" dirty="0">
+                          <a:effectLst/>
+                        </a:rPr>
+                        <a:t>Tuition Fees</a:t>
+                      </a:r>
+                      <a:endParaRPr lang="en-IN" sz="2000" b="1" i="0" u="none" strike="noStrike" dirty="0">
+                        <a:effectLst/>
+                        <a:latin typeface="Arial" panose="020B0604020202020204" pitchFamily="34" charset="0"/>
+                      </a:endParaRPr>
+                    </a:p>
+                  </a:txBody>
+                  <a:tcPr marL="7620" marR="7620" marT="7620" marB="0" anchor="b">
+                    <a:solidFill>
+                      <a:schemeClr val="bg2"/>
+                    </a:solidFill>
+                  </a:tcPr>
+                </a:tc>
+                <a:tc>
+                  <a:txBody>
+                    <a:bodyPr/>
+                    <a:lstStyle/>
+                    <a:p>
+                      <a:pPr algn="r" fontAlgn="b"/>
+                      <a:r>
+                        <a:rPr lang="en-IN" sz="2000" u="none" strike="noStrike" dirty="0">
+                          <a:effectLst/>
+                        </a:rPr>
+                        <a:t>Hostel Fees</a:t>
+                      </a:r>
+                      <a:endParaRPr lang="en-IN" sz="2000" b="1" i="0" u="none" strike="noStrike" dirty="0">
+                        <a:effectLst/>
+                        <a:latin typeface="Arial" panose="020B0604020202020204" pitchFamily="34" charset="0"/>
+                      </a:endParaRPr>
+                    </a:p>
+                  </a:txBody>
+                  <a:tcPr marL="7620" marR="7620" marT="7620" marB="0" anchor="b">
+                    <a:solidFill>
+                      <a:schemeClr val="bg2"/>
+                    </a:solidFill>
+                  </a:tcPr>
+                </a:tc>
+                <a:tc>
+                  <a:txBody>
+                    <a:bodyPr/>
+                    <a:lstStyle/>
+                    <a:p>
+                      <a:pPr algn="l" fontAlgn="b"/>
+                      <a:endParaRPr lang="en-IN" sz="2000" b="0" i="0" u="none" strike="noStrike" dirty="0">
+                        <a:effectLst/>
+                        <a:latin typeface="Arial" panose="020B0604020202020204" pitchFamily="34" charset="0"/>
+                      </a:endParaRPr>
+                    </a:p>
+                  </a:txBody>
+                  <a:tcPr marL="7620" marR="7620" marT="7620" marB="0" anchor="b">
+                    <a:solidFill>
+                      <a:schemeClr val="bg2"/>
+                    </a:solidFill>
+                  </a:tcPr>
+                </a:tc>
+                <a:extLst>
+                  <a:ext uri="{0D108BD9-81ED-4DB2-BD59-A6C34878D82A}">
+                    <a16:rowId xmlns:a16="http://schemas.microsoft.com/office/drawing/2014/main" val="4039723707"/>
+                  </a:ext>
+                </a:extLst>
+              </a:tr>
+              <a:tr h="720254">
+                <a:tc>
+                  <a:txBody>
+                    <a:bodyPr/>
+                    <a:lstStyle/>
+                    <a:p>
+                      <a:pPr algn="ctr" fontAlgn="b"/>
+                      <a:r>
+                        <a:rPr lang="en-IN" sz="2400" b="1" u="none" strike="noStrike" dirty="0">
+                          <a:effectLst/>
+                        </a:rPr>
+                        <a:t>I</a:t>
+                      </a:r>
+                      <a:endParaRPr lang="en-IN" sz="2400" b="1" i="0" u="none" strike="noStrike" dirty="0">
+                        <a:effectLst/>
+                        <a:latin typeface="Calibri" panose="020F0502020204030204" pitchFamily="34" charset="0"/>
+                      </a:endParaRPr>
+                    </a:p>
+                  </a:txBody>
+                  <a:tcPr marL="7620" marR="7620" marT="7620" marB="0" anchor="b">
+                    <a:solidFill>
+                      <a:schemeClr val="bg2"/>
+                    </a:solidFill>
+                  </a:tcPr>
+                </a:tc>
+                <a:tc>
+                  <a:txBody>
+                    <a:bodyPr/>
+                    <a:lstStyle/>
+                    <a:p>
+                      <a:pPr algn="r" fontAlgn="b"/>
+                      <a:r>
+                        <a:rPr lang="en-IN" sz="2000" u="none" strike="noStrike">
+                          <a:effectLst/>
+                        </a:rPr>
+                        <a:t>₹0</a:t>
+                      </a:r>
+                      <a:endParaRPr lang="en-IN" sz="2000" b="0" i="0" u="none" strike="noStrike">
+                        <a:effectLst/>
+                        <a:latin typeface="Calibri" panose="020F0502020204030204" pitchFamily="34" charset="0"/>
+                      </a:endParaRPr>
+                    </a:p>
+                  </a:txBody>
+                  <a:tcPr marL="7620" marR="7620" marT="7620" marB="0" anchor="b">
+                    <a:solidFill>
+                      <a:schemeClr val="bg2"/>
+                    </a:solidFill>
+                  </a:tcPr>
+                </a:tc>
+                <a:tc>
+                  <a:txBody>
+                    <a:bodyPr/>
+                    <a:lstStyle/>
+                    <a:p>
+                      <a:pPr algn="r" fontAlgn="b"/>
+                      <a:r>
+                        <a:rPr lang="en-IN" sz="2000" u="none" strike="noStrike">
+                          <a:effectLst/>
+                        </a:rPr>
+                        <a:t>₹0</a:t>
+                      </a:r>
+                      <a:endParaRPr lang="en-IN" sz="2000" b="0" i="0" u="none" strike="noStrike">
+                        <a:effectLst/>
+                        <a:latin typeface="Calibri" panose="020F0502020204030204" pitchFamily="34" charset="0"/>
+                      </a:endParaRPr>
+                    </a:p>
+                  </a:txBody>
+                  <a:tcPr marL="7620" marR="7620" marT="7620" marB="0" anchor="b">
+                    <a:solidFill>
+                      <a:schemeClr val="bg2"/>
+                    </a:solidFill>
+                  </a:tcPr>
+                </a:tc>
+                <a:tc>
+                  <a:txBody>
+                    <a:bodyPr/>
+                    <a:lstStyle/>
+                    <a:p>
+                      <a:pPr algn="r" fontAlgn="b"/>
+                      <a:r>
+                        <a:rPr lang="en-IN" sz="2000" u="none" strike="noStrike" dirty="0">
+                          <a:effectLst/>
+                        </a:rPr>
+                        <a:t>₹84,850</a:t>
+                      </a:r>
+                      <a:endParaRPr lang="en-IN" sz="2000" b="0" i="0" u="none" strike="noStrike" dirty="0">
+                        <a:effectLst/>
+                        <a:latin typeface="Calibri" panose="020F0502020204030204" pitchFamily="34" charset="0"/>
+                      </a:endParaRPr>
+                    </a:p>
+                  </a:txBody>
+                  <a:tcPr marL="7620" marR="7620" marT="7620" marB="0" anchor="b">
+                    <a:solidFill>
+                      <a:schemeClr val="bg2"/>
+                    </a:solidFill>
+                  </a:tcPr>
+                </a:tc>
+                <a:tc>
+                  <a:txBody>
+                    <a:bodyPr/>
+                    <a:lstStyle/>
+                    <a:p>
+                      <a:pPr algn="r" fontAlgn="b"/>
+                      <a:r>
+                        <a:rPr lang="en-IN" sz="2000" u="none" strike="noStrike">
+                          <a:effectLst/>
+                        </a:rPr>
+                        <a:t>₹2,35,500</a:t>
+                      </a:r>
+                      <a:endParaRPr lang="en-IN" sz="2000" b="0" i="0" u="none" strike="noStrike">
+                        <a:effectLst/>
+                        <a:latin typeface="Calibri" panose="020F0502020204030204" pitchFamily="34" charset="0"/>
+                      </a:endParaRPr>
+                    </a:p>
+                  </a:txBody>
+                  <a:tcPr marL="7620" marR="7620" marT="7620" marB="0" anchor="b">
+                    <a:solidFill>
+                      <a:schemeClr val="bg2"/>
+                    </a:solidFill>
+                  </a:tcPr>
+                </a:tc>
+                <a:tc>
+                  <a:txBody>
+                    <a:bodyPr/>
+                    <a:lstStyle/>
+                    <a:p>
+                      <a:pPr algn="r" fontAlgn="b"/>
+                      <a:r>
+                        <a:rPr lang="en-IN" sz="2400" b="1" u="none" strike="noStrike" dirty="0">
+                          <a:effectLst/>
+                        </a:rPr>
+                        <a:t>₹3,20,350</a:t>
+                      </a:r>
+                      <a:endParaRPr lang="en-IN" sz="2400" b="1" i="0" u="none" strike="noStrike" dirty="0">
+                        <a:effectLst/>
+                        <a:latin typeface="Arial" panose="020B0604020202020204" pitchFamily="34" charset="0"/>
+                      </a:endParaRPr>
+                    </a:p>
+                  </a:txBody>
+                  <a:tcPr marL="7620" marR="7620" marT="7620" marB="0" anchor="b">
+                    <a:solidFill>
+                      <a:schemeClr val="bg2"/>
+                    </a:solidFill>
+                  </a:tcPr>
+                </a:tc>
+                <a:extLst>
+                  <a:ext uri="{0D108BD9-81ED-4DB2-BD59-A6C34878D82A}">
+                    <a16:rowId xmlns:a16="http://schemas.microsoft.com/office/drawing/2014/main" val="1809891281"/>
+                  </a:ext>
+                </a:extLst>
+              </a:tr>
+              <a:tr h="720254">
+                <a:tc>
+                  <a:txBody>
+                    <a:bodyPr/>
+                    <a:lstStyle/>
+                    <a:p>
+                      <a:pPr algn="ctr" fontAlgn="b"/>
+                      <a:r>
+                        <a:rPr lang="en-IN" sz="2400" b="1" u="none" strike="noStrike" dirty="0">
+                          <a:effectLst/>
+                        </a:rPr>
+                        <a:t>II</a:t>
+                      </a:r>
+                      <a:endParaRPr lang="en-IN" sz="2400" b="1" i="0" u="none" strike="noStrike" dirty="0">
+                        <a:effectLst/>
+                        <a:latin typeface="Calibri" panose="020F0502020204030204" pitchFamily="34" charset="0"/>
+                      </a:endParaRPr>
+                    </a:p>
+                  </a:txBody>
+                  <a:tcPr marL="7620" marR="7620" marT="7620" marB="0" anchor="b">
+                    <a:solidFill>
+                      <a:schemeClr val="bg2"/>
+                    </a:solidFill>
+                  </a:tcPr>
+                </a:tc>
+                <a:tc>
+                  <a:txBody>
+                    <a:bodyPr/>
+                    <a:lstStyle/>
+                    <a:p>
+                      <a:pPr algn="r" fontAlgn="b"/>
+                      <a:r>
+                        <a:rPr lang="en-IN" sz="2000" u="none" strike="noStrike">
+                          <a:effectLst/>
+                        </a:rPr>
+                        <a:t>₹14,165</a:t>
+                      </a:r>
+                      <a:endParaRPr lang="en-IN" sz="2000" b="0" i="0" u="none" strike="noStrike">
+                        <a:effectLst/>
+                        <a:latin typeface="Calibri" panose="020F0502020204030204" pitchFamily="34" charset="0"/>
+                      </a:endParaRPr>
+                    </a:p>
+                  </a:txBody>
+                  <a:tcPr marL="7620" marR="7620" marT="7620" marB="0" anchor="b">
+                    <a:solidFill>
+                      <a:schemeClr val="bg2"/>
+                    </a:solidFill>
+                  </a:tcPr>
+                </a:tc>
+                <a:tc>
+                  <a:txBody>
+                    <a:bodyPr/>
+                    <a:lstStyle/>
+                    <a:p>
+                      <a:pPr algn="r" fontAlgn="b"/>
+                      <a:r>
+                        <a:rPr lang="en-IN" sz="2000" u="none" strike="noStrike">
+                          <a:effectLst/>
+                        </a:rPr>
+                        <a:t>₹30,739</a:t>
+                      </a:r>
+                      <a:endParaRPr lang="en-IN" sz="2000" b="0" i="0" u="none" strike="noStrike">
+                        <a:effectLst/>
+                        <a:latin typeface="Calibri" panose="020F0502020204030204" pitchFamily="34" charset="0"/>
+                      </a:endParaRPr>
+                    </a:p>
+                  </a:txBody>
+                  <a:tcPr marL="7620" marR="7620" marT="7620" marB="0" anchor="b">
+                    <a:solidFill>
+                      <a:schemeClr val="bg2"/>
+                    </a:solidFill>
+                  </a:tcPr>
+                </a:tc>
+                <a:tc>
+                  <a:txBody>
+                    <a:bodyPr/>
+                    <a:lstStyle/>
+                    <a:p>
+                      <a:pPr algn="r" fontAlgn="b"/>
+                      <a:r>
+                        <a:rPr lang="en-IN" sz="2000" u="none" strike="noStrike">
+                          <a:effectLst/>
+                        </a:rPr>
+                        <a:t>₹43,475</a:t>
+                      </a:r>
+                      <a:endParaRPr lang="en-IN" sz="2000" b="0" i="0" u="none" strike="noStrike">
+                        <a:effectLst/>
+                        <a:latin typeface="Calibri" panose="020F0502020204030204" pitchFamily="34" charset="0"/>
+                      </a:endParaRPr>
+                    </a:p>
+                  </a:txBody>
+                  <a:tcPr marL="7620" marR="7620" marT="7620" marB="0" anchor="b">
+                    <a:solidFill>
+                      <a:schemeClr val="bg2"/>
+                    </a:solidFill>
+                  </a:tcPr>
+                </a:tc>
+                <a:tc>
+                  <a:txBody>
+                    <a:bodyPr/>
+                    <a:lstStyle/>
+                    <a:p>
+                      <a:pPr algn="r" fontAlgn="b"/>
+                      <a:r>
+                        <a:rPr lang="en-IN" sz="2000" u="none" strike="noStrike">
+                          <a:effectLst/>
+                        </a:rPr>
+                        <a:t>₹1,18,816</a:t>
+                      </a:r>
+                      <a:endParaRPr lang="en-IN" sz="2000" b="0" i="0" u="none" strike="noStrike">
+                        <a:effectLst/>
+                        <a:latin typeface="Calibri" panose="020F0502020204030204" pitchFamily="34" charset="0"/>
+                      </a:endParaRPr>
+                    </a:p>
+                  </a:txBody>
+                  <a:tcPr marL="7620" marR="7620" marT="7620" marB="0" anchor="b">
+                    <a:solidFill>
+                      <a:schemeClr val="bg2"/>
+                    </a:solidFill>
+                  </a:tcPr>
+                </a:tc>
+                <a:tc>
+                  <a:txBody>
+                    <a:bodyPr/>
+                    <a:lstStyle/>
+                    <a:p>
+                      <a:pPr algn="r" fontAlgn="b"/>
+                      <a:r>
+                        <a:rPr lang="en-IN" sz="2400" b="1" u="none" strike="noStrike" dirty="0">
+                          <a:effectLst/>
+                        </a:rPr>
+                        <a:t>₹2,07,195</a:t>
+                      </a:r>
+                      <a:endParaRPr lang="en-IN" sz="2400" b="1" i="0" u="none" strike="noStrike" dirty="0">
+                        <a:effectLst/>
+                        <a:latin typeface="Arial" panose="020B0604020202020204" pitchFamily="34" charset="0"/>
+                      </a:endParaRPr>
+                    </a:p>
+                  </a:txBody>
+                  <a:tcPr marL="7620" marR="7620" marT="7620" marB="0" anchor="b">
+                    <a:solidFill>
+                      <a:schemeClr val="bg2"/>
+                    </a:solidFill>
+                  </a:tcPr>
+                </a:tc>
+                <a:extLst>
+                  <a:ext uri="{0D108BD9-81ED-4DB2-BD59-A6C34878D82A}">
+                    <a16:rowId xmlns:a16="http://schemas.microsoft.com/office/drawing/2014/main" val="75213477"/>
+                  </a:ext>
+                </a:extLst>
+              </a:tr>
+              <a:tr h="720254">
+                <a:tc>
+                  <a:txBody>
+                    <a:bodyPr/>
+                    <a:lstStyle/>
+                    <a:p>
+                      <a:pPr algn="ctr" fontAlgn="b"/>
+                      <a:r>
+                        <a:rPr lang="en-IN" sz="2400" b="1" u="none" strike="noStrike" dirty="0">
+                          <a:effectLst/>
+                        </a:rPr>
+                        <a:t>III</a:t>
+                      </a:r>
+                      <a:endParaRPr lang="en-IN" sz="2400" b="1" i="0" u="none" strike="noStrike" dirty="0">
+                        <a:effectLst/>
+                        <a:latin typeface="Calibri" panose="020F0502020204030204" pitchFamily="34" charset="0"/>
+                      </a:endParaRPr>
+                    </a:p>
+                  </a:txBody>
+                  <a:tcPr marL="7620" marR="7620" marT="7620" marB="0" anchor="b">
+                    <a:solidFill>
+                      <a:schemeClr val="bg2"/>
+                    </a:solidFill>
+                  </a:tcPr>
+                </a:tc>
+                <a:tc>
+                  <a:txBody>
+                    <a:bodyPr/>
+                    <a:lstStyle/>
+                    <a:p>
+                      <a:pPr algn="r" fontAlgn="b"/>
+                      <a:r>
+                        <a:rPr lang="en-IN" sz="2000" u="none" strike="noStrike">
+                          <a:effectLst/>
+                        </a:rPr>
+                        <a:t>₹0</a:t>
+                      </a:r>
+                      <a:endParaRPr lang="en-IN" sz="2000" b="0" i="0" u="none" strike="noStrike">
+                        <a:effectLst/>
+                        <a:latin typeface="Calibri" panose="020F0502020204030204" pitchFamily="34" charset="0"/>
+                      </a:endParaRPr>
+                    </a:p>
+                  </a:txBody>
+                  <a:tcPr marL="7620" marR="7620" marT="7620" marB="0" anchor="b">
+                    <a:solidFill>
+                      <a:schemeClr val="bg2"/>
+                    </a:solidFill>
+                  </a:tcPr>
+                </a:tc>
+                <a:tc>
+                  <a:txBody>
+                    <a:bodyPr/>
+                    <a:lstStyle/>
+                    <a:p>
+                      <a:pPr algn="r" fontAlgn="b"/>
+                      <a:r>
+                        <a:rPr lang="en-IN" sz="2000" u="none" strike="noStrike">
+                          <a:effectLst/>
+                        </a:rPr>
+                        <a:t>₹0</a:t>
+                      </a:r>
+                      <a:endParaRPr lang="en-IN" sz="2000" b="0" i="0" u="none" strike="noStrike">
+                        <a:effectLst/>
+                        <a:latin typeface="Calibri" panose="020F0502020204030204" pitchFamily="34" charset="0"/>
+                      </a:endParaRPr>
+                    </a:p>
+                  </a:txBody>
+                  <a:tcPr marL="7620" marR="7620" marT="7620" marB="0" anchor="b">
+                    <a:solidFill>
+                      <a:schemeClr val="bg2"/>
+                    </a:solidFill>
+                  </a:tcPr>
+                </a:tc>
+                <a:tc>
+                  <a:txBody>
+                    <a:bodyPr/>
+                    <a:lstStyle/>
+                    <a:p>
+                      <a:pPr algn="r" fontAlgn="b"/>
+                      <a:r>
+                        <a:rPr lang="en-IN" sz="2000" u="none" strike="noStrike">
+                          <a:effectLst/>
+                        </a:rPr>
+                        <a:t>₹10,380</a:t>
+                      </a:r>
+                      <a:endParaRPr lang="en-IN" sz="2000" b="0" i="0" u="none" strike="noStrike">
+                        <a:effectLst/>
+                        <a:latin typeface="Calibri" panose="020F0502020204030204" pitchFamily="34" charset="0"/>
+                      </a:endParaRPr>
+                    </a:p>
+                  </a:txBody>
+                  <a:tcPr marL="7620" marR="7620" marT="7620" marB="0" anchor="b">
+                    <a:solidFill>
+                      <a:schemeClr val="bg2"/>
+                    </a:solidFill>
+                  </a:tcPr>
+                </a:tc>
+                <a:tc>
+                  <a:txBody>
+                    <a:bodyPr/>
+                    <a:lstStyle/>
+                    <a:p>
+                      <a:pPr algn="r" fontAlgn="b"/>
+                      <a:r>
+                        <a:rPr lang="en-IN" sz="2000" u="none" strike="noStrike">
+                          <a:effectLst/>
+                        </a:rPr>
+                        <a:t>₹46,428</a:t>
+                      </a:r>
+                      <a:endParaRPr lang="en-IN" sz="2000" b="0" i="0" u="none" strike="noStrike">
+                        <a:effectLst/>
+                        <a:latin typeface="Calibri" panose="020F0502020204030204" pitchFamily="34" charset="0"/>
+                      </a:endParaRPr>
+                    </a:p>
+                  </a:txBody>
+                  <a:tcPr marL="7620" marR="7620" marT="7620" marB="0" anchor="b">
+                    <a:solidFill>
+                      <a:schemeClr val="bg2"/>
+                    </a:solidFill>
+                  </a:tcPr>
+                </a:tc>
+                <a:tc>
+                  <a:txBody>
+                    <a:bodyPr/>
+                    <a:lstStyle/>
+                    <a:p>
+                      <a:pPr algn="r" fontAlgn="b"/>
+                      <a:r>
+                        <a:rPr lang="en-IN" sz="2400" b="1" u="none" strike="noStrike" dirty="0">
+                          <a:effectLst/>
+                        </a:rPr>
+                        <a:t>₹56,808</a:t>
+                      </a:r>
+                      <a:endParaRPr lang="en-IN" sz="2400" b="1" i="0" u="none" strike="noStrike" dirty="0">
+                        <a:effectLst/>
+                        <a:latin typeface="Arial" panose="020B0604020202020204" pitchFamily="34" charset="0"/>
+                      </a:endParaRPr>
+                    </a:p>
+                  </a:txBody>
+                  <a:tcPr marL="7620" marR="7620" marT="7620" marB="0" anchor="b">
+                    <a:solidFill>
+                      <a:schemeClr val="bg2"/>
+                    </a:solidFill>
+                  </a:tcPr>
+                </a:tc>
+                <a:extLst>
+                  <a:ext uri="{0D108BD9-81ED-4DB2-BD59-A6C34878D82A}">
+                    <a16:rowId xmlns:a16="http://schemas.microsoft.com/office/drawing/2014/main" val="2605255515"/>
+                  </a:ext>
+                </a:extLst>
+              </a:tr>
+              <a:tr h="737007">
+                <a:tc>
+                  <a:txBody>
+                    <a:bodyPr/>
+                    <a:lstStyle/>
+                    <a:p>
+                      <a:pPr algn="ctr" fontAlgn="b"/>
+                      <a:r>
+                        <a:rPr lang="en-IN" sz="2400" b="1" u="none" strike="noStrike" dirty="0">
+                          <a:effectLst/>
+                        </a:rPr>
+                        <a:t>IV</a:t>
+                      </a:r>
+                      <a:endParaRPr lang="en-IN" sz="2400" b="1" i="0" u="none" strike="noStrike" dirty="0">
+                        <a:effectLst/>
+                        <a:latin typeface="Calibri" panose="020F0502020204030204" pitchFamily="34" charset="0"/>
+                      </a:endParaRPr>
+                    </a:p>
+                  </a:txBody>
+                  <a:tcPr marL="7620" marR="7620" marT="7620" marB="0" anchor="b">
+                    <a:solidFill>
+                      <a:schemeClr val="bg2"/>
+                    </a:solidFill>
+                  </a:tcPr>
+                </a:tc>
+                <a:tc>
+                  <a:txBody>
+                    <a:bodyPr/>
+                    <a:lstStyle/>
+                    <a:p>
+                      <a:pPr algn="r" fontAlgn="b"/>
+                      <a:r>
+                        <a:rPr lang="en-IN" sz="2000" u="none" strike="noStrike">
+                          <a:effectLst/>
+                        </a:rPr>
+                        <a:t>₹0</a:t>
+                      </a:r>
+                      <a:endParaRPr lang="en-IN" sz="2000" b="0" i="0" u="none" strike="noStrike">
+                        <a:effectLst/>
+                        <a:latin typeface="Calibri" panose="020F0502020204030204" pitchFamily="34" charset="0"/>
+                      </a:endParaRPr>
+                    </a:p>
+                  </a:txBody>
+                  <a:tcPr marL="7620" marR="7620" marT="7620" marB="0" anchor="b">
+                    <a:solidFill>
+                      <a:schemeClr val="bg2"/>
+                    </a:solidFill>
+                  </a:tcPr>
+                </a:tc>
+                <a:tc>
+                  <a:txBody>
+                    <a:bodyPr/>
+                    <a:lstStyle/>
+                    <a:p>
+                      <a:pPr algn="r" fontAlgn="b"/>
+                      <a:r>
+                        <a:rPr lang="en-IN" sz="2000" u="none" strike="noStrike">
+                          <a:effectLst/>
+                        </a:rPr>
+                        <a:t>₹55,922</a:t>
+                      </a:r>
+                      <a:endParaRPr lang="en-IN" sz="2000" b="0" i="0" u="none" strike="noStrike">
+                        <a:effectLst/>
+                        <a:latin typeface="Calibri" panose="020F0502020204030204" pitchFamily="34" charset="0"/>
+                      </a:endParaRPr>
+                    </a:p>
+                  </a:txBody>
+                  <a:tcPr marL="7620" marR="7620" marT="7620" marB="0" anchor="b">
+                    <a:solidFill>
+                      <a:schemeClr val="bg2"/>
+                    </a:solidFill>
+                  </a:tcPr>
+                </a:tc>
+                <a:tc>
+                  <a:txBody>
+                    <a:bodyPr/>
+                    <a:lstStyle/>
+                    <a:p>
+                      <a:pPr algn="r" fontAlgn="b"/>
+                      <a:r>
+                        <a:rPr lang="en-IN" sz="2000" u="none" strike="noStrike">
+                          <a:effectLst/>
+                        </a:rPr>
+                        <a:t>₹7,715</a:t>
+                      </a:r>
+                      <a:endParaRPr lang="en-IN" sz="2000" b="0" i="0" u="none" strike="noStrike">
+                        <a:effectLst/>
+                        <a:latin typeface="Calibri" panose="020F0502020204030204" pitchFamily="34" charset="0"/>
+                      </a:endParaRPr>
+                    </a:p>
+                  </a:txBody>
+                  <a:tcPr marL="7620" marR="7620" marT="7620" marB="0" anchor="b">
+                    <a:solidFill>
+                      <a:schemeClr val="bg2"/>
+                    </a:solidFill>
+                  </a:tcPr>
+                </a:tc>
+                <a:tc>
+                  <a:txBody>
+                    <a:bodyPr/>
+                    <a:lstStyle/>
+                    <a:p>
+                      <a:pPr algn="r" fontAlgn="b"/>
+                      <a:r>
+                        <a:rPr lang="en-IN" sz="2000" u="none" strike="noStrike">
+                          <a:effectLst/>
+                        </a:rPr>
+                        <a:t>₹83,747</a:t>
+                      </a:r>
+                      <a:endParaRPr lang="en-IN" sz="2000" b="0" i="0" u="none" strike="noStrike">
+                        <a:effectLst/>
+                        <a:latin typeface="Calibri" panose="020F0502020204030204" pitchFamily="34" charset="0"/>
+                      </a:endParaRPr>
+                    </a:p>
+                  </a:txBody>
+                  <a:tcPr marL="7620" marR="7620" marT="7620" marB="0" anchor="b">
+                    <a:solidFill>
+                      <a:schemeClr val="bg2"/>
+                    </a:solidFill>
+                  </a:tcPr>
+                </a:tc>
+                <a:tc>
+                  <a:txBody>
+                    <a:bodyPr/>
+                    <a:lstStyle/>
+                    <a:p>
+                      <a:pPr algn="r" fontAlgn="b"/>
+                      <a:r>
+                        <a:rPr lang="en-IN" sz="2400" b="1" u="none" strike="noStrike" dirty="0">
+                          <a:effectLst/>
+                        </a:rPr>
+                        <a:t>₹1,47,384</a:t>
+                      </a:r>
+                      <a:endParaRPr lang="en-IN" sz="2400" b="1" i="0" u="none" strike="noStrike" dirty="0">
+                        <a:effectLst/>
+                        <a:latin typeface="Arial" panose="020B0604020202020204" pitchFamily="34" charset="0"/>
+                      </a:endParaRPr>
+                    </a:p>
+                  </a:txBody>
+                  <a:tcPr marL="7620" marR="7620" marT="7620" marB="0" anchor="b">
+                    <a:solidFill>
+                      <a:schemeClr val="bg2"/>
+                    </a:solidFill>
+                  </a:tcPr>
+                </a:tc>
+                <a:extLst>
+                  <a:ext uri="{0D108BD9-81ED-4DB2-BD59-A6C34878D82A}">
+                    <a16:rowId xmlns:a16="http://schemas.microsoft.com/office/drawing/2014/main" val="440039576"/>
+                  </a:ext>
+                </a:extLst>
+              </a:tr>
+              <a:tr h="737007">
+                <a:tc>
+                  <a:txBody>
+                    <a:bodyPr/>
+                    <a:lstStyle/>
+                    <a:p>
+                      <a:pPr algn="ctr" fontAlgn="b"/>
+                      <a:r>
+                        <a:rPr lang="en-IN" sz="2400" b="1" u="none" strike="noStrike" dirty="0">
+                          <a:effectLst/>
+                        </a:rPr>
+                        <a:t>Total</a:t>
+                      </a:r>
+                      <a:endParaRPr lang="en-IN" sz="2400" b="1" i="0" u="none" strike="noStrike" dirty="0">
+                        <a:effectLst/>
+                        <a:latin typeface="Calibri" panose="020F0502020204030204" pitchFamily="34" charset="0"/>
+                      </a:endParaRPr>
+                    </a:p>
+                  </a:txBody>
+                  <a:tcPr marL="7620" marR="7620" marT="7620" marB="0" anchor="b">
+                    <a:solidFill>
+                      <a:schemeClr val="bg2"/>
+                    </a:solidFill>
+                  </a:tcPr>
+                </a:tc>
+                <a:tc>
+                  <a:txBody>
+                    <a:bodyPr/>
+                    <a:lstStyle/>
+                    <a:p>
+                      <a:pPr algn="r" fontAlgn="b"/>
+                      <a:r>
+                        <a:rPr lang="en-IN" sz="2800" b="1" u="none" strike="noStrike" dirty="0">
+                          <a:effectLst/>
+                        </a:rPr>
+                        <a:t>₹14,165</a:t>
+                      </a:r>
+                      <a:endParaRPr lang="en-IN" sz="2800" b="1" i="0" u="none" strike="noStrike" dirty="0">
+                        <a:effectLst/>
+                        <a:latin typeface="Arial" panose="020B0604020202020204" pitchFamily="34" charset="0"/>
+                      </a:endParaRPr>
+                    </a:p>
+                  </a:txBody>
+                  <a:tcPr marL="7620" marR="7620" marT="7620" marB="0" anchor="b">
+                    <a:solidFill>
+                      <a:schemeClr val="bg2"/>
+                    </a:solidFill>
+                  </a:tcPr>
+                </a:tc>
+                <a:tc>
+                  <a:txBody>
+                    <a:bodyPr/>
+                    <a:lstStyle/>
+                    <a:p>
+                      <a:pPr algn="r" fontAlgn="b"/>
+                      <a:r>
+                        <a:rPr lang="en-IN" sz="2800" b="1" u="none" strike="noStrike" dirty="0">
+                          <a:effectLst/>
+                        </a:rPr>
+                        <a:t>₹86,661</a:t>
+                      </a:r>
+                      <a:endParaRPr lang="en-IN" sz="2800" b="1" i="0" u="none" strike="noStrike" dirty="0">
+                        <a:effectLst/>
+                        <a:latin typeface="Arial" panose="020B0604020202020204" pitchFamily="34" charset="0"/>
+                      </a:endParaRPr>
+                    </a:p>
+                  </a:txBody>
+                  <a:tcPr marL="7620" marR="7620" marT="7620" marB="0" anchor="b">
+                    <a:solidFill>
+                      <a:schemeClr val="bg2"/>
+                    </a:solidFill>
+                  </a:tcPr>
+                </a:tc>
+                <a:tc>
+                  <a:txBody>
+                    <a:bodyPr/>
+                    <a:lstStyle/>
+                    <a:p>
+                      <a:pPr algn="r" fontAlgn="b"/>
+                      <a:r>
+                        <a:rPr lang="en-IN" sz="2800" b="1" u="none" strike="noStrike" dirty="0">
+                          <a:effectLst/>
+                        </a:rPr>
+                        <a:t>₹1,46,420</a:t>
+                      </a:r>
+                      <a:endParaRPr lang="en-IN" sz="2800" b="1" i="0" u="none" strike="noStrike" dirty="0">
+                        <a:effectLst/>
+                        <a:latin typeface="Arial" panose="020B0604020202020204" pitchFamily="34" charset="0"/>
+                      </a:endParaRPr>
+                    </a:p>
+                  </a:txBody>
+                  <a:tcPr marL="7620" marR="7620" marT="7620" marB="0" anchor="b">
+                    <a:solidFill>
+                      <a:schemeClr val="bg2"/>
+                    </a:solidFill>
+                  </a:tcPr>
+                </a:tc>
+                <a:tc>
+                  <a:txBody>
+                    <a:bodyPr/>
+                    <a:lstStyle/>
+                    <a:p>
+                      <a:pPr algn="r" fontAlgn="b"/>
+                      <a:r>
+                        <a:rPr lang="en-IN" sz="2800" b="1" u="none" strike="noStrike" dirty="0">
+                          <a:effectLst/>
+                        </a:rPr>
+                        <a:t>₹4,84,491</a:t>
+                      </a:r>
+                      <a:endParaRPr lang="en-IN" sz="2800" b="1" i="0" u="none" strike="noStrike" dirty="0">
+                        <a:effectLst/>
+                        <a:latin typeface="Arial" panose="020B0604020202020204" pitchFamily="34" charset="0"/>
+                      </a:endParaRPr>
+                    </a:p>
+                  </a:txBody>
+                  <a:tcPr marL="7620" marR="7620" marT="7620" marB="0" anchor="b">
+                    <a:solidFill>
+                      <a:schemeClr val="bg2"/>
+                    </a:solidFill>
+                  </a:tcPr>
+                </a:tc>
+                <a:tc>
+                  <a:txBody>
+                    <a:bodyPr/>
+                    <a:lstStyle/>
+                    <a:p>
+                      <a:pPr algn="r" fontAlgn="b"/>
+                      <a:r>
+                        <a:rPr lang="en-IN" sz="2800" b="1" u="none" strike="noStrike" dirty="0">
+                          <a:effectLst/>
+                        </a:rPr>
+                        <a:t>₹7,31,737</a:t>
+                      </a:r>
+                      <a:endParaRPr lang="en-IN" sz="2800" b="1" i="0" u="none" strike="noStrike" dirty="0">
+                        <a:effectLst/>
+                        <a:latin typeface="Arial" panose="020B0604020202020204" pitchFamily="34" charset="0"/>
+                      </a:endParaRPr>
+                    </a:p>
+                  </a:txBody>
+                  <a:tcPr marL="7620" marR="7620" marT="7620" marB="0" anchor="b">
+                    <a:solidFill>
+                      <a:schemeClr val="bg2"/>
+                    </a:solidFill>
+                  </a:tcPr>
+                </a:tc>
+                <a:extLst>
+                  <a:ext uri="{0D108BD9-81ED-4DB2-BD59-A6C34878D82A}">
+                    <a16:rowId xmlns:a16="http://schemas.microsoft.com/office/drawing/2014/main" val="2786128700"/>
+                  </a:ext>
+                </a:extLst>
+              </a:tr>
+            </a:tbl>
+          </a:graphicData>
+        </a:graphic>
+      </p:graphicFrame>
+      <p:sp>
+        <p:nvSpPr>
+          <p:cNvPr id="5" name="TextBox 4">
+            <a:extLst>
+              <a:ext uri="{FF2B5EF4-FFF2-40B4-BE49-F238E27FC236}">
+                <a16:creationId xmlns:a16="http://schemas.microsoft.com/office/drawing/2014/main" id="{69148836-3BF6-44C1-8EFE-00EDF338A513}"/>
+              </a:ext>
+            </a:extLst>
+          </p:cNvPr>
+          <p:cNvSpPr txBox="1"/>
+          <p:nvPr/>
+        </p:nvSpPr>
+        <p:spPr>
+          <a:xfrm>
+            <a:off x="402672" y="201146"/>
+            <a:ext cx="11501308" cy="646331"/>
+          </a:xfrm>
+          <a:prstGeom prst="rect">
+            <a:avLst/>
+          </a:prstGeom>
+          <a:solidFill>
+            <a:schemeClr val="accent5">
+              <a:lumMod val="20000"/>
+              <a:lumOff val="80000"/>
+            </a:schemeClr>
+          </a:solidFill>
+          <a:ln>
+            <a:solidFill>
+              <a:schemeClr val="tx1">
+                <a:lumMod val="50000"/>
+                <a:lumOff val="50000"/>
+              </a:schemeClr>
+            </a:solidFill>
+          </a:ln>
+          <a:effectLst>
+            <a:outerShdw blurRad="50800" dist="38100" dir="8100000" algn="tr" rotWithShape="0">
+              <a:prstClr val="black">
+                <a:alpha val="40000"/>
+              </a:prstClr>
+            </a:outerShdw>
+          </a:effectLst>
+        </p:spPr>
+        <p:txBody>
+          <a:bodyPr wrap="square" rtlCol="0">
+            <a:spAutoFit/>
+          </a:bodyPr>
+          <a:lstStyle/>
+          <a:p>
+            <a:pPr algn="ctr"/>
+            <a:r>
+              <a:rPr lang="en-IN" sz="3600" dirty="0"/>
+              <a:t>Fees sponsorship breakup (AY 2018-2019)</a:t>
+            </a:r>
+          </a:p>
+        </p:txBody>
+      </p:sp>
+      <p:sp>
+        <p:nvSpPr>
+          <p:cNvPr id="6" name="TextBox 5">
+            <a:extLst>
+              <a:ext uri="{FF2B5EF4-FFF2-40B4-BE49-F238E27FC236}">
+                <a16:creationId xmlns:a16="http://schemas.microsoft.com/office/drawing/2014/main" id="{DE3295D6-26E3-4C92-8630-40736BA86E55}"/>
+              </a:ext>
+            </a:extLst>
+          </p:cNvPr>
+          <p:cNvSpPr txBox="1"/>
+          <p:nvPr/>
+        </p:nvSpPr>
+        <p:spPr>
+          <a:xfrm>
+            <a:off x="1677798" y="6149130"/>
+            <a:ext cx="4605556" cy="800219"/>
+          </a:xfrm>
+          <a:prstGeom prst="rect">
+            <a:avLst/>
+          </a:prstGeom>
+          <a:noFill/>
+        </p:spPr>
+        <p:txBody>
+          <a:bodyPr wrap="square" rtlCol="0">
+            <a:spAutoFit/>
+          </a:bodyPr>
+          <a:lstStyle/>
+          <a:p>
+            <a:r>
+              <a:rPr lang="en-IN" sz="2800" dirty="0"/>
+              <a:t>Tuition Fees: </a:t>
+            </a:r>
+            <a:r>
+              <a:rPr lang="en-IN" sz="2800" b="1" dirty="0"/>
+              <a:t>₹1,60,585</a:t>
+            </a:r>
+            <a:endParaRPr lang="en-IN" sz="2800" b="1" dirty="0">
+              <a:latin typeface="Arial" panose="020B0604020202020204" pitchFamily="34" charset="0"/>
+            </a:endParaRPr>
+          </a:p>
+          <a:p>
+            <a:endParaRPr lang="en-IN" dirty="0"/>
+          </a:p>
+        </p:txBody>
+      </p:sp>
+      <p:sp>
+        <p:nvSpPr>
+          <p:cNvPr id="7" name="TextBox 6">
+            <a:extLst>
+              <a:ext uri="{FF2B5EF4-FFF2-40B4-BE49-F238E27FC236}">
+                <a16:creationId xmlns:a16="http://schemas.microsoft.com/office/drawing/2014/main" id="{496B9FD9-D0C3-49BC-9A59-1F4B78EB75D3}"/>
+              </a:ext>
+            </a:extLst>
+          </p:cNvPr>
+          <p:cNvSpPr txBox="1"/>
+          <p:nvPr/>
+        </p:nvSpPr>
+        <p:spPr>
+          <a:xfrm>
+            <a:off x="6720980" y="6149129"/>
+            <a:ext cx="4605556" cy="892552"/>
+          </a:xfrm>
+          <a:prstGeom prst="rect">
+            <a:avLst/>
+          </a:prstGeom>
+          <a:noFill/>
+        </p:spPr>
+        <p:txBody>
+          <a:bodyPr wrap="square" rtlCol="0">
+            <a:spAutoFit/>
+          </a:bodyPr>
+          <a:lstStyle/>
+          <a:p>
+            <a:r>
+              <a:rPr lang="en-IN" sz="3200" dirty="0"/>
+              <a:t>Hostel Fees: </a:t>
+            </a:r>
+            <a:r>
+              <a:rPr lang="en-IN" sz="3200" b="1" dirty="0"/>
+              <a:t>₹5,71,152</a:t>
+            </a:r>
+            <a:endParaRPr lang="en-IN" sz="3200" b="1" dirty="0">
+              <a:latin typeface="Arial" panose="020B0604020202020204" pitchFamily="34" charset="0"/>
+            </a:endParaRPr>
+          </a:p>
+          <a:p>
+            <a:endParaRPr lang="en-IN" sz="2000" dirty="0"/>
+          </a:p>
+        </p:txBody>
+      </p:sp>
+    </p:spTree>
+    <p:extLst>
+      <p:ext uri="{BB962C8B-B14F-4D97-AF65-F5344CB8AC3E}">
+        <p14:creationId xmlns:p14="http://schemas.microsoft.com/office/powerpoint/2010/main" val="3609341194"/>
+      </p:ext>
+    </p:extLst>
+  </p:cSld>
+  <p:clrMapOvr>
+    <a:masterClrMapping/>
+  </p:clrMapOvr>
+</p:sld>
+</file>
+
+<file path=ppt/slides/slide14.xml><?xml version="1.0" encoding="utf-8"?>
+<p:sld xmlns:a="http://schemas.openxmlformats.org/drawingml/2006/main" xmlns:r="http://schemas.openxmlformats.org/officeDocument/2006/relationships" xmlns:p="http://schemas.openxmlformats.org/presentationml/2006/main">
+  <p:cSld>
+    <p:spTree>
+      <p:nvGrpSpPr>
+        <p:cNvPr id="1" name=""/>
+        <p:cNvGrpSpPr/>
+        <p:nvPr/>
+      </p:nvGrpSpPr>
+      <p:grpSpPr>
+        <a:xfrm>
+          <a:off x="0" y="0"/>
+          <a:ext cx="0" cy="0"/>
+          <a:chOff x="0" y="0"/>
+          <a:chExt cx="0" cy="0"/>
+        </a:xfrm>
+      </p:grpSpPr>
+      <p:graphicFrame>
+        <p:nvGraphicFramePr>
+          <p:cNvPr id="4" name="Chart 3">
+            <a:extLst>
+              <a:ext uri="{FF2B5EF4-FFF2-40B4-BE49-F238E27FC236}">
+                <a16:creationId xmlns:a16="http://schemas.microsoft.com/office/drawing/2014/main" id="{7042F533-C72F-4310-9AC1-4A6A95E735C2}"/>
+              </a:ext>
+            </a:extLst>
+          </p:cNvPr>
+          <p:cNvGraphicFramePr>
+            <a:graphicFrameLocks/>
+          </p:cNvGraphicFramePr>
+          <p:nvPr>
+            <p:extLst>
+              <p:ext uri="{D42A27DB-BD31-4B8C-83A1-F6EECF244321}">
+                <p14:modId xmlns:p14="http://schemas.microsoft.com/office/powerpoint/2010/main" val="833978294"/>
+              </p:ext>
+            </p:extLst>
+          </p:nvPr>
+        </p:nvGraphicFramePr>
+        <p:xfrm>
+          <a:off x="67112" y="256852"/>
+          <a:ext cx="11979479" cy="6496286"/>
+        </p:xfrm>
+        <a:graphic>
+          <a:graphicData uri="http://schemas.openxmlformats.org/drawingml/2006/chart">
+            <c:chart xmlns:c="http://schemas.openxmlformats.org/drawingml/2006/chart" xmlns:r="http://schemas.openxmlformats.org/officeDocument/2006/relationships" r:id="rId2"/>
+          </a:graphicData>
+        </a:graphic>
+      </p:graphicFrame>
+    </p:spTree>
+    <p:extLst>
+      <p:ext uri="{BB962C8B-B14F-4D97-AF65-F5344CB8AC3E}">
+        <p14:creationId xmlns:p14="http://schemas.microsoft.com/office/powerpoint/2010/main" val="1316931117"/>
+      </p:ext>
+    </p:extLst>
+  </p:cSld>
+  <p:clrMapOvr>
+    <a:masterClrMapping/>
+  </p:clrMapOvr>
+</p:sld>
+</file>
+
+<file path=ppt/slides/slide15.xml><?xml version="1.0" encoding="utf-8"?>
+<p:sld xmlns:a="http://schemas.openxmlformats.org/drawingml/2006/main" xmlns:r="http://schemas.openxmlformats.org/officeDocument/2006/relationships" xmlns:p="http://schemas.openxmlformats.org/presentationml/2006/main">
+  <p:cSld>
+    <p:spTree>
+      <p:nvGrpSpPr>
+        <p:cNvPr id="1" name=""/>
+        <p:cNvGrpSpPr/>
+        <p:nvPr/>
+      </p:nvGrpSpPr>
+      <p:grpSpPr>
+        <a:xfrm>
+          <a:off x="0" y="0"/>
+          <a:ext cx="0" cy="0"/>
+          <a:chOff x="0" y="0"/>
+          <a:chExt cx="0" cy="0"/>
+        </a:xfrm>
+      </p:grpSpPr>
+      <p:graphicFrame>
+        <p:nvGraphicFramePr>
+          <p:cNvPr id="4" name="Chart 3">
+            <a:extLst>
+              <a:ext uri="{FF2B5EF4-FFF2-40B4-BE49-F238E27FC236}">
+                <a16:creationId xmlns:a16="http://schemas.microsoft.com/office/drawing/2014/main" id="{27A7FC2C-AFAD-45F1-8F50-A5296476F72E}"/>
+              </a:ext>
+            </a:extLst>
+          </p:cNvPr>
+          <p:cNvGraphicFramePr>
+            <a:graphicFrameLocks/>
+          </p:cNvGraphicFramePr>
+          <p:nvPr>
+            <p:extLst>
+              <p:ext uri="{D42A27DB-BD31-4B8C-83A1-F6EECF244321}">
+                <p14:modId xmlns:p14="http://schemas.microsoft.com/office/powerpoint/2010/main" val="1504529184"/>
+              </p:ext>
+            </p:extLst>
+          </p:nvPr>
+        </p:nvGraphicFramePr>
+        <p:xfrm>
+          <a:off x="385894" y="377506"/>
+          <a:ext cx="11509695" cy="6342076"/>
+        </p:xfrm>
+        <a:graphic>
+          <a:graphicData uri="http://schemas.openxmlformats.org/drawingml/2006/chart">
+            <c:chart xmlns:c="http://schemas.openxmlformats.org/drawingml/2006/chart" xmlns:r="http://schemas.openxmlformats.org/officeDocument/2006/relationships" r:id="rId2"/>
+          </a:graphicData>
+        </a:graphic>
+      </p:graphicFrame>
+      <p:sp>
+        <p:nvSpPr>
+          <p:cNvPr id="6" name="Smiley Face 5">
+            <a:extLst>
+              <a:ext uri="{FF2B5EF4-FFF2-40B4-BE49-F238E27FC236}">
+                <a16:creationId xmlns:a16="http://schemas.microsoft.com/office/drawing/2014/main" id="{DC3C0355-8CC5-4A18-937B-B6644D39D0F7}"/>
+              </a:ext>
+            </a:extLst>
+          </p:cNvPr>
+          <p:cNvSpPr/>
+          <p:nvPr/>
+        </p:nvSpPr>
+        <p:spPr>
+          <a:xfrm>
+            <a:off x="5507372" y="3202497"/>
+            <a:ext cx="1266738" cy="1258349"/>
+          </a:xfrm>
+          <a:prstGeom prst="smileyFace">
+            <a:avLst/>
+          </a:prstGeom>
+          <a:solidFill>
+            <a:srgbClr val="FFFF00"/>
+          </a:solidFill>
+        </p:spPr>
+        <p:style>
+          <a:lnRef idx="2">
+            <a:schemeClr val="accent1">
+              <a:shade val="50000"/>
+            </a:schemeClr>
+          </a:lnRef>
+          <a:fillRef idx="1">
+            <a:schemeClr val="accent1"/>
+          </a:fillRef>
+          <a:effectRef idx="0">
+            <a:schemeClr val="accent1"/>
+          </a:effectRef>
+          <a:fontRef idx="minor">
+            <a:schemeClr val="lt1"/>
+          </a:fontRef>
+        </p:style>
+        <p:txBody>
+          <a:bodyPr rtlCol="0" anchor="ctr"/>
+          <a:lstStyle/>
+          <a:p>
+            <a:pPr algn="ctr"/>
+            <a:endParaRPr lang="en-IN" sz="1600" b="1" dirty="0">
+              <a:solidFill>
+                <a:srgbClr val="7030A0"/>
+              </a:solidFill>
+            </a:endParaRPr>
+          </a:p>
+          <a:p>
+            <a:pPr algn="ctr"/>
+            <a:r>
+              <a:rPr lang="en-IN" sz="3200" b="1" dirty="0">
+                <a:solidFill>
+                  <a:schemeClr val="tx1"/>
+                </a:solidFill>
+              </a:rPr>
+              <a:t>22</a:t>
+            </a:r>
+            <a:endParaRPr lang="en-IN" b="1" dirty="0">
+              <a:solidFill>
+                <a:schemeClr val="tx1"/>
+              </a:solidFill>
+            </a:endParaRPr>
+          </a:p>
+        </p:txBody>
+      </p:sp>
+    </p:spTree>
+    <p:extLst>
+      <p:ext uri="{BB962C8B-B14F-4D97-AF65-F5344CB8AC3E}">
+        <p14:creationId xmlns:p14="http://schemas.microsoft.com/office/powerpoint/2010/main" val="3120050718"/>
       </p:ext>
     </p:extLst>
   </p:cSld>

</xml_diff>

<commit_message>
PPTX changes and source Excel
</commit_message>
<xml_diff>
--- a/docs/ContributionGraphs.pptx
+++ b/docs/ContributionGraphs.pptx
@@ -26069,7 +26069,7 @@
         <p:spPr>
           <a:xfrm>
             <a:off x="1677798" y="6149130"/>
-            <a:ext cx="4605556" cy="800219"/>
+            <a:ext cx="4605556" cy="861774"/>
           </a:xfrm>
           <a:prstGeom prst="rect">
             <a:avLst/>
@@ -26083,14 +26083,14 @@
           <a:lstStyle/>
           <a:p>
             <a:r>
-              <a:rPr lang="en-IN" sz="2800" dirty="0"/>
+              <a:rPr lang="en-IN" sz="3200" dirty="0"/>
               <a:t>Tuition Fees: </a:t>
             </a:r>
             <a:r>
-              <a:rPr lang="en-IN" sz="2800" b="1" dirty="0"/>
+              <a:rPr lang="en-IN" sz="3200" b="1" dirty="0"/>
               <a:t>₹1,60,585</a:t>
             </a:r>
-            <a:endParaRPr lang="en-IN" sz="2800" b="1" dirty="0">
+            <a:endParaRPr lang="en-IN" sz="3200" b="1" dirty="0">
               <a:latin typeface="Arial" panose="020B0604020202020204" pitchFamily="34" charset="0"/>
             </a:endParaRPr>
           </a:p>

</xml_diff>

<commit_message>
Jan 2019 roll out
</commit_message>
<xml_diff>
--- a/docs/ContributionGraphs.pptx
+++ b/docs/ContributionGraphs.pptx
@@ -1161,20 +1161,12 @@
               </a:defRPr>
             </a:pPr>
             <a:r>
-              <a:rPr lang="en-IN" sz="4000" b="1" dirty="0"/>
-              <a:t>Sponsorship split </a:t>
+              <a:rPr lang="en-IN" sz="4000" b="1"/>
+              <a:t>Sponsorship split</a:t>
             </a:r>
           </a:p>
         </c:rich>
       </c:tx>
-      <c:layout>
-        <c:manualLayout>
-          <c:xMode val="edge"/>
-          <c:yMode val="edge"/>
-          <c:x val="0.34043473784492118"/>
-          <c:y val="0"/>
-        </c:manualLayout>
-      </c:layout>
       <c:overlay val="0"/>
       <c:spPr>
         <a:noFill/>
@@ -1228,7 +1220,7 @@
             </c:spPr>
             <c:extLst>
               <c:ext xmlns:c16="http://schemas.microsoft.com/office/drawing/2014/chart" uri="{C3380CC4-5D6E-409C-BE32-E72D297353CC}">
-                <c16:uniqueId val="{00000001-3962-44CA-BD86-EB63939BD29B}"/>
+                <c16:uniqueId val="{00000001-5FB7-4B05-B114-610BF413F7E5}"/>
               </c:ext>
             </c:extLst>
           </c:dPt>
@@ -1248,7 +1240,7 @@
             </c:spPr>
             <c:extLst>
               <c:ext xmlns:c16="http://schemas.microsoft.com/office/drawing/2014/chart" uri="{C3380CC4-5D6E-409C-BE32-E72D297353CC}">
-                <c16:uniqueId val="{00000003-3962-44CA-BD86-EB63939BD29B}"/>
+                <c16:uniqueId val="{00000003-5FB7-4B05-B114-610BF413F7E5}"/>
               </c:ext>
             </c:extLst>
           </c:dPt>
@@ -1268,7 +1260,7 @@
             </c:spPr>
             <c:extLst>
               <c:ext xmlns:c16="http://schemas.microsoft.com/office/drawing/2014/chart" uri="{C3380CC4-5D6E-409C-BE32-E72D297353CC}">
-                <c16:uniqueId val="{00000005-3962-44CA-BD86-EB63939BD29B}"/>
+                <c16:uniqueId val="{00000005-5FB7-4B05-B114-610BF413F7E5}"/>
               </c:ext>
             </c:extLst>
           </c:dPt>
@@ -1277,8 +1269,8 @@
               <c:idx val="0"/>
               <c:layout>
                 <c:manualLayout>
-                  <c:x val="-3.8588685451699634E-2"/>
-                  <c:y val="-8.8715114735301262E-2"/>
+                  <c:x val="-4.0795507033410422E-2"/>
+                  <c:y val="-1.6625100279681313E-2"/>
                 </c:manualLayout>
               </c:layout>
               <c:showLegendKey val="0"/>
@@ -1290,7 +1282,7 @@
               <c:extLst>
                 <c:ext xmlns:c15="http://schemas.microsoft.com/office/drawing/2012/chart" uri="{CE6537A1-D6FC-4f65-9D91-7224C49458BB}"/>
                 <c:ext xmlns:c16="http://schemas.microsoft.com/office/drawing/2014/chart" uri="{C3380CC4-5D6E-409C-BE32-E72D297353CC}">
-                  <c16:uniqueId val="{00000001-3962-44CA-BD86-EB63939BD29B}"/>
+                  <c16:uniqueId val="{00000001-5FB7-4B05-B114-610BF413F7E5}"/>
                 </c:ext>
               </c:extLst>
             </c:dLbl>
@@ -1298,8 +1290,8 @@
               <c:idx val="1"/>
               <c:layout>
                 <c:manualLayout>
-                  <c:x val="3.0178992579733867E-2"/>
-                  <c:y val="1.3854296290362967E-2"/>
+                  <c:x val="3.5696068654234123E-2"/>
+                  <c:y val="1.3854250233067659E-2"/>
                 </c:manualLayout>
               </c:layout>
               <c:showLegendKey val="0"/>
@@ -1311,7 +1303,7 @@
               <c:extLst>
                 <c:ext xmlns:c15="http://schemas.microsoft.com/office/drawing/2012/chart" uri="{CE6537A1-D6FC-4f65-9D91-7224C49458BB}"/>
                 <c:ext xmlns:c16="http://schemas.microsoft.com/office/drawing/2014/chart" uri="{C3380CC4-5D6E-409C-BE32-E72D297353CC}">
-                  <c16:uniqueId val="{00000003-3962-44CA-BD86-EB63939BD29B}"/>
+                  <c16:uniqueId val="{00000003-5FB7-4B05-B114-610BF413F7E5}"/>
                 </c:ext>
               </c:extLst>
             </c:dLbl>
@@ -1332,7 +1324,7 @@
               <c:extLst>
                 <c:ext xmlns:c15="http://schemas.microsoft.com/office/drawing/2012/chart" uri="{CE6537A1-D6FC-4f65-9D91-7224C49458BB}"/>
                 <c:ext xmlns:c16="http://schemas.microsoft.com/office/drawing/2014/chart" uri="{C3380CC4-5D6E-409C-BE32-E72D297353CC}">
-                  <c16:uniqueId val="{00000005-3962-44CA-BD86-EB63939BD29B}"/>
+                  <c16:uniqueId val="{00000005-5FB7-4B05-B114-610BF413F7E5}"/>
                 </c:ext>
               </c:extLst>
             </c:dLbl>
@@ -1427,7 +1419,7 @@
           </c:val>
           <c:extLst>
             <c:ext xmlns:c16="http://schemas.microsoft.com/office/drawing/2014/chart" uri="{C3380CC4-5D6E-409C-BE32-E72D297353CC}">
-              <c16:uniqueId val="{00000006-3962-44CA-BD86-EB63939BD29B}"/>
+              <c16:uniqueId val="{00000006-5FB7-4B05-B114-610BF413F7E5}"/>
             </c:ext>
           </c:extLst>
         </c:ser>
@@ -1450,7 +1442,7 @@
             </c:spPr>
             <c:extLst>
               <c:ext xmlns:c16="http://schemas.microsoft.com/office/drawing/2014/chart" uri="{C3380CC4-5D6E-409C-BE32-E72D297353CC}">
-                <c16:uniqueId val="{00000008-3962-44CA-BD86-EB63939BD29B}"/>
+                <c16:uniqueId val="{00000008-5FB7-4B05-B114-610BF413F7E5}"/>
               </c:ext>
             </c:extLst>
           </c:dPt>
@@ -1470,7 +1462,7 @@
             </c:spPr>
             <c:extLst>
               <c:ext xmlns:c16="http://schemas.microsoft.com/office/drawing/2014/chart" uri="{C3380CC4-5D6E-409C-BE32-E72D297353CC}">
-                <c16:uniqueId val="{0000000A-3962-44CA-BD86-EB63939BD29B}"/>
+                <c16:uniqueId val="{0000000A-5FB7-4B05-B114-610BF413F7E5}"/>
               </c:ext>
             </c:extLst>
           </c:dPt>
@@ -1490,7 +1482,7 @@
             </c:spPr>
             <c:extLst>
               <c:ext xmlns:c16="http://schemas.microsoft.com/office/drawing/2014/chart" uri="{C3380CC4-5D6E-409C-BE32-E72D297353CC}">
-                <c16:uniqueId val="{0000000C-3962-44CA-BD86-EB63939BD29B}"/>
+                <c16:uniqueId val="{0000000C-5FB7-4B05-B114-610BF413F7E5}"/>
               </c:ext>
             </c:extLst>
           </c:dPt>
@@ -1499,8 +1491,8 @@
               <c:idx val="0"/>
               <c:layout>
                 <c:manualLayout>
-                  <c:x val="8.9237377706359811E-2"/>
-                  <c:y val="0.16402279001386921"/>
+                  <c:x val="8.3720330738062607E-2"/>
+                  <c:y val="4.7877888856622912E-2"/>
                 </c:manualLayout>
               </c:layout>
               <c:showLegendKey val="0"/>
@@ -1512,7 +1504,7 @@
               <c:extLst>
                 <c:ext xmlns:c15="http://schemas.microsoft.com/office/drawing/2012/chart" uri="{CE6537A1-D6FC-4f65-9D91-7224C49458BB}"/>
                 <c:ext xmlns:c16="http://schemas.microsoft.com/office/drawing/2014/chart" uri="{C3380CC4-5D6E-409C-BE32-E72D297353CC}">
-                  <c16:uniqueId val="{00000008-3962-44CA-BD86-EB63939BD29B}"/>
+                  <c16:uniqueId val="{00000008-5FB7-4B05-B114-610BF413F7E5}"/>
                 </c:ext>
               </c:extLst>
             </c:dLbl>
@@ -1533,7 +1525,7 @@
               <c:extLst>
                 <c:ext xmlns:c15="http://schemas.microsoft.com/office/drawing/2012/chart" uri="{CE6537A1-D6FC-4f65-9D91-7224C49458BB}"/>
                 <c:ext xmlns:c16="http://schemas.microsoft.com/office/drawing/2014/chart" uri="{C3380CC4-5D6E-409C-BE32-E72D297353CC}">
-                  <c16:uniqueId val="{0000000A-3962-44CA-BD86-EB63939BD29B}"/>
+                  <c16:uniqueId val="{0000000A-5FB7-4B05-B114-610BF413F7E5}"/>
                 </c:ext>
               </c:extLst>
             </c:dLbl>
@@ -1541,8 +1533,8 @@
               <c:idx val="2"/>
               <c:layout>
                 <c:manualLayout>
-                  <c:x val="-9.2557274541158557E-2"/>
-                  <c:y val="-2.6131979496934462E-2"/>
+                  <c:x val="-6.0558173014441316E-2"/>
+                  <c:y val="-2.412952218545452E-2"/>
                 </c:manualLayout>
               </c:layout>
               <c:showLegendKey val="0"/>
@@ -1554,7 +1546,7 @@
               <c:extLst>
                 <c:ext xmlns:c15="http://schemas.microsoft.com/office/drawing/2012/chart" uri="{CE6537A1-D6FC-4f65-9D91-7224C49458BB}"/>
                 <c:ext xmlns:c16="http://schemas.microsoft.com/office/drawing/2014/chart" uri="{C3380CC4-5D6E-409C-BE32-E72D297353CC}">
-                  <c16:uniqueId val="{0000000C-3962-44CA-BD86-EB63939BD29B}"/>
+                  <c16:uniqueId val="{0000000C-5FB7-4B05-B114-610BF413F7E5}"/>
                 </c:ext>
               </c:extLst>
             </c:dLbl>
@@ -1639,7 +1631,7 @@
                   <c:v>315524</c:v>
                 </c:pt>
                 <c:pt idx="1">
-                  <c:v>323275</c:v>
+                  <c:v>309110</c:v>
                 </c:pt>
                 <c:pt idx="2">
                   <c:v>92938</c:v>
@@ -1649,7 +1641,7 @@
           </c:val>
           <c:extLst>
             <c:ext xmlns:c16="http://schemas.microsoft.com/office/drawing/2014/chart" uri="{C3380CC4-5D6E-409C-BE32-E72D297353CC}">
-              <c16:uniqueId val="{0000000D-3962-44CA-BD86-EB63939BD29B}"/>
+              <c16:uniqueId val="{0000000D-5FB7-4B05-B114-610BF413F7E5}"/>
             </c:ext>
           </c:extLst>
         </c:ser>
@@ -1717,7 +1709,7 @@
   </c:chart>
   <c:spPr>
     <a:noFill/>
-    <a:ln w="38100">
+    <a:ln>
       <a:noFill/>
     </a:ln>
     <a:effectLst/>
@@ -1760,7 +1752,7 @@
           <a:lstStyle/>
           <a:p>
             <a:pPr>
-              <a:defRPr sz="3600" b="1" i="0" u="none" strike="noStrike" kern="1200" spc="0" baseline="0">
+              <a:defRPr sz="4000" b="1" i="0" u="none" strike="noStrike" kern="1200" spc="0" baseline="0">
                 <a:solidFill>
                   <a:schemeClr val="tx1">
                     <a:lumMod val="65000"/>
@@ -1773,19 +1765,19 @@
               </a:defRPr>
             </a:pPr>
             <a:r>
-              <a:rPr lang="en-IN" sz="3600" b="1" dirty="0">
+              <a:rPr lang="en-IN" sz="4000" b="1" dirty="0">
                 <a:latin typeface="Algerian" panose="04020705040A02060702" pitchFamily="82" charset="0"/>
               </a:rPr>
               <a:t>Total Donations</a:t>
             </a:r>
             <a:r>
-              <a:rPr lang="en-IN" sz="3600" b="1" baseline="0" dirty="0">
+              <a:rPr lang="en-IN" sz="4000" b="1" baseline="0" dirty="0">
                 <a:latin typeface="Algerian" panose="04020705040A02060702" pitchFamily="82" charset="0"/>
               </a:rPr>
               <a:t> </a:t>
             </a:r>
             <a:r>
-              <a:rPr lang="en-IN" sz="3600" b="1" i="0" u="none" strike="noStrike" baseline="0" dirty="0">
+              <a:rPr lang="en-IN" sz="4000" b="1" i="0" u="none" strike="noStrike" baseline="0" dirty="0">
                 <a:effectLst/>
                 <a:latin typeface="Algerian" panose="04020705040A02060702" pitchFamily="82" charset="0"/>
               </a:rPr>
@@ -1794,18 +1786,18 @@
           </a:p>
           <a:p>
             <a:pPr>
-              <a:defRPr sz="3600" b="1">
+              <a:defRPr sz="4000" b="1">
                 <a:latin typeface="Algerian" panose="04020705040A02060702" pitchFamily="82" charset="0"/>
               </a:defRPr>
             </a:pPr>
             <a:r>
-              <a:rPr lang="en-IN" sz="3600" b="1" i="0" u="none" strike="noStrike" baseline="0" dirty="0">
+              <a:rPr lang="en-IN" sz="4000" b="1" i="0" u="none" strike="noStrike" baseline="0" dirty="0">
                 <a:effectLst/>
                 <a:latin typeface="Algerian" panose="04020705040A02060702" pitchFamily="82" charset="0"/>
               </a:rPr>
               <a:t>₹ 29,40,831 : 156/390 </a:t>
             </a:r>
-            <a:endParaRPr lang="en-IN" sz="3600" b="1" dirty="0">
+            <a:endParaRPr lang="en-IN" sz="4000" b="1" dirty="0">
               <a:latin typeface="Algerian" panose="04020705040A02060702" pitchFamily="82" charset="0"/>
             </a:endParaRPr>
           </a:p>
@@ -1815,8 +1807,8 @@
         <c:manualLayout>
           <c:xMode val="edge"/>
           <c:yMode val="edge"/>
-          <c:x val="0.58717451721766967"/>
-          <c:y val="2.0794554127343007E-2"/>
+          <c:x val="0.5339571299317234"/>
+          <c:y val="2.0794531728399679E-2"/>
         </c:manualLayout>
       </c:layout>
       <c:overlay val="0"/>
@@ -1832,7 +1824,7 @@
         <a:lstStyle/>
         <a:p>
           <a:pPr>
-            <a:defRPr sz="3600" b="1" i="0" u="none" strike="noStrike" kern="1200" spc="0" baseline="0">
+            <a:defRPr sz="4000" b="1" i="0" u="none" strike="noStrike" kern="1200" spc="0" baseline="0">
               <a:solidFill>
                 <a:schemeClr val="tx1">
                   <a:lumMod val="65000"/>
@@ -1943,8 +1935,8 @@
               <c:idx val="0"/>
               <c:layout>
                 <c:manualLayout>
-                  <c:x val="5.8457007716250352E-3"/>
-                  <c:y val="9.2798497054315698E-2"/>
+                  <c:x val="5.2131132457136865E-3"/>
+                  <c:y val="0.13529008955586552"/>
                 </c:manualLayout>
               </c:layout>
               <c:tx>
@@ -1993,35 +1985,92 @@
               <c:idx val="1"/>
               <c:layout>
                 <c:manualLayout>
-                  <c:x val="-0.10544915457257059"/>
-                  <c:y val="-1.1949403900467177E-2"/>
+                  <c:x val="-0.16414947340829264"/>
+                  <c:y val="-1.7732256473478585E-2"/>
                 </c:manualLayout>
               </c:layout>
               <c:tx>
                 <c:rich>
-                  <a:bodyPr/>
+                  <a:bodyPr rot="0" spcFirstLastPara="1" vertOverflow="ellipsis" vert="horz" wrap="square" lIns="38100" tIns="19050" rIns="38100" bIns="19050" anchor="ctr" anchorCtr="1">
+                    <a:noAutofit/>
+                  </a:bodyPr>
                   <a:lstStyle/>
                   <a:p>
+                    <a:pPr>
+                      <a:defRPr sz="3200" b="1" i="0" u="none" strike="noStrike" kern="1200" baseline="0">
+                        <a:solidFill>
+                          <a:schemeClr val="tx1">
+                            <a:lumMod val="75000"/>
+                            <a:lumOff val="25000"/>
+                          </a:schemeClr>
+                        </a:solidFill>
+                        <a:latin typeface="Arial Rounded MT Bold" panose="020F0704030504030204" pitchFamily="34" charset="0"/>
+                        <a:ea typeface="+mn-ea"/>
+                        <a:cs typeface="+mn-cs"/>
+                      </a:defRPr>
+                    </a:pPr>
                     <a:fld id="{B6665D21-5686-45C8-B3C0-56912E84858F}" type="VALUE">
-                      <a:rPr lang="en-US"/>
-                      <a:pPr/>
+                      <a:rPr lang="en-US" b="1"/>
+                      <a:pPr>
+                        <a:defRPr sz="3200" b="1">
+                          <a:latin typeface="Arial Rounded MT Bold" panose="020F0704030504030204" pitchFamily="34" charset="0"/>
+                        </a:defRPr>
+                      </a:pPr>
                       <a:t>[VALUE]</a:t>
                     </a:fld>
                     <a:r>
-                      <a:rPr lang="en-US" baseline="0" dirty="0"/>
+                      <a:rPr lang="en-US" b="1" baseline="0" dirty="0"/>
                       <a:t> </a:t>
                     </a:r>
                   </a:p>
                   <a:p>
+                    <a:pPr>
+                      <a:defRPr sz="3200" b="1">
+                        <a:latin typeface="Arial Rounded MT Bold" panose="020F0704030504030204" pitchFamily="34" charset="0"/>
+                      </a:defRPr>
+                    </a:pPr>
                     <a:fld id="{5A1A7562-FCB1-4F37-A8E7-A19F1635E100}" type="PERCENTAGE">
-                      <a:rPr lang="en-US" baseline="0" smtClean="0"/>
-                      <a:pPr/>
+                      <a:rPr lang="en-US" b="1" baseline="0" smtClean="0"/>
+                      <a:pPr>
+                        <a:defRPr sz="3200" b="1">
+                          <a:latin typeface="Arial Rounded MT Bold" panose="020F0704030504030204" pitchFamily="34" charset="0"/>
+                        </a:defRPr>
+                      </a:pPr>
                       <a:t>[PERCENTAGE]</a:t>
                     </a:fld>
                     <a:endParaRPr lang="en-IN"/>
                   </a:p>
                 </c:rich>
               </c:tx>
+              <c:spPr>
+                <a:noFill/>
+                <a:ln>
+                  <a:noFill/>
+                </a:ln>
+                <a:effectLst/>
+              </c:spPr>
+              <c:txPr>
+                <a:bodyPr rot="0" spcFirstLastPara="1" vertOverflow="ellipsis" vert="horz" wrap="square" lIns="38100" tIns="19050" rIns="38100" bIns="19050" anchor="ctr" anchorCtr="1">
+                  <a:noAutofit/>
+                </a:bodyPr>
+                <a:lstStyle/>
+                <a:p>
+                  <a:pPr>
+                    <a:defRPr sz="3200" b="1" i="0" u="none" strike="noStrike" kern="1200" baseline="0">
+                      <a:solidFill>
+                        <a:schemeClr val="tx1">
+                          <a:lumMod val="75000"/>
+                          <a:lumOff val="25000"/>
+                        </a:schemeClr>
+                      </a:solidFill>
+                      <a:latin typeface="Arial Rounded MT Bold" panose="020F0704030504030204" pitchFamily="34" charset="0"/>
+                      <a:ea typeface="+mn-ea"/>
+                      <a:cs typeface="+mn-cs"/>
+                    </a:defRPr>
+                  </a:pPr>
+                  <a:endParaRPr lang="en-US"/>
+                </a:p>
+              </c:txPr>
               <c:showLegendKey val="0"/>
               <c:showVal val="1"/>
               <c:showCatName val="0"/>
@@ -2032,8 +2081,8 @@
                 <c:ext xmlns:c15="http://schemas.microsoft.com/office/drawing/2012/chart" uri="{CE6537A1-D6FC-4f65-9D91-7224C49458BB}">
                   <c15:layout>
                     <c:manualLayout>
-                      <c:w val="0.15899786970866162"/>
-                      <c:h val="9.8352913756721103E-2"/>
+                      <c:w val="0.24253835791116779"/>
+                      <c:h val="0.15390845055532962"/>
                     </c:manualLayout>
                   </c15:layout>
                   <c15:dlblFieldTable/>
@@ -2098,8 +2147,8 @@
               <c:idx val="3"/>
               <c:layout>
                 <c:manualLayout>
-                  <c:x val="3.6126949896596643E-2"/>
-                  <c:y val="3.0178336275639584E-2"/>
+                  <c:x val="6.6607938835348865E-2"/>
+                  <c:y val="1.5363519300600622E-2"/>
                 </c:manualLayout>
               </c:layout>
               <c:tx>
@@ -2158,7 +2207,7 @@
               <a:lstStyle/>
               <a:p>
                 <a:pPr>
-                  <a:defRPr sz="2000" b="0" i="0" u="none" strike="noStrike" kern="1200" baseline="0">
+                  <a:defRPr sz="3200" b="1" i="0" u="none" strike="noStrike" kern="1200" baseline="0">
                     <a:solidFill>
                       <a:schemeClr val="tx1">
                         <a:lumMod val="75000"/>
@@ -2179,21 +2228,7 @@
             <c:showSerName val="0"/>
             <c:showPercent val="1"/>
             <c:showBubbleSize val="0"/>
-            <c:showLeaderLines val="1"/>
-            <c:leaderLines>
-              <c:spPr>
-                <a:ln w="9525" cap="flat" cmpd="sng" algn="ctr">
-                  <a:solidFill>
-                    <a:schemeClr val="tx1">
-                      <a:lumMod val="35000"/>
-                      <a:lumOff val="65000"/>
-                    </a:schemeClr>
-                  </a:solidFill>
-                  <a:round/>
-                </a:ln>
-                <a:effectLst/>
-              </c:spPr>
-            </c:leaderLines>
+            <c:showLeaderLines val="0"/>
             <c:extLst>
               <c:ext xmlns:c15="http://schemas.microsoft.com/office/drawing/2012/chart" uri="{CE6537A1-D6FC-4f65-9D91-7224C49458BB}"/>
             </c:extLst>
@@ -2252,7 +2287,7 @@
           <c:showSerName val="0"/>
           <c:showPercent val="1"/>
           <c:showBubbleSize val="0"/>
-          <c:showLeaderLines val="1"/>
+          <c:showLeaderLines val="0"/>
         </c:dLbls>
         <c:firstSliceAng val="0"/>
       </c:pieChart>
@@ -2270,10 +2305,10 @@
         <c:manualLayout>
           <c:xMode val="edge"/>
           <c:yMode val="edge"/>
-          <c:x val="0.72611422503930134"/>
-          <c:y val="0.58354273842811732"/>
-          <c:w val="0.24448117650039311"/>
-          <c:h val="0.41076076242719772"/>
+          <c:x val="0.69326793879625292"/>
+          <c:y val="0.48052099694917949"/>
+          <c:w val="0.28572886435882316"/>
+          <c:h val="0.51941382152766868"/>
         </c:manualLayout>
       </c:layout>
       <c:overlay val="0"/>
@@ -2289,7 +2324,7 @@
         <a:lstStyle/>
         <a:p>
           <a:pPr>
-            <a:defRPr sz="1600" b="0" i="0" u="none" strike="noStrike" kern="1200" baseline="0">
+            <a:defRPr sz="3200" b="1" i="0" u="none" strike="noStrike" kern="1200" baseline="0">
               <a:solidFill>
                 <a:schemeClr val="tx1">
                   <a:lumMod val="65000"/>
@@ -2353,7 +2388,7 @@
           <a:lstStyle/>
           <a:p>
             <a:pPr>
-              <a:defRPr sz="3600" b="1" i="0" u="none" strike="noStrike" kern="1200" baseline="0">
+              <a:defRPr sz="4000" b="1" i="0" u="none" strike="noStrike" kern="1200" baseline="0">
                 <a:solidFill>
                   <a:schemeClr val="tx2"/>
                 </a:solidFill>
@@ -2363,7 +2398,7 @@
               </a:defRPr>
             </a:pPr>
             <a:r>
-              <a:rPr lang="en-IN" sz="3600" dirty="0"/>
+              <a:rPr lang="en-IN" sz="4000" dirty="0"/>
               <a:t>CEG ‘94 Contributions 2/2</a:t>
             </a:r>
           </a:p>
@@ -2373,8 +2408,8 @@
         <c:manualLayout>
           <c:xMode val="edge"/>
           <c:yMode val="edge"/>
-          <c:x val="0.34448898117815374"/>
-          <c:y val="9.3293986614884014E-2"/>
+          <c:x val="0.10199775234308725"/>
+          <c:y val="0.10262338527637242"/>
         </c:manualLayout>
       </c:layout>
       <c:overlay val="0"/>
@@ -2390,7 +2425,7 @@
         <a:lstStyle/>
         <a:p>
           <a:pPr>
-            <a:defRPr sz="3600" b="1" i="0" u="none" strike="noStrike" kern="1200" baseline="0">
+            <a:defRPr sz="4000" b="1" i="0" u="none" strike="noStrike" kern="1200" baseline="0">
               <a:solidFill>
                 <a:schemeClr val="tx2"/>
               </a:solidFill>
@@ -2410,10 +2445,10 @@
           <c:layoutTarget val="inner"/>
           <c:xMode val="edge"/>
           <c:yMode val="edge"/>
-          <c:x val="0.15748332307524857"/>
-          <c:y val="0.22727002818041592"/>
-          <c:w val="0.42052604880993077"/>
-          <c:h val="0.66603372859212151"/>
+          <c:x val="0.18595395318138999"/>
+          <c:y val="0.27236212171094315"/>
+          <c:w val="0.39205541870378935"/>
+          <c:h val="0.62094163506159428"/>
         </c:manualLayout>
       </c:layout>
       <c:doughnutChart>
@@ -2681,8 +2716,8 @@
               <c:idx val="0"/>
               <c:layout>
                 <c:manualLayout>
-                  <c:x val="-3.4768568486205152E-2"/>
-                  <c:y val="5.2295931953667905E-2"/>
+                  <c:x val="-5.3421739935056355E-2"/>
+                  <c:y val="3.9856733738350039E-2"/>
                 </c:manualLayout>
               </c:layout>
               <c:showLegendKey val="0"/>
@@ -2702,8 +2737,8 @@
               <c:idx val="1"/>
               <c:layout>
                 <c:manualLayout>
-                  <c:x val="-5.199990909187889E-2"/>
-                  <c:y val="-7.8887289233030289E-3"/>
+                  <c:x val="-5.1018163226149875E-2"/>
+                  <c:y val="-3.276712535393865E-2"/>
                 </c:manualLayout>
               </c:layout>
               <c:showLegendKey val="0"/>
@@ -2723,8 +2758,8 @@
               <c:idx val="2"/>
               <c:layout>
                 <c:manualLayout>
-                  <c:x val="-1.834380554691056E-2"/>
-                  <c:y val="-6.3879078260309682E-2"/>
+                  <c:x val="4.2363493648568066E-3"/>
+                  <c:y val="-4.9884980268076966E-2"/>
                 </c:manualLayout>
               </c:layout>
               <c:showLegendKey val="0"/>
@@ -2744,8 +2779,8 @@
               <c:idx val="3"/>
               <c:layout>
                 <c:manualLayout>
-                  <c:x val="4.0641727847986746E-2"/>
-                  <c:y val="-1.0789045522935558E-2"/>
+                  <c:x val="6.0276645162567068E-2"/>
+                  <c:y val="-1.0789045522935446E-2"/>
                 </c:manualLayout>
               </c:layout>
               <c:showLegendKey val="0"/>
@@ -2765,8 +2800,8 @@
               <c:idx val="4"/>
               <c:layout>
                 <c:manualLayout>
-                  <c:x val="4.0541079571043498E-2"/>
-                  <c:y val="6.2520438667835335E-3"/>
+                  <c:x val="6.0175996885623827E-2"/>
+                  <c:y val="3.7350039405078146E-2"/>
                 </c:manualLayout>
               </c:layout>
               <c:showLegendKey val="0"/>
@@ -2786,36 +2821,10 @@
               <c:idx val="5"/>
               <c:layout>
                 <c:manualLayout>
-                  <c:x val="1.9913593995363996E-2"/>
-                  <c:y val="3.6378900426299647E-2"/>
+                  <c:x val="2.8749306786925125E-2"/>
+                  <c:y val="5.3482797972361718E-2"/>
                 </c:manualLayout>
               </c:layout>
-              <c:spPr>
-                <a:noFill/>
-                <a:ln>
-                  <a:noFill/>
-                </a:ln>
-                <a:effectLst/>
-              </c:spPr>
-              <c:txPr>
-                <a:bodyPr rot="0" spcFirstLastPara="1" vertOverflow="ellipsis" vert="horz" wrap="square" lIns="38100" tIns="19050" rIns="38100" bIns="19050" anchor="ctr" anchorCtr="1">
-                  <a:spAutoFit/>
-                </a:bodyPr>
-                <a:lstStyle/>
-                <a:p>
-                  <a:pPr>
-                    <a:defRPr sz="1800" b="1" i="0" u="none" strike="noStrike" kern="1200" baseline="0">
-                      <a:solidFill>
-                        <a:schemeClr val="tx2"/>
-                      </a:solidFill>
-                      <a:latin typeface="+mn-lt"/>
-                      <a:ea typeface="+mn-ea"/>
-                      <a:cs typeface="+mn-cs"/>
-                    </a:defRPr>
-                  </a:pPr>
-                  <a:endParaRPr lang="en-US"/>
-                </a:p>
-              </c:txPr>
               <c:showLegendKey val="0"/>
               <c:showVal val="1"/>
               <c:showCatName val="0"/>
@@ -2864,7 +2873,7 @@
               <a:lstStyle/>
               <a:p>
                 <a:pPr>
-                  <a:defRPr sz="1800" b="1" i="0" u="none" strike="noStrike" kern="1200" baseline="0">
+                  <a:defRPr sz="3000" b="0" i="0" u="none" strike="noStrike" kern="1200" baseline="0">
                     <a:solidFill>
                       <a:schemeClr val="tx2"/>
                     </a:solidFill>
@@ -3242,7 +3251,7 @@
               <c:layout>
                 <c:manualLayout>
                   <c:x val="1.035935145404293E-3"/>
-                  <c:y val="-4.0448330251897466E-2"/>
+                  <c:y val="-4.6667929359556375E-2"/>
                 </c:manualLayout>
               </c:layout>
               <c:showLegendKey val="0"/>
@@ -3262,8 +3271,8 @@
               <c:idx val="2"/>
               <c:layout>
                 <c:manualLayout>
-                  <c:x val="5.0436150263703051E-2"/>
-                  <c:y val="-5.3657509939421351E-3"/>
+                  <c:x val="7.4979796906928409E-2"/>
+                  <c:y val="-1.0030450324686335E-2"/>
                 </c:manualLayout>
               </c:layout>
               <c:showLegendKey val="0"/>
@@ -3283,7 +3292,7 @@
               <c:idx val="3"/>
               <c:layout>
                 <c:manualLayout>
-                  <c:x val="5.3782898729126186E-2"/>
+                  <c:x val="7.8326545372351467E-2"/>
                   <c:y val="1.0690854214188547E-2"/>
                 </c:manualLayout>
               </c:layout>
@@ -3304,8 +3313,8 @@
               <c:idx val="5"/>
               <c:layout>
                 <c:manualLayout>
-                  <c:x val="-5.0560066690692393E-2"/>
-                  <c:y val="-2.3805882883724473E-3"/>
+                  <c:x val="-2.3071182450279983E-2"/>
+                  <c:y val="0.2121955809258608"/>
                 </c:manualLayout>
               </c:layout>
               <c:showLegendKey val="0"/>
@@ -3356,7 +3365,7 @@
               <a:lstStyle/>
               <a:p>
                 <a:pPr>
-                  <a:defRPr sz="2000" b="1" i="0" u="none" strike="noStrike" kern="1200" baseline="0">
+                  <a:defRPr sz="3200" b="0" i="0" u="none" strike="noStrike" kern="1200" baseline="0">
                     <a:solidFill>
                       <a:schemeClr val="tx2"/>
                     </a:solidFill>
@@ -3490,10 +3499,10 @@
         <c:manualLayout>
           <c:xMode val="edge"/>
           <c:yMode val="edge"/>
-          <c:x val="0.73340567331610096"/>
-          <c:y val="0.41189258360555303"/>
-          <c:w val="0.24952076114215846"/>
-          <c:h val="0.50661254799222644"/>
+          <c:x val="0.70985240804101946"/>
+          <c:y val="0.30149469944460688"/>
+          <c:w val="0.27988575878811267"/>
+          <c:h val="0.60923593326859904"/>
         </c:manualLayout>
       </c:layout>
       <c:overlay val="0"/>
@@ -3509,14 +3518,14 @@
         <a:lstStyle/>
         <a:p>
           <a:pPr>
-            <a:defRPr sz="1800" b="0" i="0" u="none" strike="noStrike" kern="1200" baseline="0">
+            <a:defRPr sz="2400" b="1" i="0" u="none" strike="noStrike" kern="1200" baseline="0">
               <a:ln>
                 <a:noFill/>
               </a:ln>
               <a:solidFill>
                 <a:schemeClr val="tx2"/>
               </a:solidFill>
-              <a:latin typeface="Arial Rounded MT Bold" panose="020F0704030504030204" pitchFamily="34" charset="0"/>
+              <a:latin typeface="+mn-lt"/>
               <a:ea typeface="+mn-ea"/>
               <a:cs typeface="+mn-cs"/>
             </a:defRPr>
@@ -3609,8 +3618,8 @@
         <c:manualLayout>
           <c:xMode val="edge"/>
           <c:yMode val="edge"/>
-          <c:x val="0.29473878122712377"/>
-          <c:y val="1.503712381072351E-2"/>
+          <c:x val="4.6384092803955008E-2"/>
+          <c:y val="1.6946189452367231E-2"/>
         </c:manualLayout>
       </c:layout>
       <c:overlay val="0"/>
@@ -3649,8 +3658,8 @@
           <c:layoutTarget val="inner"/>
           <c:xMode val="edge"/>
           <c:yMode val="edge"/>
-          <c:x val="0.10977160315144714"/>
-          <c:y val="0.23290873793308037"/>
+          <c:x val="0.1673663788848013"/>
+          <c:y val="0.22527245147628647"/>
           <c:w val="0.45117880630676721"/>
           <c:h val="0.7670912859571386"/>
         </c:manualLayout>
@@ -3747,8 +3756,8 @@
               <c:idx val="0"/>
               <c:layout>
                 <c:manualLayout>
-                  <c:x val="-5.4509127336191676E-2"/>
-                  <c:y val="4.2547661627585186E-2"/>
+                  <c:x val="-6.3929477908521992E-2"/>
+                  <c:y val="6.163831804402245E-2"/>
                 </c:manualLayout>
               </c:layout>
               <c:showLegendKey val="0"/>
@@ -3768,8 +3777,8 @@
               <c:idx val="1"/>
               <c:layout>
                 <c:manualLayout>
-                  <c:x val="-1.4554108479173577E-2"/>
-                  <c:y val="-5.2091937594898975E-2"/>
+                  <c:x val="-4.0870248068204775E-3"/>
+                  <c:y val="-7.6909790936267416E-2"/>
                 </c:manualLayout>
               </c:layout>
               <c:showLegendKey val="0"/>
@@ -3789,8 +3798,8 @@
               <c:idx val="2"/>
               <c:layout>
                 <c:manualLayout>
-                  <c:x val="5.8353951216653495E-2"/>
-                  <c:y val="2.4545773907401897E-3"/>
+                  <c:x val="7.3007899927439224E-2"/>
+                  <c:y val="-2.9999538517203231E-2"/>
                 </c:manualLayout>
               </c:layout>
               <c:showLegendKey val="0"/>
@@ -3810,8 +3819,8 @@
               <c:idx val="3"/>
               <c:layout>
                 <c:manualLayout>
-                  <c:x val="4.4596227730646559E-2"/>
-                  <c:y val="5.4819045379993506E-2"/>
+                  <c:x val="6.6577072836717766E-2"/>
+                  <c:y val="4.5273717171774801E-2"/>
                 </c:manualLayout>
               </c:layout>
               <c:showLegendKey val="0"/>
@@ -3841,14 +3850,14 @@
               <a:lstStyle/>
               <a:p>
                 <a:pPr>
-                  <a:defRPr sz="1800" b="0" i="0" u="none" strike="noStrike" kern="1200" baseline="0">
+                  <a:defRPr sz="2800" b="0" i="0" u="none" strike="noStrike" kern="1200" baseline="0">
                     <a:solidFill>
                       <a:schemeClr val="tx1">
                         <a:lumMod val="75000"/>
                         <a:lumOff val="25000"/>
                       </a:schemeClr>
                     </a:solidFill>
-                    <a:latin typeface="Arial Rounded MT Bold" panose="020F0704030504030204" pitchFamily="34" charset="0"/>
+                    <a:latin typeface="+mn-lt"/>
                     <a:ea typeface="+mn-ea"/>
                     <a:cs typeface="+mn-cs"/>
                   </a:defRPr>
@@ -4030,8 +4039,8 @@
               <c:idx val="0"/>
               <c:layout>
                 <c:manualLayout>
-                  <c:x val="5.7282448380650552E-2"/>
-                  <c:y val="-2.1000323338598081E-2"/>
+                  <c:x val="5.745010663237192E-2"/>
+                  <c:y val="-6.8726964379691238E-2"/>
                 </c:manualLayout>
               </c:layout>
               <c:showLegendKey val="0"/>
@@ -4051,8 +4060,8 @@
               <c:idx val="1"/>
               <c:layout>
                 <c:manualLayout>
-                  <c:x val="5.4769844154274432E-2"/>
-                  <c:y val="3.2727698543202531E-2"/>
+                  <c:x val="6.4284509641777426E-2"/>
+                  <c:y val="6.7090880092789476E-2"/>
                 </c:manualLayout>
               </c:layout>
               <c:showLegendKey val="0"/>
@@ -4072,8 +4081,8 @@
               <c:idx val="2"/>
               <c:layout>
                 <c:manualLayout>
-                  <c:x val="-6.2155904994525113E-2"/>
-                  <c:y val="3.8727876822875838E-2"/>
+                  <c:x val="-9.2814271565368089E-2"/>
+                  <c:y val="2.1546286048082158E-2"/>
                 </c:manualLayout>
               </c:layout>
               <c:showLegendKey val="0"/>
@@ -4093,8 +4102,8 @@
               <c:idx val="3"/>
               <c:layout>
                 <c:manualLayout>
-                  <c:x val="-7.8936095577520224E-2"/>
-                  <c:y val="3.0158426893834453E-2"/>
+                  <c:x val="-0.12650942301503518"/>
+                  <c:y val="0.12370264333437705"/>
                 </c:manualLayout>
               </c:layout>
               <c:showLegendKey val="0"/>
@@ -4124,14 +4133,14 @@
               <a:lstStyle/>
               <a:p>
                 <a:pPr>
-                  <a:defRPr sz="1800" b="0" i="0" u="none" strike="noStrike" kern="1200" baseline="0">
+                  <a:defRPr sz="3200" b="0" i="0" u="none" strike="noStrike" kern="1200" baseline="0">
                     <a:solidFill>
                       <a:schemeClr val="tx1">
                         <a:lumMod val="75000"/>
                         <a:lumOff val="25000"/>
                       </a:schemeClr>
                     </a:solidFill>
-                    <a:latin typeface="Arial Rounded MT Bold" panose="020F0704030504030204" pitchFamily="34" charset="0"/>
+                    <a:latin typeface="+mn-lt"/>
                     <a:ea typeface="+mn-ea"/>
                     <a:cs typeface="+mn-cs"/>
                   </a:defRPr>
@@ -4249,10 +4258,10 @@
         <c:manualLayout>
           <c:xMode val="edge"/>
           <c:yMode val="edge"/>
-          <c:x val="0.71114332981992723"/>
-          <c:y val="0.55785273106872058"/>
-          <c:w val="0.26242706744349448"/>
-          <c:h val="0.43177953929586144"/>
+          <c:x val="0.69422836895325535"/>
+          <c:y val="0.42230907051201594"/>
+          <c:w val="0.30577163104674471"/>
+          <c:h val="0.56732319985256607"/>
         </c:manualLayout>
       </c:layout>
       <c:overlay val="0"/>
@@ -4268,14 +4277,14 @@
         <a:lstStyle/>
         <a:p>
           <a:pPr>
-            <a:defRPr sz="1800" b="0" i="0" u="none" strike="noStrike" kern="1200" baseline="0">
+            <a:defRPr sz="2400" b="0" i="0" u="none" strike="noStrike" kern="1200" baseline="0">
               <a:solidFill>
                 <a:schemeClr val="tx1">
                   <a:lumMod val="65000"/>
                   <a:lumOff val="35000"/>
                 </a:schemeClr>
               </a:solidFill>
-              <a:latin typeface="Arial Rounded MT Bold" panose="020F0704030504030204" pitchFamily="34" charset="0"/>
+              <a:latin typeface="+mn-lt"/>
               <a:ea typeface="+mn-ea"/>
               <a:cs typeface="+mn-cs"/>
             </a:defRPr>
@@ -25650,19 +25659,19 @@
 <c:userShapes xmlns:c="http://schemas.openxmlformats.org/drawingml/2006/chart">
   <cdr:relSizeAnchor xmlns:cdr="http://schemas.openxmlformats.org/drawingml/2006/chartDrawing">
     <cdr:from>
-      <cdr:x>0.69133</cdr:x>
-      <cdr:y>0.15542</cdr:y>
+      <cdr:x>0.74923</cdr:x>
+      <cdr:y>0.10548</cdr:y>
     </cdr:from>
     <cdr:to>
-      <cdr:x>0.90926</cdr:x>
-      <cdr:y>0.32606</cdr:y>
+      <cdr:x>0.95988</cdr:x>
+      <cdr:y>0.2721</cdr:y>
     </cdr:to>
     <cdr:sp macro="" textlink="">
       <cdr:nvSpPr>
         <cdr:cNvPr id="2" name="TextBox 1">
           <a:extLst xmlns:a="http://schemas.openxmlformats.org/drawingml/2006/main">
             <a:ext uri="{FF2B5EF4-FFF2-40B4-BE49-F238E27FC236}">
-              <a16:creationId xmlns:a16="http://schemas.microsoft.com/office/drawing/2014/main" id="{E16907A7-8A70-4978-BFCD-4F3A305CD432}"/>
+              <a16:creationId xmlns:a16="http://schemas.microsoft.com/office/drawing/2014/main" id="{7C9402CF-5DE4-4978-897B-928A200C08B1}"/>
             </a:ext>
           </a:extLst>
         </cdr:cNvPr>
@@ -25670,8 +25679,8 @@
       </cdr:nvSpPr>
       <cdr:spPr>
         <a:xfrm xmlns:a="http://schemas.openxmlformats.org/drawingml/2006/main">
-          <a:off x="7956958" y="985705"/>
-          <a:ext cx="2508308" cy="1082179"/>
+          <a:off x="8968510" y="701964"/>
+          <a:ext cx="2521527" cy="1108835"/>
         </a:xfrm>
         <a:prstGeom xmlns:a="http://schemas.openxmlformats.org/drawingml/2006/main" prst="rect">
           <a:avLst/>
@@ -25683,28 +25692,95 @@
         </a:ln>
       </cdr:spPr>
       <cdr:txBody>
-        <a:bodyPr xmlns:a="http://schemas.openxmlformats.org/drawingml/2006/main" vertOverflow="clip" wrap="square" rtlCol="0"/>
-        <a:lstStyle xmlns:a="http://schemas.openxmlformats.org/drawingml/2006/main"/>
+        <a:bodyPr xmlns:a="http://schemas.openxmlformats.org/drawingml/2006/main" wrap="square" rtlCol="0"/>
+        <a:lstStyle xmlns:a="http://schemas.openxmlformats.org/drawingml/2006/main">
+          <a:lvl1pPr marL="0" indent="0">
+            <a:defRPr sz="1100">
+              <a:latin typeface="+mn-lt"/>
+              <a:ea typeface="+mn-ea"/>
+              <a:cs typeface="+mn-cs"/>
+            </a:defRPr>
+          </a:lvl1pPr>
+          <a:lvl2pPr marL="457200" indent="0">
+            <a:defRPr sz="1100">
+              <a:latin typeface="+mn-lt"/>
+              <a:ea typeface="+mn-ea"/>
+              <a:cs typeface="+mn-cs"/>
+            </a:defRPr>
+          </a:lvl2pPr>
+          <a:lvl3pPr marL="914400" indent="0">
+            <a:defRPr sz="1100">
+              <a:latin typeface="+mn-lt"/>
+              <a:ea typeface="+mn-ea"/>
+              <a:cs typeface="+mn-cs"/>
+            </a:defRPr>
+          </a:lvl3pPr>
+          <a:lvl4pPr marL="1371600" indent="0">
+            <a:defRPr sz="1100">
+              <a:latin typeface="+mn-lt"/>
+              <a:ea typeface="+mn-ea"/>
+              <a:cs typeface="+mn-cs"/>
+            </a:defRPr>
+          </a:lvl4pPr>
+          <a:lvl5pPr marL="1828800" indent="0">
+            <a:defRPr sz="1100">
+              <a:latin typeface="+mn-lt"/>
+              <a:ea typeface="+mn-ea"/>
+              <a:cs typeface="+mn-cs"/>
+            </a:defRPr>
+          </a:lvl5pPr>
+          <a:lvl6pPr marL="2286000" indent="0">
+            <a:defRPr sz="1100">
+              <a:latin typeface="+mn-lt"/>
+              <a:ea typeface="+mn-ea"/>
+              <a:cs typeface="+mn-cs"/>
+            </a:defRPr>
+          </a:lvl6pPr>
+          <a:lvl7pPr marL="2743200" indent="0">
+            <a:defRPr sz="1100">
+              <a:latin typeface="+mn-lt"/>
+              <a:ea typeface="+mn-ea"/>
+              <a:cs typeface="+mn-cs"/>
+            </a:defRPr>
+          </a:lvl7pPr>
+          <a:lvl8pPr marL="3200400" indent="0">
+            <a:defRPr sz="1100">
+              <a:latin typeface="+mn-lt"/>
+              <a:ea typeface="+mn-ea"/>
+              <a:cs typeface="+mn-cs"/>
+            </a:defRPr>
+          </a:lvl8pPr>
+          <a:lvl9pPr marL="3657600" indent="0">
+            <a:defRPr sz="1100">
+              <a:latin typeface="+mn-lt"/>
+              <a:ea typeface="+mn-ea"/>
+              <a:cs typeface="+mn-cs"/>
+            </a:defRPr>
+          </a:lvl9pPr>
+        </a:lstStyle>
         <a:p xmlns:a="http://schemas.openxmlformats.org/drawingml/2006/main">
           <a:pPr algn="ctr"/>
           <a:r>
-            <a:rPr lang="en-IN" sz="3200" b="1" dirty="0"/>
+            <a:rPr lang="en-IN" sz="3200" b="1" dirty="0">
+              <a:latin typeface="+mn-lt"/>
+            </a:rPr>
             <a:t>22 Students</a:t>
           </a:r>
         </a:p>
         <a:p xmlns:a="http://schemas.openxmlformats.org/drawingml/2006/main">
           <a:pPr algn="ctr"/>
           <a:r>
-            <a:rPr lang="en-IN" sz="3200" b="1" dirty="0"/>
-            <a:t>₹7,31,737</a:t>
+            <a:rPr lang="en-IN" sz="3200" b="1" dirty="0">
+              <a:latin typeface="+mn-lt"/>
+            </a:rPr>
+            <a:t>₹7,17,572</a:t>
           </a:r>
-          <a:endParaRPr lang="en-IN" sz="3200" b="1" dirty="0">
-            <a:latin typeface="Arial" panose="020B0604020202020204" pitchFamily="34" charset="0"/>
-          </a:endParaRPr>
         </a:p>
         <a:p xmlns:a="http://schemas.openxmlformats.org/drawingml/2006/main">
           <a:pPr algn="ctr"/>
-          <a:endParaRPr lang="en-IN" sz="3200" b="1" dirty="0"/>
+          <a:endParaRPr lang="en-IN" sz="3200" b="1" dirty="0">
+            <a:latin typeface="+mn-lt"/>
+          </a:endParaRPr>
         </a:p>
       </cdr:txBody>
     </cdr:sp>
@@ -25754,12 +25830,12 @@
   </cdr:relSizeAnchor>
   <cdr:relSizeAnchor xmlns:cdr="http://schemas.openxmlformats.org/drawingml/2006/chartDrawing">
     <cdr:from>
-      <cdr:x>0.08284</cdr:x>
-      <cdr:y>0.23091</cdr:y>
+      <cdr:x>0.11576</cdr:x>
+      <cdr:y>0.24631</cdr:y>
     </cdr:from>
     <cdr:to>
-      <cdr:x>0.37672</cdr:x>
-      <cdr:y>0.45395</cdr:y>
+      <cdr:x>0.40964</cdr:x>
+      <cdr:y>0.46935</cdr:y>
     </cdr:to>
     <cdr:sp macro="" textlink="">
       <cdr:nvSpPr>
@@ -25774,8 +25850,8 @@
       </cdr:nvSpPr>
       <cdr:spPr>
         <a:xfrm xmlns:a="http://schemas.openxmlformats.org/drawingml/2006/main">
-          <a:off x="1071658" y="1886040"/>
-          <a:ext cx="3801672" cy="1821730"/>
+          <a:off x="1510756" y="2011808"/>
+          <a:ext cx="3835423" cy="1821730"/>
         </a:xfrm>
         <a:prstGeom xmlns:a="http://schemas.openxmlformats.org/drawingml/2006/main" prst="rect">
           <a:avLst/>
@@ -25786,38 +25862,38 @@
         <a:lstStyle xmlns:a="http://schemas.openxmlformats.org/drawingml/2006/main"/>
         <a:p xmlns:a="http://schemas.openxmlformats.org/drawingml/2006/main">
           <a:r>
-            <a:rPr lang="en-IN" sz="2800" b="0" dirty="0"/>
+            <a:rPr lang="en-IN" sz="3000" b="0" dirty="0"/>
             <a:t>Donations</a:t>
           </a:r>
           <a:r>
-            <a:rPr lang="en-IN" sz="2800" b="0" baseline="0" dirty="0"/>
+            <a:rPr lang="en-IN" sz="3000" b="0" baseline="0" dirty="0"/>
             <a:t> for </a:t>
           </a:r>
         </a:p>
         <a:p xmlns:a="http://schemas.openxmlformats.org/drawingml/2006/main">
           <a:r>
-            <a:rPr lang="en-IN" sz="2800" b="0" baseline="0" dirty="0"/>
+            <a:rPr lang="en-IN" sz="3000" b="0" baseline="0" dirty="0"/>
             <a:t>short term </a:t>
           </a:r>
         </a:p>
         <a:p xmlns:a="http://schemas.openxmlformats.org/drawingml/2006/main">
           <a:r>
-            <a:rPr lang="en-IN" sz="2800" b="0" baseline="0" dirty="0"/>
+            <a:rPr lang="en-IN" sz="3000" b="0" baseline="0" dirty="0"/>
             <a:t>reserve</a:t>
           </a:r>
-          <a:endParaRPr lang="en-IN" sz="2800" b="0" dirty="0"/>
+          <a:endParaRPr lang="en-IN" sz="3000" b="0" dirty="0"/>
         </a:p>
       </cdr:txBody>
     </cdr:sp>
   </cdr:relSizeAnchor>
   <cdr:relSizeAnchor xmlns:cdr="http://schemas.openxmlformats.org/drawingml/2006/chartDrawing">
     <cdr:from>
-      <cdr:x>0.38119</cdr:x>
-      <cdr:y>0.53202</cdr:y>
+      <cdr:x>0.39221</cdr:x>
+      <cdr:y>0.5197</cdr:y>
     </cdr:from>
     <cdr:to>
-      <cdr:x>0.6188</cdr:x>
-      <cdr:y>0.67972</cdr:y>
+      <cdr:x>0.62982</cdr:x>
+      <cdr:y>0.6674</cdr:y>
     </cdr:to>
     <cdr:sp macro="" textlink="">
       <cdr:nvSpPr>
@@ -25832,8 +25908,8 @@
       </cdr:nvSpPr>
       <cdr:spPr>
         <a:xfrm xmlns:a="http://schemas.openxmlformats.org/drawingml/2006/main">
-          <a:off x="4931191" y="4345410"/>
-          <a:ext cx="3073755" cy="1206374"/>
+          <a:off x="5118668" y="4244735"/>
+          <a:ext cx="3101044" cy="1206373"/>
         </a:xfrm>
         <a:prstGeom xmlns:a="http://schemas.openxmlformats.org/drawingml/2006/main" prst="rect">
           <a:avLst/>
@@ -25908,32 +25984,32 @@
         </a:lstStyle>
         <a:p xmlns:a="http://schemas.openxmlformats.org/drawingml/2006/main">
           <a:r>
-            <a:rPr lang="en-IN" sz="2800" dirty="0"/>
+            <a:rPr lang="en-IN" sz="3000" dirty="0"/>
             <a:t>Donations</a:t>
           </a:r>
           <a:r>
-            <a:rPr lang="en-IN" sz="2800" baseline="0" dirty="0"/>
+            <a:rPr lang="en-IN" sz="3000" baseline="0" dirty="0"/>
             <a:t> </a:t>
           </a:r>
         </a:p>
         <a:p xmlns:a="http://schemas.openxmlformats.org/drawingml/2006/main">
           <a:r>
-            <a:rPr lang="en-IN" sz="2800" baseline="0" dirty="0"/>
+            <a:rPr lang="en-IN" sz="3000" baseline="0" dirty="0"/>
             <a:t>for corpus</a:t>
           </a:r>
-          <a:endParaRPr lang="en-IN" sz="2800" dirty="0"/>
+          <a:endParaRPr lang="en-IN" sz="3000" dirty="0"/>
         </a:p>
       </cdr:txBody>
     </cdr:sp>
   </cdr:relSizeAnchor>
   <cdr:relSizeAnchor xmlns:cdr="http://schemas.openxmlformats.org/drawingml/2006/chartDrawing">
     <cdr:from>
-      <cdr:x>0.75112</cdr:x>
-      <cdr:y>0.23642</cdr:y>
+      <cdr:x>0.71833</cdr:x>
+      <cdr:y>0.0882</cdr:y>
     </cdr:from>
     <cdr:to>
       <cdr:x>1</cdr:x>
-      <cdr:y>0.42847</cdr:y>
+      <cdr:y>0.28825</cdr:y>
     </cdr:to>
     <cdr:sp macro="" textlink="">
       <cdr:nvSpPr>
@@ -25948,55 +26024,60 @@
       </cdr:nvSpPr>
       <cdr:spPr>
         <a:xfrm xmlns:a="http://schemas.openxmlformats.org/drawingml/2006/main">
-          <a:off x="9716654" y="1930991"/>
-          <a:ext cx="3219484" cy="1568673"/>
+          <a:off x="9374909" y="720373"/>
+          <a:ext cx="3676073" cy="1633984"/>
         </a:xfrm>
         <a:prstGeom xmlns:a="http://schemas.openxmlformats.org/drawingml/2006/main" prst="rect">
           <a:avLst/>
         </a:prstGeom>
+        <a:ln xmlns:a="http://schemas.openxmlformats.org/drawingml/2006/main">
+          <a:solidFill>
+            <a:schemeClr val="accent1"/>
+          </a:solidFill>
+        </a:ln>
       </cdr:spPr>
       <cdr:txBody>
         <a:bodyPr xmlns:a="http://schemas.openxmlformats.org/drawingml/2006/main" vertOverflow="clip" wrap="square" rtlCol="0"/>
         <a:lstStyle xmlns:a="http://schemas.openxmlformats.org/drawingml/2006/main"/>
         <a:p xmlns:a="http://schemas.openxmlformats.org/drawingml/2006/main">
           <a:r>
-            <a:rPr lang="en-IN" sz="2000" b="1" dirty="0">
-              <a:latin typeface="Bahnschrift SemiBold SemiConden" panose="020B0502040204020203" pitchFamily="34" charset="0"/>
+            <a:rPr lang="en-IN" sz="2400" b="0" dirty="0">
+              <a:latin typeface="+mn-lt"/>
             </a:rPr>
             <a:t>Branch</a:t>
           </a:r>
         </a:p>
         <a:p xmlns:a="http://schemas.openxmlformats.org/drawingml/2006/main">
           <a:r>
-            <a:rPr lang="en-IN" sz="2000" b="1" dirty="0">
-              <a:latin typeface="Bahnschrift SemiBold SemiConden" panose="020B0502040204020203" pitchFamily="34" charset="0"/>
+            <a:rPr lang="en-IN" sz="2400" b="0" dirty="0">
+              <a:latin typeface="+mn-lt"/>
             </a:rPr>
             <a:t># contributed </a:t>
           </a:r>
         </a:p>
         <a:p xmlns:a="http://schemas.openxmlformats.org/drawingml/2006/main">
           <a:r>
-            <a:rPr lang="en-IN" sz="2000" b="1" dirty="0">
-              <a:latin typeface="Bahnschrift SemiBold SemiConden" panose="020B0502040204020203" pitchFamily="34" charset="0"/>
+            <a:rPr lang="en-IN" sz="2400" b="0" dirty="0">
+              <a:latin typeface="+mn-lt"/>
             </a:rPr>
             <a:t>total donations </a:t>
           </a:r>
         </a:p>
         <a:p xmlns:a="http://schemas.openxmlformats.org/drawingml/2006/main">
           <a:r>
-            <a:rPr lang="en-IN" sz="2000" b="1" dirty="0">
-              <a:latin typeface="Bahnschrift SemiBold SemiConden" panose="020B0502040204020203" pitchFamily="34" charset="0"/>
+            <a:rPr lang="en-IN" sz="2400" b="0" dirty="0">
+              <a:latin typeface="+mn-lt"/>
             </a:rPr>
             <a:t>percentage/total</a:t>
           </a:r>
           <a:r>
-            <a:rPr lang="en-IN" sz="2000" b="1" baseline="0" dirty="0">
-              <a:latin typeface="Bahnschrift SemiBold SemiConden" panose="020B0502040204020203" pitchFamily="34" charset="0"/>
+            <a:rPr lang="en-IN" sz="2400" b="0" baseline="0" dirty="0">
+              <a:latin typeface="+mn-lt"/>
             </a:rPr>
             <a:t> donations</a:t>
           </a:r>
-          <a:endParaRPr lang="en-IN" sz="2000" b="1" dirty="0">
-            <a:latin typeface="Bahnschrift SemiBold SemiConden" panose="020B0502040204020203" pitchFamily="34" charset="0"/>
+          <a:endParaRPr lang="en-IN" sz="2400" b="0" dirty="0">
+            <a:latin typeface="+mn-lt"/>
           </a:endParaRPr>
         </a:p>
       </cdr:txBody>
@@ -26009,19 +26090,19 @@
 <c:userShapes xmlns:c="http://schemas.openxmlformats.org/drawingml/2006/chart">
   <cdr:relSizeAnchor xmlns:cdr="http://schemas.openxmlformats.org/drawingml/2006/chartDrawing">
     <cdr:from>
-      <cdr:x>0.73324</cdr:x>
-      <cdr:y>0.36762</cdr:y>
+      <cdr:x>0.1166</cdr:x>
+      <cdr:y>0.14801</cdr:y>
     </cdr:from>
     <cdr:to>
-      <cdr:x>0.97346</cdr:x>
-      <cdr:y>0.58985</cdr:y>
+      <cdr:x>0.32922</cdr:x>
+      <cdr:y>0.36694</cdr:y>
     </cdr:to>
     <cdr:sp macro="" textlink="">
       <cdr:nvSpPr>
-        <cdr:cNvPr id="2" name="TextBox 1">
+        <cdr:cNvPr id="3" name="TextBox 1">
           <a:extLst xmlns:a="http://schemas.openxmlformats.org/drawingml/2006/main">
             <a:ext uri="{FF2B5EF4-FFF2-40B4-BE49-F238E27FC236}">
-              <a16:creationId xmlns:a16="http://schemas.microsoft.com/office/drawing/2014/main" id="{4B01AAB4-696E-47B4-BC3D-52C8AE30F561}"/>
+              <a16:creationId xmlns:a16="http://schemas.microsoft.com/office/drawing/2014/main" id="{DB2943D9-0336-43CB-A7D7-8E9ADAE884B7}"/>
             </a:ext>
           </a:extLst>
         </cdr:cNvPr>
@@ -26029,8 +26110,8 @@
       </cdr:nvSpPr>
       <cdr:spPr>
         <a:xfrm xmlns:a="http://schemas.openxmlformats.org/drawingml/2006/main">
-          <a:off x="8808440" y="2445590"/>
-          <a:ext cx="2885813" cy="1478360"/>
+          <a:off x="1414787" y="984617"/>
+          <a:ext cx="2579777" cy="1456409"/>
         </a:xfrm>
         <a:prstGeom xmlns:a="http://schemas.openxmlformats.org/drawingml/2006/main" prst="rect">
           <a:avLst/>
@@ -26105,75 +26186,45 @@
         </a:lstStyle>
         <a:p xmlns:a="http://schemas.openxmlformats.org/drawingml/2006/main">
           <a:r>
-            <a:rPr lang="en-IN" sz="2000" b="1" dirty="0">
-              <a:latin typeface="Bahnschrift SemiBold SemiConden" panose="020B0502040204020203" pitchFamily="34" charset="0"/>
-            </a:rPr>
-            <a:t>Branch </a:t>
+            <a:rPr lang="en-IN" sz="3000" b="0" dirty="0"/>
+            <a:t>Donations</a:t>
+          </a:r>
+          <a:r>
+            <a:rPr lang="en-IN" sz="3000" b="0" baseline="0" dirty="0"/>
+            <a:t> for </a:t>
           </a:r>
         </a:p>
         <a:p xmlns:a="http://schemas.openxmlformats.org/drawingml/2006/main">
           <a:r>
-            <a:rPr lang="en-IN" sz="2000" b="1" dirty="0">
-              <a:latin typeface="Bahnschrift SemiBold SemiConden" panose="020B0502040204020203" pitchFamily="34" charset="0"/>
-            </a:rPr>
-            <a:t># </a:t>
-          </a:r>
-          <a:r>
-            <a:rPr lang="en-IN" sz="1800" b="1" dirty="0">
-              <a:latin typeface="Bahnschrift SemiBold SemiConden" panose="020B0502040204020203" pitchFamily="34" charset="0"/>
-            </a:rPr>
-            <a:t>contributed</a:t>
-          </a:r>
-          <a:r>
-            <a:rPr lang="en-IN" sz="2000" b="1" dirty="0">
-              <a:latin typeface="Bahnschrift SemiBold SemiConden" panose="020B0502040204020203" pitchFamily="34" charset="0"/>
-            </a:rPr>
-            <a:t> </a:t>
+            <a:rPr lang="en-IN" sz="3000" b="0" baseline="0" dirty="0"/>
+            <a:t>short term </a:t>
           </a:r>
         </a:p>
         <a:p xmlns:a="http://schemas.openxmlformats.org/drawingml/2006/main">
           <a:r>
-            <a:rPr lang="en-IN" sz="2000" b="1" dirty="0">
-              <a:latin typeface="Bahnschrift SemiBold SemiConden" panose="020B0502040204020203" pitchFamily="34" charset="0"/>
-            </a:rPr>
-            <a:t>total donations </a:t>
+            <a:rPr lang="en-IN" sz="3000" b="0" baseline="0" dirty="0"/>
+            <a:t>reserve</a:t>
           </a:r>
-        </a:p>
-        <a:p xmlns:a="http://schemas.openxmlformats.org/drawingml/2006/main">
-          <a:r>
-            <a:rPr lang="en-IN" sz="2000" b="1" dirty="0">
-              <a:latin typeface="Bahnschrift SemiBold SemiConden" panose="020B0502040204020203" pitchFamily="34" charset="0"/>
-            </a:rPr>
-            <a:t>percentage/total</a:t>
-          </a:r>
-          <a:r>
-            <a:rPr lang="en-IN" sz="2000" b="1" baseline="0" dirty="0">
-              <a:latin typeface="Bahnschrift SemiBold SemiConden" panose="020B0502040204020203" pitchFamily="34" charset="0"/>
-            </a:rPr>
-            <a:t> donations</a:t>
-          </a:r>
-          <a:endParaRPr lang="en-IN" sz="2000" b="1" dirty="0">
-            <a:latin typeface="Bahnschrift SemiBold SemiConden" panose="020B0502040204020203" pitchFamily="34" charset="0"/>
-          </a:endParaRPr>
+          <a:endParaRPr lang="en-IN" sz="3000" b="0" dirty="0"/>
         </a:p>
       </cdr:txBody>
     </cdr:sp>
   </cdr:relSizeAnchor>
   <cdr:relSizeAnchor xmlns:cdr="http://schemas.openxmlformats.org/drawingml/2006/chartDrawing">
     <cdr:from>
-      <cdr:x>0.11539</cdr:x>
-      <cdr:y>0.15495</cdr:y>
+      <cdr:x>0.40183</cdr:x>
+      <cdr:y>0.58026</cdr:y>
     </cdr:from>
     <cdr:to>
-      <cdr:x>0.32801</cdr:x>
-      <cdr:y>0.3396</cdr:y>
+      <cdr:x>0.57903</cdr:x>
+      <cdr:y>0.73209</cdr:y>
     </cdr:to>
     <cdr:sp macro="" textlink="">
       <cdr:nvSpPr>
-        <cdr:cNvPr id="3" name="TextBox 1">
+        <cdr:cNvPr id="4" name="TextBox 1">
           <a:extLst xmlns:a="http://schemas.openxmlformats.org/drawingml/2006/main">
             <a:ext uri="{FF2B5EF4-FFF2-40B4-BE49-F238E27FC236}">
-              <a16:creationId xmlns:a16="http://schemas.microsoft.com/office/drawing/2014/main" id="{DB2943D9-0336-43CB-A7D7-8E9ADAE884B7}"/>
+              <a16:creationId xmlns:a16="http://schemas.microsoft.com/office/drawing/2014/main" id="{27CF571E-E261-41CB-8CBE-2A8C3D35FCF8}"/>
             </a:ext>
           </a:extLst>
         </cdr:cNvPr>
@@ -26181,8 +26232,8 @@
       </cdr:nvSpPr>
       <cdr:spPr>
         <a:xfrm xmlns:a="http://schemas.openxmlformats.org/drawingml/2006/main">
-          <a:off x="1386198" y="1030773"/>
-          <a:ext cx="2554211" cy="1228378"/>
+          <a:off x="4875478" y="3860167"/>
+          <a:ext cx="2150088" cy="1010023"/>
         </a:xfrm>
         <a:prstGeom xmlns:a="http://schemas.openxmlformats.org/drawingml/2006/main" prst="rect">
           <a:avLst/>
@@ -26257,142 +26308,20 @@
         </a:lstStyle>
         <a:p xmlns:a="http://schemas.openxmlformats.org/drawingml/2006/main">
           <a:r>
-            <a:rPr lang="en-IN" sz="2400" b="0" dirty="0"/>
+            <a:rPr lang="en-IN" sz="3000" b="0" dirty="0"/>
             <a:t>Donations</a:t>
           </a:r>
           <a:r>
-            <a:rPr lang="en-IN" sz="2400" b="0" baseline="0" dirty="0"/>
-            <a:t> for </a:t>
-          </a:r>
-        </a:p>
-        <a:p xmlns:a="http://schemas.openxmlformats.org/drawingml/2006/main">
-          <a:r>
-            <a:rPr lang="en-IN" sz="2400" b="0" baseline="0" dirty="0"/>
-            <a:t>short term </a:t>
-          </a:r>
-        </a:p>
-        <a:p xmlns:a="http://schemas.openxmlformats.org/drawingml/2006/main">
-          <a:r>
-            <a:rPr lang="en-IN" sz="2400" b="0" baseline="0" dirty="0"/>
-            <a:t>reserve</a:t>
-          </a:r>
-          <a:endParaRPr lang="en-IN" sz="2400" b="0" dirty="0"/>
-        </a:p>
-      </cdr:txBody>
-    </cdr:sp>
-  </cdr:relSizeAnchor>
-  <cdr:relSizeAnchor xmlns:cdr="http://schemas.openxmlformats.org/drawingml/2006/chartDrawing">
-    <cdr:from>
-      <cdr:x>0.36072</cdr:x>
-      <cdr:y>0.62469</cdr:y>
-    </cdr:from>
-    <cdr:to>
-      <cdr:x>0.4872</cdr:x>
-      <cdr:y>0.74653</cdr:y>
-    </cdr:to>
-    <cdr:sp macro="" textlink="">
-      <cdr:nvSpPr>
-        <cdr:cNvPr id="4" name="TextBox 1">
-          <a:extLst xmlns:a="http://schemas.openxmlformats.org/drawingml/2006/main">
-            <a:ext uri="{FF2B5EF4-FFF2-40B4-BE49-F238E27FC236}">
-              <a16:creationId xmlns:a16="http://schemas.microsoft.com/office/drawing/2014/main" id="{27CF571E-E261-41CB-8CBE-2A8C3D35FCF8}"/>
-            </a:ext>
-          </a:extLst>
-        </cdr:cNvPr>
-        <cdr:cNvSpPr txBox="1"/>
-      </cdr:nvSpPr>
-      <cdr:spPr>
-        <a:xfrm xmlns:a="http://schemas.openxmlformats.org/drawingml/2006/main">
-          <a:off x="4333301" y="4155699"/>
-          <a:ext cx="1519417" cy="810583"/>
-        </a:xfrm>
-        <a:prstGeom xmlns:a="http://schemas.openxmlformats.org/drawingml/2006/main" prst="rect">
-          <a:avLst/>
-        </a:prstGeom>
-      </cdr:spPr>
-      <cdr:txBody>
-        <a:bodyPr xmlns:a="http://schemas.openxmlformats.org/drawingml/2006/main" wrap="square" rtlCol="0"/>
-        <a:lstStyle xmlns:a="http://schemas.openxmlformats.org/drawingml/2006/main">
-          <a:lvl1pPr marL="0" indent="0">
-            <a:defRPr sz="1100">
-              <a:latin typeface="+mn-lt"/>
-              <a:ea typeface="+mn-ea"/>
-              <a:cs typeface="+mn-cs"/>
-            </a:defRPr>
-          </a:lvl1pPr>
-          <a:lvl2pPr marL="457200" indent="0">
-            <a:defRPr sz="1100">
-              <a:latin typeface="+mn-lt"/>
-              <a:ea typeface="+mn-ea"/>
-              <a:cs typeface="+mn-cs"/>
-            </a:defRPr>
-          </a:lvl2pPr>
-          <a:lvl3pPr marL="914400" indent="0">
-            <a:defRPr sz="1100">
-              <a:latin typeface="+mn-lt"/>
-              <a:ea typeface="+mn-ea"/>
-              <a:cs typeface="+mn-cs"/>
-            </a:defRPr>
-          </a:lvl3pPr>
-          <a:lvl4pPr marL="1371600" indent="0">
-            <a:defRPr sz="1100">
-              <a:latin typeface="+mn-lt"/>
-              <a:ea typeface="+mn-ea"/>
-              <a:cs typeface="+mn-cs"/>
-            </a:defRPr>
-          </a:lvl4pPr>
-          <a:lvl5pPr marL="1828800" indent="0">
-            <a:defRPr sz="1100">
-              <a:latin typeface="+mn-lt"/>
-              <a:ea typeface="+mn-ea"/>
-              <a:cs typeface="+mn-cs"/>
-            </a:defRPr>
-          </a:lvl5pPr>
-          <a:lvl6pPr marL="2286000" indent="0">
-            <a:defRPr sz="1100">
-              <a:latin typeface="+mn-lt"/>
-              <a:ea typeface="+mn-ea"/>
-              <a:cs typeface="+mn-cs"/>
-            </a:defRPr>
-          </a:lvl6pPr>
-          <a:lvl7pPr marL="2743200" indent="0">
-            <a:defRPr sz="1100">
-              <a:latin typeface="+mn-lt"/>
-              <a:ea typeface="+mn-ea"/>
-              <a:cs typeface="+mn-cs"/>
-            </a:defRPr>
-          </a:lvl7pPr>
-          <a:lvl8pPr marL="3200400" indent="0">
-            <a:defRPr sz="1100">
-              <a:latin typeface="+mn-lt"/>
-              <a:ea typeface="+mn-ea"/>
-              <a:cs typeface="+mn-cs"/>
-            </a:defRPr>
-          </a:lvl8pPr>
-          <a:lvl9pPr marL="3657600" indent="0">
-            <a:defRPr sz="1100">
-              <a:latin typeface="+mn-lt"/>
-              <a:ea typeface="+mn-ea"/>
-              <a:cs typeface="+mn-cs"/>
-            </a:defRPr>
-          </a:lvl9pPr>
-        </a:lstStyle>
-        <a:p xmlns:a="http://schemas.openxmlformats.org/drawingml/2006/main">
-          <a:r>
-            <a:rPr lang="en-IN" sz="2400" dirty="0"/>
-            <a:t>Donations</a:t>
-          </a:r>
-          <a:r>
-            <a:rPr lang="en-IN" sz="2400" baseline="0" dirty="0"/>
+            <a:rPr lang="en-IN" sz="3000" b="0" baseline="0" dirty="0"/>
             <a:t> </a:t>
           </a:r>
         </a:p>
         <a:p xmlns:a="http://schemas.openxmlformats.org/drawingml/2006/main">
           <a:r>
-            <a:rPr lang="en-IN" sz="2400" baseline="0" dirty="0"/>
+            <a:rPr lang="en-IN" sz="3000" b="0" baseline="0" dirty="0"/>
             <a:t>for corpus</a:t>
           </a:r>
-          <a:endParaRPr lang="en-IN" sz="2400" dirty="0"/>
+          <a:endParaRPr lang="en-IN" sz="3000" b="0" dirty="0"/>
         </a:p>
       </cdr:txBody>
     </cdr:sp>
@@ -26549,7 +26478,7 @@
           <a:p>
             <a:fld id="{A88ED8C5-EA9B-4755-BFCA-84BA78378920}" type="datetimeFigureOut">
               <a:rPr lang="en-IN" smtClean="0"/>
-              <a:t>27-01-2019</a:t>
+              <a:t>30-01-2019</a:t>
             </a:fld>
             <a:endParaRPr lang="en-IN"/>
           </a:p>
@@ -26749,7 +26678,7 @@
           <a:p>
             <a:fld id="{A88ED8C5-EA9B-4755-BFCA-84BA78378920}" type="datetimeFigureOut">
               <a:rPr lang="en-IN" smtClean="0"/>
-              <a:t>27-01-2019</a:t>
+              <a:t>30-01-2019</a:t>
             </a:fld>
             <a:endParaRPr lang="en-IN"/>
           </a:p>
@@ -26959,7 +26888,7 @@
           <a:p>
             <a:fld id="{A88ED8C5-EA9B-4755-BFCA-84BA78378920}" type="datetimeFigureOut">
               <a:rPr lang="en-IN" smtClean="0"/>
-              <a:t>27-01-2019</a:t>
+              <a:t>30-01-2019</a:t>
             </a:fld>
             <a:endParaRPr lang="en-IN"/>
           </a:p>
@@ -27159,7 +27088,7 @@
           <a:p>
             <a:fld id="{A88ED8C5-EA9B-4755-BFCA-84BA78378920}" type="datetimeFigureOut">
               <a:rPr lang="en-IN" smtClean="0"/>
-              <a:t>27-01-2019</a:t>
+              <a:t>30-01-2019</a:t>
             </a:fld>
             <a:endParaRPr lang="en-IN"/>
           </a:p>
@@ -27435,7 +27364,7 @@
           <a:p>
             <a:fld id="{A88ED8C5-EA9B-4755-BFCA-84BA78378920}" type="datetimeFigureOut">
               <a:rPr lang="en-IN" smtClean="0"/>
-              <a:t>27-01-2019</a:t>
+              <a:t>30-01-2019</a:t>
             </a:fld>
             <a:endParaRPr lang="en-IN"/>
           </a:p>
@@ -27703,7 +27632,7 @@
           <a:p>
             <a:fld id="{A88ED8C5-EA9B-4755-BFCA-84BA78378920}" type="datetimeFigureOut">
               <a:rPr lang="en-IN" smtClean="0"/>
-              <a:t>27-01-2019</a:t>
+              <a:t>30-01-2019</a:t>
             </a:fld>
             <a:endParaRPr lang="en-IN"/>
           </a:p>
@@ -28118,7 +28047,7 @@
           <a:p>
             <a:fld id="{A88ED8C5-EA9B-4755-BFCA-84BA78378920}" type="datetimeFigureOut">
               <a:rPr lang="en-IN" smtClean="0"/>
-              <a:t>27-01-2019</a:t>
+              <a:t>30-01-2019</a:t>
             </a:fld>
             <a:endParaRPr lang="en-IN"/>
           </a:p>
@@ -28260,7 +28189,7 @@
           <a:p>
             <a:fld id="{A88ED8C5-EA9B-4755-BFCA-84BA78378920}" type="datetimeFigureOut">
               <a:rPr lang="en-IN" smtClean="0"/>
-              <a:t>27-01-2019</a:t>
+              <a:t>30-01-2019</a:t>
             </a:fld>
             <a:endParaRPr lang="en-IN"/>
           </a:p>
@@ -28373,7 +28302,7 @@
           <a:p>
             <a:fld id="{A88ED8C5-EA9B-4755-BFCA-84BA78378920}" type="datetimeFigureOut">
               <a:rPr lang="en-IN" smtClean="0"/>
-              <a:t>27-01-2019</a:t>
+              <a:t>30-01-2019</a:t>
             </a:fld>
             <a:endParaRPr lang="en-IN"/>
           </a:p>
@@ -28686,7 +28615,7 @@
           <a:p>
             <a:fld id="{A88ED8C5-EA9B-4755-BFCA-84BA78378920}" type="datetimeFigureOut">
               <a:rPr lang="en-IN" smtClean="0"/>
-              <a:t>27-01-2019</a:t>
+              <a:t>30-01-2019</a:t>
             </a:fld>
             <a:endParaRPr lang="en-IN"/>
           </a:p>
@@ -28975,7 +28904,7 @@
           <a:p>
             <a:fld id="{A88ED8C5-EA9B-4755-BFCA-84BA78378920}" type="datetimeFigureOut">
               <a:rPr lang="en-IN" smtClean="0"/>
-              <a:t>27-01-2019</a:t>
+              <a:t>30-01-2019</a:t>
             </a:fld>
             <a:endParaRPr lang="en-IN"/>
           </a:p>
@@ -29218,7 +29147,7 @@
           <a:p>
             <a:fld id="{A88ED8C5-EA9B-4755-BFCA-84BA78378920}" type="datetimeFigureOut">
               <a:rPr lang="en-IN" smtClean="0"/>
-              <a:t>27-01-2019</a:t>
+              <a:t>30-01-2019</a:t>
             </a:fld>
             <a:endParaRPr lang="en-IN"/>
           </a:p>
@@ -29869,1102 +29798,6 @@
           <a:chExt cx="0" cy="0"/>
         </a:xfrm>
       </p:grpSpPr>
-      <p:graphicFrame>
-        <p:nvGraphicFramePr>
-          <p:cNvPr id="4" name="Table 3">
-            <a:extLst>
-              <a:ext uri="{FF2B5EF4-FFF2-40B4-BE49-F238E27FC236}">
-                <a16:creationId xmlns:a16="http://schemas.microsoft.com/office/drawing/2014/main" id="{8BA27396-326B-47ED-A9C5-2542F4EA5617}"/>
-              </a:ext>
-            </a:extLst>
-          </p:cNvPr>
-          <p:cNvGraphicFramePr>
-            <a:graphicFrameLocks noGrp="1"/>
-          </p:cNvGraphicFramePr>
-          <p:nvPr>
-            <p:extLst>
-              <p:ext uri="{D42A27DB-BD31-4B8C-83A1-F6EECF244321}">
-                <p14:modId xmlns:p14="http://schemas.microsoft.com/office/powerpoint/2010/main" val="2700124490"/>
-              </p:ext>
-            </p:extLst>
-          </p:nvPr>
-        </p:nvGraphicFramePr>
-        <p:xfrm>
-          <a:off x="402672" y="780176"/>
-          <a:ext cx="11501308" cy="5041784"/>
-        </p:xfrm>
-        <a:graphic>
-          <a:graphicData uri="http://schemas.openxmlformats.org/drawingml/2006/table">
-            <a:tbl>
-              <a:tblPr>
-                <a:effectLst>
-                  <a:outerShdw blurRad="50800" dist="38100" dir="5400000" algn="t" rotWithShape="0">
-                    <a:prstClr val="black">
-                      <a:alpha val="40000"/>
-                    </a:prstClr>
-                  </a:outerShdw>
-                </a:effectLst>
-                <a:tableStyleId>{F5AB1C69-6EDB-4FF4-983F-18BD219EF322}</a:tableStyleId>
-              </a:tblPr>
-              <a:tblGrid>
-                <a:gridCol w="908918">
-                  <a:extLst>
-                    <a:ext uri="{9D8B030D-6E8A-4147-A177-3AD203B41FA5}">
-                      <a16:colId xmlns:a16="http://schemas.microsoft.com/office/drawing/2014/main" val="3470720179"/>
-                    </a:ext>
-                  </a:extLst>
-                </a:gridCol>
-                <a:gridCol w="1909782">
-                  <a:extLst>
-                    <a:ext uri="{9D8B030D-6E8A-4147-A177-3AD203B41FA5}">
-                      <a16:colId xmlns:a16="http://schemas.microsoft.com/office/drawing/2014/main" val="394327988"/>
-                    </a:ext>
-                  </a:extLst>
-                </a:gridCol>
-                <a:gridCol w="2105637">
-                  <a:extLst>
-                    <a:ext uri="{9D8B030D-6E8A-4147-A177-3AD203B41FA5}">
-                      <a16:colId xmlns:a16="http://schemas.microsoft.com/office/drawing/2014/main" val="757948988"/>
-                    </a:ext>
-                  </a:extLst>
-                </a:gridCol>
-                <a:gridCol w="2214694">
-                  <a:extLst>
-                    <a:ext uri="{9D8B030D-6E8A-4147-A177-3AD203B41FA5}">
-                      <a16:colId xmlns:a16="http://schemas.microsoft.com/office/drawing/2014/main" val="2317696018"/>
-                    </a:ext>
-                  </a:extLst>
-                </a:gridCol>
-                <a:gridCol w="2097247">
-                  <a:extLst>
-                    <a:ext uri="{9D8B030D-6E8A-4147-A177-3AD203B41FA5}">
-                      <a16:colId xmlns:a16="http://schemas.microsoft.com/office/drawing/2014/main" val="903491076"/>
-                    </a:ext>
-                  </a:extLst>
-                </a:gridCol>
-                <a:gridCol w="2265030">
-                  <a:extLst>
-                    <a:ext uri="{9D8B030D-6E8A-4147-A177-3AD203B41FA5}">
-                      <a16:colId xmlns:a16="http://schemas.microsoft.com/office/drawing/2014/main" val="1418716750"/>
-                    </a:ext>
-                  </a:extLst>
-                </a:gridCol>
-              </a:tblGrid>
-              <a:tr h="703504">
-                <a:tc>
-                  <a:txBody>
-                    <a:bodyPr/>
-                    <a:lstStyle/>
-                    <a:p>
-                      <a:pPr algn="l" fontAlgn="b"/>
-                      <a:endParaRPr lang="en-IN" sz="2800" b="1" i="0" u="none" strike="noStrike" dirty="0">
-                        <a:effectLst/>
-                        <a:latin typeface="Arial" panose="020B0604020202020204" pitchFamily="34" charset="0"/>
-                      </a:endParaRPr>
-                    </a:p>
-                  </a:txBody>
-                  <a:tcPr marL="7620" marR="7620" marT="7620" marB="0" anchor="b">
-                    <a:solidFill>
-                      <a:schemeClr val="bg2"/>
-                    </a:solidFill>
-                  </a:tcPr>
-                </a:tc>
-                <a:tc gridSpan="2">
-                  <a:txBody>
-                    <a:bodyPr/>
-                    <a:lstStyle/>
-                    <a:p>
-                      <a:pPr algn="ctr" fontAlgn="b"/>
-                      <a:r>
-                        <a:rPr lang="en-IN" sz="2800" u="none" strike="noStrike" dirty="0">
-                          <a:effectLst/>
-                        </a:rPr>
-                        <a:t>Jul-18</a:t>
-                      </a:r>
-                      <a:endParaRPr lang="en-IN" sz="2800" b="1" i="0" u="none" strike="noStrike" dirty="0">
-                        <a:effectLst/>
-                        <a:latin typeface="Arial" panose="020B0604020202020204" pitchFamily="34" charset="0"/>
-                      </a:endParaRPr>
-                    </a:p>
-                  </a:txBody>
-                  <a:tcPr marL="7620" marR="7620" marT="7620" marB="0" anchor="b">
-                    <a:solidFill>
-                      <a:schemeClr val="bg2"/>
-                    </a:solidFill>
-                  </a:tcPr>
-                </a:tc>
-                <a:tc hMerge="1">
-                  <a:txBody>
-                    <a:bodyPr/>
-                    <a:lstStyle/>
-                    <a:p>
-                      <a:endParaRPr lang="en-IN"/>
-                    </a:p>
-                  </a:txBody>
-                  <a:tcPr/>
-                </a:tc>
-                <a:tc gridSpan="2">
-                  <a:txBody>
-                    <a:bodyPr/>
-                    <a:lstStyle/>
-                    <a:p>
-                      <a:pPr algn="ctr" fontAlgn="b"/>
-                      <a:r>
-                        <a:rPr lang="en-IN" sz="2800" u="none" strike="noStrike" dirty="0">
-                          <a:effectLst/>
-                        </a:rPr>
-                        <a:t>Dec-18</a:t>
-                      </a:r>
-                      <a:endParaRPr lang="en-IN" sz="2800" b="1" i="0" u="none" strike="noStrike" dirty="0">
-                        <a:effectLst/>
-                        <a:latin typeface="Arial" panose="020B0604020202020204" pitchFamily="34" charset="0"/>
-                      </a:endParaRPr>
-                    </a:p>
-                  </a:txBody>
-                  <a:tcPr marL="7620" marR="7620" marT="7620" marB="0" anchor="b">
-                    <a:solidFill>
-                      <a:schemeClr val="bg2"/>
-                    </a:solidFill>
-                  </a:tcPr>
-                </a:tc>
-                <a:tc hMerge="1">
-                  <a:txBody>
-                    <a:bodyPr/>
-                    <a:lstStyle/>
-                    <a:p>
-                      <a:endParaRPr lang="en-IN"/>
-                    </a:p>
-                  </a:txBody>
-                  <a:tcPr/>
-                </a:tc>
-                <a:tc>
-                  <a:txBody>
-                    <a:bodyPr/>
-                    <a:lstStyle/>
-                    <a:p>
-                      <a:pPr algn="l" fontAlgn="b"/>
-                      <a:endParaRPr lang="en-IN" sz="2800" b="0" i="0" u="none" strike="noStrike" dirty="0">
-                        <a:effectLst/>
-                        <a:latin typeface="Arial" panose="020B0604020202020204" pitchFamily="34" charset="0"/>
-                      </a:endParaRPr>
-                    </a:p>
-                  </a:txBody>
-                  <a:tcPr marL="7620" marR="7620" marT="7620" marB="0" anchor="b">
-                    <a:solidFill>
-                      <a:schemeClr val="bg2"/>
-                    </a:solidFill>
-                  </a:tcPr>
-                </a:tc>
-                <a:extLst>
-                  <a:ext uri="{0D108BD9-81ED-4DB2-BD59-A6C34878D82A}">
-                    <a16:rowId xmlns:a16="http://schemas.microsoft.com/office/drawing/2014/main" val="244004340"/>
-                  </a:ext>
-                </a:extLst>
-              </a:tr>
-              <a:tr h="703504">
-                <a:tc>
-                  <a:txBody>
-                    <a:bodyPr/>
-                    <a:lstStyle/>
-                    <a:p>
-                      <a:pPr algn="ctr" fontAlgn="b"/>
-                      <a:r>
-                        <a:rPr lang="en-IN" sz="2800" u="none" strike="noStrike" dirty="0">
-                          <a:effectLst/>
-                        </a:rPr>
-                        <a:t>Year</a:t>
-                      </a:r>
-                      <a:endParaRPr lang="en-IN" sz="2800" b="1" i="0" u="none" strike="noStrike" dirty="0">
-                        <a:effectLst/>
-                        <a:latin typeface="Arial" panose="020B0604020202020204" pitchFamily="34" charset="0"/>
-                      </a:endParaRPr>
-                    </a:p>
-                  </a:txBody>
-                  <a:tcPr marL="7620" marR="7620" marT="7620" marB="0" anchor="b">
-                    <a:solidFill>
-                      <a:schemeClr val="bg2"/>
-                    </a:solidFill>
-                  </a:tcPr>
-                </a:tc>
-                <a:tc>
-                  <a:txBody>
-                    <a:bodyPr/>
-                    <a:lstStyle/>
-                    <a:p>
-                      <a:pPr algn="r" fontAlgn="b"/>
-                      <a:r>
-                        <a:rPr lang="en-IN" sz="2800" u="none" strike="noStrike" dirty="0">
-                          <a:effectLst/>
-                        </a:rPr>
-                        <a:t>Tuition Fees</a:t>
-                      </a:r>
-                      <a:endParaRPr lang="en-IN" sz="2800" b="1" i="0" u="none" strike="noStrike" dirty="0">
-                        <a:effectLst/>
-                        <a:latin typeface="Arial" panose="020B0604020202020204" pitchFamily="34" charset="0"/>
-                      </a:endParaRPr>
-                    </a:p>
-                  </a:txBody>
-                  <a:tcPr marL="7620" marR="7620" marT="7620" marB="0" anchor="b">
-                    <a:solidFill>
-                      <a:schemeClr val="bg2"/>
-                    </a:solidFill>
-                  </a:tcPr>
-                </a:tc>
-                <a:tc>
-                  <a:txBody>
-                    <a:bodyPr/>
-                    <a:lstStyle/>
-                    <a:p>
-                      <a:pPr algn="r" fontAlgn="b"/>
-                      <a:r>
-                        <a:rPr lang="en-IN" sz="2800" u="none" strike="noStrike" dirty="0">
-                          <a:effectLst/>
-                        </a:rPr>
-                        <a:t>Hostel Fees</a:t>
-                      </a:r>
-                      <a:endParaRPr lang="en-IN" sz="2800" b="1" i="0" u="none" strike="noStrike" dirty="0">
-                        <a:effectLst/>
-                        <a:latin typeface="Arial" panose="020B0604020202020204" pitchFamily="34" charset="0"/>
-                      </a:endParaRPr>
-                    </a:p>
-                  </a:txBody>
-                  <a:tcPr marL="7620" marR="7620" marT="7620" marB="0" anchor="b">
-                    <a:solidFill>
-                      <a:schemeClr val="bg2"/>
-                    </a:solidFill>
-                  </a:tcPr>
-                </a:tc>
-                <a:tc>
-                  <a:txBody>
-                    <a:bodyPr/>
-                    <a:lstStyle/>
-                    <a:p>
-                      <a:pPr algn="r" fontAlgn="b"/>
-                      <a:r>
-                        <a:rPr lang="en-IN" sz="2800" u="none" strike="noStrike" dirty="0">
-                          <a:effectLst/>
-                        </a:rPr>
-                        <a:t>Tuition Fees</a:t>
-                      </a:r>
-                      <a:endParaRPr lang="en-IN" sz="2800" b="1" i="0" u="none" strike="noStrike" dirty="0">
-                        <a:effectLst/>
-                        <a:latin typeface="Arial" panose="020B0604020202020204" pitchFamily="34" charset="0"/>
-                      </a:endParaRPr>
-                    </a:p>
-                  </a:txBody>
-                  <a:tcPr marL="7620" marR="7620" marT="7620" marB="0" anchor="b">
-                    <a:solidFill>
-                      <a:schemeClr val="bg2"/>
-                    </a:solidFill>
-                  </a:tcPr>
-                </a:tc>
-                <a:tc>
-                  <a:txBody>
-                    <a:bodyPr/>
-                    <a:lstStyle/>
-                    <a:p>
-                      <a:pPr algn="r" fontAlgn="b"/>
-                      <a:r>
-                        <a:rPr lang="en-IN" sz="2800" u="none" strike="noStrike" dirty="0">
-                          <a:effectLst/>
-                        </a:rPr>
-                        <a:t>Hostel Fees</a:t>
-                      </a:r>
-                      <a:endParaRPr lang="en-IN" sz="2800" b="1" i="0" u="none" strike="noStrike" dirty="0">
-                        <a:effectLst/>
-                        <a:latin typeface="Arial" panose="020B0604020202020204" pitchFamily="34" charset="0"/>
-                      </a:endParaRPr>
-                    </a:p>
-                  </a:txBody>
-                  <a:tcPr marL="7620" marR="7620" marT="7620" marB="0" anchor="b">
-                    <a:solidFill>
-                      <a:schemeClr val="bg2"/>
-                    </a:solidFill>
-                  </a:tcPr>
-                </a:tc>
-                <a:tc>
-                  <a:txBody>
-                    <a:bodyPr/>
-                    <a:lstStyle/>
-                    <a:p>
-                      <a:pPr algn="l" fontAlgn="b"/>
-                      <a:endParaRPr lang="en-IN" sz="2800" b="0" i="0" u="none" strike="noStrike" dirty="0">
-                        <a:effectLst/>
-                        <a:latin typeface="Arial" panose="020B0604020202020204" pitchFamily="34" charset="0"/>
-                      </a:endParaRPr>
-                    </a:p>
-                  </a:txBody>
-                  <a:tcPr marL="7620" marR="7620" marT="7620" marB="0" anchor="b">
-                    <a:solidFill>
-                      <a:schemeClr val="bg2"/>
-                    </a:solidFill>
-                  </a:tcPr>
-                </a:tc>
-                <a:extLst>
-                  <a:ext uri="{0D108BD9-81ED-4DB2-BD59-A6C34878D82A}">
-                    <a16:rowId xmlns:a16="http://schemas.microsoft.com/office/drawing/2014/main" val="4039723707"/>
-                  </a:ext>
-                </a:extLst>
-              </a:tr>
-              <a:tr h="720254">
-                <a:tc>
-                  <a:txBody>
-                    <a:bodyPr/>
-                    <a:lstStyle/>
-                    <a:p>
-                      <a:pPr algn="ctr" fontAlgn="b"/>
-                      <a:r>
-                        <a:rPr lang="en-IN" sz="3200" b="1" u="none" strike="noStrike" dirty="0">
-                          <a:effectLst/>
-                        </a:rPr>
-                        <a:t>I</a:t>
-                      </a:r>
-                      <a:endParaRPr lang="en-IN" sz="3200" b="1" i="0" u="none" strike="noStrike" dirty="0">
-                        <a:effectLst/>
-                        <a:latin typeface="Calibri" panose="020F0502020204030204" pitchFamily="34" charset="0"/>
-                      </a:endParaRPr>
-                    </a:p>
-                  </a:txBody>
-                  <a:tcPr marL="7620" marR="7620" marT="7620" marB="0" anchor="b">
-                    <a:solidFill>
-                      <a:schemeClr val="bg2"/>
-                    </a:solidFill>
-                  </a:tcPr>
-                </a:tc>
-                <a:tc>
-                  <a:txBody>
-                    <a:bodyPr/>
-                    <a:lstStyle/>
-                    <a:p>
-                      <a:pPr algn="r" fontAlgn="b"/>
-                      <a:r>
-                        <a:rPr lang="en-IN" sz="2800" u="none" strike="noStrike" dirty="0">
-                          <a:effectLst/>
-                        </a:rPr>
-                        <a:t>₹0</a:t>
-                      </a:r>
-                      <a:endParaRPr lang="en-IN" sz="2800" b="0" i="0" u="none" strike="noStrike" dirty="0">
-                        <a:effectLst/>
-                        <a:latin typeface="Calibri" panose="020F0502020204030204" pitchFamily="34" charset="0"/>
-                      </a:endParaRPr>
-                    </a:p>
-                  </a:txBody>
-                  <a:tcPr marL="7620" marR="7620" marT="7620" marB="0" anchor="b">
-                    <a:solidFill>
-                      <a:schemeClr val="bg2"/>
-                    </a:solidFill>
-                  </a:tcPr>
-                </a:tc>
-                <a:tc>
-                  <a:txBody>
-                    <a:bodyPr/>
-                    <a:lstStyle/>
-                    <a:p>
-                      <a:pPr algn="r" fontAlgn="b"/>
-                      <a:r>
-                        <a:rPr lang="en-IN" sz="2800" u="none" strike="noStrike" dirty="0">
-                          <a:effectLst/>
-                        </a:rPr>
-                        <a:t>₹0</a:t>
-                      </a:r>
-                      <a:endParaRPr lang="en-IN" sz="2800" b="0" i="0" u="none" strike="noStrike" dirty="0">
-                        <a:effectLst/>
-                        <a:latin typeface="Calibri" panose="020F0502020204030204" pitchFamily="34" charset="0"/>
-                      </a:endParaRPr>
-                    </a:p>
-                  </a:txBody>
-                  <a:tcPr marL="7620" marR="7620" marT="7620" marB="0" anchor="b">
-                    <a:solidFill>
-                      <a:schemeClr val="bg2"/>
-                    </a:solidFill>
-                  </a:tcPr>
-                </a:tc>
-                <a:tc>
-                  <a:txBody>
-                    <a:bodyPr/>
-                    <a:lstStyle/>
-                    <a:p>
-                      <a:pPr algn="r" fontAlgn="b"/>
-                      <a:r>
-                        <a:rPr lang="en-IN" sz="2800" u="none" strike="noStrike" dirty="0">
-                          <a:effectLst/>
-                        </a:rPr>
-                        <a:t>₹84,850</a:t>
-                      </a:r>
-                      <a:endParaRPr lang="en-IN" sz="2800" b="0" i="0" u="none" strike="noStrike" dirty="0">
-                        <a:effectLst/>
-                        <a:latin typeface="Calibri" panose="020F0502020204030204" pitchFamily="34" charset="0"/>
-                      </a:endParaRPr>
-                    </a:p>
-                  </a:txBody>
-                  <a:tcPr marL="7620" marR="7620" marT="7620" marB="0" anchor="b">
-                    <a:solidFill>
-                      <a:schemeClr val="bg2"/>
-                    </a:solidFill>
-                  </a:tcPr>
-                </a:tc>
-                <a:tc>
-                  <a:txBody>
-                    <a:bodyPr/>
-                    <a:lstStyle/>
-                    <a:p>
-                      <a:pPr algn="r" fontAlgn="b"/>
-                      <a:r>
-                        <a:rPr lang="en-IN" sz="2800" u="none" strike="noStrike">
-                          <a:effectLst/>
-                        </a:rPr>
-                        <a:t>₹2,35,500</a:t>
-                      </a:r>
-                      <a:endParaRPr lang="en-IN" sz="2800" b="0" i="0" u="none" strike="noStrike">
-                        <a:effectLst/>
-                        <a:latin typeface="Calibri" panose="020F0502020204030204" pitchFamily="34" charset="0"/>
-                      </a:endParaRPr>
-                    </a:p>
-                  </a:txBody>
-                  <a:tcPr marL="7620" marR="7620" marT="7620" marB="0" anchor="b">
-                    <a:solidFill>
-                      <a:schemeClr val="bg2"/>
-                    </a:solidFill>
-                  </a:tcPr>
-                </a:tc>
-                <a:tc>
-                  <a:txBody>
-                    <a:bodyPr/>
-                    <a:lstStyle/>
-                    <a:p>
-                      <a:pPr algn="r" fontAlgn="b"/>
-                      <a:r>
-                        <a:rPr lang="en-IN" sz="3200" b="1" u="none" strike="noStrike" dirty="0">
-                          <a:effectLst/>
-                        </a:rPr>
-                        <a:t>₹3,20,350</a:t>
-                      </a:r>
-                      <a:endParaRPr lang="en-IN" sz="3200" b="1" i="0" u="none" strike="noStrike" dirty="0">
-                        <a:effectLst/>
-                        <a:latin typeface="Arial" panose="020B0604020202020204" pitchFamily="34" charset="0"/>
-                      </a:endParaRPr>
-                    </a:p>
-                  </a:txBody>
-                  <a:tcPr marL="7620" marR="7620" marT="7620" marB="0" anchor="b">
-                    <a:solidFill>
-                      <a:schemeClr val="bg2"/>
-                    </a:solidFill>
-                  </a:tcPr>
-                </a:tc>
-                <a:extLst>
-                  <a:ext uri="{0D108BD9-81ED-4DB2-BD59-A6C34878D82A}">
-                    <a16:rowId xmlns:a16="http://schemas.microsoft.com/office/drawing/2014/main" val="1809891281"/>
-                  </a:ext>
-                </a:extLst>
-              </a:tr>
-              <a:tr h="720254">
-                <a:tc>
-                  <a:txBody>
-                    <a:bodyPr/>
-                    <a:lstStyle/>
-                    <a:p>
-                      <a:pPr algn="ctr" fontAlgn="b"/>
-                      <a:r>
-                        <a:rPr lang="en-IN" sz="3200" b="1" u="none" strike="noStrike" dirty="0">
-                          <a:effectLst/>
-                        </a:rPr>
-                        <a:t>II</a:t>
-                      </a:r>
-                      <a:endParaRPr lang="en-IN" sz="3200" b="1" i="0" u="none" strike="noStrike" dirty="0">
-                        <a:effectLst/>
-                        <a:latin typeface="Calibri" panose="020F0502020204030204" pitchFamily="34" charset="0"/>
-                      </a:endParaRPr>
-                    </a:p>
-                  </a:txBody>
-                  <a:tcPr marL="7620" marR="7620" marT="7620" marB="0" anchor="b">
-                    <a:solidFill>
-                      <a:schemeClr val="bg2"/>
-                    </a:solidFill>
-                  </a:tcPr>
-                </a:tc>
-                <a:tc>
-                  <a:txBody>
-                    <a:bodyPr/>
-                    <a:lstStyle/>
-                    <a:p>
-                      <a:pPr algn="r" fontAlgn="b"/>
-                      <a:r>
-                        <a:rPr lang="en-IN" sz="2800" u="none" strike="noStrike" dirty="0">
-                          <a:effectLst/>
-                        </a:rPr>
-                        <a:t>₹14,165</a:t>
-                      </a:r>
-                      <a:endParaRPr lang="en-IN" sz="2800" b="0" i="0" u="none" strike="noStrike" dirty="0">
-                        <a:effectLst/>
-                        <a:latin typeface="Calibri" panose="020F0502020204030204" pitchFamily="34" charset="0"/>
-                      </a:endParaRPr>
-                    </a:p>
-                  </a:txBody>
-                  <a:tcPr marL="7620" marR="7620" marT="7620" marB="0" anchor="b">
-                    <a:solidFill>
-                      <a:schemeClr val="bg2"/>
-                    </a:solidFill>
-                  </a:tcPr>
-                </a:tc>
-                <a:tc>
-                  <a:txBody>
-                    <a:bodyPr/>
-                    <a:lstStyle/>
-                    <a:p>
-                      <a:pPr algn="r" fontAlgn="b"/>
-                      <a:r>
-                        <a:rPr lang="en-IN" sz="2800" u="none" strike="noStrike">
-                          <a:effectLst/>
-                        </a:rPr>
-                        <a:t>₹30,739</a:t>
-                      </a:r>
-                      <a:endParaRPr lang="en-IN" sz="2800" b="0" i="0" u="none" strike="noStrike">
-                        <a:effectLst/>
-                        <a:latin typeface="Calibri" panose="020F0502020204030204" pitchFamily="34" charset="0"/>
-                      </a:endParaRPr>
-                    </a:p>
-                  </a:txBody>
-                  <a:tcPr marL="7620" marR="7620" marT="7620" marB="0" anchor="b">
-                    <a:solidFill>
-                      <a:schemeClr val="bg2"/>
-                    </a:solidFill>
-                  </a:tcPr>
-                </a:tc>
-                <a:tc>
-                  <a:txBody>
-                    <a:bodyPr/>
-                    <a:lstStyle/>
-                    <a:p>
-                      <a:pPr algn="r" fontAlgn="b"/>
-                      <a:r>
-                        <a:rPr lang="en-IN" sz="2800" u="none" strike="noStrike">
-                          <a:effectLst/>
-                        </a:rPr>
-                        <a:t>₹43,475</a:t>
-                      </a:r>
-                      <a:endParaRPr lang="en-IN" sz="2800" b="0" i="0" u="none" strike="noStrike">
-                        <a:effectLst/>
-                        <a:latin typeface="Calibri" panose="020F0502020204030204" pitchFamily="34" charset="0"/>
-                      </a:endParaRPr>
-                    </a:p>
-                  </a:txBody>
-                  <a:tcPr marL="7620" marR="7620" marT="7620" marB="0" anchor="b">
-                    <a:solidFill>
-                      <a:schemeClr val="bg2"/>
-                    </a:solidFill>
-                  </a:tcPr>
-                </a:tc>
-                <a:tc>
-                  <a:txBody>
-                    <a:bodyPr/>
-                    <a:lstStyle/>
-                    <a:p>
-                      <a:pPr algn="r" fontAlgn="b"/>
-                      <a:r>
-                        <a:rPr lang="en-IN" sz="2800" u="none" strike="noStrike">
-                          <a:effectLst/>
-                        </a:rPr>
-                        <a:t>₹1,18,816</a:t>
-                      </a:r>
-                      <a:endParaRPr lang="en-IN" sz="2800" b="0" i="0" u="none" strike="noStrike">
-                        <a:effectLst/>
-                        <a:latin typeface="Calibri" panose="020F0502020204030204" pitchFamily="34" charset="0"/>
-                      </a:endParaRPr>
-                    </a:p>
-                  </a:txBody>
-                  <a:tcPr marL="7620" marR="7620" marT="7620" marB="0" anchor="b">
-                    <a:solidFill>
-                      <a:schemeClr val="bg2"/>
-                    </a:solidFill>
-                  </a:tcPr>
-                </a:tc>
-                <a:tc>
-                  <a:txBody>
-                    <a:bodyPr/>
-                    <a:lstStyle/>
-                    <a:p>
-                      <a:pPr algn="r" fontAlgn="b"/>
-                      <a:r>
-                        <a:rPr lang="en-IN" sz="3200" b="1" u="none" strike="noStrike" dirty="0">
-                          <a:effectLst/>
-                        </a:rPr>
-                        <a:t>₹2,07,195</a:t>
-                      </a:r>
-                      <a:endParaRPr lang="en-IN" sz="3200" b="1" i="0" u="none" strike="noStrike" dirty="0">
-                        <a:effectLst/>
-                        <a:latin typeface="Arial" panose="020B0604020202020204" pitchFamily="34" charset="0"/>
-                      </a:endParaRPr>
-                    </a:p>
-                  </a:txBody>
-                  <a:tcPr marL="7620" marR="7620" marT="7620" marB="0" anchor="b">
-                    <a:solidFill>
-                      <a:schemeClr val="bg2"/>
-                    </a:solidFill>
-                  </a:tcPr>
-                </a:tc>
-                <a:extLst>
-                  <a:ext uri="{0D108BD9-81ED-4DB2-BD59-A6C34878D82A}">
-                    <a16:rowId xmlns:a16="http://schemas.microsoft.com/office/drawing/2014/main" val="75213477"/>
-                  </a:ext>
-                </a:extLst>
-              </a:tr>
-              <a:tr h="720254">
-                <a:tc>
-                  <a:txBody>
-                    <a:bodyPr/>
-                    <a:lstStyle/>
-                    <a:p>
-                      <a:pPr algn="ctr" fontAlgn="b"/>
-                      <a:r>
-                        <a:rPr lang="en-IN" sz="3200" b="1" u="none" strike="noStrike" dirty="0">
-                          <a:effectLst/>
-                        </a:rPr>
-                        <a:t>III</a:t>
-                      </a:r>
-                      <a:endParaRPr lang="en-IN" sz="3200" b="1" i="0" u="none" strike="noStrike" dirty="0">
-                        <a:effectLst/>
-                        <a:latin typeface="Calibri" panose="020F0502020204030204" pitchFamily="34" charset="0"/>
-                      </a:endParaRPr>
-                    </a:p>
-                  </a:txBody>
-                  <a:tcPr marL="7620" marR="7620" marT="7620" marB="0" anchor="b">
-                    <a:solidFill>
-                      <a:schemeClr val="bg2"/>
-                    </a:solidFill>
-                  </a:tcPr>
-                </a:tc>
-                <a:tc>
-                  <a:txBody>
-                    <a:bodyPr/>
-                    <a:lstStyle/>
-                    <a:p>
-                      <a:pPr algn="r" fontAlgn="b"/>
-                      <a:r>
-                        <a:rPr lang="en-IN" sz="2800" u="none" strike="noStrike">
-                          <a:effectLst/>
-                        </a:rPr>
-                        <a:t>₹0</a:t>
-                      </a:r>
-                      <a:endParaRPr lang="en-IN" sz="2800" b="0" i="0" u="none" strike="noStrike">
-                        <a:effectLst/>
-                        <a:latin typeface="Calibri" panose="020F0502020204030204" pitchFamily="34" charset="0"/>
-                      </a:endParaRPr>
-                    </a:p>
-                  </a:txBody>
-                  <a:tcPr marL="7620" marR="7620" marT="7620" marB="0" anchor="b">
-                    <a:solidFill>
-                      <a:schemeClr val="bg2"/>
-                    </a:solidFill>
-                  </a:tcPr>
-                </a:tc>
-                <a:tc>
-                  <a:txBody>
-                    <a:bodyPr/>
-                    <a:lstStyle/>
-                    <a:p>
-                      <a:pPr algn="r" fontAlgn="b"/>
-                      <a:r>
-                        <a:rPr lang="en-IN" sz="2800" u="none" strike="noStrike" dirty="0">
-                          <a:effectLst/>
-                        </a:rPr>
-                        <a:t>₹0</a:t>
-                      </a:r>
-                      <a:endParaRPr lang="en-IN" sz="2800" b="0" i="0" u="none" strike="noStrike" dirty="0">
-                        <a:effectLst/>
-                        <a:latin typeface="Calibri" panose="020F0502020204030204" pitchFamily="34" charset="0"/>
-                      </a:endParaRPr>
-                    </a:p>
-                  </a:txBody>
-                  <a:tcPr marL="7620" marR="7620" marT="7620" marB="0" anchor="b">
-                    <a:solidFill>
-                      <a:schemeClr val="bg2"/>
-                    </a:solidFill>
-                  </a:tcPr>
-                </a:tc>
-                <a:tc>
-                  <a:txBody>
-                    <a:bodyPr/>
-                    <a:lstStyle/>
-                    <a:p>
-                      <a:pPr algn="r" fontAlgn="b"/>
-                      <a:r>
-                        <a:rPr lang="en-IN" sz="2800" u="none" strike="noStrike">
-                          <a:effectLst/>
-                        </a:rPr>
-                        <a:t>₹10,380</a:t>
-                      </a:r>
-                      <a:endParaRPr lang="en-IN" sz="2800" b="0" i="0" u="none" strike="noStrike">
-                        <a:effectLst/>
-                        <a:latin typeface="Calibri" panose="020F0502020204030204" pitchFamily="34" charset="0"/>
-                      </a:endParaRPr>
-                    </a:p>
-                  </a:txBody>
-                  <a:tcPr marL="7620" marR="7620" marT="7620" marB="0" anchor="b">
-                    <a:solidFill>
-                      <a:schemeClr val="bg2"/>
-                    </a:solidFill>
-                  </a:tcPr>
-                </a:tc>
-                <a:tc>
-                  <a:txBody>
-                    <a:bodyPr/>
-                    <a:lstStyle/>
-                    <a:p>
-                      <a:pPr algn="r" fontAlgn="b"/>
-                      <a:r>
-                        <a:rPr lang="en-IN" sz="2800" u="none" strike="noStrike">
-                          <a:effectLst/>
-                        </a:rPr>
-                        <a:t>₹46,428</a:t>
-                      </a:r>
-                      <a:endParaRPr lang="en-IN" sz="2800" b="0" i="0" u="none" strike="noStrike">
-                        <a:effectLst/>
-                        <a:latin typeface="Calibri" panose="020F0502020204030204" pitchFamily="34" charset="0"/>
-                      </a:endParaRPr>
-                    </a:p>
-                  </a:txBody>
-                  <a:tcPr marL="7620" marR="7620" marT="7620" marB="0" anchor="b">
-                    <a:solidFill>
-                      <a:schemeClr val="bg2"/>
-                    </a:solidFill>
-                  </a:tcPr>
-                </a:tc>
-                <a:tc>
-                  <a:txBody>
-                    <a:bodyPr/>
-                    <a:lstStyle/>
-                    <a:p>
-                      <a:pPr algn="r" fontAlgn="b"/>
-                      <a:r>
-                        <a:rPr lang="en-IN" sz="3200" b="1" u="none" strike="noStrike" dirty="0">
-                          <a:effectLst/>
-                        </a:rPr>
-                        <a:t>₹56,808</a:t>
-                      </a:r>
-                      <a:endParaRPr lang="en-IN" sz="3200" b="1" i="0" u="none" strike="noStrike" dirty="0">
-                        <a:effectLst/>
-                        <a:latin typeface="Arial" panose="020B0604020202020204" pitchFamily="34" charset="0"/>
-                      </a:endParaRPr>
-                    </a:p>
-                  </a:txBody>
-                  <a:tcPr marL="7620" marR="7620" marT="7620" marB="0" anchor="b">
-                    <a:solidFill>
-                      <a:schemeClr val="bg2"/>
-                    </a:solidFill>
-                  </a:tcPr>
-                </a:tc>
-                <a:extLst>
-                  <a:ext uri="{0D108BD9-81ED-4DB2-BD59-A6C34878D82A}">
-                    <a16:rowId xmlns:a16="http://schemas.microsoft.com/office/drawing/2014/main" val="2605255515"/>
-                  </a:ext>
-                </a:extLst>
-              </a:tr>
-              <a:tr h="737007">
-                <a:tc>
-                  <a:txBody>
-                    <a:bodyPr/>
-                    <a:lstStyle/>
-                    <a:p>
-                      <a:pPr algn="ctr" fontAlgn="b"/>
-                      <a:r>
-                        <a:rPr lang="en-IN" sz="3200" b="1" u="none" strike="noStrike" dirty="0">
-                          <a:effectLst/>
-                        </a:rPr>
-                        <a:t>IV</a:t>
-                      </a:r>
-                      <a:endParaRPr lang="en-IN" sz="3200" b="1" i="0" u="none" strike="noStrike" dirty="0">
-                        <a:effectLst/>
-                        <a:latin typeface="Calibri" panose="020F0502020204030204" pitchFamily="34" charset="0"/>
-                      </a:endParaRPr>
-                    </a:p>
-                  </a:txBody>
-                  <a:tcPr marL="7620" marR="7620" marT="7620" marB="0" anchor="b">
-                    <a:solidFill>
-                      <a:schemeClr val="bg2"/>
-                    </a:solidFill>
-                  </a:tcPr>
-                </a:tc>
-                <a:tc>
-                  <a:txBody>
-                    <a:bodyPr/>
-                    <a:lstStyle/>
-                    <a:p>
-                      <a:pPr algn="r" fontAlgn="b"/>
-                      <a:r>
-                        <a:rPr lang="en-IN" sz="2800" u="none" strike="noStrike">
-                          <a:effectLst/>
-                        </a:rPr>
-                        <a:t>₹0</a:t>
-                      </a:r>
-                      <a:endParaRPr lang="en-IN" sz="2800" b="0" i="0" u="none" strike="noStrike">
-                        <a:effectLst/>
-                        <a:latin typeface="Calibri" panose="020F0502020204030204" pitchFamily="34" charset="0"/>
-                      </a:endParaRPr>
-                    </a:p>
-                  </a:txBody>
-                  <a:tcPr marL="7620" marR="7620" marT="7620" marB="0" anchor="b">
-                    <a:solidFill>
-                      <a:schemeClr val="bg2"/>
-                    </a:solidFill>
-                  </a:tcPr>
-                </a:tc>
-                <a:tc>
-                  <a:txBody>
-                    <a:bodyPr/>
-                    <a:lstStyle/>
-                    <a:p>
-                      <a:pPr algn="r" fontAlgn="b"/>
-                      <a:r>
-                        <a:rPr lang="en-IN" sz="2800" u="none" strike="noStrike" dirty="0">
-                          <a:effectLst/>
-                        </a:rPr>
-                        <a:t>₹55,922</a:t>
-                      </a:r>
-                      <a:endParaRPr lang="en-IN" sz="2800" b="0" i="0" u="none" strike="noStrike" dirty="0">
-                        <a:effectLst/>
-                        <a:latin typeface="Calibri" panose="020F0502020204030204" pitchFamily="34" charset="0"/>
-                      </a:endParaRPr>
-                    </a:p>
-                  </a:txBody>
-                  <a:tcPr marL="7620" marR="7620" marT="7620" marB="0" anchor="b">
-                    <a:solidFill>
-                      <a:schemeClr val="bg2"/>
-                    </a:solidFill>
-                  </a:tcPr>
-                </a:tc>
-                <a:tc>
-                  <a:txBody>
-                    <a:bodyPr/>
-                    <a:lstStyle/>
-                    <a:p>
-                      <a:pPr algn="r" fontAlgn="b"/>
-                      <a:r>
-                        <a:rPr lang="en-IN" sz="2800" u="none" strike="noStrike" dirty="0">
-                          <a:effectLst/>
-                        </a:rPr>
-                        <a:t>₹7,715</a:t>
-                      </a:r>
-                      <a:endParaRPr lang="en-IN" sz="2800" b="0" i="0" u="none" strike="noStrike" dirty="0">
-                        <a:effectLst/>
-                        <a:latin typeface="Calibri" panose="020F0502020204030204" pitchFamily="34" charset="0"/>
-                      </a:endParaRPr>
-                    </a:p>
-                  </a:txBody>
-                  <a:tcPr marL="7620" marR="7620" marT="7620" marB="0" anchor="b">
-                    <a:solidFill>
-                      <a:schemeClr val="bg2"/>
-                    </a:solidFill>
-                  </a:tcPr>
-                </a:tc>
-                <a:tc>
-                  <a:txBody>
-                    <a:bodyPr/>
-                    <a:lstStyle/>
-                    <a:p>
-                      <a:pPr algn="r" fontAlgn="b"/>
-                      <a:r>
-                        <a:rPr lang="en-IN" sz="2800" u="none" strike="noStrike" dirty="0">
-                          <a:effectLst/>
-                        </a:rPr>
-                        <a:t>₹83,747</a:t>
-                      </a:r>
-                      <a:endParaRPr lang="en-IN" sz="2800" b="0" i="0" u="none" strike="noStrike" dirty="0">
-                        <a:effectLst/>
-                        <a:latin typeface="Calibri" panose="020F0502020204030204" pitchFamily="34" charset="0"/>
-                      </a:endParaRPr>
-                    </a:p>
-                  </a:txBody>
-                  <a:tcPr marL="7620" marR="7620" marT="7620" marB="0" anchor="b">
-                    <a:solidFill>
-                      <a:schemeClr val="bg2"/>
-                    </a:solidFill>
-                  </a:tcPr>
-                </a:tc>
-                <a:tc>
-                  <a:txBody>
-                    <a:bodyPr/>
-                    <a:lstStyle/>
-                    <a:p>
-                      <a:pPr algn="r" fontAlgn="b"/>
-                      <a:r>
-                        <a:rPr lang="en-IN" sz="3200" b="1" u="none" strike="noStrike" dirty="0">
-                          <a:effectLst/>
-                        </a:rPr>
-                        <a:t>₹1,47,384</a:t>
-                      </a:r>
-                      <a:endParaRPr lang="en-IN" sz="3200" b="1" i="0" u="none" strike="noStrike" dirty="0">
-                        <a:effectLst/>
-                        <a:latin typeface="Arial" panose="020B0604020202020204" pitchFamily="34" charset="0"/>
-                      </a:endParaRPr>
-                    </a:p>
-                  </a:txBody>
-                  <a:tcPr marL="7620" marR="7620" marT="7620" marB="0" anchor="b">
-                    <a:solidFill>
-                      <a:schemeClr val="bg2"/>
-                    </a:solidFill>
-                  </a:tcPr>
-                </a:tc>
-                <a:extLst>
-                  <a:ext uri="{0D108BD9-81ED-4DB2-BD59-A6C34878D82A}">
-                    <a16:rowId xmlns:a16="http://schemas.microsoft.com/office/drawing/2014/main" val="440039576"/>
-                  </a:ext>
-                </a:extLst>
-              </a:tr>
-              <a:tr h="737007">
-                <a:tc>
-                  <a:txBody>
-                    <a:bodyPr/>
-                    <a:lstStyle/>
-                    <a:p>
-                      <a:pPr algn="ctr" fontAlgn="b"/>
-                      <a:r>
-                        <a:rPr lang="en-IN" sz="3200" b="1" u="none" strike="noStrike" dirty="0">
-                          <a:effectLst/>
-                        </a:rPr>
-                        <a:t>Total</a:t>
-                      </a:r>
-                      <a:endParaRPr lang="en-IN" sz="3200" b="1" i="0" u="none" strike="noStrike" dirty="0">
-                        <a:effectLst/>
-                        <a:latin typeface="Calibri" panose="020F0502020204030204" pitchFamily="34" charset="0"/>
-                      </a:endParaRPr>
-                    </a:p>
-                  </a:txBody>
-                  <a:tcPr marL="7620" marR="7620" marT="7620" marB="0" anchor="b">
-                    <a:solidFill>
-                      <a:schemeClr val="bg2"/>
-                    </a:solidFill>
-                  </a:tcPr>
-                </a:tc>
-                <a:tc>
-                  <a:txBody>
-                    <a:bodyPr/>
-                    <a:lstStyle/>
-                    <a:p>
-                      <a:pPr algn="r" fontAlgn="b"/>
-                      <a:r>
-                        <a:rPr lang="en-IN" sz="3600" b="1" u="none" strike="noStrike" dirty="0">
-                          <a:effectLst/>
-                        </a:rPr>
-                        <a:t>₹14,165</a:t>
-                      </a:r>
-                      <a:endParaRPr lang="en-IN" sz="3600" b="1" i="0" u="none" strike="noStrike" dirty="0">
-                        <a:effectLst/>
-                        <a:latin typeface="Arial" panose="020B0604020202020204" pitchFamily="34" charset="0"/>
-                      </a:endParaRPr>
-                    </a:p>
-                  </a:txBody>
-                  <a:tcPr marL="7620" marR="7620" marT="7620" marB="0" anchor="b">
-                    <a:solidFill>
-                      <a:schemeClr val="bg2"/>
-                    </a:solidFill>
-                  </a:tcPr>
-                </a:tc>
-                <a:tc>
-                  <a:txBody>
-                    <a:bodyPr/>
-                    <a:lstStyle/>
-                    <a:p>
-                      <a:pPr algn="r" fontAlgn="b"/>
-                      <a:r>
-                        <a:rPr lang="en-IN" sz="3600" b="1" u="none" strike="noStrike" dirty="0">
-                          <a:effectLst/>
-                        </a:rPr>
-                        <a:t>₹86,661</a:t>
-                      </a:r>
-                      <a:endParaRPr lang="en-IN" sz="3600" b="1" i="0" u="none" strike="noStrike" dirty="0">
-                        <a:effectLst/>
-                        <a:latin typeface="Arial" panose="020B0604020202020204" pitchFamily="34" charset="0"/>
-                      </a:endParaRPr>
-                    </a:p>
-                  </a:txBody>
-                  <a:tcPr marL="7620" marR="7620" marT="7620" marB="0" anchor="b">
-                    <a:solidFill>
-                      <a:schemeClr val="bg2"/>
-                    </a:solidFill>
-                  </a:tcPr>
-                </a:tc>
-                <a:tc>
-                  <a:txBody>
-                    <a:bodyPr/>
-                    <a:lstStyle/>
-                    <a:p>
-                      <a:pPr algn="r" fontAlgn="b"/>
-                      <a:r>
-                        <a:rPr lang="en-IN" sz="3600" b="1" u="none" strike="noStrike" dirty="0">
-                          <a:effectLst/>
-                        </a:rPr>
-                        <a:t>₹1,46,420</a:t>
-                      </a:r>
-                      <a:endParaRPr lang="en-IN" sz="3600" b="1" i="0" u="none" strike="noStrike" dirty="0">
-                        <a:effectLst/>
-                        <a:latin typeface="Arial" panose="020B0604020202020204" pitchFamily="34" charset="0"/>
-                      </a:endParaRPr>
-                    </a:p>
-                  </a:txBody>
-                  <a:tcPr marL="7620" marR="7620" marT="7620" marB="0" anchor="b">
-                    <a:solidFill>
-                      <a:schemeClr val="bg2"/>
-                    </a:solidFill>
-                  </a:tcPr>
-                </a:tc>
-                <a:tc>
-                  <a:txBody>
-                    <a:bodyPr/>
-                    <a:lstStyle/>
-                    <a:p>
-                      <a:pPr algn="r" fontAlgn="b"/>
-                      <a:r>
-                        <a:rPr lang="en-IN" sz="3600" b="1" u="none" strike="noStrike" dirty="0">
-                          <a:effectLst/>
-                        </a:rPr>
-                        <a:t>₹4,84,491</a:t>
-                      </a:r>
-                      <a:endParaRPr lang="en-IN" sz="3600" b="1" i="0" u="none" strike="noStrike" dirty="0">
-                        <a:effectLst/>
-                        <a:latin typeface="Arial" panose="020B0604020202020204" pitchFamily="34" charset="0"/>
-                      </a:endParaRPr>
-                    </a:p>
-                  </a:txBody>
-                  <a:tcPr marL="7620" marR="7620" marT="7620" marB="0" anchor="b">
-                    <a:solidFill>
-                      <a:schemeClr val="bg2"/>
-                    </a:solidFill>
-                  </a:tcPr>
-                </a:tc>
-                <a:tc>
-                  <a:txBody>
-                    <a:bodyPr/>
-                    <a:lstStyle/>
-                    <a:p>
-                      <a:pPr algn="r" fontAlgn="b"/>
-                      <a:r>
-                        <a:rPr lang="en-IN" sz="3600" b="1" u="none" strike="noStrike" dirty="0">
-                          <a:effectLst/>
-                        </a:rPr>
-                        <a:t>₹7,31,737</a:t>
-                      </a:r>
-                      <a:endParaRPr lang="en-IN" sz="3600" b="1" i="0" u="none" strike="noStrike" dirty="0">
-                        <a:effectLst/>
-                        <a:latin typeface="Arial" panose="020B0604020202020204" pitchFamily="34" charset="0"/>
-                      </a:endParaRPr>
-                    </a:p>
-                  </a:txBody>
-                  <a:tcPr marL="7620" marR="7620" marT="7620" marB="0" anchor="b">
-                    <a:solidFill>
-                      <a:schemeClr val="bg2"/>
-                    </a:solidFill>
-                  </a:tcPr>
-                </a:tc>
-                <a:extLst>
-                  <a:ext uri="{0D108BD9-81ED-4DB2-BD59-A6C34878D82A}">
-                    <a16:rowId xmlns:a16="http://schemas.microsoft.com/office/drawing/2014/main" val="2786128700"/>
-                  </a:ext>
-                </a:extLst>
-              </a:tr>
-            </a:tbl>
-          </a:graphicData>
-        </a:graphic>
-      </p:graphicFrame>
       <p:sp>
         <p:nvSpPr>
           <p:cNvPr id="5" name="TextBox 4">
@@ -31055,7 +29888,7 @@
             </a:r>
             <a:r>
               <a:rPr lang="en-IN" sz="3600" b="1" dirty="0"/>
-              <a:t>₹1,60,585</a:t>
+              <a:t>₹1,46,420</a:t>
             </a:r>
             <a:endParaRPr lang="en-IN" sz="3600" b="1" dirty="0">
               <a:latin typeface="Arial" panose="020B0604020202020204" pitchFamily="34" charset="0"/>
@@ -31111,6 +29944,972 @@
           </a:p>
         </p:txBody>
       </p:sp>
+      <p:graphicFrame>
+        <p:nvGraphicFramePr>
+          <p:cNvPr id="2" name="Table 1">
+            <a:extLst>
+              <a:ext uri="{FF2B5EF4-FFF2-40B4-BE49-F238E27FC236}">
+                <a16:creationId xmlns:a16="http://schemas.microsoft.com/office/drawing/2014/main" id="{0D690C6C-38C8-4285-8615-A51982D0493C}"/>
+              </a:ext>
+            </a:extLst>
+          </p:cNvPr>
+          <p:cNvGraphicFramePr>
+            <a:graphicFrameLocks noGrp="1"/>
+          </p:cNvGraphicFramePr>
+          <p:nvPr>
+            <p:extLst>
+              <p:ext uri="{D42A27DB-BD31-4B8C-83A1-F6EECF244321}">
+                <p14:modId xmlns:p14="http://schemas.microsoft.com/office/powerpoint/2010/main" val="1309190476"/>
+              </p:ext>
+            </p:extLst>
+          </p:nvPr>
+        </p:nvGraphicFramePr>
+        <p:xfrm>
+          <a:off x="402672" y="840509"/>
+          <a:ext cx="11501307" cy="5126184"/>
+        </p:xfrm>
+        <a:graphic>
+          <a:graphicData uri="http://schemas.openxmlformats.org/drawingml/2006/table">
+            <a:tbl>
+              <a:tblPr>
+                <a:tableStyleId>{5C22544A-7EE6-4342-B048-85BDC9FD1C3A}</a:tableStyleId>
+              </a:tblPr>
+              <a:tblGrid>
+                <a:gridCol w="908918">
+                  <a:extLst>
+                    <a:ext uri="{9D8B030D-6E8A-4147-A177-3AD203B41FA5}">
+                      <a16:colId xmlns:a16="http://schemas.microsoft.com/office/drawing/2014/main" val="105627127"/>
+                    </a:ext>
+                  </a:extLst>
+                </a:gridCol>
+                <a:gridCol w="2035617">
+                  <a:extLst>
+                    <a:ext uri="{9D8B030D-6E8A-4147-A177-3AD203B41FA5}">
+                      <a16:colId xmlns:a16="http://schemas.microsoft.com/office/drawing/2014/main" val="844773290"/>
+                    </a:ext>
+                  </a:extLst>
+                </a:gridCol>
+                <a:gridCol w="2386618">
+                  <a:extLst>
+                    <a:ext uri="{9D8B030D-6E8A-4147-A177-3AD203B41FA5}">
+                      <a16:colId xmlns:a16="http://schemas.microsoft.com/office/drawing/2014/main" val="2089608385"/>
+                    </a:ext>
+                  </a:extLst>
+                </a:gridCol>
+                <a:gridCol w="2219857">
+                  <a:extLst>
+                    <a:ext uri="{9D8B030D-6E8A-4147-A177-3AD203B41FA5}">
+                      <a16:colId xmlns:a16="http://schemas.microsoft.com/office/drawing/2014/main" val="3220094729"/>
+                    </a:ext>
+                  </a:extLst>
+                </a:gridCol>
+                <a:gridCol w="2202378">
+                  <a:extLst>
+                    <a:ext uri="{9D8B030D-6E8A-4147-A177-3AD203B41FA5}">
+                      <a16:colId xmlns:a16="http://schemas.microsoft.com/office/drawing/2014/main" val="4179454954"/>
+                    </a:ext>
+                  </a:extLst>
+                </a:gridCol>
+                <a:gridCol w="1747919">
+                  <a:extLst>
+                    <a:ext uri="{9D8B030D-6E8A-4147-A177-3AD203B41FA5}">
+                      <a16:colId xmlns:a16="http://schemas.microsoft.com/office/drawing/2014/main" val="2039875627"/>
+                    </a:ext>
+                  </a:extLst>
+                </a:gridCol>
+              </a:tblGrid>
+              <a:tr h="715281">
+                <a:tc>
+                  <a:txBody>
+                    <a:bodyPr/>
+                    <a:lstStyle/>
+                    <a:p>
+                      <a:pPr algn="l" fontAlgn="b"/>
+                      <a:endParaRPr lang="en-IN" sz="3200" b="0" i="0" u="none" strike="noStrike">
+                        <a:effectLst/>
+                        <a:latin typeface="+mn-lt"/>
+                      </a:endParaRPr>
+                    </a:p>
+                  </a:txBody>
+                  <a:tcPr marL="7620" marR="7620" marT="7620" marB="0" anchor="b"/>
+                </a:tc>
+                <a:tc gridSpan="2">
+                  <a:txBody>
+                    <a:bodyPr/>
+                    <a:lstStyle/>
+                    <a:p>
+                      <a:pPr algn="ctr" fontAlgn="b"/>
+                      <a:r>
+                        <a:rPr lang="en-IN" sz="3200" u="none" strike="noStrike" dirty="0">
+                          <a:effectLst/>
+                          <a:latin typeface="+mn-lt"/>
+                        </a:rPr>
+                        <a:t>Jul-18</a:t>
+                      </a:r>
+                      <a:endParaRPr lang="en-IN" sz="3200" b="1" i="0" u="none" strike="noStrike" dirty="0">
+                        <a:effectLst/>
+                        <a:latin typeface="+mn-lt"/>
+                      </a:endParaRPr>
+                    </a:p>
+                  </a:txBody>
+                  <a:tcPr marL="7620" marR="7620" marT="7620" marB="0" anchor="b"/>
+                </a:tc>
+                <a:tc hMerge="1">
+                  <a:txBody>
+                    <a:bodyPr/>
+                    <a:lstStyle/>
+                    <a:p>
+                      <a:endParaRPr lang="en-IN"/>
+                    </a:p>
+                  </a:txBody>
+                  <a:tcPr/>
+                </a:tc>
+                <a:tc gridSpan="2">
+                  <a:txBody>
+                    <a:bodyPr/>
+                    <a:lstStyle/>
+                    <a:p>
+                      <a:pPr algn="ctr" fontAlgn="b"/>
+                      <a:r>
+                        <a:rPr lang="en-IN" sz="3200" u="none" strike="noStrike" dirty="0">
+                          <a:effectLst/>
+                          <a:latin typeface="+mn-lt"/>
+                        </a:rPr>
+                        <a:t>Dec-18</a:t>
+                      </a:r>
+                      <a:endParaRPr lang="en-IN" sz="3200" b="1" i="0" u="none" strike="noStrike" dirty="0">
+                        <a:effectLst/>
+                        <a:latin typeface="+mn-lt"/>
+                      </a:endParaRPr>
+                    </a:p>
+                  </a:txBody>
+                  <a:tcPr marL="7620" marR="7620" marT="7620" marB="0" anchor="b"/>
+                </a:tc>
+                <a:tc hMerge="1">
+                  <a:txBody>
+                    <a:bodyPr/>
+                    <a:lstStyle/>
+                    <a:p>
+                      <a:endParaRPr lang="en-IN"/>
+                    </a:p>
+                  </a:txBody>
+                  <a:tcPr/>
+                </a:tc>
+                <a:tc>
+                  <a:txBody>
+                    <a:bodyPr/>
+                    <a:lstStyle/>
+                    <a:p>
+                      <a:pPr algn="l" fontAlgn="b"/>
+                      <a:endParaRPr lang="en-IN" sz="3200" b="0" i="0" u="none" strike="noStrike">
+                        <a:effectLst/>
+                        <a:latin typeface="+mn-lt"/>
+                      </a:endParaRPr>
+                    </a:p>
+                  </a:txBody>
+                  <a:tcPr marL="7620" marR="7620" marT="7620" marB="0" anchor="b"/>
+                </a:tc>
+                <a:extLst>
+                  <a:ext uri="{0D108BD9-81ED-4DB2-BD59-A6C34878D82A}">
+                    <a16:rowId xmlns:a16="http://schemas.microsoft.com/office/drawing/2014/main" val="1506807140"/>
+                  </a:ext>
+                </a:extLst>
+              </a:tr>
+              <a:tr h="715281">
+                <a:tc>
+                  <a:txBody>
+                    <a:bodyPr/>
+                    <a:lstStyle/>
+                    <a:p>
+                      <a:pPr algn="ctr" fontAlgn="b"/>
+                      <a:r>
+                        <a:rPr lang="en-IN" sz="3200" u="none" strike="noStrike">
+                          <a:effectLst/>
+                          <a:latin typeface="+mn-lt"/>
+                        </a:rPr>
+                        <a:t>Year</a:t>
+                      </a:r>
+                      <a:endParaRPr lang="en-IN" sz="3200" b="1" i="0" u="none" strike="noStrike">
+                        <a:effectLst/>
+                        <a:latin typeface="+mn-lt"/>
+                      </a:endParaRPr>
+                    </a:p>
+                  </a:txBody>
+                  <a:tcPr marL="7620" marR="7620" marT="7620" marB="0" anchor="b"/>
+                </a:tc>
+                <a:tc>
+                  <a:txBody>
+                    <a:bodyPr/>
+                    <a:lstStyle/>
+                    <a:p>
+                      <a:pPr algn="ctr" fontAlgn="b"/>
+                      <a:r>
+                        <a:rPr lang="en-IN" sz="3200" u="none" strike="noStrike" dirty="0">
+                          <a:effectLst/>
+                          <a:latin typeface="+mn-lt"/>
+                        </a:rPr>
+                        <a:t>Tuition Fees</a:t>
+                      </a:r>
+                      <a:endParaRPr lang="en-IN" sz="3200" b="1" i="0" u="none" strike="noStrike" dirty="0">
+                        <a:effectLst/>
+                        <a:latin typeface="+mn-lt"/>
+                      </a:endParaRPr>
+                    </a:p>
+                  </a:txBody>
+                  <a:tcPr marL="7620" marR="7620" marT="7620" marB="0" anchor="b"/>
+                </a:tc>
+                <a:tc>
+                  <a:txBody>
+                    <a:bodyPr/>
+                    <a:lstStyle/>
+                    <a:p>
+                      <a:pPr algn="ctr" fontAlgn="b"/>
+                      <a:r>
+                        <a:rPr lang="en-IN" sz="3200" u="none" strike="noStrike" dirty="0">
+                          <a:effectLst/>
+                          <a:latin typeface="+mn-lt"/>
+                        </a:rPr>
+                        <a:t>Hostel Fees</a:t>
+                      </a:r>
+                      <a:endParaRPr lang="en-IN" sz="3200" b="1" i="0" u="none" strike="noStrike" dirty="0">
+                        <a:effectLst/>
+                        <a:latin typeface="+mn-lt"/>
+                      </a:endParaRPr>
+                    </a:p>
+                  </a:txBody>
+                  <a:tcPr marL="7620" marR="7620" marT="7620" marB="0" anchor="b"/>
+                </a:tc>
+                <a:tc>
+                  <a:txBody>
+                    <a:bodyPr/>
+                    <a:lstStyle/>
+                    <a:p>
+                      <a:pPr algn="ctr" fontAlgn="b"/>
+                      <a:r>
+                        <a:rPr lang="en-IN" sz="3200" u="none" strike="noStrike" dirty="0">
+                          <a:effectLst/>
+                          <a:latin typeface="+mn-lt"/>
+                        </a:rPr>
+                        <a:t>Tuition Fees</a:t>
+                      </a:r>
+                      <a:endParaRPr lang="en-IN" sz="3200" b="1" i="0" u="none" strike="noStrike" dirty="0">
+                        <a:effectLst/>
+                        <a:latin typeface="+mn-lt"/>
+                      </a:endParaRPr>
+                    </a:p>
+                  </a:txBody>
+                  <a:tcPr marL="7620" marR="7620" marT="7620" marB="0" anchor="b"/>
+                </a:tc>
+                <a:tc>
+                  <a:txBody>
+                    <a:bodyPr/>
+                    <a:lstStyle/>
+                    <a:p>
+                      <a:pPr algn="ctr" fontAlgn="b"/>
+                      <a:r>
+                        <a:rPr lang="en-IN" sz="3200" u="none" strike="noStrike">
+                          <a:effectLst/>
+                          <a:latin typeface="+mn-lt"/>
+                        </a:rPr>
+                        <a:t>Hostel Fees</a:t>
+                      </a:r>
+                      <a:endParaRPr lang="en-IN" sz="3200" b="1" i="0" u="none" strike="noStrike">
+                        <a:effectLst/>
+                        <a:latin typeface="+mn-lt"/>
+                      </a:endParaRPr>
+                    </a:p>
+                  </a:txBody>
+                  <a:tcPr marL="7620" marR="7620" marT="7620" marB="0" anchor="b"/>
+                </a:tc>
+                <a:tc>
+                  <a:txBody>
+                    <a:bodyPr/>
+                    <a:lstStyle/>
+                    <a:p>
+                      <a:pPr algn="l" fontAlgn="b"/>
+                      <a:endParaRPr lang="en-IN" sz="3200" b="0" i="0" u="none" strike="noStrike">
+                        <a:effectLst/>
+                        <a:latin typeface="+mn-lt"/>
+                      </a:endParaRPr>
+                    </a:p>
+                  </a:txBody>
+                  <a:tcPr marL="7620" marR="7620" marT="7620" marB="0" anchor="b"/>
+                </a:tc>
+                <a:extLst>
+                  <a:ext uri="{0D108BD9-81ED-4DB2-BD59-A6C34878D82A}">
+                    <a16:rowId xmlns:a16="http://schemas.microsoft.com/office/drawing/2014/main" val="3427448352"/>
+                  </a:ext>
+                </a:extLst>
+              </a:tr>
+              <a:tr h="732312">
+                <a:tc>
+                  <a:txBody>
+                    <a:bodyPr/>
+                    <a:lstStyle/>
+                    <a:p>
+                      <a:pPr algn="ctr" fontAlgn="b"/>
+                      <a:r>
+                        <a:rPr lang="en-IN" sz="3200" u="none" strike="noStrike">
+                          <a:effectLst/>
+                          <a:latin typeface="+mn-lt"/>
+                        </a:rPr>
+                        <a:t>I</a:t>
+                      </a:r>
+                      <a:endParaRPr lang="en-IN" sz="3200" b="0" i="0" u="none" strike="noStrike">
+                        <a:effectLst/>
+                        <a:latin typeface="+mn-lt"/>
+                      </a:endParaRPr>
+                    </a:p>
+                  </a:txBody>
+                  <a:tcPr marL="7620" marR="7620" marT="7620" marB="0" anchor="b"/>
+                </a:tc>
+                <a:tc>
+                  <a:txBody>
+                    <a:bodyPr/>
+                    <a:lstStyle/>
+                    <a:p>
+                      <a:pPr algn="r" fontAlgn="b"/>
+                      <a:r>
+                        <a:rPr lang="en-IN" sz="3200" u="none" strike="noStrike" dirty="0">
+                          <a:effectLst/>
+                          <a:latin typeface="+mn-lt"/>
+                        </a:rPr>
+                        <a:t>₹0</a:t>
+                      </a:r>
+                      <a:endParaRPr lang="en-IN" sz="3200" b="0" i="0" u="none" strike="noStrike" dirty="0">
+                        <a:effectLst/>
+                        <a:latin typeface="+mn-lt"/>
+                      </a:endParaRPr>
+                    </a:p>
+                  </a:txBody>
+                  <a:tcPr marL="7620" marR="7620" marT="7620" marB="0" anchor="b"/>
+                </a:tc>
+                <a:tc>
+                  <a:txBody>
+                    <a:bodyPr/>
+                    <a:lstStyle/>
+                    <a:p>
+                      <a:pPr algn="r" fontAlgn="b"/>
+                      <a:r>
+                        <a:rPr lang="en-IN" sz="3200" u="none" strike="noStrike">
+                          <a:effectLst/>
+                          <a:latin typeface="+mn-lt"/>
+                        </a:rPr>
+                        <a:t>₹0</a:t>
+                      </a:r>
+                      <a:endParaRPr lang="en-IN" sz="3200" b="0" i="0" u="none" strike="noStrike">
+                        <a:effectLst/>
+                        <a:latin typeface="+mn-lt"/>
+                      </a:endParaRPr>
+                    </a:p>
+                  </a:txBody>
+                  <a:tcPr marL="7620" marR="7620" marT="7620" marB="0" anchor="b"/>
+                </a:tc>
+                <a:tc>
+                  <a:txBody>
+                    <a:bodyPr/>
+                    <a:lstStyle/>
+                    <a:p>
+                      <a:pPr algn="r" fontAlgn="b"/>
+                      <a:r>
+                        <a:rPr lang="en-IN" sz="3200" u="none" strike="noStrike">
+                          <a:effectLst/>
+                          <a:latin typeface="+mn-lt"/>
+                        </a:rPr>
+                        <a:t>₹84,850</a:t>
+                      </a:r>
+                      <a:endParaRPr lang="en-IN" sz="3200" b="0" i="0" u="none" strike="noStrike">
+                        <a:effectLst/>
+                        <a:latin typeface="+mn-lt"/>
+                      </a:endParaRPr>
+                    </a:p>
+                  </a:txBody>
+                  <a:tcPr marL="7620" marR="7620" marT="7620" marB="0" anchor="b"/>
+                </a:tc>
+                <a:tc>
+                  <a:txBody>
+                    <a:bodyPr/>
+                    <a:lstStyle/>
+                    <a:p>
+                      <a:pPr algn="r" fontAlgn="b"/>
+                      <a:r>
+                        <a:rPr lang="en-IN" sz="3200" u="none" strike="noStrike">
+                          <a:effectLst/>
+                          <a:latin typeface="+mn-lt"/>
+                        </a:rPr>
+                        <a:t>₹2,35,500</a:t>
+                      </a:r>
+                      <a:endParaRPr lang="en-IN" sz="3200" b="0" i="0" u="none" strike="noStrike">
+                        <a:effectLst/>
+                        <a:latin typeface="+mn-lt"/>
+                      </a:endParaRPr>
+                    </a:p>
+                  </a:txBody>
+                  <a:tcPr marL="7620" marR="7620" marT="7620" marB="0" anchor="b"/>
+                </a:tc>
+                <a:tc>
+                  <a:txBody>
+                    <a:bodyPr/>
+                    <a:lstStyle/>
+                    <a:p>
+                      <a:pPr algn="r" fontAlgn="b"/>
+                      <a:r>
+                        <a:rPr lang="en-IN" sz="3200" u="none" strike="noStrike">
+                          <a:effectLst/>
+                          <a:latin typeface="+mn-lt"/>
+                        </a:rPr>
+                        <a:t>₹3,20,350</a:t>
+                      </a:r>
+                      <a:endParaRPr lang="en-IN" sz="3200" b="1" i="0" u="none" strike="noStrike">
+                        <a:effectLst/>
+                        <a:latin typeface="+mn-lt"/>
+                      </a:endParaRPr>
+                    </a:p>
+                  </a:txBody>
+                  <a:tcPr marL="7620" marR="7620" marT="7620" marB="0" anchor="b"/>
+                </a:tc>
+                <a:extLst>
+                  <a:ext uri="{0D108BD9-81ED-4DB2-BD59-A6C34878D82A}">
+                    <a16:rowId xmlns:a16="http://schemas.microsoft.com/office/drawing/2014/main" val="2453385880"/>
+                  </a:ext>
+                </a:extLst>
+              </a:tr>
+              <a:tr h="732312">
+                <a:tc>
+                  <a:txBody>
+                    <a:bodyPr/>
+                    <a:lstStyle/>
+                    <a:p>
+                      <a:pPr algn="ctr" fontAlgn="b"/>
+                      <a:r>
+                        <a:rPr lang="en-IN" sz="3200" u="none" strike="noStrike">
+                          <a:effectLst/>
+                          <a:latin typeface="+mn-lt"/>
+                        </a:rPr>
+                        <a:t>II</a:t>
+                      </a:r>
+                      <a:endParaRPr lang="en-IN" sz="3200" b="0" i="0" u="none" strike="noStrike">
+                        <a:effectLst/>
+                        <a:latin typeface="+mn-lt"/>
+                      </a:endParaRPr>
+                    </a:p>
+                  </a:txBody>
+                  <a:tcPr marL="7620" marR="7620" marT="7620" marB="0" anchor="b"/>
+                </a:tc>
+                <a:tc>
+                  <a:txBody>
+                    <a:bodyPr/>
+                    <a:lstStyle/>
+                    <a:p>
+                      <a:pPr algn="r" fontAlgn="b"/>
+                      <a:r>
+                        <a:rPr lang="en-IN" sz="3200" u="none" strike="noStrike">
+                          <a:effectLst/>
+                          <a:latin typeface="+mn-lt"/>
+                        </a:rPr>
+                        <a:t>₹0</a:t>
+                      </a:r>
+                      <a:endParaRPr lang="en-IN" sz="3200" b="0" i="0" u="none" strike="noStrike">
+                        <a:effectLst/>
+                        <a:latin typeface="+mn-lt"/>
+                      </a:endParaRPr>
+                    </a:p>
+                  </a:txBody>
+                  <a:tcPr marL="7620" marR="7620" marT="7620" marB="0" anchor="b"/>
+                </a:tc>
+                <a:tc>
+                  <a:txBody>
+                    <a:bodyPr/>
+                    <a:lstStyle/>
+                    <a:p>
+                      <a:pPr algn="r" fontAlgn="b"/>
+                      <a:r>
+                        <a:rPr lang="en-IN" sz="3200" u="none" strike="noStrike">
+                          <a:effectLst/>
+                          <a:latin typeface="+mn-lt"/>
+                        </a:rPr>
+                        <a:t>₹30,739</a:t>
+                      </a:r>
+                      <a:endParaRPr lang="en-IN" sz="3200" b="0" i="0" u="none" strike="noStrike">
+                        <a:effectLst/>
+                        <a:latin typeface="+mn-lt"/>
+                      </a:endParaRPr>
+                    </a:p>
+                  </a:txBody>
+                  <a:tcPr marL="7620" marR="7620" marT="7620" marB="0" anchor="b"/>
+                </a:tc>
+                <a:tc>
+                  <a:txBody>
+                    <a:bodyPr/>
+                    <a:lstStyle/>
+                    <a:p>
+                      <a:pPr algn="r" fontAlgn="b"/>
+                      <a:r>
+                        <a:rPr lang="en-IN" sz="3200" u="none" strike="noStrike" dirty="0">
+                          <a:effectLst/>
+                          <a:latin typeface="+mn-lt"/>
+                        </a:rPr>
+                        <a:t>₹43,475</a:t>
+                      </a:r>
+                      <a:endParaRPr lang="en-IN" sz="3200" b="0" i="0" u="none" strike="noStrike" dirty="0">
+                        <a:effectLst/>
+                        <a:latin typeface="+mn-lt"/>
+                      </a:endParaRPr>
+                    </a:p>
+                  </a:txBody>
+                  <a:tcPr marL="7620" marR="7620" marT="7620" marB="0" anchor="b"/>
+                </a:tc>
+                <a:tc>
+                  <a:txBody>
+                    <a:bodyPr/>
+                    <a:lstStyle/>
+                    <a:p>
+                      <a:pPr algn="r" fontAlgn="b"/>
+                      <a:r>
+                        <a:rPr lang="en-IN" sz="3200" u="none" strike="noStrike">
+                          <a:effectLst/>
+                          <a:latin typeface="+mn-lt"/>
+                        </a:rPr>
+                        <a:t>₹1,18,816</a:t>
+                      </a:r>
+                      <a:endParaRPr lang="en-IN" sz="3200" b="0" i="0" u="none" strike="noStrike">
+                        <a:effectLst/>
+                        <a:latin typeface="+mn-lt"/>
+                      </a:endParaRPr>
+                    </a:p>
+                  </a:txBody>
+                  <a:tcPr marL="7620" marR="7620" marT="7620" marB="0" anchor="b"/>
+                </a:tc>
+                <a:tc>
+                  <a:txBody>
+                    <a:bodyPr/>
+                    <a:lstStyle/>
+                    <a:p>
+                      <a:pPr algn="r" fontAlgn="b"/>
+                      <a:r>
+                        <a:rPr lang="en-IN" sz="3200" u="none" strike="noStrike">
+                          <a:effectLst/>
+                          <a:latin typeface="+mn-lt"/>
+                        </a:rPr>
+                        <a:t>₹1,93,030</a:t>
+                      </a:r>
+                      <a:endParaRPr lang="en-IN" sz="3200" b="1" i="0" u="none" strike="noStrike">
+                        <a:effectLst/>
+                        <a:latin typeface="+mn-lt"/>
+                      </a:endParaRPr>
+                    </a:p>
+                  </a:txBody>
+                  <a:tcPr marL="7620" marR="7620" marT="7620" marB="0" anchor="b"/>
+                </a:tc>
+                <a:extLst>
+                  <a:ext uri="{0D108BD9-81ED-4DB2-BD59-A6C34878D82A}">
+                    <a16:rowId xmlns:a16="http://schemas.microsoft.com/office/drawing/2014/main" val="1693619294"/>
+                  </a:ext>
+                </a:extLst>
+              </a:tr>
+              <a:tr h="732312">
+                <a:tc>
+                  <a:txBody>
+                    <a:bodyPr/>
+                    <a:lstStyle/>
+                    <a:p>
+                      <a:pPr algn="ctr" fontAlgn="b"/>
+                      <a:r>
+                        <a:rPr lang="en-IN" sz="3200" u="none" strike="noStrike">
+                          <a:effectLst/>
+                          <a:latin typeface="+mn-lt"/>
+                        </a:rPr>
+                        <a:t>III</a:t>
+                      </a:r>
+                      <a:endParaRPr lang="en-IN" sz="3200" b="0" i="0" u="none" strike="noStrike">
+                        <a:effectLst/>
+                        <a:latin typeface="+mn-lt"/>
+                      </a:endParaRPr>
+                    </a:p>
+                  </a:txBody>
+                  <a:tcPr marL="7620" marR="7620" marT="7620" marB="0" anchor="b"/>
+                </a:tc>
+                <a:tc>
+                  <a:txBody>
+                    <a:bodyPr/>
+                    <a:lstStyle/>
+                    <a:p>
+                      <a:pPr algn="r" fontAlgn="b"/>
+                      <a:r>
+                        <a:rPr lang="en-IN" sz="3200" u="none" strike="noStrike">
+                          <a:effectLst/>
+                          <a:latin typeface="+mn-lt"/>
+                        </a:rPr>
+                        <a:t>₹0</a:t>
+                      </a:r>
+                      <a:endParaRPr lang="en-IN" sz="3200" b="0" i="0" u="none" strike="noStrike">
+                        <a:effectLst/>
+                        <a:latin typeface="+mn-lt"/>
+                      </a:endParaRPr>
+                    </a:p>
+                  </a:txBody>
+                  <a:tcPr marL="7620" marR="7620" marT="7620" marB="0" anchor="b"/>
+                </a:tc>
+                <a:tc>
+                  <a:txBody>
+                    <a:bodyPr/>
+                    <a:lstStyle/>
+                    <a:p>
+                      <a:pPr algn="r" fontAlgn="b"/>
+                      <a:r>
+                        <a:rPr lang="en-IN" sz="3200" u="none" strike="noStrike">
+                          <a:effectLst/>
+                          <a:latin typeface="+mn-lt"/>
+                        </a:rPr>
+                        <a:t>₹0</a:t>
+                      </a:r>
+                      <a:endParaRPr lang="en-IN" sz="3200" b="0" i="0" u="none" strike="noStrike">
+                        <a:effectLst/>
+                        <a:latin typeface="+mn-lt"/>
+                      </a:endParaRPr>
+                    </a:p>
+                  </a:txBody>
+                  <a:tcPr marL="7620" marR="7620" marT="7620" marB="0" anchor="b"/>
+                </a:tc>
+                <a:tc>
+                  <a:txBody>
+                    <a:bodyPr/>
+                    <a:lstStyle/>
+                    <a:p>
+                      <a:pPr algn="r" fontAlgn="b"/>
+                      <a:r>
+                        <a:rPr lang="en-IN" sz="3200" u="none" strike="noStrike">
+                          <a:effectLst/>
+                          <a:latin typeface="+mn-lt"/>
+                        </a:rPr>
+                        <a:t>₹10,380</a:t>
+                      </a:r>
+                      <a:endParaRPr lang="en-IN" sz="3200" b="0" i="0" u="none" strike="noStrike">
+                        <a:effectLst/>
+                        <a:latin typeface="+mn-lt"/>
+                      </a:endParaRPr>
+                    </a:p>
+                  </a:txBody>
+                  <a:tcPr marL="7620" marR="7620" marT="7620" marB="0" anchor="b"/>
+                </a:tc>
+                <a:tc>
+                  <a:txBody>
+                    <a:bodyPr/>
+                    <a:lstStyle/>
+                    <a:p>
+                      <a:pPr algn="r" fontAlgn="b"/>
+                      <a:r>
+                        <a:rPr lang="en-IN" sz="3200" u="none" strike="noStrike">
+                          <a:effectLst/>
+                          <a:latin typeface="+mn-lt"/>
+                        </a:rPr>
+                        <a:t>₹46,428</a:t>
+                      </a:r>
+                      <a:endParaRPr lang="en-IN" sz="3200" b="0" i="0" u="none" strike="noStrike">
+                        <a:effectLst/>
+                        <a:latin typeface="+mn-lt"/>
+                      </a:endParaRPr>
+                    </a:p>
+                  </a:txBody>
+                  <a:tcPr marL="7620" marR="7620" marT="7620" marB="0" anchor="b"/>
+                </a:tc>
+                <a:tc>
+                  <a:txBody>
+                    <a:bodyPr/>
+                    <a:lstStyle/>
+                    <a:p>
+                      <a:pPr algn="r" fontAlgn="b"/>
+                      <a:r>
+                        <a:rPr lang="en-IN" sz="3200" u="none" strike="noStrike">
+                          <a:effectLst/>
+                          <a:latin typeface="+mn-lt"/>
+                        </a:rPr>
+                        <a:t>₹56,808</a:t>
+                      </a:r>
+                      <a:endParaRPr lang="en-IN" sz="3200" b="1" i="0" u="none" strike="noStrike">
+                        <a:effectLst/>
+                        <a:latin typeface="+mn-lt"/>
+                      </a:endParaRPr>
+                    </a:p>
+                  </a:txBody>
+                  <a:tcPr marL="7620" marR="7620" marT="7620" marB="0" anchor="b"/>
+                </a:tc>
+                <a:extLst>
+                  <a:ext uri="{0D108BD9-81ED-4DB2-BD59-A6C34878D82A}">
+                    <a16:rowId xmlns:a16="http://schemas.microsoft.com/office/drawing/2014/main" val="2909148743"/>
+                  </a:ext>
+                </a:extLst>
+              </a:tr>
+              <a:tr h="749343">
+                <a:tc>
+                  <a:txBody>
+                    <a:bodyPr/>
+                    <a:lstStyle/>
+                    <a:p>
+                      <a:pPr algn="ctr" fontAlgn="b"/>
+                      <a:r>
+                        <a:rPr lang="en-IN" sz="3200" u="none" strike="noStrike">
+                          <a:effectLst/>
+                          <a:latin typeface="+mn-lt"/>
+                        </a:rPr>
+                        <a:t>IV</a:t>
+                      </a:r>
+                      <a:endParaRPr lang="en-IN" sz="3200" b="0" i="0" u="none" strike="noStrike">
+                        <a:effectLst/>
+                        <a:latin typeface="+mn-lt"/>
+                      </a:endParaRPr>
+                    </a:p>
+                  </a:txBody>
+                  <a:tcPr marL="7620" marR="7620" marT="7620" marB="0" anchor="b"/>
+                </a:tc>
+                <a:tc>
+                  <a:txBody>
+                    <a:bodyPr/>
+                    <a:lstStyle/>
+                    <a:p>
+                      <a:pPr algn="r" fontAlgn="b"/>
+                      <a:r>
+                        <a:rPr lang="en-IN" sz="3200" u="none" strike="noStrike">
+                          <a:effectLst/>
+                          <a:latin typeface="+mn-lt"/>
+                        </a:rPr>
+                        <a:t>₹0</a:t>
+                      </a:r>
+                      <a:endParaRPr lang="en-IN" sz="3200" b="0" i="0" u="none" strike="noStrike">
+                        <a:effectLst/>
+                        <a:latin typeface="+mn-lt"/>
+                      </a:endParaRPr>
+                    </a:p>
+                  </a:txBody>
+                  <a:tcPr marL="7620" marR="7620" marT="7620" marB="0" anchor="b"/>
+                </a:tc>
+                <a:tc>
+                  <a:txBody>
+                    <a:bodyPr/>
+                    <a:lstStyle/>
+                    <a:p>
+                      <a:pPr algn="r" fontAlgn="b"/>
+                      <a:r>
+                        <a:rPr lang="en-IN" sz="3200" u="none" strike="noStrike" dirty="0">
+                          <a:effectLst/>
+                          <a:latin typeface="+mn-lt"/>
+                        </a:rPr>
+                        <a:t>₹55,922</a:t>
+                      </a:r>
+                      <a:endParaRPr lang="en-IN" sz="3200" b="0" i="0" u="none" strike="noStrike" dirty="0">
+                        <a:effectLst/>
+                        <a:latin typeface="+mn-lt"/>
+                      </a:endParaRPr>
+                    </a:p>
+                  </a:txBody>
+                  <a:tcPr marL="7620" marR="7620" marT="7620" marB="0" anchor="b"/>
+                </a:tc>
+                <a:tc>
+                  <a:txBody>
+                    <a:bodyPr/>
+                    <a:lstStyle/>
+                    <a:p>
+                      <a:pPr algn="r" fontAlgn="b"/>
+                      <a:r>
+                        <a:rPr lang="en-IN" sz="3200" u="none" strike="noStrike" dirty="0">
+                          <a:effectLst/>
+                          <a:latin typeface="+mn-lt"/>
+                        </a:rPr>
+                        <a:t>₹7,715</a:t>
+                      </a:r>
+                      <a:endParaRPr lang="en-IN" sz="3200" b="0" i="0" u="none" strike="noStrike" dirty="0">
+                        <a:effectLst/>
+                        <a:latin typeface="+mn-lt"/>
+                      </a:endParaRPr>
+                    </a:p>
+                  </a:txBody>
+                  <a:tcPr marL="7620" marR="7620" marT="7620" marB="0" anchor="b"/>
+                </a:tc>
+                <a:tc>
+                  <a:txBody>
+                    <a:bodyPr/>
+                    <a:lstStyle/>
+                    <a:p>
+                      <a:pPr algn="r" fontAlgn="b"/>
+                      <a:r>
+                        <a:rPr lang="en-IN" sz="3200" u="none" strike="noStrike">
+                          <a:effectLst/>
+                          <a:latin typeface="+mn-lt"/>
+                        </a:rPr>
+                        <a:t>₹83,747</a:t>
+                      </a:r>
+                      <a:endParaRPr lang="en-IN" sz="3200" b="0" i="0" u="none" strike="noStrike">
+                        <a:effectLst/>
+                        <a:latin typeface="+mn-lt"/>
+                      </a:endParaRPr>
+                    </a:p>
+                  </a:txBody>
+                  <a:tcPr marL="7620" marR="7620" marT="7620" marB="0" anchor="b"/>
+                </a:tc>
+                <a:tc>
+                  <a:txBody>
+                    <a:bodyPr/>
+                    <a:lstStyle/>
+                    <a:p>
+                      <a:pPr algn="r" fontAlgn="b"/>
+                      <a:r>
+                        <a:rPr lang="en-IN" sz="3200" u="none" strike="noStrike">
+                          <a:effectLst/>
+                          <a:latin typeface="+mn-lt"/>
+                        </a:rPr>
+                        <a:t>₹1,47,384</a:t>
+                      </a:r>
+                      <a:endParaRPr lang="en-IN" sz="3200" b="1" i="0" u="none" strike="noStrike">
+                        <a:effectLst/>
+                        <a:latin typeface="+mn-lt"/>
+                      </a:endParaRPr>
+                    </a:p>
+                  </a:txBody>
+                  <a:tcPr marL="7620" marR="7620" marT="7620" marB="0" anchor="b"/>
+                </a:tc>
+                <a:extLst>
+                  <a:ext uri="{0D108BD9-81ED-4DB2-BD59-A6C34878D82A}">
+                    <a16:rowId xmlns:a16="http://schemas.microsoft.com/office/drawing/2014/main" val="2361735879"/>
+                  </a:ext>
+                </a:extLst>
+              </a:tr>
+              <a:tr h="749343">
+                <a:tc>
+                  <a:txBody>
+                    <a:bodyPr/>
+                    <a:lstStyle/>
+                    <a:p>
+                      <a:pPr algn="ctr" fontAlgn="b"/>
+                      <a:r>
+                        <a:rPr lang="en-IN" sz="3200" u="none" strike="noStrike">
+                          <a:effectLst/>
+                          <a:latin typeface="+mn-lt"/>
+                        </a:rPr>
+                        <a:t>Total</a:t>
+                      </a:r>
+                      <a:endParaRPr lang="en-IN" sz="3200" b="0" i="0" u="none" strike="noStrike">
+                        <a:effectLst/>
+                        <a:latin typeface="+mn-lt"/>
+                      </a:endParaRPr>
+                    </a:p>
+                  </a:txBody>
+                  <a:tcPr marL="7620" marR="7620" marT="7620" marB="0" anchor="b"/>
+                </a:tc>
+                <a:tc>
+                  <a:txBody>
+                    <a:bodyPr/>
+                    <a:lstStyle/>
+                    <a:p>
+                      <a:pPr algn="r" fontAlgn="b"/>
+                      <a:r>
+                        <a:rPr lang="en-IN" sz="3200" u="none" strike="noStrike">
+                          <a:effectLst/>
+                          <a:latin typeface="+mn-lt"/>
+                        </a:rPr>
+                        <a:t>₹0</a:t>
+                      </a:r>
+                      <a:endParaRPr lang="en-IN" sz="3200" b="1" i="0" u="none" strike="noStrike">
+                        <a:effectLst/>
+                        <a:latin typeface="+mn-lt"/>
+                      </a:endParaRPr>
+                    </a:p>
+                  </a:txBody>
+                  <a:tcPr marL="7620" marR="7620" marT="7620" marB="0" anchor="b"/>
+                </a:tc>
+                <a:tc>
+                  <a:txBody>
+                    <a:bodyPr/>
+                    <a:lstStyle/>
+                    <a:p>
+                      <a:pPr algn="r" fontAlgn="b"/>
+                      <a:r>
+                        <a:rPr lang="en-IN" sz="3200" u="none" strike="noStrike">
+                          <a:effectLst/>
+                          <a:latin typeface="+mn-lt"/>
+                        </a:rPr>
+                        <a:t>₹86,661</a:t>
+                      </a:r>
+                      <a:endParaRPr lang="en-IN" sz="3200" b="1" i="0" u="none" strike="noStrike">
+                        <a:effectLst/>
+                        <a:latin typeface="+mn-lt"/>
+                      </a:endParaRPr>
+                    </a:p>
+                  </a:txBody>
+                  <a:tcPr marL="7620" marR="7620" marT="7620" marB="0" anchor="b"/>
+                </a:tc>
+                <a:tc>
+                  <a:txBody>
+                    <a:bodyPr/>
+                    <a:lstStyle/>
+                    <a:p>
+                      <a:pPr algn="r" fontAlgn="b"/>
+                      <a:r>
+                        <a:rPr lang="en-IN" sz="3200" u="none" strike="noStrike" dirty="0">
+                          <a:effectLst/>
+                          <a:latin typeface="+mn-lt"/>
+                        </a:rPr>
+                        <a:t>₹1,46,420</a:t>
+                      </a:r>
+                      <a:endParaRPr lang="en-IN" sz="3200" b="1" i="0" u="none" strike="noStrike" dirty="0">
+                        <a:effectLst/>
+                        <a:latin typeface="+mn-lt"/>
+                      </a:endParaRPr>
+                    </a:p>
+                  </a:txBody>
+                  <a:tcPr marL="7620" marR="7620" marT="7620" marB="0" anchor="b"/>
+                </a:tc>
+                <a:tc>
+                  <a:txBody>
+                    <a:bodyPr/>
+                    <a:lstStyle/>
+                    <a:p>
+                      <a:pPr algn="r" fontAlgn="b"/>
+                      <a:r>
+                        <a:rPr lang="en-IN" sz="3200" u="none" strike="noStrike">
+                          <a:effectLst/>
+                          <a:latin typeface="+mn-lt"/>
+                        </a:rPr>
+                        <a:t>₹4,84,491</a:t>
+                      </a:r>
+                      <a:endParaRPr lang="en-IN" sz="3200" b="1" i="0" u="none" strike="noStrike">
+                        <a:effectLst/>
+                        <a:latin typeface="+mn-lt"/>
+                      </a:endParaRPr>
+                    </a:p>
+                  </a:txBody>
+                  <a:tcPr marL="7620" marR="7620" marT="7620" marB="0" anchor="b"/>
+                </a:tc>
+                <a:tc>
+                  <a:txBody>
+                    <a:bodyPr/>
+                    <a:lstStyle/>
+                    <a:p>
+                      <a:pPr algn="r" fontAlgn="b"/>
+                      <a:r>
+                        <a:rPr lang="en-IN" sz="3200" u="none" strike="noStrike" dirty="0">
+                          <a:effectLst/>
+                          <a:latin typeface="+mn-lt"/>
+                        </a:rPr>
+                        <a:t>₹7,17,572</a:t>
+                      </a:r>
+                      <a:endParaRPr lang="en-IN" sz="3200" b="1" i="0" u="none" strike="noStrike" dirty="0">
+                        <a:effectLst/>
+                        <a:latin typeface="+mn-lt"/>
+                      </a:endParaRPr>
+                    </a:p>
+                  </a:txBody>
+                  <a:tcPr marL="7620" marR="7620" marT="7620" marB="0" anchor="b"/>
+                </a:tc>
+                <a:extLst>
+                  <a:ext uri="{0D108BD9-81ED-4DB2-BD59-A6C34878D82A}">
+                    <a16:rowId xmlns:a16="http://schemas.microsoft.com/office/drawing/2014/main" val="669371411"/>
+                  </a:ext>
+                </a:extLst>
+              </a:tr>
+            </a:tbl>
+          </a:graphicData>
+        </a:graphic>
+      </p:graphicFrame>
     </p:spTree>
     <p:extLst>
       <p:ext uri="{BB962C8B-B14F-4D97-AF65-F5344CB8AC3E}">
@@ -31203,7 +31002,7 @@
       </p:grpSpPr>
       <p:graphicFrame>
         <p:nvGraphicFramePr>
-          <p:cNvPr id="4" name="Chart 3">
+          <p:cNvPr id="3" name="Chart 2">
             <a:extLst>
               <a:ext uri="{FF2B5EF4-FFF2-40B4-BE49-F238E27FC236}">
                 <a16:creationId xmlns:a16="http://schemas.microsoft.com/office/drawing/2014/main" id="{27A7FC2C-AFAD-45F1-8F50-A5296476F72E}"/>
@@ -31216,14 +31015,14 @@
           <p:nvPr>
             <p:extLst>
               <p:ext uri="{D42A27DB-BD31-4B8C-83A1-F6EECF244321}">
-                <p14:modId xmlns:p14="http://schemas.microsoft.com/office/powerpoint/2010/main" val="326158213"/>
+                <p14:modId xmlns:p14="http://schemas.microsoft.com/office/powerpoint/2010/main" val="184183958"/>
               </p:ext>
             </p:extLst>
           </p:nvPr>
         </p:nvGraphicFramePr>
         <p:xfrm>
-          <a:off x="341152" y="515924"/>
-          <a:ext cx="11509695" cy="6342076"/>
+          <a:off x="129308" y="203200"/>
+          <a:ext cx="11970327" cy="6654800"/>
         </p:xfrm>
         <a:graphic>
           <a:graphicData uri="http://schemas.openxmlformats.org/drawingml/2006/chart">
@@ -31276,14 +31075,14 @@
           <p:nvPr>
             <p:extLst>
               <p:ext uri="{D42A27DB-BD31-4B8C-83A1-F6EECF244321}">
-                <p14:modId xmlns:p14="http://schemas.microsoft.com/office/powerpoint/2010/main" val="3829900630"/>
+                <p14:modId xmlns:p14="http://schemas.microsoft.com/office/powerpoint/2010/main" val="1619153366"/>
               </p:ext>
             </p:extLst>
           </p:nvPr>
         </p:nvGraphicFramePr>
         <p:xfrm>
-          <a:off x="385894" y="0"/>
-          <a:ext cx="11249635" cy="6857999"/>
+          <a:off x="0" y="92278"/>
+          <a:ext cx="12650598" cy="6765721"/>
         </p:xfrm>
         <a:graphic>
           <a:graphicData uri="http://schemas.openxmlformats.org/drawingml/2006/chart">
@@ -31336,14 +31135,14 @@
           <p:nvPr>
             <p:extLst>
               <p:ext uri="{D42A27DB-BD31-4B8C-83A1-F6EECF244321}">
-                <p14:modId xmlns:p14="http://schemas.microsoft.com/office/powerpoint/2010/main" val="1521172428"/>
+                <p14:modId xmlns:p14="http://schemas.microsoft.com/office/powerpoint/2010/main" val="1305175055"/>
               </p:ext>
             </p:extLst>
           </p:nvPr>
         </p:nvGraphicFramePr>
         <p:xfrm>
           <a:off x="-858982" y="-654865"/>
-          <a:ext cx="12936138" cy="8167729"/>
+          <a:ext cx="13050982" cy="8167729"/>
         </p:xfrm>
         <a:graphic>
           <a:graphicData uri="http://schemas.openxmlformats.org/drawingml/2006/chart">
@@ -31396,14 +31195,14 @@
           <p:nvPr>
             <p:extLst>
               <p:ext uri="{D42A27DB-BD31-4B8C-83A1-F6EECF244321}">
-                <p14:modId xmlns:p14="http://schemas.microsoft.com/office/powerpoint/2010/main" val="3301514994"/>
+                <p14:modId xmlns:p14="http://schemas.microsoft.com/office/powerpoint/2010/main" val="217466803"/>
               </p:ext>
             </p:extLst>
           </p:nvPr>
         </p:nvGraphicFramePr>
         <p:xfrm>
-          <a:off x="58724" y="117446"/>
-          <a:ext cx="12013034" cy="6652469"/>
+          <a:off x="58724" y="205531"/>
+          <a:ext cx="12133276" cy="6652469"/>
         </p:xfrm>
         <a:graphic>
           <a:graphicData uri="http://schemas.openxmlformats.org/drawingml/2006/chart">
@@ -31411,6 +31210,142 @@
           </a:graphicData>
         </a:graphic>
       </p:graphicFrame>
+      <p:sp>
+        <p:nvSpPr>
+          <p:cNvPr id="5" name="TextBox 1">
+            <a:extLst>
+              <a:ext uri="{FF2B5EF4-FFF2-40B4-BE49-F238E27FC236}">
+                <a16:creationId xmlns:a16="http://schemas.microsoft.com/office/drawing/2014/main" id="{CE47AA83-FEAE-4B97-A018-726A7AF2738D}"/>
+              </a:ext>
+            </a:extLst>
+          </p:cNvPr>
+          <p:cNvSpPr txBox="1"/>
+          <p:nvPr/>
+        </p:nvSpPr>
+        <p:spPr>
+          <a:xfrm>
+            <a:off x="8599054" y="1568298"/>
+            <a:ext cx="3676073" cy="1633984"/>
+          </a:xfrm>
+          <a:prstGeom prst="rect">
+            <a:avLst/>
+          </a:prstGeom>
+          <a:ln>
+            <a:solidFill>
+              <a:schemeClr val="accent1"/>
+            </a:solidFill>
+          </a:ln>
+        </p:spPr>
+        <p:txBody>
+          <a:bodyPr wrap="square" rtlCol="0"/>
+          <a:lstStyle>
+            <a:lvl1pPr marL="0" indent="0">
+              <a:defRPr sz="1100">
+                <a:latin typeface="+mn-lt"/>
+                <a:ea typeface="+mn-ea"/>
+                <a:cs typeface="+mn-cs"/>
+              </a:defRPr>
+            </a:lvl1pPr>
+            <a:lvl2pPr marL="457200" indent="0">
+              <a:defRPr sz="1100">
+                <a:latin typeface="+mn-lt"/>
+                <a:ea typeface="+mn-ea"/>
+                <a:cs typeface="+mn-cs"/>
+              </a:defRPr>
+            </a:lvl2pPr>
+            <a:lvl3pPr marL="914400" indent="0">
+              <a:defRPr sz="1100">
+                <a:latin typeface="+mn-lt"/>
+                <a:ea typeface="+mn-ea"/>
+                <a:cs typeface="+mn-cs"/>
+              </a:defRPr>
+            </a:lvl3pPr>
+            <a:lvl4pPr marL="1371600" indent="0">
+              <a:defRPr sz="1100">
+                <a:latin typeface="+mn-lt"/>
+                <a:ea typeface="+mn-ea"/>
+                <a:cs typeface="+mn-cs"/>
+              </a:defRPr>
+            </a:lvl4pPr>
+            <a:lvl5pPr marL="1828800" indent="0">
+              <a:defRPr sz="1100">
+                <a:latin typeface="+mn-lt"/>
+                <a:ea typeface="+mn-ea"/>
+                <a:cs typeface="+mn-cs"/>
+              </a:defRPr>
+            </a:lvl5pPr>
+            <a:lvl6pPr marL="2286000" indent="0">
+              <a:defRPr sz="1100">
+                <a:latin typeface="+mn-lt"/>
+                <a:ea typeface="+mn-ea"/>
+                <a:cs typeface="+mn-cs"/>
+              </a:defRPr>
+            </a:lvl6pPr>
+            <a:lvl7pPr marL="2743200" indent="0">
+              <a:defRPr sz="1100">
+                <a:latin typeface="+mn-lt"/>
+                <a:ea typeface="+mn-ea"/>
+                <a:cs typeface="+mn-cs"/>
+              </a:defRPr>
+            </a:lvl7pPr>
+            <a:lvl8pPr marL="3200400" indent="0">
+              <a:defRPr sz="1100">
+                <a:latin typeface="+mn-lt"/>
+                <a:ea typeface="+mn-ea"/>
+                <a:cs typeface="+mn-cs"/>
+              </a:defRPr>
+            </a:lvl8pPr>
+            <a:lvl9pPr marL="3657600" indent="0">
+              <a:defRPr sz="1100">
+                <a:latin typeface="+mn-lt"/>
+                <a:ea typeface="+mn-ea"/>
+                <a:cs typeface="+mn-cs"/>
+              </a:defRPr>
+            </a:lvl9pPr>
+          </a:lstStyle>
+          <a:p>
+            <a:r>
+              <a:rPr lang="en-IN" sz="2400" b="0" dirty="0">
+                <a:latin typeface="+mn-lt"/>
+              </a:rPr>
+              <a:t>Branch</a:t>
+            </a:r>
+          </a:p>
+          <a:p>
+            <a:r>
+              <a:rPr lang="en-IN" sz="2400" b="0" dirty="0">
+                <a:latin typeface="+mn-lt"/>
+              </a:rPr>
+              <a:t># contributed </a:t>
+            </a:r>
+          </a:p>
+          <a:p>
+            <a:r>
+              <a:rPr lang="en-IN" sz="2400" b="0" dirty="0">
+                <a:latin typeface="+mn-lt"/>
+              </a:rPr>
+              <a:t>total donations </a:t>
+            </a:r>
+          </a:p>
+          <a:p>
+            <a:r>
+              <a:rPr lang="en-IN" sz="2400" b="0" dirty="0">
+                <a:latin typeface="+mn-lt"/>
+              </a:rPr>
+              <a:t>percentage/total</a:t>
+            </a:r>
+            <a:r>
+              <a:rPr lang="en-IN" sz="2400" b="0" baseline="0" dirty="0">
+                <a:latin typeface="+mn-lt"/>
+              </a:rPr>
+              <a:t> donations</a:t>
+            </a:r>
+            <a:endParaRPr lang="en-IN" sz="2400" b="0" dirty="0">
+              <a:latin typeface="+mn-lt"/>
+            </a:endParaRPr>
+          </a:p>
+        </p:txBody>
+      </p:sp>
     </p:spTree>
     <p:extLst>
       <p:ext uri="{BB962C8B-B14F-4D97-AF65-F5344CB8AC3E}">

</xml_diff>